<commit_message>
Final draft for modelling in poster
</commit_message>
<xml_diff>
--- a/Poster/WDN_poster_R.pptx
+++ b/Poster/WDN_poster_R.pptx
@@ -366,7 +366,7 @@
               <a:pPr>
                 <a:defRPr/>
               </a:pPr>
-              <a:t>‹nr.›</a:t>
+              <a:t>‹#›</a:t>
             </a:fld>
             <a:endParaRPr lang="da-DK" altLang="en-US" dirty="0"/>
           </a:p>
@@ -580,7 +580,7 @@
               <a:pPr>
                 <a:defRPr/>
               </a:pPr>
-              <a:t>‹nr.›</a:t>
+              <a:t>‹#›</a:t>
             </a:fld>
             <a:endParaRPr lang="da-DK" altLang="en-US" dirty="0"/>
           </a:p>
@@ -804,7 +804,7 @@
               <a:pPr>
                 <a:defRPr/>
               </a:pPr>
-              <a:t>‹nr.›</a:t>
+              <a:t>‹#›</a:t>
             </a:fld>
             <a:endParaRPr lang="da-DK" altLang="en-US" dirty="0"/>
           </a:p>
@@ -1018,7 +1018,7 @@
               <a:pPr>
                 <a:defRPr/>
               </a:pPr>
-              <a:t>‹nr.›</a:t>
+              <a:t>‹#›</a:t>
             </a:fld>
             <a:endParaRPr lang="da-DK" altLang="en-US" dirty="0"/>
           </a:p>
@@ -1254,7 +1254,7 @@
               <a:pPr>
                 <a:defRPr/>
               </a:pPr>
-              <a:t>‹nr.›</a:t>
+              <a:t>‹#›</a:t>
             </a:fld>
             <a:endParaRPr lang="da-DK" altLang="en-US" dirty="0"/>
           </a:p>
@@ -1586,7 +1586,7 @@
               <a:pPr>
                 <a:defRPr/>
               </a:pPr>
-              <a:t>‹nr.›</a:t>
+              <a:t>‹#›</a:t>
             </a:fld>
             <a:endParaRPr lang="da-DK" altLang="en-US" dirty="0"/>
           </a:p>
@@ -2052,7 +2052,7 @@
               <a:pPr>
                 <a:defRPr/>
               </a:pPr>
-              <a:t>‹nr.›</a:t>
+              <a:t>‹#›</a:t>
             </a:fld>
             <a:endParaRPr lang="da-DK" altLang="en-US" dirty="0"/>
           </a:p>
@@ -2214,7 +2214,7 @@
               <a:pPr>
                 <a:defRPr/>
               </a:pPr>
-              <a:t>‹nr.›</a:t>
+              <a:t>‹#›</a:t>
             </a:fld>
             <a:endParaRPr lang="da-DK" altLang="en-US" dirty="0"/>
           </a:p>
@@ -2353,7 +2353,7 @@
               <a:pPr>
                 <a:defRPr/>
               </a:pPr>
-              <a:t>‹nr.›</a:t>
+              <a:t>‹#›</a:t>
             </a:fld>
             <a:endParaRPr lang="da-DK" altLang="en-US" dirty="0"/>
           </a:p>
@@ -2674,7 +2674,7 @@
               <a:pPr>
                 <a:defRPr/>
               </a:pPr>
-              <a:t>‹nr.›</a:t>
+              <a:t>‹#›</a:t>
             </a:fld>
             <a:endParaRPr lang="da-DK" altLang="en-US" dirty="0"/>
           </a:p>
@@ -2972,7 +2972,7 @@
               <a:pPr>
                 <a:defRPr/>
               </a:pPr>
-              <a:t>‹nr.›</a:t>
+              <a:t>‹#›</a:t>
             </a:fld>
             <a:endParaRPr lang="da-DK" altLang="en-US" dirty="0"/>
           </a:p>
@@ -3333,7 +3333,7 @@
               <a:pPr>
                 <a:defRPr/>
               </a:pPr>
-              <a:t>‹nr.›</a:t>
+              <a:t>‹#›</a:t>
             </a:fld>
             <a:endParaRPr lang="da-DK" altLang="en-US" dirty="0"/>
           </a:p>
@@ -3773,8 +3773,8 @@
         </p:nvSpPr>
         <p:spPr bwMode="auto">
           <a:xfrm>
-            <a:off x="378504" y="10077727"/>
-            <a:ext cx="29489400" cy="13145709"/>
+            <a:off x="378504" y="9419415"/>
+            <a:ext cx="29489400" cy="13804022"/>
           </a:xfrm>
           <a:prstGeom prst="roundRect">
             <a:avLst>
@@ -5703,7 +5703,7 @@
           <p:nvPr/>
         </p:nvPicPr>
         <p:blipFill>
-          <a:blip r:embed="rId2">
+          <a:blip r:embed="rId3">
             <a:extLst>
               <a:ext uri="{28A0092B-C50C-407E-A947-70E740481C1C}">
                 <a14:useLocalDpi xmlns:a14="http://schemas.microsoft.com/office/drawing/2010/main" val="0"/>
@@ -7279,7 +7279,7 @@
                 <a:buNone/>
               </a:pPr>
               <a:r>
-                <a:rPr lang="en-GB" altLang="en-US" sz="6600">
+                <a:rPr lang="en-GB" altLang="en-US" sz="6600" dirty="0">
                   <a:latin typeface="Helvetica" panose="020B0604020202020204" pitchFamily="34" charset="0"/>
                   <a:cs typeface="Helvetica" panose="020B0604020202020204" pitchFamily="34" charset="0"/>
                 </a:rPr>
@@ -7304,7 +7304,7 @@
           <p:nvPr/>
         </p:nvPicPr>
         <p:blipFill>
-          <a:blip r:embed="rId3">
+          <a:blip r:embed="rId4">
             <a:extLst>
               <a:ext uri="{28A0092B-C50C-407E-A947-70E740481C1C}">
                 <a14:useLocalDpi xmlns:a14="http://schemas.microsoft.com/office/drawing/2010/main" val="0"/>
@@ -9553,7 +9553,7 @@
           <p:nvPr/>
         </p:nvPicPr>
         <p:blipFill>
-          <a:blip r:embed="rId4">
+          <a:blip r:embed="rId5">
             <a:extLst>
               <a:ext uri="{28A0092B-C50C-407E-A947-70E740481C1C}">
                 <a14:useLocalDpi xmlns:a14="http://schemas.microsoft.com/office/drawing/2010/main" val="0"/>
@@ -9589,7 +9589,7 @@
           <p:nvPr/>
         </p:nvPicPr>
         <p:blipFill>
-          <a:blip r:embed="rId5">
+          <a:blip r:embed="rId6">
             <a:extLst>
               <a:ext uri="{28A0092B-C50C-407E-A947-70E740481C1C}">
                 <a14:useLocalDpi xmlns:a14="http://schemas.microsoft.com/office/drawing/2010/main" val="0"/>
@@ -9625,7 +9625,7 @@
           <p:nvPr/>
         </p:nvPicPr>
         <p:blipFill>
-          <a:blip r:embed="rId6">
+          <a:blip r:embed="rId7">
             <a:extLst>
               <a:ext uri="{28A0092B-C50C-407E-A947-70E740481C1C}">
                 <a14:useLocalDpi xmlns:a14="http://schemas.microsoft.com/office/drawing/2010/main" val="0"/>
@@ -9661,7 +9661,7 @@
           <p:nvPr/>
         </p:nvPicPr>
         <p:blipFill>
-          <a:blip r:embed="rId7">
+          <a:blip r:embed="rId8">
             <a:extLst>
               <a:ext uri="{28A0092B-C50C-407E-A947-70E740481C1C}">
                 <a14:useLocalDpi xmlns:a14="http://schemas.microsoft.com/office/drawing/2010/main" val="0"/>
@@ -10018,45 +10018,15 @@
       </p:sp>
       <p:pic>
         <p:nvPicPr>
-          <p:cNvPr id="5" name="Billede 4">
+          <p:cNvPr id="11" name="Billede 10">
             <a:extLst>
               <a:ext uri="{FF2B5EF4-FFF2-40B4-BE49-F238E27FC236}">
-                <a16:creationId xmlns:a16="http://schemas.microsoft.com/office/drawing/2014/main" id="{AD51FC40-D383-48EE-9340-0FF88DB36855}"/>
+                <a16:creationId xmlns:a16="http://schemas.microsoft.com/office/drawing/2014/main" id="{F8476A85-22C7-487F-97E4-B750455386E1}"/>
               </a:ext>
             </a:extLst>
           </p:cNvPr>
           <p:cNvPicPr>
             <a:picLocks noChangeAspect="1"/>
-          </p:cNvPicPr>
-          <p:nvPr/>
-        </p:nvPicPr>
-        <p:blipFill>
-          <a:blip r:embed="rId8"/>
-          <a:stretch>
-            <a:fillRect/>
-          </a:stretch>
-        </p:blipFill>
-        <p:spPr>
-          <a:xfrm>
-            <a:off x="10796453" y="10570611"/>
-            <a:ext cx="7953263" cy="11666849"/>
-          </a:xfrm>
-          <a:prstGeom prst="rect">
-            <a:avLst/>
-          </a:prstGeom>
-        </p:spPr>
-      </p:pic>
-      <p:pic>
-        <p:nvPicPr>
-          <p:cNvPr id="13341" name="Picture 8">
-            <a:extLst>
-              <a:ext uri="{FF2B5EF4-FFF2-40B4-BE49-F238E27FC236}">
-                <a16:creationId xmlns:a16="http://schemas.microsoft.com/office/drawing/2014/main" id="{B959DBC8-D19A-6441-8E3E-3CDF14ED708A}"/>
-              </a:ext>
-            </a:extLst>
-          </p:cNvPr>
-          <p:cNvPicPr>
-            <a:picLocks noChangeAspect="1" noChangeArrowheads="1"/>
           </p:cNvPicPr>
           <p:nvPr/>
         </p:nvPicPr>
@@ -10068,50 +10038,26 @@
               </a:ext>
             </a:extLst>
           </a:blip>
-          <a:srcRect/>
           <a:stretch>
             <a:fillRect/>
           </a:stretch>
         </p:blipFill>
-        <p:spPr bwMode="auto">
+        <p:spPr>
           <a:xfrm>
-            <a:off x="12261143" y="10990487"/>
-            <a:ext cx="5264770" cy="2436630"/>
+            <a:off x="21850135" y="3132136"/>
+            <a:ext cx="7613865" cy="5431981"/>
           </a:xfrm>
           <a:prstGeom prst="rect">
             <a:avLst/>
           </a:prstGeom>
-          <a:noFill/>
-          <a:ln>
-            <a:noFill/>
-          </a:ln>
-          <a:extLst>
-            <a:ext uri="{909E8E84-426E-40DD-AFC4-6F175D3DCCD1}">
-              <a14:hiddenFill xmlns:a14="http://schemas.microsoft.com/office/drawing/2010/main">
-                <a:solidFill>
-                  <a:srgbClr val="FFFFFF"/>
-                </a:solidFill>
-              </a14:hiddenFill>
-            </a:ext>
-            <a:ext uri="{91240B29-F687-4F45-9708-019B960494DF}">
-              <a14:hiddenLine xmlns:a14="http://schemas.microsoft.com/office/drawing/2010/main" w="9525">
-                <a:solidFill>
-                  <a:srgbClr val="000000"/>
-                </a:solidFill>
-                <a:miter lim="800000"/>
-                <a:headEnd/>
-                <a:tailEnd/>
-              </a14:hiddenLine>
-            </a:ext>
-          </a:extLst>
         </p:spPr>
       </p:pic>
       <p:pic>
         <p:nvPicPr>
-          <p:cNvPr id="11" name="Billede 10">
+          <p:cNvPr id="8" name="Picture 7">
             <a:extLst>
               <a:ext uri="{FF2B5EF4-FFF2-40B4-BE49-F238E27FC236}">
-                <a16:creationId xmlns:a16="http://schemas.microsoft.com/office/drawing/2014/main" id="{F8476A85-22C7-487F-97E4-B750455386E1}"/>
+                <a16:creationId xmlns:a16="http://schemas.microsoft.com/office/drawing/2014/main" id="{9DE72C86-46F9-427C-8B36-E911496E5E9B}"/>
               </a:ext>
             </a:extLst>
           </p:cNvPr>
@@ -10134,20 +10080,210 @@
         </p:blipFill>
         <p:spPr>
           <a:xfrm>
-            <a:off x="21850135" y="3132136"/>
-            <a:ext cx="7613865" cy="5431981"/>
+            <a:off x="39587745" y="15383958"/>
+            <a:ext cx="28322510" cy="12047166"/>
           </a:xfrm>
           <a:prstGeom prst="rect">
             <a:avLst/>
           </a:prstGeom>
         </p:spPr>
       </p:pic>
+      <p:sp>
+        <p:nvSpPr>
+          <p:cNvPr id="61" name="Text Box 62">
+            <a:extLst>
+              <a:ext uri="{FF2B5EF4-FFF2-40B4-BE49-F238E27FC236}">
+                <a16:creationId xmlns:a16="http://schemas.microsoft.com/office/drawing/2014/main" id="{DB4E3378-0EAE-440F-B5BA-577BC4B04699}"/>
+              </a:ext>
+            </a:extLst>
+          </p:cNvPr>
+          <p:cNvSpPr txBox="1">
+            <a:spLocks noChangeArrowheads="1"/>
+          </p:cNvSpPr>
+          <p:nvPr/>
+        </p:nvSpPr>
+        <p:spPr bwMode="auto">
+          <a:xfrm>
+            <a:off x="11388710" y="9529024"/>
+            <a:ext cx="7011856" cy="1107996"/>
+          </a:xfrm>
+          <a:prstGeom prst="rect">
+            <a:avLst/>
+          </a:prstGeom>
+          <a:noFill/>
+          <a:ln>
+            <a:noFill/>
+          </a:ln>
+          <a:extLst>
+            <a:ext uri="{909E8E84-426E-40DD-AFC4-6F175D3DCCD1}">
+              <a14:hiddenFill xmlns:a14="http://schemas.microsoft.com/office/drawing/2010/main">
+                <a:solidFill>
+                  <a:srgbClr val="FFFFFF"/>
+                </a:solidFill>
+              </a14:hiddenFill>
+            </a:ext>
+            <a:ext uri="{91240B29-F687-4F45-9708-019B960494DF}">
+              <a14:hiddenLine xmlns:a14="http://schemas.microsoft.com/office/drawing/2010/main" w="9525">
+                <a:solidFill>
+                  <a:srgbClr val="000000"/>
+                </a:solidFill>
+                <a:miter lim="800000"/>
+                <a:headEnd/>
+                <a:tailEnd/>
+              </a14:hiddenLine>
+            </a:ext>
+          </a:extLst>
+        </p:spPr>
+        <p:txBody>
+          <a:bodyPr wrap="none">
+            <a:spAutoFit/>
+          </a:bodyPr>
+          <a:lstStyle>
+            <a:lvl1pPr defTabSz="4173538">
+              <a:spcBef>
+                <a:spcPct val="20000"/>
+              </a:spcBef>
+              <a:buChar char="•"/>
+              <a:defRPr sz="14600">
+                <a:solidFill>
+                  <a:schemeClr val="tx1"/>
+                </a:solidFill>
+                <a:latin typeface="Arial" panose="020B0604020202020204" pitchFamily="34" charset="0"/>
+              </a:defRPr>
+            </a:lvl1pPr>
+            <a:lvl2pPr marL="742950" indent="-285750" defTabSz="4173538">
+              <a:spcBef>
+                <a:spcPct val="20000"/>
+              </a:spcBef>
+              <a:buChar char="–"/>
+              <a:defRPr sz="12800">
+                <a:solidFill>
+                  <a:schemeClr val="tx1"/>
+                </a:solidFill>
+                <a:latin typeface="Arial" panose="020B0604020202020204" pitchFamily="34" charset="0"/>
+              </a:defRPr>
+            </a:lvl2pPr>
+            <a:lvl3pPr marL="1143000" indent="-228600" defTabSz="4173538">
+              <a:spcBef>
+                <a:spcPct val="20000"/>
+              </a:spcBef>
+              <a:buChar char="•"/>
+              <a:defRPr sz="11000">
+                <a:solidFill>
+                  <a:schemeClr val="tx1"/>
+                </a:solidFill>
+                <a:latin typeface="Arial" panose="020B0604020202020204" pitchFamily="34" charset="0"/>
+              </a:defRPr>
+            </a:lvl3pPr>
+            <a:lvl4pPr marL="1600200" indent="-228600" defTabSz="4173538">
+              <a:spcBef>
+                <a:spcPct val="20000"/>
+              </a:spcBef>
+              <a:buChar char="–"/>
+              <a:defRPr sz="9100">
+                <a:solidFill>
+                  <a:schemeClr val="tx1"/>
+                </a:solidFill>
+                <a:latin typeface="Arial" panose="020B0604020202020204" pitchFamily="34" charset="0"/>
+              </a:defRPr>
+            </a:lvl4pPr>
+            <a:lvl5pPr marL="2057400" indent="-228600" defTabSz="4173538">
+              <a:spcBef>
+                <a:spcPct val="20000"/>
+              </a:spcBef>
+              <a:buChar char="»"/>
+              <a:defRPr sz="9100">
+                <a:solidFill>
+                  <a:schemeClr val="tx1"/>
+                </a:solidFill>
+                <a:latin typeface="Arial" panose="020B0604020202020204" pitchFamily="34" charset="0"/>
+              </a:defRPr>
+            </a:lvl5pPr>
+            <a:lvl6pPr marL="2514600" indent="-228600" defTabSz="4173538" eaLnBrk="0" fontAlgn="base" hangingPunct="0">
+              <a:spcBef>
+                <a:spcPct val="20000"/>
+              </a:spcBef>
+              <a:spcAft>
+                <a:spcPct val="0"/>
+              </a:spcAft>
+              <a:buChar char="»"/>
+              <a:defRPr sz="9100">
+                <a:solidFill>
+                  <a:schemeClr val="tx1"/>
+                </a:solidFill>
+                <a:latin typeface="Arial" panose="020B0604020202020204" pitchFamily="34" charset="0"/>
+              </a:defRPr>
+            </a:lvl6pPr>
+            <a:lvl7pPr marL="2971800" indent="-228600" defTabSz="4173538" eaLnBrk="0" fontAlgn="base" hangingPunct="0">
+              <a:spcBef>
+                <a:spcPct val="20000"/>
+              </a:spcBef>
+              <a:spcAft>
+                <a:spcPct val="0"/>
+              </a:spcAft>
+              <a:buChar char="»"/>
+              <a:defRPr sz="9100">
+                <a:solidFill>
+                  <a:schemeClr val="tx1"/>
+                </a:solidFill>
+                <a:latin typeface="Arial" panose="020B0604020202020204" pitchFamily="34" charset="0"/>
+              </a:defRPr>
+            </a:lvl7pPr>
+            <a:lvl8pPr marL="3429000" indent="-228600" defTabSz="4173538" eaLnBrk="0" fontAlgn="base" hangingPunct="0">
+              <a:spcBef>
+                <a:spcPct val="20000"/>
+              </a:spcBef>
+              <a:spcAft>
+                <a:spcPct val="0"/>
+              </a:spcAft>
+              <a:buChar char="»"/>
+              <a:defRPr sz="9100">
+                <a:solidFill>
+                  <a:schemeClr val="tx1"/>
+                </a:solidFill>
+                <a:latin typeface="Arial" panose="020B0604020202020204" pitchFamily="34" charset="0"/>
+              </a:defRPr>
+            </a:lvl8pPr>
+            <a:lvl9pPr marL="3886200" indent="-228600" defTabSz="4173538" eaLnBrk="0" fontAlgn="base" hangingPunct="0">
+              <a:spcBef>
+                <a:spcPct val="20000"/>
+              </a:spcBef>
+              <a:spcAft>
+                <a:spcPct val="0"/>
+              </a:spcAft>
+              <a:buChar char="»"/>
+              <a:defRPr sz="9100">
+                <a:solidFill>
+                  <a:schemeClr val="tx1"/>
+                </a:solidFill>
+                <a:latin typeface="Arial" panose="020B0604020202020204" pitchFamily="34" charset="0"/>
+              </a:defRPr>
+            </a:lvl9pPr>
+          </a:lstStyle>
+          <a:p>
+            <a:pPr eaLnBrk="1" hangingPunct="1">
+              <a:spcBef>
+                <a:spcPct val="0"/>
+              </a:spcBef>
+              <a:buFontTx/>
+              <a:buNone/>
+            </a:pPr>
+            <a:r>
+              <a:rPr lang="en-GB" altLang="en-US" sz="6600" dirty="0">
+                <a:latin typeface="Helvetica" panose="020B0604020202020204" pitchFamily="34" charset="0"/>
+                <a:cs typeface="Helvetica" panose="020B0604020202020204" pitchFamily="34" charset="0"/>
+              </a:rPr>
+              <a:t>Modelling, design </a:t>
+            </a:r>
+          </a:p>
+        </p:txBody>
+      </p:sp>
       <p:pic>
         <p:nvPicPr>
-          <p:cNvPr id="19" name="Billede 18">
+          <p:cNvPr id="27" name="Picture 26">
             <a:extLst>
               <a:ext uri="{FF2B5EF4-FFF2-40B4-BE49-F238E27FC236}">
-                <a16:creationId xmlns:a16="http://schemas.microsoft.com/office/drawing/2014/main" id="{E8FF3C74-DF35-4663-A1F0-2A9E1E316D18}"/>
+                <a16:creationId xmlns:a16="http://schemas.microsoft.com/office/drawing/2014/main" id="{5B129D72-8E8E-4048-937A-5F807E49DBE3}"/>
               </a:ext>
             </a:extLst>
           </p:cNvPr>
@@ -10170,8 +10306,8 @@
         </p:blipFill>
         <p:spPr>
           <a:xfrm>
-            <a:off x="867320" y="10398943"/>
-            <a:ext cx="28334493" cy="11998378"/>
+            <a:off x="719931" y="10660063"/>
+            <a:ext cx="28744069" cy="12226480"/>
           </a:xfrm>
           <a:prstGeom prst="rect">
             <a:avLst/>
@@ -10180,10 +10316,10 @@
       </p:pic>
       <p:pic>
         <p:nvPicPr>
-          <p:cNvPr id="21" name="Billede 20">
+          <p:cNvPr id="4" name="Picture 3">
             <a:extLst>
               <a:ext uri="{FF2B5EF4-FFF2-40B4-BE49-F238E27FC236}">
-                <a16:creationId xmlns:a16="http://schemas.microsoft.com/office/drawing/2014/main" id="{1777C856-8D4B-4A35-932C-540EB440ACB8}"/>
+                <a16:creationId xmlns:a16="http://schemas.microsoft.com/office/drawing/2014/main" id="{C849BEC9-D98F-49D9-B71F-84238995EEB6}"/>
               </a:ext>
             </a:extLst>
           </p:cNvPr>
@@ -10200,8 +10336,281 @@
         </p:blipFill>
         <p:spPr>
           <a:xfrm>
-            <a:off x="20836731" y="11634357"/>
-            <a:ext cx="7530077" cy="3799659"/>
+            <a:off x="1690772" y="14411700"/>
+            <a:ext cx="6401602" cy="2843088"/>
+          </a:xfrm>
+          <a:prstGeom prst="rect">
+            <a:avLst/>
+          </a:prstGeom>
+        </p:spPr>
+      </p:pic>
+      <p:pic>
+        <p:nvPicPr>
+          <p:cNvPr id="13341" name="Picture 8">
+            <a:extLst>
+              <a:ext uri="{FF2B5EF4-FFF2-40B4-BE49-F238E27FC236}">
+                <a16:creationId xmlns:a16="http://schemas.microsoft.com/office/drawing/2014/main" id="{B959DBC8-D19A-6441-8E3E-3CDF14ED708A}"/>
+              </a:ext>
+            </a:extLst>
+          </p:cNvPr>
+          <p:cNvPicPr>
+            <a:picLocks noChangeAspect="1" noChangeArrowheads="1"/>
+          </p:cNvPicPr>
+          <p:nvPr/>
+        </p:nvPicPr>
+        <p:blipFill>
+          <a:blip r:embed="rId13">
+            <a:extLst>
+              <a:ext uri="{28A0092B-C50C-407E-A947-70E740481C1C}">
+                <a14:useLocalDpi xmlns:a14="http://schemas.microsoft.com/office/drawing/2010/main" val="0"/>
+              </a:ext>
+            </a:extLst>
+          </a:blip>
+          <a:srcRect/>
+          <a:stretch>
+            <a:fillRect/>
+          </a:stretch>
+        </p:blipFill>
+        <p:spPr bwMode="auto">
+          <a:xfrm>
+            <a:off x="12137919" y="11543464"/>
+            <a:ext cx="6077162" cy="2812619"/>
+          </a:xfrm>
+          <a:prstGeom prst="rect">
+            <a:avLst/>
+          </a:prstGeom>
+          <a:noFill/>
+          <a:ln>
+            <a:noFill/>
+          </a:ln>
+          <a:extLst>
+            <a:ext uri="{909E8E84-426E-40DD-AFC4-6F175D3DCCD1}">
+              <a14:hiddenFill xmlns:a14="http://schemas.microsoft.com/office/drawing/2010/main">
+                <a:solidFill>
+                  <a:srgbClr val="FFFFFF"/>
+                </a:solidFill>
+              </a14:hiddenFill>
+            </a:ext>
+            <a:ext uri="{91240B29-F687-4F45-9708-019B960494DF}">
+              <a14:hiddenLine xmlns:a14="http://schemas.microsoft.com/office/drawing/2010/main" w="9525">
+                <a:solidFill>
+                  <a:srgbClr val="000000"/>
+                </a:solidFill>
+                <a:miter lim="800000"/>
+                <a:headEnd/>
+                <a:tailEnd/>
+              </a14:hiddenLine>
+            </a:ext>
+          </a:extLst>
+        </p:spPr>
+      </p:pic>
+      <p:graphicFrame>
+        <p:nvGraphicFramePr>
+          <p:cNvPr id="12" name="Object 11">
+            <a:extLst>
+              <a:ext uri="{FF2B5EF4-FFF2-40B4-BE49-F238E27FC236}">
+                <a16:creationId xmlns:a16="http://schemas.microsoft.com/office/drawing/2014/main" id="{266A74DF-3BD5-446A-9847-83D83F74ABF3}"/>
+              </a:ext>
+            </a:extLst>
+          </p:cNvPr>
+          <p:cNvGraphicFramePr>
+            <a:graphicFrameLocks noChangeAspect="1"/>
+          </p:cNvGraphicFramePr>
+          <p:nvPr>
+            <p:extLst>
+              <p:ext uri="{D42A27DB-BD31-4B8C-83A1-F6EECF244321}">
+                <p14:modId xmlns:p14="http://schemas.microsoft.com/office/powerpoint/2010/main" val="1378411479"/>
+              </p:ext>
+            </p:extLst>
+          </p:nvPr>
+        </p:nvGraphicFramePr>
+        <p:xfrm>
+          <a:off x="21217732" y="13123952"/>
+          <a:ext cx="7882904" cy="4359927"/>
+        </p:xfrm>
+        <a:graphic>
+          <a:graphicData uri="http://schemas.openxmlformats.org/presentationml/2006/ole">
+            <mc:AlternateContent xmlns:mc="http://schemas.openxmlformats.org/markup-compatibility/2006">
+              <mc:Choice xmlns:v="urn:schemas-microsoft-com:vml" Requires="v">
+                <p:oleObj spid="_x0000_s1027" name="Acrobat Document" r:id="rId14" imgW="7715024" imgH="4267200" progId="Acrobat.Document.DC">
+                  <p:embed/>
+                </p:oleObj>
+              </mc:Choice>
+              <mc:Fallback>
+                <p:oleObj name="Acrobat Document" r:id="rId14" imgW="7715024" imgH="4267200" progId="Acrobat.Document.DC">
+                  <p:embed/>
+                  <p:pic>
+                    <p:nvPicPr>
+                      <p:cNvPr id="0" name=""/>
+                      <p:cNvPicPr/>
+                      <p:nvPr/>
+                    </p:nvPicPr>
+                    <p:blipFill>
+                      <a:blip r:embed="rId15"/>
+                      <a:stretch>
+                        <a:fillRect/>
+                      </a:stretch>
+                    </p:blipFill>
+                    <p:spPr>
+                      <a:xfrm>
+                        <a:off x="21217732" y="13123952"/>
+                        <a:ext cx="7882904" cy="4359927"/>
+                      </a:xfrm>
+                      <a:prstGeom prst="rect">
+                        <a:avLst/>
+                      </a:prstGeom>
+                    </p:spPr>
+                  </p:pic>
+                </p:oleObj>
+              </mc:Fallback>
+            </mc:AlternateContent>
+          </a:graphicData>
+        </a:graphic>
+      </p:graphicFrame>
+      <p:pic>
+        <p:nvPicPr>
+          <p:cNvPr id="16" name="Picture 15">
+            <a:extLst>
+              <a:ext uri="{FF2B5EF4-FFF2-40B4-BE49-F238E27FC236}">
+                <a16:creationId xmlns:a16="http://schemas.microsoft.com/office/drawing/2014/main" id="{F9AF0FFB-360E-4890-81F2-83D3EE785256}"/>
+              </a:ext>
+            </a:extLst>
+          </p:cNvPr>
+          <p:cNvPicPr>
+            <a:picLocks noChangeAspect="1"/>
+          </p:cNvPicPr>
+          <p:nvPr/>
+        </p:nvPicPr>
+        <p:blipFill>
+          <a:blip r:embed="rId16"/>
+          <a:stretch>
+            <a:fillRect/>
+          </a:stretch>
+        </p:blipFill>
+        <p:spPr>
+          <a:xfrm>
+            <a:off x="864017" y="19118432"/>
+            <a:ext cx="8142758" cy="3381626"/>
+          </a:xfrm>
+          <a:prstGeom prst="rect">
+            <a:avLst/>
+          </a:prstGeom>
+        </p:spPr>
+      </p:pic>
+      <p:pic>
+        <p:nvPicPr>
+          <p:cNvPr id="20" name="Picture 19">
+            <a:extLst>
+              <a:ext uri="{FF2B5EF4-FFF2-40B4-BE49-F238E27FC236}">
+                <a16:creationId xmlns:a16="http://schemas.microsoft.com/office/drawing/2014/main" id="{35F31AD6-3B1B-4228-8E29-193A9D7C2B51}"/>
+              </a:ext>
+            </a:extLst>
+          </p:cNvPr>
+          <p:cNvPicPr>
+            <a:picLocks noChangeAspect="1"/>
+          </p:cNvPicPr>
+          <p:nvPr/>
+        </p:nvPicPr>
+        <p:blipFill>
+          <a:blip r:embed="rId17"/>
+          <a:stretch>
+            <a:fillRect/>
+          </a:stretch>
+        </p:blipFill>
+        <p:spPr>
+          <a:xfrm>
+            <a:off x="15121731" y="17104109"/>
+            <a:ext cx="3893962" cy="301358"/>
+          </a:xfrm>
+          <a:prstGeom prst="rect">
+            <a:avLst/>
+          </a:prstGeom>
+        </p:spPr>
+      </p:pic>
+      <p:pic>
+        <p:nvPicPr>
+          <p:cNvPr id="23" name="Picture 22">
+            <a:extLst>
+              <a:ext uri="{FF2B5EF4-FFF2-40B4-BE49-F238E27FC236}">
+                <a16:creationId xmlns:a16="http://schemas.microsoft.com/office/drawing/2014/main" id="{F1E2E721-3DDF-4B56-9FF1-A12901654A0C}"/>
+              </a:ext>
+            </a:extLst>
+          </p:cNvPr>
+          <p:cNvPicPr>
+            <a:picLocks noChangeAspect="1"/>
+          </p:cNvPicPr>
+          <p:nvPr/>
+        </p:nvPicPr>
+        <p:blipFill>
+          <a:blip r:embed="rId18"/>
+          <a:stretch>
+            <a:fillRect/>
+          </a:stretch>
+        </p:blipFill>
+        <p:spPr>
+          <a:xfrm>
+            <a:off x="12477393" y="17060862"/>
+            <a:ext cx="1156472" cy="293612"/>
+          </a:xfrm>
+          <a:prstGeom prst="rect">
+            <a:avLst/>
+          </a:prstGeom>
+        </p:spPr>
+      </p:pic>
+      <p:pic>
+        <p:nvPicPr>
+          <p:cNvPr id="25" name="Picture 24">
+            <a:extLst>
+              <a:ext uri="{FF2B5EF4-FFF2-40B4-BE49-F238E27FC236}">
+                <a16:creationId xmlns:a16="http://schemas.microsoft.com/office/drawing/2014/main" id="{E39166FF-46FB-49E0-891F-DDB5B276E858}"/>
+              </a:ext>
+            </a:extLst>
+          </p:cNvPr>
+          <p:cNvPicPr>
+            <a:picLocks noChangeAspect="1"/>
+          </p:cNvPicPr>
+          <p:nvPr/>
+        </p:nvPicPr>
+        <p:blipFill>
+          <a:blip r:embed="rId19"/>
+          <a:stretch>
+            <a:fillRect/>
+          </a:stretch>
+        </p:blipFill>
+        <p:spPr>
+          <a:xfrm>
+            <a:off x="26162188" y="11833955"/>
+            <a:ext cx="2436794" cy="577733"/>
+          </a:xfrm>
+          <a:prstGeom prst="rect">
+            <a:avLst/>
+          </a:prstGeom>
+        </p:spPr>
+      </p:pic>
+      <p:pic>
+        <p:nvPicPr>
+          <p:cNvPr id="29" name="Picture 28">
+            <a:extLst>
+              <a:ext uri="{FF2B5EF4-FFF2-40B4-BE49-F238E27FC236}">
+                <a16:creationId xmlns:a16="http://schemas.microsoft.com/office/drawing/2014/main" id="{387D898F-5264-4249-BBEC-6DFA0D452937}"/>
+              </a:ext>
+            </a:extLst>
+          </p:cNvPr>
+          <p:cNvPicPr>
+            <a:picLocks noChangeAspect="1"/>
+          </p:cNvPicPr>
+          <p:nvPr/>
+        </p:nvPicPr>
+        <p:blipFill>
+          <a:blip r:embed="rId20"/>
+          <a:stretch>
+            <a:fillRect/>
+          </a:stretch>
+        </p:blipFill>
+        <p:spPr>
+          <a:xfrm>
+            <a:off x="25451963" y="10772370"/>
+            <a:ext cx="3708986" cy="1030692"/>
           </a:xfrm>
           <a:prstGeom prst="rect">
             <a:avLst/>

</xml_diff>

<commit_message>
Add drawio folder, changes to poster_R.pptx and a couple figures in /Poster
</commit_message>
<xml_diff>
--- a/Poster/WDN_poster_R.pptx
+++ b/Poster/WDN_poster_R.pptx
@@ -3948,8 +3948,8 @@
         </p:nvSpPr>
         <p:spPr bwMode="auto">
           <a:xfrm>
-            <a:off x="796925" y="373063"/>
-            <a:ext cx="28193206" cy="2431435"/>
+            <a:off x="431800" y="339393"/>
+            <a:ext cx="13937348" cy="1754326"/>
           </a:xfrm>
           <a:prstGeom prst="rect">
             <a:avLst/>
@@ -4113,11 +4113,18 @@
               <a:buNone/>
             </a:pPr>
             <a:r>
-              <a:rPr lang="en-GB" altLang="en-US" sz="9000" b="1" dirty="0">
+              <a:rPr lang="en-GB" altLang="en-US" sz="5400" b="1" dirty="0" err="1">
                 <a:latin typeface="Helvetica" panose="020B0604020202020204" pitchFamily="34" charset="0"/>
                 <a:cs typeface="Helvetica" panose="020B0604020202020204" pitchFamily="34" charset="0"/>
               </a:rPr>
-              <a:t>WDN …</a:t>
+              <a:t>Modeling</a:t>
+            </a:r>
+            <a:r>
+              <a:rPr lang="en-GB" altLang="en-US" sz="5400" b="1" dirty="0">
+                <a:latin typeface="Helvetica" panose="020B0604020202020204" pitchFamily="34" charset="0"/>
+                <a:cs typeface="Helvetica" panose="020B0604020202020204" pitchFamily="34" charset="0"/>
+              </a:rPr>
+              <a:t> and Networked Control of</a:t>
             </a:r>
           </a:p>
           <a:p>
@@ -4129,11 +4136,11 @@
               <a:buNone/>
             </a:pPr>
             <a:r>
-              <a:rPr lang="en-GB" altLang="en-US" sz="6200" dirty="0">
+              <a:rPr lang="en-GB" altLang="en-US" sz="5400" b="1" dirty="0">
                 <a:latin typeface="Helvetica" panose="020B0604020202020204" pitchFamily="34" charset="0"/>
                 <a:cs typeface="Helvetica" panose="020B0604020202020204" pitchFamily="34" charset="0"/>
               </a:rPr>
-              <a:t>Subtitle goes here</a:t>
+              <a:t>Water Distribution Networks</a:t>
             </a:r>
           </a:p>
         </p:txBody>
@@ -4154,8 +4161,8 @@
         </p:nvSpPr>
         <p:spPr bwMode="auto">
           <a:xfrm>
-            <a:off x="17004208" y="32386"/>
-            <a:ext cx="14493875" cy="1754187"/>
+            <a:off x="15488548" y="245046"/>
+            <a:ext cx="15637668" cy="2308324"/>
           </a:xfrm>
           <a:prstGeom prst="rect">
             <a:avLst/>
@@ -4185,7 +4192,7 @@
           </a:extLst>
         </p:spPr>
         <p:txBody>
-          <a:bodyPr>
+          <a:bodyPr wrap="square">
             <a:spAutoFit/>
           </a:bodyPr>
           <a:lstStyle>
@@ -4319,11 +4326,18 @@
               <a:buNone/>
             </a:pPr>
             <a:r>
+              <a:rPr lang="en-GB" altLang="en-US" sz="3600" b="1" dirty="0">
+                <a:latin typeface="Helvetica" panose="020B0604020202020204" pitchFamily="34" charset="0"/>
+                <a:cs typeface="Helvetica" panose="020B0604020202020204" pitchFamily="34" charset="0"/>
+              </a:rPr>
+              <a:t>Authors</a:t>
+            </a:r>
+            <a:r>
               <a:rPr lang="en-GB" altLang="en-US" sz="3600" dirty="0">
                 <a:latin typeface="Helvetica" panose="020B0604020202020204" pitchFamily="34" charset="0"/>
                 <a:cs typeface="Helvetica" panose="020B0604020202020204" pitchFamily="34" charset="0"/>
               </a:rPr>
-              <a:t>Author names</a:t>
+              <a:t>: Laurits H. Andersen, Mathias C. Frederiksen,</a:t>
             </a:r>
           </a:p>
           <a:p>
@@ -4339,7 +4353,48 @@
                 <a:latin typeface="Helvetica" panose="020B0604020202020204" pitchFamily="34" charset="0"/>
                 <a:cs typeface="Helvetica" panose="020B0604020202020204" pitchFamily="34" charset="0"/>
               </a:rPr>
-              <a:t>Address, Department of Electronic Systems, Aalborg University, Denmark</a:t>
+              <a:t>Christian M. Jensen, Jeppe N. Jensen, Rasmus L. Kristiansen, Kasper </a:t>
+            </a:r>
+            <a:r>
+              <a:rPr lang="en-GB" altLang="en-US" sz="3600" dirty="0" err="1">
+                <a:latin typeface="Helvetica" panose="020B0604020202020204" pitchFamily="34" charset="0"/>
+                <a:cs typeface="Helvetica" panose="020B0604020202020204" pitchFamily="34" charset="0"/>
+              </a:rPr>
+              <a:t>Laustsen</a:t>
+            </a:r>
+            <a:r>
+              <a:rPr lang="en-GB" altLang="en-US" sz="3600" dirty="0">
+                <a:latin typeface="Helvetica" panose="020B0604020202020204" pitchFamily="34" charset="0"/>
+                <a:cs typeface="Helvetica" panose="020B0604020202020204" pitchFamily="34" charset="0"/>
+              </a:rPr>
+              <a:t> and Martin H. </a:t>
+            </a:r>
+            <a:r>
+              <a:rPr lang="en-GB" altLang="en-US" sz="3600" dirty="0" err="1">
+                <a:latin typeface="Helvetica" panose="020B0604020202020204" pitchFamily="34" charset="0"/>
+                <a:cs typeface="Helvetica" panose="020B0604020202020204" pitchFamily="34" charset="0"/>
+              </a:rPr>
+              <a:t>Therkildsen</a:t>
+            </a:r>
+            <a:endParaRPr lang="en-GB" altLang="en-US" sz="3600" dirty="0">
+              <a:latin typeface="Helvetica" panose="020B0604020202020204" pitchFamily="34" charset="0"/>
+              <a:cs typeface="Helvetica" panose="020B0604020202020204" pitchFamily="34" charset="0"/>
+            </a:endParaRPr>
+          </a:p>
+          <a:p>
+            <a:pPr eaLnBrk="1" hangingPunct="1">
+              <a:spcBef>
+                <a:spcPct val="0"/>
+              </a:spcBef>
+              <a:buFontTx/>
+              <a:buNone/>
+            </a:pPr>
+            <a:r>
+              <a:rPr lang="en-GB" altLang="en-US" sz="3600" dirty="0">
+                <a:latin typeface="Helvetica" panose="020B0604020202020204" pitchFamily="34" charset="0"/>
+                <a:cs typeface="Helvetica" panose="020B0604020202020204" pitchFamily="34" charset="0"/>
+              </a:rPr>
+              <a:t>Department of Electronic Systems, Aalborg University, Denmark</a:t>
             </a:r>
           </a:p>
         </p:txBody>
@@ -4361,9 +4416,9 @@
         <p:grpSpPr bwMode="auto">
           <a:xfrm>
             <a:off x="15335554" y="33892606"/>
-            <a:ext cx="14670088" cy="5853112"/>
+            <a:ext cx="14670088" cy="5945820"/>
             <a:chOff x="15464295" y="29481462"/>
-            <a:chExt cx="14669630" cy="8610601"/>
+            <a:chExt cx="14669630" cy="8746985"/>
           </a:xfrm>
         </p:grpSpPr>
         <p:sp>
@@ -4383,7 +4438,7 @@
           <p:spPr bwMode="auto">
             <a:xfrm>
               <a:off x="15464295" y="29481463"/>
-              <a:ext cx="14669630" cy="8610600"/>
+              <a:ext cx="14669630" cy="8746984"/>
             </a:xfrm>
             <a:prstGeom prst="roundRect">
               <a:avLst>
@@ -4951,10 +5006,10 @@
         </p:nvGrpSpPr>
         <p:grpSpPr bwMode="auto">
           <a:xfrm>
-            <a:off x="338138" y="40454263"/>
-            <a:ext cx="29489400" cy="1905000"/>
-            <a:chOff x="15579725" y="38677532"/>
-            <a:chExt cx="14554200" cy="3605531"/>
+            <a:off x="338138" y="40136714"/>
+            <a:ext cx="29489400" cy="2426765"/>
+            <a:chOff x="15579725" y="38076514"/>
+            <a:chExt cx="14554200" cy="4206549"/>
           </a:xfrm>
         </p:grpSpPr>
         <p:sp>
@@ -4973,8 +5028,8 @@
           </p:nvSpPr>
           <p:spPr bwMode="auto">
             <a:xfrm>
-              <a:off x="15579725" y="38701663"/>
-              <a:ext cx="14554200" cy="3581400"/>
+              <a:off x="15579725" y="38076514"/>
+              <a:ext cx="14554200" cy="4206549"/>
             </a:xfrm>
             <a:prstGeom prst="roundRect">
               <a:avLst>
@@ -5703,7 +5758,7 @@
           <p:nvPr/>
         </p:nvPicPr>
         <p:blipFill>
-          <a:blip r:embed="rId3">
+          <a:blip r:embed="rId2">
             <a:extLst>
               <a:ext uri="{28A0092B-C50C-407E-A947-70E740481C1C}">
                 <a14:useLocalDpi xmlns:a14="http://schemas.microsoft.com/office/drawing/2010/main" val="0"/>
@@ -5940,394 +5995,6 @@
       </p:sp>
       <p:grpSp>
         <p:nvGrpSpPr>
-          <p:cNvPr id="13322" name="Group 46">
-            <a:extLst>
-              <a:ext uri="{FF2B5EF4-FFF2-40B4-BE49-F238E27FC236}">
-                <a16:creationId xmlns:a16="http://schemas.microsoft.com/office/drawing/2014/main" id="{C54033BD-4496-0544-A463-46A8D3576B52}"/>
-              </a:ext>
-            </a:extLst>
-          </p:cNvPr>
-          <p:cNvGrpSpPr>
-            <a:grpSpLocks/>
-          </p:cNvGrpSpPr>
-          <p:nvPr/>
-        </p:nvGrpSpPr>
-        <p:grpSpPr bwMode="auto">
-          <a:xfrm>
-            <a:off x="-17034669" y="19346863"/>
-            <a:ext cx="14303375" cy="20864512"/>
-            <a:chOff x="509494" y="19346863"/>
-            <a:chExt cx="14303675" cy="13487400"/>
-          </a:xfrm>
-        </p:grpSpPr>
-        <p:sp>
-          <p:nvSpPr>
-            <p:cNvPr id="13350" name="AutoShape 63">
-              <a:extLst>
-                <a:ext uri="{FF2B5EF4-FFF2-40B4-BE49-F238E27FC236}">
-                  <a16:creationId xmlns:a16="http://schemas.microsoft.com/office/drawing/2014/main" id="{2966682B-7831-0643-AEF3-2BAEB99EF23A}"/>
-                </a:ext>
-              </a:extLst>
-            </p:cNvPr>
-            <p:cNvSpPr>
-              <a:spLocks noChangeArrowheads="1"/>
-            </p:cNvSpPr>
-            <p:nvPr/>
-          </p:nvSpPr>
-          <p:spPr bwMode="auto">
-            <a:xfrm>
-              <a:off x="509494" y="19346863"/>
-              <a:ext cx="14303675" cy="13487400"/>
-            </a:xfrm>
-            <a:prstGeom prst="roundRect">
-              <a:avLst>
-                <a:gd name="adj" fmla="val 2787"/>
-              </a:avLst>
-            </a:prstGeom>
-            <a:solidFill>
-              <a:schemeClr val="bg1"/>
-            </a:solidFill>
-            <a:ln w="76200">
-              <a:solidFill>
-                <a:schemeClr val="tx1"/>
-              </a:solidFill>
-              <a:round/>
-              <a:headEnd/>
-              <a:tailEnd/>
-            </a:ln>
-          </p:spPr>
-          <p:txBody>
-            <a:bodyPr wrap="none" anchor="ctr"/>
-            <a:lstStyle>
-              <a:lvl1pPr>
-                <a:spcBef>
-                  <a:spcPct val="20000"/>
-                </a:spcBef>
-                <a:buChar char="•"/>
-                <a:defRPr sz="14600">
-                  <a:solidFill>
-                    <a:schemeClr val="tx1"/>
-                  </a:solidFill>
-                  <a:latin typeface="Arial" panose="020B0604020202020204" pitchFamily="34" charset="0"/>
-                </a:defRPr>
-              </a:lvl1pPr>
-              <a:lvl2pPr marL="742950" indent="-285750">
-                <a:spcBef>
-                  <a:spcPct val="20000"/>
-                </a:spcBef>
-                <a:buChar char="–"/>
-                <a:defRPr sz="12800">
-                  <a:solidFill>
-                    <a:schemeClr val="tx1"/>
-                  </a:solidFill>
-                  <a:latin typeface="Arial" panose="020B0604020202020204" pitchFamily="34" charset="0"/>
-                </a:defRPr>
-              </a:lvl2pPr>
-              <a:lvl3pPr marL="1143000" indent="-228600">
-                <a:spcBef>
-                  <a:spcPct val="20000"/>
-                </a:spcBef>
-                <a:buChar char="•"/>
-                <a:defRPr sz="11000">
-                  <a:solidFill>
-                    <a:schemeClr val="tx1"/>
-                  </a:solidFill>
-                  <a:latin typeface="Arial" panose="020B0604020202020204" pitchFamily="34" charset="0"/>
-                </a:defRPr>
-              </a:lvl3pPr>
-              <a:lvl4pPr marL="1600200" indent="-228600">
-                <a:spcBef>
-                  <a:spcPct val="20000"/>
-                </a:spcBef>
-                <a:buChar char="–"/>
-                <a:defRPr sz="9100">
-                  <a:solidFill>
-                    <a:schemeClr val="tx1"/>
-                  </a:solidFill>
-                  <a:latin typeface="Arial" panose="020B0604020202020204" pitchFamily="34" charset="0"/>
-                </a:defRPr>
-              </a:lvl4pPr>
-              <a:lvl5pPr marL="2057400" indent="-228600">
-                <a:spcBef>
-                  <a:spcPct val="20000"/>
-                </a:spcBef>
-                <a:buChar char="»"/>
-                <a:defRPr sz="9100">
-                  <a:solidFill>
-                    <a:schemeClr val="tx1"/>
-                  </a:solidFill>
-                  <a:latin typeface="Arial" panose="020B0604020202020204" pitchFamily="34" charset="0"/>
-                </a:defRPr>
-              </a:lvl5pPr>
-              <a:lvl6pPr marL="2514600" indent="-228600" eaLnBrk="0" fontAlgn="base" hangingPunct="0">
-                <a:spcBef>
-                  <a:spcPct val="20000"/>
-                </a:spcBef>
-                <a:spcAft>
-                  <a:spcPct val="0"/>
-                </a:spcAft>
-                <a:buChar char="»"/>
-                <a:defRPr sz="9100">
-                  <a:solidFill>
-                    <a:schemeClr val="tx1"/>
-                  </a:solidFill>
-                  <a:latin typeface="Arial" panose="020B0604020202020204" pitchFamily="34" charset="0"/>
-                </a:defRPr>
-              </a:lvl6pPr>
-              <a:lvl7pPr marL="2971800" indent="-228600" eaLnBrk="0" fontAlgn="base" hangingPunct="0">
-                <a:spcBef>
-                  <a:spcPct val="20000"/>
-                </a:spcBef>
-                <a:spcAft>
-                  <a:spcPct val="0"/>
-                </a:spcAft>
-                <a:buChar char="»"/>
-                <a:defRPr sz="9100">
-                  <a:solidFill>
-                    <a:schemeClr val="tx1"/>
-                  </a:solidFill>
-                  <a:latin typeface="Arial" panose="020B0604020202020204" pitchFamily="34" charset="0"/>
-                </a:defRPr>
-              </a:lvl7pPr>
-              <a:lvl8pPr marL="3429000" indent="-228600" eaLnBrk="0" fontAlgn="base" hangingPunct="0">
-                <a:spcBef>
-                  <a:spcPct val="20000"/>
-                </a:spcBef>
-                <a:spcAft>
-                  <a:spcPct val="0"/>
-                </a:spcAft>
-                <a:buChar char="»"/>
-                <a:defRPr sz="9100">
-                  <a:solidFill>
-                    <a:schemeClr val="tx1"/>
-                  </a:solidFill>
-                  <a:latin typeface="Arial" panose="020B0604020202020204" pitchFamily="34" charset="0"/>
-                </a:defRPr>
-              </a:lvl8pPr>
-              <a:lvl9pPr marL="3886200" indent="-228600" eaLnBrk="0" fontAlgn="base" hangingPunct="0">
-                <a:spcBef>
-                  <a:spcPct val="20000"/>
-                </a:spcBef>
-                <a:spcAft>
-                  <a:spcPct val="0"/>
-                </a:spcAft>
-                <a:buChar char="»"/>
-                <a:defRPr sz="9100">
-                  <a:solidFill>
-                    <a:schemeClr val="tx1"/>
-                  </a:solidFill>
-                  <a:latin typeface="Arial" panose="020B0604020202020204" pitchFamily="34" charset="0"/>
-                </a:defRPr>
-              </a:lvl9pPr>
-            </a:lstStyle>
-            <a:p>
-              <a:pPr eaLnBrk="1" hangingPunct="1">
-                <a:spcBef>
-                  <a:spcPct val="0"/>
-                </a:spcBef>
-                <a:buFontTx/>
-                <a:buNone/>
-              </a:pPr>
-              <a:endParaRPr lang="en-GB" altLang="en-US" sz="6600" dirty="0">
-                <a:latin typeface="Helvetica" panose="020B0604020202020204" pitchFamily="34" charset="0"/>
-                <a:cs typeface="Helvetica" panose="020B0604020202020204" pitchFamily="34" charset="0"/>
-              </a:endParaRPr>
-            </a:p>
-          </p:txBody>
-        </p:sp>
-        <p:sp>
-          <p:nvSpPr>
-            <p:cNvPr id="13351" name="Text Box 41">
-              <a:extLst>
-                <a:ext uri="{FF2B5EF4-FFF2-40B4-BE49-F238E27FC236}">
-                  <a16:creationId xmlns:a16="http://schemas.microsoft.com/office/drawing/2014/main" id="{B9F7F1B2-D6C8-D74D-AFC6-434EAFC6A03E}"/>
-                </a:ext>
-              </a:extLst>
-            </p:cNvPr>
-            <p:cNvSpPr txBox="1">
-              <a:spLocks noChangeArrowheads="1"/>
-            </p:cNvSpPr>
-            <p:nvPr/>
-          </p:nvSpPr>
-          <p:spPr bwMode="auto">
-            <a:xfrm>
-              <a:off x="1916956" y="19372311"/>
-              <a:ext cx="11862543" cy="716239"/>
-            </a:xfrm>
-            <a:prstGeom prst="rect">
-              <a:avLst/>
-            </a:prstGeom>
-            <a:noFill/>
-            <a:ln>
-              <a:noFill/>
-            </a:ln>
-            <a:extLst>
-              <a:ext uri="{909E8E84-426E-40DD-AFC4-6F175D3DCCD1}">
-                <a14:hiddenFill xmlns:a14="http://schemas.microsoft.com/office/drawing/2010/main">
-                  <a:solidFill>
-                    <a:srgbClr val="FFFFFF"/>
-                  </a:solidFill>
-                </a14:hiddenFill>
-              </a:ext>
-              <a:ext uri="{91240B29-F687-4F45-9708-019B960494DF}">
-                <a14:hiddenLine xmlns:a14="http://schemas.microsoft.com/office/drawing/2010/main" w="9525">
-                  <a:solidFill>
-                    <a:srgbClr val="000000"/>
-                  </a:solidFill>
-                  <a:miter lim="800000"/>
-                  <a:headEnd/>
-                  <a:tailEnd/>
-                </a14:hiddenLine>
-              </a:ext>
-            </a:extLst>
-          </p:spPr>
-          <p:txBody>
-            <a:bodyPr wrap="none">
-              <a:spAutoFit/>
-            </a:bodyPr>
-            <a:lstStyle>
-              <a:lvl1pPr defTabSz="4173538">
-                <a:spcBef>
-                  <a:spcPct val="20000"/>
-                </a:spcBef>
-                <a:buChar char="•"/>
-                <a:defRPr sz="14600">
-                  <a:solidFill>
-                    <a:schemeClr val="tx1"/>
-                  </a:solidFill>
-                  <a:latin typeface="Arial" panose="020B0604020202020204" pitchFamily="34" charset="0"/>
-                </a:defRPr>
-              </a:lvl1pPr>
-              <a:lvl2pPr marL="742950" indent="-285750" defTabSz="4173538">
-                <a:spcBef>
-                  <a:spcPct val="20000"/>
-                </a:spcBef>
-                <a:buChar char="–"/>
-                <a:defRPr sz="12800">
-                  <a:solidFill>
-                    <a:schemeClr val="tx1"/>
-                  </a:solidFill>
-                  <a:latin typeface="Arial" panose="020B0604020202020204" pitchFamily="34" charset="0"/>
-                </a:defRPr>
-              </a:lvl2pPr>
-              <a:lvl3pPr marL="1143000" indent="-228600" defTabSz="4173538">
-                <a:spcBef>
-                  <a:spcPct val="20000"/>
-                </a:spcBef>
-                <a:buChar char="•"/>
-                <a:defRPr sz="11000">
-                  <a:solidFill>
-                    <a:schemeClr val="tx1"/>
-                  </a:solidFill>
-                  <a:latin typeface="Arial" panose="020B0604020202020204" pitchFamily="34" charset="0"/>
-                </a:defRPr>
-              </a:lvl3pPr>
-              <a:lvl4pPr marL="1600200" indent="-228600" defTabSz="4173538">
-                <a:spcBef>
-                  <a:spcPct val="20000"/>
-                </a:spcBef>
-                <a:buChar char="–"/>
-                <a:defRPr sz="9100">
-                  <a:solidFill>
-                    <a:schemeClr val="tx1"/>
-                  </a:solidFill>
-                  <a:latin typeface="Arial" panose="020B0604020202020204" pitchFamily="34" charset="0"/>
-                </a:defRPr>
-              </a:lvl4pPr>
-              <a:lvl5pPr marL="2057400" indent="-228600" defTabSz="4173538">
-                <a:spcBef>
-                  <a:spcPct val="20000"/>
-                </a:spcBef>
-                <a:buChar char="»"/>
-                <a:defRPr sz="9100">
-                  <a:solidFill>
-                    <a:schemeClr val="tx1"/>
-                  </a:solidFill>
-                  <a:latin typeface="Arial" panose="020B0604020202020204" pitchFamily="34" charset="0"/>
-                </a:defRPr>
-              </a:lvl5pPr>
-              <a:lvl6pPr marL="2514600" indent="-228600" defTabSz="4173538" eaLnBrk="0" fontAlgn="base" hangingPunct="0">
-                <a:spcBef>
-                  <a:spcPct val="20000"/>
-                </a:spcBef>
-                <a:spcAft>
-                  <a:spcPct val="0"/>
-                </a:spcAft>
-                <a:buChar char="»"/>
-                <a:defRPr sz="9100">
-                  <a:solidFill>
-                    <a:schemeClr val="tx1"/>
-                  </a:solidFill>
-                  <a:latin typeface="Arial" panose="020B0604020202020204" pitchFamily="34" charset="0"/>
-                </a:defRPr>
-              </a:lvl6pPr>
-              <a:lvl7pPr marL="2971800" indent="-228600" defTabSz="4173538" eaLnBrk="0" fontAlgn="base" hangingPunct="0">
-                <a:spcBef>
-                  <a:spcPct val="20000"/>
-                </a:spcBef>
-                <a:spcAft>
-                  <a:spcPct val="0"/>
-                </a:spcAft>
-                <a:buChar char="»"/>
-                <a:defRPr sz="9100">
-                  <a:solidFill>
-                    <a:schemeClr val="tx1"/>
-                  </a:solidFill>
-                  <a:latin typeface="Arial" panose="020B0604020202020204" pitchFamily="34" charset="0"/>
-                </a:defRPr>
-              </a:lvl7pPr>
-              <a:lvl8pPr marL="3429000" indent="-228600" defTabSz="4173538" eaLnBrk="0" fontAlgn="base" hangingPunct="0">
-                <a:spcBef>
-                  <a:spcPct val="20000"/>
-                </a:spcBef>
-                <a:spcAft>
-                  <a:spcPct val="0"/>
-                </a:spcAft>
-                <a:buChar char="»"/>
-                <a:defRPr sz="9100">
-                  <a:solidFill>
-                    <a:schemeClr val="tx1"/>
-                  </a:solidFill>
-                  <a:latin typeface="Arial" panose="020B0604020202020204" pitchFamily="34" charset="0"/>
-                </a:defRPr>
-              </a:lvl8pPr>
-              <a:lvl9pPr marL="3886200" indent="-228600" defTabSz="4173538" eaLnBrk="0" fontAlgn="base" hangingPunct="0">
-                <a:spcBef>
-                  <a:spcPct val="20000"/>
-                </a:spcBef>
-                <a:spcAft>
-                  <a:spcPct val="0"/>
-                </a:spcAft>
-                <a:buChar char="»"/>
-                <a:defRPr sz="9100">
-                  <a:solidFill>
-                    <a:schemeClr val="tx1"/>
-                  </a:solidFill>
-                  <a:latin typeface="Arial" panose="020B0604020202020204" pitchFamily="34" charset="0"/>
-                </a:defRPr>
-              </a:lvl9pPr>
-            </a:lstStyle>
-            <a:p>
-              <a:pPr eaLnBrk="1" hangingPunct="1">
-                <a:spcBef>
-                  <a:spcPct val="0"/>
-                </a:spcBef>
-                <a:buFontTx/>
-                <a:buNone/>
-              </a:pPr>
-              <a:r>
-                <a:rPr lang="en-GB" altLang="en-US" sz="6600">
-                  <a:latin typeface="Helvetica" panose="020B0604020202020204" pitchFamily="34" charset="0"/>
-                  <a:cs typeface="Helvetica" panose="020B0604020202020204" pitchFamily="34" charset="0"/>
-                </a:rPr>
-                <a:t>Modelling approach (methods) </a:t>
-              </a:r>
-            </a:p>
-          </p:txBody>
-        </p:sp>
-      </p:grpSp>
-      <p:grpSp>
-        <p:nvGrpSpPr>
           <p:cNvPr id="13323" name="Group 48">
             <a:extLst>
               <a:ext uri="{FF2B5EF4-FFF2-40B4-BE49-F238E27FC236}">
@@ -6342,10 +6009,10 @@
         </p:nvGrpSpPr>
         <p:grpSpPr bwMode="auto">
           <a:xfrm>
-            <a:off x="333920" y="33974936"/>
-            <a:ext cx="14706600" cy="5863490"/>
-            <a:chOff x="15123210" y="5326064"/>
-            <a:chExt cx="14705915" cy="23975726"/>
+            <a:off x="333920" y="33863079"/>
+            <a:ext cx="14706600" cy="5975348"/>
+            <a:chOff x="15123210" y="5338760"/>
+            <a:chExt cx="14705915" cy="23963030"/>
           </a:xfrm>
         </p:grpSpPr>
         <p:sp>
@@ -6364,8 +6031,8 @@
           </p:nvSpPr>
           <p:spPr bwMode="auto">
             <a:xfrm>
-              <a:off x="15123210" y="5326064"/>
-              <a:ext cx="14705915" cy="23926801"/>
+              <a:off x="15123210" y="5538005"/>
+              <a:ext cx="14705915" cy="23714858"/>
             </a:xfrm>
             <a:prstGeom prst="roundRect">
               <a:avLst>
@@ -6917,8 +6584,8 @@
         </p:nvGrpSpPr>
         <p:grpSpPr bwMode="auto">
           <a:xfrm>
-            <a:off x="431800" y="23422182"/>
-            <a:ext cx="29489400" cy="10186044"/>
+            <a:off x="378504" y="23422182"/>
+            <a:ext cx="29542696" cy="10186044"/>
             <a:chOff x="400843" y="33291458"/>
             <a:chExt cx="14554200" cy="8839199"/>
           </a:xfrm>
@@ -7114,8 +6781,8 @@
           </p:nvSpPr>
           <p:spPr bwMode="auto">
             <a:xfrm>
-              <a:off x="5750718" y="33291462"/>
-              <a:ext cx="1484349" cy="961492"/>
+              <a:off x="572429" y="33291462"/>
+              <a:ext cx="14243780" cy="961492"/>
             </a:xfrm>
             <a:prstGeom prst="rect">
               <a:avLst/>
@@ -7145,7 +6812,7 @@
             </a:extLst>
           </p:spPr>
           <p:txBody>
-            <a:bodyPr wrap="none">
+            <a:bodyPr wrap="square">
               <a:spAutoFit/>
             </a:bodyPr>
             <a:lstStyle>
@@ -7271,7 +6938,7 @@
               </a:lvl9pPr>
             </a:lstStyle>
             <a:p>
-              <a:pPr eaLnBrk="1" hangingPunct="1">
+              <a:pPr algn="ctr" eaLnBrk="1" hangingPunct="1">
                 <a:spcBef>
                   <a:spcPct val="0"/>
                 </a:spcBef>
@@ -7285,879 +6952,6 @@
                 </a:rPr>
                 <a:t>Results</a:t>
               </a:r>
-            </a:p>
-          </p:txBody>
-        </p:sp>
-      </p:grpSp>
-      <p:pic>
-        <p:nvPicPr>
-          <p:cNvPr id="13325" name="Picture 50" descr="C:\Users\Rasmus Olsen\Documents\Universitetet\papers\LocationEstimationVsMmPr\aau_segl_en copy.png">
-            <a:extLst>
-              <a:ext uri="{FF2B5EF4-FFF2-40B4-BE49-F238E27FC236}">
-                <a16:creationId xmlns:a16="http://schemas.microsoft.com/office/drawing/2014/main" id="{ACDAA454-3341-1A4D-9B9D-C21336911F57}"/>
-              </a:ext>
-            </a:extLst>
-          </p:cNvPr>
-          <p:cNvPicPr>
-            <a:picLocks noChangeAspect="1" noChangeArrowheads="1"/>
-          </p:cNvPicPr>
-          <p:nvPr/>
-        </p:nvPicPr>
-        <p:blipFill>
-          <a:blip r:embed="rId4">
-            <a:extLst>
-              <a:ext uri="{28A0092B-C50C-407E-A947-70E740481C1C}">
-                <a14:useLocalDpi xmlns:a14="http://schemas.microsoft.com/office/drawing/2010/main" val="0"/>
-              </a:ext>
-            </a:extLst>
-          </a:blip>
-          <a:srcRect/>
-          <a:stretch>
-            <a:fillRect/>
-          </a:stretch>
-        </p:blipFill>
-        <p:spPr bwMode="auto">
-          <a:xfrm>
-            <a:off x="41497746" y="1042830"/>
-            <a:ext cx="4695825" cy="4725987"/>
-          </a:xfrm>
-          <a:prstGeom prst="rect">
-            <a:avLst/>
-          </a:prstGeom>
-          <a:noFill/>
-          <a:ln>
-            <a:noFill/>
-          </a:ln>
-          <a:extLst>
-            <a:ext uri="{909E8E84-426E-40DD-AFC4-6F175D3DCCD1}">
-              <a14:hiddenFill xmlns:a14="http://schemas.microsoft.com/office/drawing/2010/main">
-                <a:solidFill>
-                  <a:srgbClr val="FFFFFF"/>
-                </a:solidFill>
-              </a14:hiddenFill>
-            </a:ext>
-            <a:ext uri="{91240B29-F687-4F45-9708-019B960494DF}">
-              <a14:hiddenLine xmlns:a14="http://schemas.microsoft.com/office/drawing/2010/main" w="9525">
-                <a:solidFill>
-                  <a:srgbClr val="000000"/>
-                </a:solidFill>
-                <a:miter lim="800000"/>
-                <a:headEnd/>
-                <a:tailEnd/>
-              </a14:hiddenLine>
-            </a:ext>
-          </a:extLst>
-        </p:spPr>
-      </p:pic>
-      <p:grpSp>
-        <p:nvGrpSpPr>
-          <p:cNvPr id="13326" name="Group 49">
-            <a:extLst>
-              <a:ext uri="{FF2B5EF4-FFF2-40B4-BE49-F238E27FC236}">
-                <a16:creationId xmlns:a16="http://schemas.microsoft.com/office/drawing/2014/main" id="{5139625F-C463-5B4F-9A3A-A5A14E4AEFCA}"/>
-              </a:ext>
-            </a:extLst>
-          </p:cNvPr>
-          <p:cNvGrpSpPr>
-            <a:grpSpLocks/>
-          </p:cNvGrpSpPr>
-          <p:nvPr/>
-        </p:nvGrpSpPr>
-        <p:grpSpPr bwMode="auto">
-          <a:xfrm>
-            <a:off x="31809233" y="909480"/>
-            <a:ext cx="14695488" cy="11303000"/>
-            <a:chOff x="15579725" y="29481462"/>
-            <a:chExt cx="14554200" cy="8610601"/>
-          </a:xfrm>
-        </p:grpSpPr>
-        <p:sp>
-          <p:nvSpPr>
-            <p:cNvPr id="13342" name="AutoShape 37">
-              <a:extLst>
-                <a:ext uri="{FF2B5EF4-FFF2-40B4-BE49-F238E27FC236}">
-                  <a16:creationId xmlns:a16="http://schemas.microsoft.com/office/drawing/2014/main" id="{BDF326A2-8B4F-3E4B-9A78-2839EA135A78}"/>
-                </a:ext>
-              </a:extLst>
-            </p:cNvPr>
-            <p:cNvSpPr>
-              <a:spLocks noChangeArrowheads="1"/>
-            </p:cNvSpPr>
-            <p:nvPr/>
-          </p:nvSpPr>
-          <p:spPr bwMode="auto">
-            <a:xfrm>
-              <a:off x="15579725" y="29481463"/>
-              <a:ext cx="14554200" cy="8610600"/>
-            </a:xfrm>
-            <a:prstGeom prst="roundRect">
-              <a:avLst>
-                <a:gd name="adj" fmla="val 3875"/>
-              </a:avLst>
-            </a:prstGeom>
-            <a:solidFill>
-              <a:schemeClr val="bg1"/>
-            </a:solidFill>
-            <a:ln w="76200">
-              <a:solidFill>
-                <a:schemeClr val="tx1"/>
-              </a:solidFill>
-              <a:round/>
-              <a:headEnd/>
-              <a:tailEnd/>
-            </a:ln>
-          </p:spPr>
-          <p:txBody>
-            <a:bodyPr wrap="none" anchor="ctr"/>
-            <a:lstStyle>
-              <a:lvl1pPr>
-                <a:spcBef>
-                  <a:spcPct val="20000"/>
-                </a:spcBef>
-                <a:buChar char="•"/>
-                <a:defRPr sz="14600">
-                  <a:solidFill>
-                    <a:schemeClr val="tx1"/>
-                  </a:solidFill>
-                  <a:latin typeface="Arial" panose="020B0604020202020204" pitchFamily="34" charset="0"/>
-                </a:defRPr>
-              </a:lvl1pPr>
-              <a:lvl2pPr marL="742950" indent="-285750">
-                <a:spcBef>
-                  <a:spcPct val="20000"/>
-                </a:spcBef>
-                <a:buChar char="–"/>
-                <a:defRPr sz="12800">
-                  <a:solidFill>
-                    <a:schemeClr val="tx1"/>
-                  </a:solidFill>
-                  <a:latin typeface="Arial" panose="020B0604020202020204" pitchFamily="34" charset="0"/>
-                </a:defRPr>
-              </a:lvl2pPr>
-              <a:lvl3pPr marL="1143000" indent="-228600">
-                <a:spcBef>
-                  <a:spcPct val="20000"/>
-                </a:spcBef>
-                <a:buChar char="•"/>
-                <a:defRPr sz="11000">
-                  <a:solidFill>
-                    <a:schemeClr val="tx1"/>
-                  </a:solidFill>
-                  <a:latin typeface="Arial" panose="020B0604020202020204" pitchFamily="34" charset="0"/>
-                </a:defRPr>
-              </a:lvl3pPr>
-              <a:lvl4pPr marL="1600200" indent="-228600">
-                <a:spcBef>
-                  <a:spcPct val="20000"/>
-                </a:spcBef>
-                <a:buChar char="–"/>
-                <a:defRPr sz="9100">
-                  <a:solidFill>
-                    <a:schemeClr val="tx1"/>
-                  </a:solidFill>
-                  <a:latin typeface="Arial" panose="020B0604020202020204" pitchFamily="34" charset="0"/>
-                </a:defRPr>
-              </a:lvl4pPr>
-              <a:lvl5pPr marL="2057400" indent="-228600">
-                <a:spcBef>
-                  <a:spcPct val="20000"/>
-                </a:spcBef>
-                <a:buChar char="»"/>
-                <a:defRPr sz="9100">
-                  <a:solidFill>
-                    <a:schemeClr val="tx1"/>
-                  </a:solidFill>
-                  <a:latin typeface="Arial" panose="020B0604020202020204" pitchFamily="34" charset="0"/>
-                </a:defRPr>
-              </a:lvl5pPr>
-              <a:lvl6pPr marL="2514600" indent="-228600" eaLnBrk="0" fontAlgn="base" hangingPunct="0">
-                <a:spcBef>
-                  <a:spcPct val="20000"/>
-                </a:spcBef>
-                <a:spcAft>
-                  <a:spcPct val="0"/>
-                </a:spcAft>
-                <a:buChar char="»"/>
-                <a:defRPr sz="9100">
-                  <a:solidFill>
-                    <a:schemeClr val="tx1"/>
-                  </a:solidFill>
-                  <a:latin typeface="Arial" panose="020B0604020202020204" pitchFamily="34" charset="0"/>
-                </a:defRPr>
-              </a:lvl6pPr>
-              <a:lvl7pPr marL="2971800" indent="-228600" eaLnBrk="0" fontAlgn="base" hangingPunct="0">
-                <a:spcBef>
-                  <a:spcPct val="20000"/>
-                </a:spcBef>
-                <a:spcAft>
-                  <a:spcPct val="0"/>
-                </a:spcAft>
-                <a:buChar char="»"/>
-                <a:defRPr sz="9100">
-                  <a:solidFill>
-                    <a:schemeClr val="tx1"/>
-                  </a:solidFill>
-                  <a:latin typeface="Arial" panose="020B0604020202020204" pitchFamily="34" charset="0"/>
-                </a:defRPr>
-              </a:lvl7pPr>
-              <a:lvl8pPr marL="3429000" indent="-228600" eaLnBrk="0" fontAlgn="base" hangingPunct="0">
-                <a:spcBef>
-                  <a:spcPct val="20000"/>
-                </a:spcBef>
-                <a:spcAft>
-                  <a:spcPct val="0"/>
-                </a:spcAft>
-                <a:buChar char="»"/>
-                <a:defRPr sz="9100">
-                  <a:solidFill>
-                    <a:schemeClr val="tx1"/>
-                  </a:solidFill>
-                  <a:latin typeface="Arial" panose="020B0604020202020204" pitchFamily="34" charset="0"/>
-                </a:defRPr>
-              </a:lvl8pPr>
-              <a:lvl9pPr marL="3886200" indent="-228600" eaLnBrk="0" fontAlgn="base" hangingPunct="0">
-                <a:spcBef>
-                  <a:spcPct val="20000"/>
-                </a:spcBef>
-                <a:spcAft>
-                  <a:spcPct val="0"/>
-                </a:spcAft>
-                <a:buChar char="»"/>
-                <a:defRPr sz="9100">
-                  <a:solidFill>
-                    <a:schemeClr val="tx1"/>
-                  </a:solidFill>
-                  <a:latin typeface="Arial" panose="020B0604020202020204" pitchFamily="34" charset="0"/>
-                </a:defRPr>
-              </a:lvl9pPr>
-            </a:lstStyle>
-            <a:p>
-              <a:pPr eaLnBrk="1" hangingPunct="1">
-                <a:spcBef>
-                  <a:spcPct val="0"/>
-                </a:spcBef>
-                <a:buFontTx/>
-                <a:buNone/>
-              </a:pPr>
-              <a:endParaRPr lang="en-GB" altLang="en-US" sz="6600">
-                <a:latin typeface="Helvetica" panose="020B0604020202020204" pitchFamily="34" charset="0"/>
-                <a:cs typeface="Helvetica" panose="020B0604020202020204" pitchFamily="34" charset="0"/>
-              </a:endParaRPr>
-            </a:p>
-          </p:txBody>
-        </p:sp>
-        <p:sp>
-          <p:nvSpPr>
-            <p:cNvPr id="13343" name="Text Box 44">
-              <a:extLst>
-                <a:ext uri="{FF2B5EF4-FFF2-40B4-BE49-F238E27FC236}">
-                  <a16:creationId xmlns:a16="http://schemas.microsoft.com/office/drawing/2014/main" id="{6ECFCBB1-8F46-CB4F-AE65-E1DE0E35763D}"/>
-                </a:ext>
-              </a:extLst>
-            </p:cNvPr>
-            <p:cNvSpPr txBox="1">
-              <a:spLocks noChangeArrowheads="1"/>
-            </p:cNvSpPr>
-            <p:nvPr/>
-          </p:nvSpPr>
-          <p:spPr bwMode="auto">
-            <a:xfrm>
-              <a:off x="17789525" y="29481462"/>
-              <a:ext cx="10071988" cy="844069"/>
-            </a:xfrm>
-            <a:prstGeom prst="rect">
-              <a:avLst/>
-            </a:prstGeom>
-            <a:noFill/>
-            <a:ln>
-              <a:noFill/>
-            </a:ln>
-            <a:extLst>
-              <a:ext uri="{909E8E84-426E-40DD-AFC4-6F175D3DCCD1}">
-                <a14:hiddenFill xmlns:a14="http://schemas.microsoft.com/office/drawing/2010/main">
-                  <a:solidFill>
-                    <a:srgbClr val="FFFFFF"/>
-                  </a:solidFill>
-                </a14:hiddenFill>
-              </a:ext>
-              <a:ext uri="{91240B29-F687-4F45-9708-019B960494DF}">
-                <a14:hiddenLine xmlns:a14="http://schemas.microsoft.com/office/drawing/2010/main" w="9525">
-                  <a:solidFill>
-                    <a:srgbClr val="000000"/>
-                  </a:solidFill>
-                  <a:miter lim="800000"/>
-                  <a:headEnd/>
-                  <a:tailEnd/>
-                </a14:hiddenLine>
-              </a:ext>
-            </a:extLst>
-          </p:spPr>
-          <p:txBody>
-            <a:bodyPr wrap="none">
-              <a:spAutoFit/>
-            </a:bodyPr>
-            <a:lstStyle>
-              <a:lvl1pPr defTabSz="4173538">
-                <a:spcBef>
-                  <a:spcPct val="20000"/>
-                </a:spcBef>
-                <a:buChar char="•"/>
-                <a:defRPr sz="14600">
-                  <a:solidFill>
-                    <a:schemeClr val="tx1"/>
-                  </a:solidFill>
-                  <a:latin typeface="Arial" panose="020B0604020202020204" pitchFamily="34" charset="0"/>
-                </a:defRPr>
-              </a:lvl1pPr>
-              <a:lvl2pPr marL="742950" indent="-285750" defTabSz="4173538">
-                <a:spcBef>
-                  <a:spcPct val="20000"/>
-                </a:spcBef>
-                <a:buChar char="–"/>
-                <a:defRPr sz="12800">
-                  <a:solidFill>
-                    <a:schemeClr val="tx1"/>
-                  </a:solidFill>
-                  <a:latin typeface="Arial" panose="020B0604020202020204" pitchFamily="34" charset="0"/>
-                </a:defRPr>
-              </a:lvl2pPr>
-              <a:lvl3pPr marL="1143000" indent="-228600" defTabSz="4173538">
-                <a:spcBef>
-                  <a:spcPct val="20000"/>
-                </a:spcBef>
-                <a:buChar char="•"/>
-                <a:defRPr sz="11000">
-                  <a:solidFill>
-                    <a:schemeClr val="tx1"/>
-                  </a:solidFill>
-                  <a:latin typeface="Arial" panose="020B0604020202020204" pitchFamily="34" charset="0"/>
-                </a:defRPr>
-              </a:lvl3pPr>
-              <a:lvl4pPr marL="1600200" indent="-228600" defTabSz="4173538">
-                <a:spcBef>
-                  <a:spcPct val="20000"/>
-                </a:spcBef>
-                <a:buChar char="–"/>
-                <a:defRPr sz="9100">
-                  <a:solidFill>
-                    <a:schemeClr val="tx1"/>
-                  </a:solidFill>
-                  <a:latin typeface="Arial" panose="020B0604020202020204" pitchFamily="34" charset="0"/>
-                </a:defRPr>
-              </a:lvl4pPr>
-              <a:lvl5pPr marL="2057400" indent="-228600" defTabSz="4173538">
-                <a:spcBef>
-                  <a:spcPct val="20000"/>
-                </a:spcBef>
-                <a:buChar char="»"/>
-                <a:defRPr sz="9100">
-                  <a:solidFill>
-                    <a:schemeClr val="tx1"/>
-                  </a:solidFill>
-                  <a:latin typeface="Arial" panose="020B0604020202020204" pitchFamily="34" charset="0"/>
-                </a:defRPr>
-              </a:lvl5pPr>
-              <a:lvl6pPr marL="2514600" indent="-228600" defTabSz="4173538" eaLnBrk="0" fontAlgn="base" hangingPunct="0">
-                <a:spcBef>
-                  <a:spcPct val="20000"/>
-                </a:spcBef>
-                <a:spcAft>
-                  <a:spcPct val="0"/>
-                </a:spcAft>
-                <a:buChar char="»"/>
-                <a:defRPr sz="9100">
-                  <a:solidFill>
-                    <a:schemeClr val="tx1"/>
-                  </a:solidFill>
-                  <a:latin typeface="Arial" panose="020B0604020202020204" pitchFamily="34" charset="0"/>
-                </a:defRPr>
-              </a:lvl6pPr>
-              <a:lvl7pPr marL="2971800" indent="-228600" defTabSz="4173538" eaLnBrk="0" fontAlgn="base" hangingPunct="0">
-                <a:spcBef>
-                  <a:spcPct val="20000"/>
-                </a:spcBef>
-                <a:spcAft>
-                  <a:spcPct val="0"/>
-                </a:spcAft>
-                <a:buChar char="»"/>
-                <a:defRPr sz="9100">
-                  <a:solidFill>
-                    <a:schemeClr val="tx1"/>
-                  </a:solidFill>
-                  <a:latin typeface="Arial" panose="020B0604020202020204" pitchFamily="34" charset="0"/>
-                </a:defRPr>
-              </a:lvl7pPr>
-              <a:lvl8pPr marL="3429000" indent="-228600" defTabSz="4173538" eaLnBrk="0" fontAlgn="base" hangingPunct="0">
-                <a:spcBef>
-                  <a:spcPct val="20000"/>
-                </a:spcBef>
-                <a:spcAft>
-                  <a:spcPct val="0"/>
-                </a:spcAft>
-                <a:buChar char="»"/>
-                <a:defRPr sz="9100">
-                  <a:solidFill>
-                    <a:schemeClr val="tx1"/>
-                  </a:solidFill>
-                  <a:latin typeface="Arial" panose="020B0604020202020204" pitchFamily="34" charset="0"/>
-                </a:defRPr>
-              </a:lvl8pPr>
-              <a:lvl9pPr marL="3886200" indent="-228600" defTabSz="4173538" eaLnBrk="0" fontAlgn="base" hangingPunct="0">
-                <a:spcBef>
-                  <a:spcPct val="20000"/>
-                </a:spcBef>
-                <a:spcAft>
-                  <a:spcPct val="0"/>
-                </a:spcAft>
-                <a:buChar char="»"/>
-                <a:defRPr sz="9100">
-                  <a:solidFill>
-                    <a:schemeClr val="tx1"/>
-                  </a:solidFill>
-                  <a:latin typeface="Arial" panose="020B0604020202020204" pitchFamily="34" charset="0"/>
-                </a:defRPr>
-              </a:lvl9pPr>
-            </a:lstStyle>
-            <a:p>
-              <a:pPr eaLnBrk="1" hangingPunct="1">
-                <a:spcBef>
-                  <a:spcPct val="0"/>
-                </a:spcBef>
-                <a:buFontTx/>
-                <a:buNone/>
-              </a:pPr>
-              <a:r>
-                <a:rPr lang="en-GB" altLang="en-US" sz="6600" dirty="0">
-                  <a:latin typeface="Helvetica" panose="020B0604020202020204" pitchFamily="34" charset="0"/>
-                  <a:cs typeface="Helvetica" panose="020B0604020202020204" pitchFamily="34" charset="0"/>
-                </a:rPr>
-                <a:t>Controller and filter design</a:t>
-              </a:r>
-            </a:p>
-          </p:txBody>
-        </p:sp>
-        <p:sp>
-          <p:nvSpPr>
-            <p:cNvPr id="13344" name="Rectangle 60">
-              <a:extLst>
-                <a:ext uri="{FF2B5EF4-FFF2-40B4-BE49-F238E27FC236}">
-                  <a16:creationId xmlns:a16="http://schemas.microsoft.com/office/drawing/2014/main" id="{4E3E2E79-B930-6D44-ADD2-35EF45FFE1F1}"/>
-                </a:ext>
-              </a:extLst>
-            </p:cNvPr>
-            <p:cNvSpPr>
-              <a:spLocks noChangeArrowheads="1"/>
-            </p:cNvSpPr>
-            <p:nvPr/>
-          </p:nvSpPr>
-          <p:spPr bwMode="auto">
-            <a:xfrm>
-              <a:off x="15946438" y="31038503"/>
-              <a:ext cx="13868400" cy="4290682"/>
-            </a:xfrm>
-            <a:prstGeom prst="rect">
-              <a:avLst/>
-            </a:prstGeom>
-            <a:noFill/>
-            <a:ln>
-              <a:noFill/>
-            </a:ln>
-            <a:extLst>
-              <a:ext uri="{909E8E84-426E-40DD-AFC4-6F175D3DCCD1}">
-                <a14:hiddenFill xmlns:a14="http://schemas.microsoft.com/office/drawing/2010/main">
-                  <a:solidFill>
-                    <a:srgbClr val="FFFFFF"/>
-                  </a:solidFill>
-                </a14:hiddenFill>
-              </a:ext>
-              <a:ext uri="{91240B29-F687-4F45-9708-019B960494DF}">
-                <a14:hiddenLine xmlns:a14="http://schemas.microsoft.com/office/drawing/2010/main" w="9525">
-                  <a:solidFill>
-                    <a:srgbClr val="000000"/>
-                  </a:solidFill>
-                  <a:miter lim="800000"/>
-                  <a:headEnd/>
-                  <a:tailEnd/>
-                </a14:hiddenLine>
-              </a:ext>
-            </a:extLst>
-          </p:spPr>
-          <p:txBody>
-            <a:bodyPr>
-              <a:spAutoFit/>
-            </a:bodyPr>
-            <a:lstStyle>
-              <a:lvl1pPr marL="342900" indent="-342900" defTabSz="4173538">
-                <a:spcBef>
-                  <a:spcPct val="20000"/>
-                </a:spcBef>
-                <a:buChar char="•"/>
-                <a:defRPr sz="14600">
-                  <a:solidFill>
-                    <a:schemeClr val="tx1"/>
-                  </a:solidFill>
-                  <a:latin typeface="Arial" panose="020B0604020202020204" pitchFamily="34" charset="0"/>
-                </a:defRPr>
-              </a:lvl1pPr>
-              <a:lvl2pPr marL="742950" indent="-285750" defTabSz="4173538">
-                <a:spcBef>
-                  <a:spcPct val="20000"/>
-                </a:spcBef>
-                <a:buChar char="–"/>
-                <a:defRPr sz="12800">
-                  <a:solidFill>
-                    <a:schemeClr val="tx1"/>
-                  </a:solidFill>
-                  <a:latin typeface="Arial" panose="020B0604020202020204" pitchFamily="34" charset="0"/>
-                </a:defRPr>
-              </a:lvl2pPr>
-              <a:lvl3pPr marL="1143000" indent="-228600" defTabSz="4173538">
-                <a:spcBef>
-                  <a:spcPct val="20000"/>
-                </a:spcBef>
-                <a:buChar char="•"/>
-                <a:defRPr sz="11000">
-                  <a:solidFill>
-                    <a:schemeClr val="tx1"/>
-                  </a:solidFill>
-                  <a:latin typeface="Arial" panose="020B0604020202020204" pitchFamily="34" charset="0"/>
-                </a:defRPr>
-              </a:lvl3pPr>
-              <a:lvl4pPr marL="1600200" indent="-228600" defTabSz="4173538">
-                <a:spcBef>
-                  <a:spcPct val="20000"/>
-                </a:spcBef>
-                <a:buChar char="–"/>
-                <a:defRPr sz="9100">
-                  <a:solidFill>
-                    <a:schemeClr val="tx1"/>
-                  </a:solidFill>
-                  <a:latin typeface="Arial" panose="020B0604020202020204" pitchFamily="34" charset="0"/>
-                </a:defRPr>
-              </a:lvl4pPr>
-              <a:lvl5pPr marL="2057400" indent="-228600" defTabSz="4173538">
-                <a:spcBef>
-                  <a:spcPct val="20000"/>
-                </a:spcBef>
-                <a:buChar char="»"/>
-                <a:defRPr sz="9100">
-                  <a:solidFill>
-                    <a:schemeClr val="tx1"/>
-                  </a:solidFill>
-                  <a:latin typeface="Arial" panose="020B0604020202020204" pitchFamily="34" charset="0"/>
-                </a:defRPr>
-              </a:lvl5pPr>
-              <a:lvl6pPr marL="2514600" indent="-228600" defTabSz="4173538" eaLnBrk="0" fontAlgn="base" hangingPunct="0">
-                <a:spcBef>
-                  <a:spcPct val="20000"/>
-                </a:spcBef>
-                <a:spcAft>
-                  <a:spcPct val="0"/>
-                </a:spcAft>
-                <a:buChar char="»"/>
-                <a:defRPr sz="9100">
-                  <a:solidFill>
-                    <a:schemeClr val="tx1"/>
-                  </a:solidFill>
-                  <a:latin typeface="Arial" panose="020B0604020202020204" pitchFamily="34" charset="0"/>
-                </a:defRPr>
-              </a:lvl6pPr>
-              <a:lvl7pPr marL="2971800" indent="-228600" defTabSz="4173538" eaLnBrk="0" fontAlgn="base" hangingPunct="0">
-                <a:spcBef>
-                  <a:spcPct val="20000"/>
-                </a:spcBef>
-                <a:spcAft>
-                  <a:spcPct val="0"/>
-                </a:spcAft>
-                <a:buChar char="»"/>
-                <a:defRPr sz="9100">
-                  <a:solidFill>
-                    <a:schemeClr val="tx1"/>
-                  </a:solidFill>
-                  <a:latin typeface="Arial" panose="020B0604020202020204" pitchFamily="34" charset="0"/>
-                </a:defRPr>
-              </a:lvl7pPr>
-              <a:lvl8pPr marL="3429000" indent="-228600" defTabSz="4173538" eaLnBrk="0" fontAlgn="base" hangingPunct="0">
-                <a:spcBef>
-                  <a:spcPct val="20000"/>
-                </a:spcBef>
-                <a:spcAft>
-                  <a:spcPct val="0"/>
-                </a:spcAft>
-                <a:buChar char="»"/>
-                <a:defRPr sz="9100">
-                  <a:solidFill>
-                    <a:schemeClr val="tx1"/>
-                  </a:solidFill>
-                  <a:latin typeface="Arial" panose="020B0604020202020204" pitchFamily="34" charset="0"/>
-                </a:defRPr>
-              </a:lvl8pPr>
-              <a:lvl9pPr marL="3886200" indent="-228600" defTabSz="4173538" eaLnBrk="0" fontAlgn="base" hangingPunct="0">
-                <a:spcBef>
-                  <a:spcPct val="20000"/>
-                </a:spcBef>
-                <a:spcAft>
-                  <a:spcPct val="0"/>
-                </a:spcAft>
-                <a:buChar char="»"/>
-                <a:defRPr sz="9100">
-                  <a:solidFill>
-                    <a:schemeClr val="tx1"/>
-                  </a:solidFill>
-                  <a:latin typeface="Arial" panose="020B0604020202020204" pitchFamily="34" charset="0"/>
-                </a:defRPr>
-              </a:lvl9pPr>
-            </a:lstStyle>
-            <a:p>
-              <a:pPr eaLnBrk="1" hangingPunct="1">
-                <a:spcBef>
-                  <a:spcPct val="0"/>
-                </a:spcBef>
-                <a:buFontTx/>
-                <a:buNone/>
-              </a:pPr>
-              <a:r>
-                <a:rPr lang="en-GB" altLang="en-US" sz="2400" dirty="0">
-                  <a:latin typeface="Helvetica" panose="020B0604020202020204" pitchFamily="34" charset="0"/>
-                  <a:cs typeface="Helvetica" panose="020B0604020202020204" pitchFamily="34" charset="0"/>
-                </a:rPr>
-                <a:t>- Outer loop tank pressure control implemented with LQR with integral action </a:t>
-              </a:r>
-            </a:p>
-            <a:p>
-              <a:pPr eaLnBrk="1" hangingPunct="1">
-                <a:spcBef>
-                  <a:spcPct val="0"/>
-                </a:spcBef>
-                <a:buFontTx/>
-                <a:buNone/>
-              </a:pPr>
-              <a:endParaRPr lang="en-GB" altLang="en-US" sz="2400" dirty="0">
-                <a:latin typeface="Helvetica" panose="020B0604020202020204" pitchFamily="34" charset="0"/>
-                <a:cs typeface="Helvetica" panose="020B0604020202020204" pitchFamily="34" charset="0"/>
-              </a:endParaRPr>
-            </a:p>
-            <a:p>
-              <a:pPr eaLnBrk="1" hangingPunct="1">
-                <a:spcBef>
-                  <a:spcPct val="0"/>
-                </a:spcBef>
-                <a:buFontTx/>
-                <a:buNone/>
-              </a:pPr>
-              <a:endParaRPr lang="en-GB" altLang="en-US" sz="2400" dirty="0">
-                <a:latin typeface="Helvetica" panose="020B0604020202020204" pitchFamily="34" charset="0"/>
-                <a:cs typeface="Helvetica" panose="020B0604020202020204" pitchFamily="34" charset="0"/>
-              </a:endParaRPr>
-            </a:p>
-            <a:p>
-              <a:pPr eaLnBrk="1" hangingPunct="1">
-                <a:spcBef>
-                  <a:spcPct val="0"/>
-                </a:spcBef>
-                <a:buFontTx/>
-                <a:buChar char="-"/>
-              </a:pPr>
-              <a:r>
-                <a:rPr lang="en-GB" altLang="en-US" sz="2400" dirty="0">
-                  <a:latin typeface="Helvetica" panose="020B0604020202020204" pitchFamily="34" charset="0"/>
-                  <a:cs typeface="Helvetica" panose="020B0604020202020204" pitchFamily="34" charset="0"/>
-                </a:rPr>
-                <a:t>Inner loop pump controllers made with the Root Locus design method.</a:t>
-              </a:r>
-            </a:p>
-            <a:p>
-              <a:pPr eaLnBrk="1" hangingPunct="1">
-                <a:spcBef>
-                  <a:spcPct val="0"/>
-                </a:spcBef>
-                <a:buFontTx/>
-                <a:buChar char="-"/>
-              </a:pPr>
-              <a:r>
-                <a:rPr lang="en-GB" altLang="en-US" sz="2400" dirty="0">
-                  <a:latin typeface="Helvetica" panose="020B0604020202020204" pitchFamily="34" charset="0"/>
-                  <a:cs typeface="Helvetica" panose="020B0604020202020204" pitchFamily="34" charset="0"/>
-                </a:rPr>
-                <a:t>Linearized transfer matrix indicated low coupling between pumps</a:t>
-              </a:r>
-            </a:p>
-            <a:p>
-              <a:pPr eaLnBrk="1" hangingPunct="1">
-                <a:spcBef>
-                  <a:spcPct val="0"/>
-                </a:spcBef>
-                <a:buFontTx/>
-                <a:buChar char="-"/>
-              </a:pPr>
-              <a:r>
-                <a:rPr lang="en-GB" altLang="en-US" sz="2400" b="1" dirty="0">
-                  <a:latin typeface="Helvetica" panose="020B0604020202020204" pitchFamily="34" charset="0"/>
-                  <a:cs typeface="Helvetica" panose="020B0604020202020204" pitchFamily="34" charset="0"/>
-                </a:rPr>
-                <a:t>Plot of transfer matrix</a:t>
-              </a:r>
-              <a:endParaRPr lang="en-GB" altLang="en-US" sz="2400" dirty="0">
-                <a:latin typeface="Helvetica" panose="020B0604020202020204" pitchFamily="34" charset="0"/>
-                <a:cs typeface="Helvetica" panose="020B0604020202020204" pitchFamily="34" charset="0"/>
-              </a:endParaRPr>
-            </a:p>
-            <a:p>
-              <a:pPr eaLnBrk="1" hangingPunct="1">
-                <a:spcBef>
-                  <a:spcPct val="0"/>
-                </a:spcBef>
-                <a:buFontTx/>
-                <a:buNone/>
-              </a:pPr>
-              <a:r>
-                <a:rPr lang="en-GB" altLang="en-US" sz="2400" dirty="0">
-                  <a:latin typeface="Helvetica" panose="020B0604020202020204" pitchFamily="34" charset="0"/>
-                  <a:cs typeface="Helvetica" panose="020B0604020202020204" pitchFamily="34" charset="0"/>
-                </a:rPr>
-                <a:t>- Four second time delay modelled with second order </a:t>
-              </a:r>
-              <a:r>
-                <a:rPr lang="en-GB" altLang="en-US" sz="2400" dirty="0" err="1">
-                  <a:latin typeface="Helvetica" panose="020B0604020202020204" pitchFamily="34" charset="0"/>
-                  <a:cs typeface="Helvetica" panose="020B0604020202020204" pitchFamily="34" charset="0"/>
-                </a:rPr>
-                <a:t>padé</a:t>
-              </a:r>
-              <a:r>
-                <a:rPr lang="en-GB" altLang="en-US" sz="2400" dirty="0">
-                  <a:latin typeface="Helvetica" panose="020B0604020202020204" pitchFamily="34" charset="0"/>
-                  <a:cs typeface="Helvetica" panose="020B0604020202020204" pitchFamily="34" charset="0"/>
-                </a:rPr>
-                <a:t> approximation</a:t>
-              </a:r>
-            </a:p>
-            <a:p>
-              <a:pPr eaLnBrk="1" hangingPunct="1">
-                <a:spcBef>
-                  <a:spcPct val="0"/>
-                </a:spcBef>
-                <a:buFontTx/>
-                <a:buNone/>
-              </a:pPr>
-              <a:endParaRPr lang="en-GB" altLang="en-US" sz="2400" dirty="0">
-                <a:latin typeface="Helvetica" panose="020B0604020202020204" pitchFamily="34" charset="0"/>
-                <a:cs typeface="Helvetica" panose="020B0604020202020204" pitchFamily="34" charset="0"/>
-              </a:endParaRPr>
-            </a:p>
-            <a:p>
-              <a:pPr eaLnBrk="1" hangingPunct="1">
-                <a:spcBef>
-                  <a:spcPct val="0"/>
-                </a:spcBef>
-                <a:buFontTx/>
-                <a:buNone/>
-              </a:pPr>
-              <a:endParaRPr lang="en-GB" altLang="en-US" sz="2400" dirty="0">
-                <a:latin typeface="Helvetica" panose="020B0604020202020204" pitchFamily="34" charset="0"/>
-                <a:cs typeface="Helvetica" panose="020B0604020202020204" pitchFamily="34" charset="0"/>
-              </a:endParaRPr>
-            </a:p>
-            <a:p>
-              <a:pPr eaLnBrk="1" hangingPunct="1">
-                <a:spcBef>
-                  <a:spcPct val="0"/>
-                </a:spcBef>
-                <a:buFontTx/>
-                <a:buChar char="-"/>
-              </a:pPr>
-              <a:r>
-                <a:rPr lang="en-GB" altLang="en-US" sz="2400" dirty="0">
-                  <a:latin typeface="Helvetica" panose="020B0604020202020204" pitchFamily="34" charset="0"/>
-                  <a:cs typeface="Helvetica" panose="020B0604020202020204" pitchFamily="34" charset="0"/>
-                </a:rPr>
-                <a:t>FFT of consumer data used to create model of consumption pattern for Kalman Filter</a:t>
-              </a:r>
-            </a:p>
-            <a:p>
-              <a:pPr eaLnBrk="1" hangingPunct="1">
-                <a:spcBef>
-                  <a:spcPct val="0"/>
-                </a:spcBef>
-                <a:buFontTx/>
-                <a:buChar char="-"/>
-              </a:pPr>
-              <a:r>
-                <a:rPr lang="en-GB" altLang="en-US" sz="2400" dirty="0">
-                  <a:latin typeface="Helvetica" panose="020B0604020202020204" pitchFamily="34" charset="0"/>
-                  <a:cs typeface="Helvetica" panose="020B0604020202020204" pitchFamily="34" charset="0"/>
-                </a:rPr>
-                <a:t>Estimated consumer flow is fed forward to LQR controller</a:t>
-              </a:r>
-            </a:p>
-            <a:p>
-              <a:pPr eaLnBrk="1" hangingPunct="1">
-                <a:spcBef>
-                  <a:spcPct val="0"/>
-                </a:spcBef>
-                <a:buFontTx/>
-                <a:buChar char="-"/>
-              </a:pPr>
-              <a:endParaRPr lang="en-GB" altLang="en-US" sz="2400" dirty="0">
-                <a:latin typeface="Helvetica" panose="020B0604020202020204" pitchFamily="34" charset="0"/>
-                <a:cs typeface="Helvetica" panose="020B0604020202020204" pitchFamily="34" charset="0"/>
-              </a:endParaRPr>
-            </a:p>
-            <a:p>
-              <a:pPr eaLnBrk="1" hangingPunct="1">
-                <a:spcBef>
-                  <a:spcPct val="0"/>
-                </a:spcBef>
-                <a:buFontTx/>
-                <a:buNone/>
-              </a:pPr>
-              <a:endParaRPr lang="en-GB" altLang="en-US" sz="2400" dirty="0">
-                <a:latin typeface="Helvetica" panose="020B0604020202020204" pitchFamily="34" charset="0"/>
-                <a:cs typeface="Helvetica" panose="020B0604020202020204" pitchFamily="34" charset="0"/>
-              </a:endParaRPr>
-            </a:p>
-            <a:p>
-              <a:pPr eaLnBrk="1" hangingPunct="1">
-                <a:spcBef>
-                  <a:spcPct val="0"/>
-                </a:spcBef>
-                <a:buFontTx/>
-                <a:buNone/>
-              </a:pPr>
-              <a:r>
-                <a:rPr lang="en-GB" altLang="en-US" sz="2400" dirty="0">
-                  <a:latin typeface="Helvetica" panose="020B0604020202020204" pitchFamily="34" charset="0"/>
-                  <a:cs typeface="Helvetica" panose="020B0604020202020204" pitchFamily="34" charset="0"/>
-                </a:rPr>
-                <a:t>- Interaction between (stiff) Kalman filter and slow LQR controller resulted oscillations:</a:t>
-              </a:r>
-            </a:p>
-            <a:p>
-              <a:pPr eaLnBrk="1" hangingPunct="1">
-                <a:spcBef>
-                  <a:spcPct val="0"/>
-                </a:spcBef>
-                <a:buFontTx/>
-                <a:buNone/>
-              </a:pPr>
-              <a:r>
-                <a:rPr lang="en-GB" altLang="en-US" sz="2400" dirty="0">
-                  <a:latin typeface="Helvetica" panose="020B0604020202020204" pitchFamily="34" charset="0"/>
-                  <a:cs typeface="Helvetica" panose="020B0604020202020204" pitchFamily="34" charset="0"/>
-                </a:rPr>
-                <a:t>- </a:t>
-              </a:r>
-              <a:r>
-                <a:rPr lang="en-GB" altLang="en-US" sz="2400" b="1" dirty="0">
-                  <a:latin typeface="Helvetica" panose="020B0604020202020204" pitchFamily="34" charset="0"/>
-                  <a:cs typeface="Helvetica" panose="020B0604020202020204" pitchFamily="34" charset="0"/>
-                </a:rPr>
-                <a:t>Plot of Kalman-LQR oscillations</a:t>
-              </a:r>
-              <a:endParaRPr lang="en-GB" altLang="en-US" sz="2400" dirty="0">
-                <a:latin typeface="Helvetica" panose="020B0604020202020204" pitchFamily="34" charset="0"/>
-                <a:cs typeface="Helvetica" panose="020B0604020202020204" pitchFamily="34" charset="0"/>
-              </a:endParaRPr>
             </a:p>
           </p:txBody>
         </p:sp>
@@ -8609,297 +7403,6 @@
       </p:sp>
       <p:sp>
         <p:nvSpPr>
-          <p:cNvPr id="2" name="TextBox 1">
-            <a:extLst>
-              <a:ext uri="{FF2B5EF4-FFF2-40B4-BE49-F238E27FC236}">
-                <a16:creationId xmlns:a16="http://schemas.microsoft.com/office/drawing/2014/main" id="{3A170F90-C89D-4746-A6A6-B0DDF929F7E8}"/>
-              </a:ext>
-            </a:extLst>
-          </p:cNvPr>
-          <p:cNvSpPr txBox="1"/>
-          <p:nvPr/>
-        </p:nvSpPr>
-        <p:spPr>
-          <a:xfrm>
-            <a:off x="-21402293" y="21272913"/>
-            <a:ext cx="13424693" cy="9325630"/>
-          </a:xfrm>
-          <a:prstGeom prst="rect">
-            <a:avLst/>
-          </a:prstGeom>
-          <a:noFill/>
-        </p:spPr>
-        <p:txBody>
-          <a:bodyPr wrap="square" rtlCol="0">
-            <a:spAutoFit/>
-          </a:bodyPr>
-          <a:lstStyle/>
-          <a:p>
-            <a:r>
-              <a:rPr lang="en-US" sz="2400" dirty="0">
-                <a:latin typeface="Helvetica" panose="020B0604020202020204" pitchFamily="34" charset="0"/>
-                <a:cs typeface="Helvetica" panose="020B0604020202020204" pitchFamily="34" charset="0"/>
-              </a:rPr>
-              <a:t>- Modeling of network was based on graph theory.</a:t>
-            </a:r>
-            <a:endParaRPr lang="en-DK" sz="2400" dirty="0">
-              <a:latin typeface="Helvetica" panose="020B0604020202020204" pitchFamily="34" charset="0"/>
-              <a:cs typeface="Helvetica" panose="020B0604020202020204" pitchFamily="34" charset="0"/>
-            </a:endParaRPr>
-          </a:p>
-          <a:p>
-            <a:endParaRPr lang="en-DK" sz="2400" dirty="0">
-              <a:latin typeface="Helvetica" panose="020B0604020202020204" pitchFamily="34" charset="0"/>
-              <a:cs typeface="Helvetica" panose="020B0604020202020204" pitchFamily="34" charset="0"/>
-            </a:endParaRPr>
-          </a:p>
-          <a:p>
-            <a:pPr marL="342900" indent="-342900">
-              <a:buFontTx/>
-              <a:buChar char="-"/>
-            </a:pPr>
-            <a:r>
-              <a:rPr lang="en-US" sz="2400" dirty="0">
-                <a:latin typeface="Helvetica" panose="020B0604020202020204" pitchFamily="34" charset="0"/>
-                <a:cs typeface="Helvetica" panose="020B0604020202020204" pitchFamily="34" charset="0"/>
-              </a:rPr>
-              <a:t>Slow and fast dynamics are separated for cascaded control</a:t>
-            </a:r>
-          </a:p>
-          <a:p>
-            <a:pPr marL="800100" lvl="1" indent="-342900">
-              <a:buFontTx/>
-              <a:buChar char="-"/>
-            </a:pPr>
-            <a:r>
-              <a:rPr lang="en-US" sz="2400" dirty="0">
-                <a:latin typeface="Helvetica" panose="020B0604020202020204" pitchFamily="34" charset="0"/>
-                <a:cs typeface="Helvetica" panose="020B0604020202020204" pitchFamily="34" charset="0"/>
-              </a:rPr>
-              <a:t>Slow dynamics from tank dynamics</a:t>
-            </a:r>
-          </a:p>
-          <a:p>
-            <a:pPr marL="800100" lvl="1" indent="-342900">
-              <a:buFontTx/>
-              <a:buChar char="-"/>
-            </a:pPr>
-            <a:r>
-              <a:rPr lang="en-US" sz="2400" dirty="0">
-                <a:latin typeface="Helvetica" panose="020B0604020202020204" pitchFamily="34" charset="0"/>
-                <a:cs typeface="Helvetica" panose="020B0604020202020204" pitchFamily="34" charset="0"/>
-              </a:rPr>
-              <a:t>Fast dynamics from pipe inertia</a:t>
-            </a:r>
-          </a:p>
-          <a:p>
-            <a:pPr marL="800100" lvl="1" indent="-342900">
-              <a:buFontTx/>
-              <a:buChar char="-"/>
-            </a:pPr>
-            <a:r>
-              <a:rPr lang="en-US" sz="2400" dirty="0">
-                <a:latin typeface="Helvetica" panose="020B0604020202020204" pitchFamily="34" charset="0"/>
-                <a:cs typeface="Helvetica" panose="020B0604020202020204" pitchFamily="34" charset="0"/>
-              </a:rPr>
-              <a:t>valves, pumps and pipes includes static resistances</a:t>
-            </a:r>
-          </a:p>
-          <a:p>
-            <a:pPr marL="342900" indent="-342900">
-              <a:buFontTx/>
-              <a:buChar char="-"/>
-            </a:pPr>
-            <a:endParaRPr lang="en-US" sz="2400" dirty="0">
-              <a:latin typeface="Helvetica" panose="020B0604020202020204" pitchFamily="34" charset="0"/>
-              <a:cs typeface="Helvetica" panose="020B0604020202020204" pitchFamily="34" charset="0"/>
-            </a:endParaRPr>
-          </a:p>
-          <a:p>
-            <a:pPr marL="342900" indent="-342900">
-              <a:buFontTx/>
-              <a:buChar char="-"/>
-            </a:pPr>
-            <a:endParaRPr lang="en-US" sz="2400" dirty="0">
-              <a:latin typeface="Helvetica" panose="020B0604020202020204" pitchFamily="34" charset="0"/>
-              <a:cs typeface="Helvetica" panose="020B0604020202020204" pitchFamily="34" charset="0"/>
-            </a:endParaRPr>
-          </a:p>
-          <a:p>
-            <a:pPr marL="342900" indent="-342900">
-              <a:buFontTx/>
-              <a:buChar char="-"/>
-            </a:pPr>
-            <a:r>
-              <a:rPr lang="en-US" sz="2400" dirty="0">
-                <a:latin typeface="Helvetica" panose="020B0604020202020204" pitchFamily="34" charset="0"/>
-                <a:cs typeface="Helvetica" panose="020B0604020202020204" pitchFamily="34" charset="0"/>
-              </a:rPr>
-              <a:t>Model is non-linear. </a:t>
-            </a:r>
-          </a:p>
-          <a:p>
-            <a:pPr marL="800100" lvl="1" indent="-342900">
-              <a:buFontTx/>
-              <a:buChar char="-"/>
-            </a:pPr>
-            <a:r>
-              <a:rPr lang="en-US" sz="2400" dirty="0" err="1">
-                <a:latin typeface="Helvetica" panose="020B0604020202020204" pitchFamily="34" charset="0"/>
-                <a:cs typeface="Helvetica" panose="020B0604020202020204" pitchFamily="34" charset="0"/>
-              </a:rPr>
-              <a:t>Linearised</a:t>
-            </a:r>
-            <a:r>
-              <a:rPr lang="en-US" sz="2400" dirty="0">
-                <a:latin typeface="Helvetica" panose="020B0604020202020204" pitchFamily="34" charset="0"/>
-                <a:cs typeface="Helvetica" panose="020B0604020202020204" pitchFamily="34" charset="0"/>
-              </a:rPr>
-              <a:t> with Taylor expansion</a:t>
-            </a:r>
-          </a:p>
-          <a:p>
-            <a:pPr marL="342900" indent="-342900">
-              <a:buFontTx/>
-              <a:buChar char="-"/>
-            </a:pPr>
-            <a:endParaRPr lang="en-US" sz="2400" dirty="0">
-              <a:latin typeface="Helvetica" panose="020B0604020202020204" pitchFamily="34" charset="0"/>
-              <a:cs typeface="Helvetica" panose="020B0604020202020204" pitchFamily="34" charset="0"/>
-            </a:endParaRPr>
-          </a:p>
-          <a:p>
-            <a:endParaRPr lang="en-DK" sz="2400" dirty="0">
-              <a:latin typeface="Helvetica" panose="020B0604020202020204" pitchFamily="34" charset="0"/>
-              <a:cs typeface="Helvetica" panose="020B0604020202020204" pitchFamily="34" charset="0"/>
-            </a:endParaRPr>
-          </a:p>
-          <a:p>
-            <a:endParaRPr lang="en-DK" sz="2400" dirty="0">
-              <a:latin typeface="Helvetica" panose="020B0604020202020204" pitchFamily="34" charset="0"/>
-              <a:cs typeface="Helvetica" panose="020B0604020202020204" pitchFamily="34" charset="0"/>
-            </a:endParaRPr>
-          </a:p>
-          <a:p>
-            <a:endParaRPr lang="en-DK" sz="2400" dirty="0">
-              <a:latin typeface="Helvetica" panose="020B0604020202020204" pitchFamily="34" charset="0"/>
-              <a:cs typeface="Helvetica" panose="020B0604020202020204" pitchFamily="34" charset="0"/>
-            </a:endParaRPr>
-          </a:p>
-          <a:p>
-            <a:endParaRPr lang="en-DK" sz="2400" dirty="0">
-              <a:latin typeface="Helvetica" panose="020B0604020202020204" pitchFamily="34" charset="0"/>
-              <a:cs typeface="Helvetica" panose="020B0604020202020204" pitchFamily="34" charset="0"/>
-            </a:endParaRPr>
-          </a:p>
-          <a:p>
-            <a:endParaRPr lang="en-DK" sz="2400" dirty="0">
-              <a:latin typeface="Helvetica" panose="020B0604020202020204" pitchFamily="34" charset="0"/>
-              <a:cs typeface="Helvetica" panose="020B0604020202020204" pitchFamily="34" charset="0"/>
-            </a:endParaRPr>
-          </a:p>
-          <a:p>
-            <a:pPr marL="342900" indent="-342900">
-              <a:buFontTx/>
-              <a:buChar char="-"/>
-            </a:pPr>
-            <a:endParaRPr lang="en-DK" sz="2400" dirty="0">
-              <a:latin typeface="Helvetica" panose="020B0604020202020204" pitchFamily="34" charset="0"/>
-              <a:cs typeface="Helvetica" panose="020B0604020202020204" pitchFamily="34" charset="0"/>
-            </a:endParaRPr>
-          </a:p>
-          <a:p>
-            <a:pPr marL="342900" indent="-342900">
-              <a:buFontTx/>
-              <a:buChar char="-"/>
-            </a:pPr>
-            <a:endParaRPr lang="en-US" sz="2400" dirty="0">
-              <a:latin typeface="Helvetica" panose="020B0604020202020204" pitchFamily="34" charset="0"/>
-              <a:cs typeface="Helvetica" panose="020B0604020202020204" pitchFamily="34" charset="0"/>
-            </a:endParaRPr>
-          </a:p>
-          <a:p>
-            <a:pPr marL="342900" indent="-342900">
-              <a:buFontTx/>
-              <a:buChar char="-"/>
-            </a:pPr>
-            <a:endParaRPr lang="en-US" sz="2400" dirty="0">
-              <a:latin typeface="Helvetica" panose="020B0604020202020204" pitchFamily="34" charset="0"/>
-              <a:cs typeface="Helvetica" panose="020B0604020202020204" pitchFamily="34" charset="0"/>
-            </a:endParaRPr>
-          </a:p>
-          <a:p>
-            <a:pPr marL="342900" indent="-342900">
-              <a:buFontTx/>
-              <a:buChar char="-"/>
-            </a:pPr>
-            <a:r>
-              <a:rPr lang="en-DK" sz="2400" dirty="0">
-                <a:latin typeface="Helvetica" panose="020B0604020202020204" pitchFamily="34" charset="0"/>
-                <a:cs typeface="Helvetica" panose="020B0604020202020204" pitchFamily="34" charset="0"/>
-              </a:rPr>
-              <a:t>Leakage detection and disturbance estimation with Kalman filter. </a:t>
-            </a:r>
-          </a:p>
-          <a:p>
-            <a:pPr marL="800100" lvl="1" indent="-342900">
-              <a:buFontTx/>
-              <a:buChar char="-"/>
-            </a:pPr>
-            <a:r>
-              <a:rPr lang="en-DK" sz="2400" dirty="0">
-                <a:latin typeface="Helvetica" panose="020B0604020202020204" pitchFamily="34" charset="0"/>
-                <a:cs typeface="Helvetica" panose="020B0604020202020204" pitchFamily="34" charset="0"/>
-              </a:rPr>
-              <a:t>Consumer flow is not realisticly measured</a:t>
-            </a:r>
-          </a:p>
-          <a:p>
-            <a:pPr marL="800100" lvl="1" indent="-342900">
-              <a:buFontTx/>
-              <a:buChar char="-"/>
-            </a:pPr>
-            <a:r>
-              <a:rPr lang="en-DK" sz="2400" dirty="0">
-                <a:latin typeface="Helvetica" panose="020B0604020202020204" pitchFamily="34" charset="0"/>
-                <a:cs typeface="Helvetica" panose="020B0604020202020204" pitchFamily="34" charset="0"/>
-              </a:rPr>
-              <a:t>Stiff kalman filter allows for leakage detection</a:t>
-            </a:r>
-          </a:p>
-          <a:p>
-            <a:pPr marL="800100" lvl="1" indent="-342900">
-              <a:buFontTx/>
-              <a:buChar char="-"/>
-            </a:pPr>
-            <a:r>
-              <a:rPr lang="en-DK" sz="2400" dirty="0">
-                <a:latin typeface="Helvetica" panose="020B0604020202020204" pitchFamily="34" charset="0"/>
-                <a:cs typeface="Helvetica" panose="020B0604020202020204" pitchFamily="34" charset="0"/>
-              </a:rPr>
-              <a:t>Input is based on mass conservation – what comes in and must come out</a:t>
-            </a:r>
-          </a:p>
-          <a:p>
-            <a:pPr marL="800100" lvl="1" indent="-342900">
-              <a:buFontTx/>
-              <a:buChar char="-"/>
-            </a:pPr>
-            <a:endParaRPr lang="en-DK" sz="2400" dirty="0">
-              <a:latin typeface="Helvetica" panose="020B0604020202020204" pitchFamily="34" charset="0"/>
-              <a:cs typeface="Helvetica" panose="020B0604020202020204" pitchFamily="34" charset="0"/>
-            </a:endParaRPr>
-          </a:p>
-          <a:p>
-            <a:endParaRPr lang="en-DK" sz="2400" dirty="0">
-              <a:latin typeface="Helvetica" panose="020B0604020202020204" pitchFamily="34" charset="0"/>
-              <a:cs typeface="Helvetica" panose="020B0604020202020204" pitchFamily="34" charset="0"/>
-            </a:endParaRPr>
-          </a:p>
-        </p:txBody>
-      </p:sp>
-      <p:sp>
-        <p:nvSpPr>
           <p:cNvPr id="49" name="TextBox 4">
             <a:extLst>
               <a:ext uri="{FF2B5EF4-FFF2-40B4-BE49-F238E27FC236}">
@@ -8914,7 +7417,7 @@
         </p:nvSpPr>
         <p:spPr bwMode="auto">
           <a:xfrm>
-            <a:off x="3661129" y="25958851"/>
+            <a:off x="903853" y="25038683"/>
             <a:ext cx="6515893" cy="1107996"/>
           </a:xfrm>
           <a:prstGeom prst="rect">
@@ -9047,13 +7550,30 @@
             </a:lvl9pPr>
           </a:lstStyle>
           <a:p>
-            <a:pPr algn="just" eaLnBrk="1" hangingPunct="1"/>
+            <a:pPr algn="ctr" eaLnBrk="1" hangingPunct="1"/>
+            <a:r>
+              <a:rPr lang="en-GB" altLang="en-US" sz="2200" b="1" dirty="0">
+                <a:latin typeface="Helvetica" panose="020B0604020202020204" pitchFamily="34" charset="0"/>
+                <a:cs typeface="Helvetica" panose="020B0604020202020204" pitchFamily="34" charset="0"/>
+              </a:rPr>
+              <a:t>Outer Loop LQR control</a:t>
+            </a:r>
+          </a:p>
+          <a:p>
+            <a:pPr eaLnBrk="1" hangingPunct="1"/>
+            <a:r>
+              <a:rPr lang="en-GB" altLang="en-US" sz="2200" b="1" dirty="0">
+                <a:latin typeface="Helvetica" panose="020B0604020202020204" pitchFamily="34" charset="0"/>
+                <a:cs typeface="Helvetica" panose="020B0604020202020204" pitchFamily="34" charset="0"/>
+              </a:rPr>
+              <a:t>F</a:t>
+            </a:r>
             <a:r>
               <a:rPr lang="en-GB" altLang="en-US" sz="2200" dirty="0">
                 <a:latin typeface="Helvetica" panose="020B0604020202020204" pitchFamily="34" charset="0"/>
                 <a:cs typeface="Helvetica" panose="020B0604020202020204" pitchFamily="34" charset="0"/>
               </a:rPr>
-              <a:t>Inner Loop LQR control: The LQR controller follows constant tank pressure difference, starting 15 mm below reference.</a:t>
+              <a:t>ollows constant tank pressure difference, starting 15 mm below reference.</a:t>
             </a:r>
           </a:p>
         </p:txBody>
@@ -9074,8 +7594,8 @@
         </p:nvSpPr>
         <p:spPr bwMode="auto">
           <a:xfrm>
-            <a:off x="10933928" y="26027872"/>
-            <a:ext cx="6924675" cy="430213"/>
+            <a:off x="15539641" y="24552901"/>
+            <a:ext cx="6924675" cy="769441"/>
           </a:xfrm>
           <a:prstGeom prst="rect">
             <a:avLst/>
@@ -9207,13 +7727,23 @@
             </a:lvl9pPr>
           </a:lstStyle>
           <a:p>
-            <a:pPr algn="just" eaLnBrk="1" hangingPunct="1"/>
+            <a:pPr algn="ctr" eaLnBrk="1" hangingPunct="1"/>
+            <a:r>
+              <a:rPr lang="en-GB" altLang="en-US" sz="2200" b="1" dirty="0">
+                <a:latin typeface="Helvetica" panose="020B0604020202020204" pitchFamily="34" charset="0"/>
+                <a:cs typeface="Helvetica" panose="020B0604020202020204" pitchFamily="34" charset="0"/>
+              </a:rPr>
+              <a:t>Inner loop Pump control</a:t>
+            </a:r>
+          </a:p>
+          <a:p>
+            <a:pPr eaLnBrk="1" hangingPunct="1"/>
             <a:r>
               <a:rPr lang="en-GB" altLang="en-US" sz="2200" dirty="0">
                 <a:latin typeface="Helvetica" panose="020B0604020202020204" pitchFamily="34" charset="0"/>
                 <a:cs typeface="Helvetica" panose="020B0604020202020204" pitchFamily="34" charset="0"/>
               </a:rPr>
-              <a:t>Outer loop Pump control: </a:t>
+              <a:t>Pumps attempt to follow their reference </a:t>
             </a:r>
           </a:p>
         </p:txBody>
@@ -9234,8 +7764,8 @@
         </p:nvSpPr>
         <p:spPr bwMode="auto">
           <a:xfrm>
-            <a:off x="3675417" y="25403763"/>
-            <a:ext cx="13623925" cy="461962"/>
+            <a:off x="1008320" y="23817120"/>
+            <a:ext cx="10812139" cy="830997"/>
           </a:xfrm>
           <a:prstGeom prst="rect">
             <a:avLst/>
@@ -9265,7 +7795,7 @@
           </a:extLst>
         </p:spPr>
         <p:txBody>
-          <a:bodyPr>
+          <a:bodyPr wrap="square">
             <a:spAutoFit/>
           </a:bodyPr>
           <a:lstStyle>
@@ -9394,8 +7924,8 @@
         </p:nvSpPr>
         <p:spPr bwMode="auto">
           <a:xfrm>
-            <a:off x="3597629" y="30178962"/>
-            <a:ext cx="6924675" cy="769938"/>
+            <a:off x="8180866" y="28185455"/>
+            <a:ext cx="6924675" cy="1107996"/>
           </a:xfrm>
           <a:prstGeom prst="rect">
             <a:avLst/>
@@ -9527,13 +8057,23 @@
             </a:lvl9pPr>
           </a:lstStyle>
           <a:p>
-            <a:pPr algn="just" eaLnBrk="1" hangingPunct="1"/>
+            <a:pPr algn="ctr" eaLnBrk="1" hangingPunct="1"/>
+            <a:r>
+              <a:rPr lang="en-GB" altLang="en-US" sz="2200" b="1" dirty="0">
+                <a:latin typeface="Helvetica" panose="020B0604020202020204" pitchFamily="34" charset="0"/>
+                <a:cs typeface="Helvetica" panose="020B0604020202020204" pitchFamily="34" charset="0"/>
+              </a:rPr>
+              <a:t>Consumer flow (disturbance) estimation</a:t>
+            </a:r>
+          </a:p>
+          <a:p>
+            <a:pPr eaLnBrk="1" hangingPunct="1"/>
             <a:r>
               <a:rPr lang="en-GB" altLang="en-US" sz="2200" dirty="0">
                 <a:latin typeface="Helvetica" panose="020B0604020202020204" pitchFamily="34" charset="0"/>
                 <a:cs typeface="Helvetica" panose="020B0604020202020204" pitchFamily="34" charset="0"/>
               </a:rPr>
-              <a:t>Consumer flow (disturbance) estimation: The Kalman filter tracking based on model and measurement data</a:t>
+              <a:t>The Kalman filter tracking based on model and measurement data</a:t>
             </a:r>
           </a:p>
         </p:txBody>
@@ -9544,6 +8084,78 @@
             <a:extLst>
               <a:ext uri="{FF2B5EF4-FFF2-40B4-BE49-F238E27FC236}">
                 <a16:creationId xmlns:a16="http://schemas.microsoft.com/office/drawing/2014/main" id="{32ED717A-6CB9-EF47-B281-CCA93522B77E}"/>
+              </a:ext>
+            </a:extLst>
+          </p:cNvPr>
+          <p:cNvPicPr>
+            <a:picLocks noChangeAspect="1"/>
+          </p:cNvPicPr>
+          <p:nvPr/>
+        </p:nvPicPr>
+        <p:blipFill>
+          <a:blip r:embed="rId3">
+            <a:extLst>
+              <a:ext uri="{28A0092B-C50C-407E-A947-70E740481C1C}">
+                <a14:useLocalDpi xmlns:a14="http://schemas.microsoft.com/office/drawing/2010/main" val="0"/>
+              </a:ext>
+            </a:extLst>
+          </a:blip>
+          <a:stretch>
+            <a:fillRect/>
+          </a:stretch>
+        </p:blipFill>
+        <p:spPr>
+          <a:xfrm>
+            <a:off x="7341385" y="29273366"/>
+            <a:ext cx="7161942" cy="4168089"/>
+          </a:xfrm>
+          <a:prstGeom prst="rect">
+            <a:avLst/>
+          </a:prstGeom>
+        </p:spPr>
+      </p:pic>
+      <p:pic>
+        <p:nvPicPr>
+          <p:cNvPr id="54" name="Picture 53">
+            <a:extLst>
+              <a:ext uri="{FF2B5EF4-FFF2-40B4-BE49-F238E27FC236}">
+                <a16:creationId xmlns:a16="http://schemas.microsoft.com/office/drawing/2014/main" id="{928DD5A1-827C-C142-82B2-EB86987C2556}"/>
+              </a:ext>
+            </a:extLst>
+          </p:cNvPr>
+          <p:cNvPicPr>
+            <a:picLocks noChangeAspect="1"/>
+          </p:cNvPicPr>
+          <p:nvPr/>
+        </p:nvPicPr>
+        <p:blipFill>
+          <a:blip r:embed="rId4">
+            <a:extLst>
+              <a:ext uri="{28A0092B-C50C-407E-A947-70E740481C1C}">
+                <a14:useLocalDpi xmlns:a14="http://schemas.microsoft.com/office/drawing/2010/main" val="0"/>
+              </a:ext>
+            </a:extLst>
+          </a:blip>
+          <a:stretch>
+            <a:fillRect/>
+          </a:stretch>
+        </p:blipFill>
+        <p:spPr>
+          <a:xfrm>
+            <a:off x="14983553" y="25312500"/>
+            <a:ext cx="7226910" cy="4143666"/>
+          </a:xfrm>
+          <a:prstGeom prst="rect">
+            <a:avLst/>
+          </a:prstGeom>
+        </p:spPr>
+      </p:pic>
+      <p:pic>
+        <p:nvPicPr>
+          <p:cNvPr id="55" name="Picture 54">
+            <a:extLst>
+              <a:ext uri="{FF2B5EF4-FFF2-40B4-BE49-F238E27FC236}">
+                <a16:creationId xmlns:a16="http://schemas.microsoft.com/office/drawing/2014/main" id="{2C13C81C-FDD6-EB42-9E96-8DB2A50812B6}"/>
               </a:ext>
             </a:extLst>
           </p:cNvPr>
@@ -9566,8 +8178,8 @@
         </p:blipFill>
         <p:spPr>
           <a:xfrm>
-            <a:off x="20224076" y="24729358"/>
-            <a:ext cx="6720585" cy="3911229"/>
+            <a:off x="22221047" y="30061926"/>
+            <a:ext cx="7351572" cy="3137530"/>
           </a:xfrm>
           <a:prstGeom prst="rect">
             <a:avLst/>
@@ -9576,10 +8188,10 @@
       </p:pic>
       <p:pic>
         <p:nvPicPr>
-          <p:cNvPr id="54" name="Picture 53">
+          <p:cNvPr id="56" name="Picture 55">
             <a:extLst>
               <a:ext uri="{FF2B5EF4-FFF2-40B4-BE49-F238E27FC236}">
-                <a16:creationId xmlns:a16="http://schemas.microsoft.com/office/drawing/2014/main" id="{928DD5A1-827C-C142-82B2-EB86987C2556}"/>
+                <a16:creationId xmlns:a16="http://schemas.microsoft.com/office/drawing/2014/main" id="{4A077C95-FD8A-2447-8340-EAB9A573F2BC}"/>
               </a:ext>
             </a:extLst>
           </p:cNvPr>
@@ -9602,79 +8214,7 @@
         </p:blipFill>
         <p:spPr>
           <a:xfrm>
-            <a:off x="10861489" y="26537527"/>
-            <a:ext cx="6807818" cy="3903373"/>
-          </a:xfrm>
-          <a:prstGeom prst="rect">
-            <a:avLst/>
-          </a:prstGeom>
-        </p:spPr>
-      </p:pic>
-      <p:pic>
-        <p:nvPicPr>
-          <p:cNvPr id="55" name="Picture 54">
-            <a:extLst>
-              <a:ext uri="{FF2B5EF4-FFF2-40B4-BE49-F238E27FC236}">
-                <a16:creationId xmlns:a16="http://schemas.microsoft.com/office/drawing/2014/main" id="{2C13C81C-FDD6-EB42-9E96-8DB2A50812B6}"/>
-              </a:ext>
-            </a:extLst>
-          </p:cNvPr>
-          <p:cNvPicPr>
-            <a:picLocks noChangeAspect="1"/>
-          </p:cNvPicPr>
-          <p:nvPr/>
-        </p:nvPicPr>
-        <p:blipFill>
-          <a:blip r:embed="rId7">
-            <a:extLst>
-              <a:ext uri="{28A0092B-C50C-407E-A947-70E740481C1C}">
-                <a14:useLocalDpi xmlns:a14="http://schemas.microsoft.com/office/drawing/2010/main" val="0"/>
-              </a:ext>
-            </a:extLst>
-          </a:blip>
-          <a:stretch>
-            <a:fillRect/>
-          </a:stretch>
-        </p:blipFill>
-        <p:spPr>
-          <a:xfrm>
-            <a:off x="20240628" y="29195675"/>
-            <a:ext cx="6571830" cy="2804749"/>
-          </a:xfrm>
-          <a:prstGeom prst="rect">
-            <a:avLst/>
-          </a:prstGeom>
-        </p:spPr>
-      </p:pic>
-      <p:pic>
-        <p:nvPicPr>
-          <p:cNvPr id="56" name="Picture 55">
-            <a:extLst>
-              <a:ext uri="{FF2B5EF4-FFF2-40B4-BE49-F238E27FC236}">
-                <a16:creationId xmlns:a16="http://schemas.microsoft.com/office/drawing/2014/main" id="{4A077C95-FD8A-2447-8340-EAB9A573F2BC}"/>
-              </a:ext>
-            </a:extLst>
-          </p:cNvPr>
-          <p:cNvPicPr>
-            <a:picLocks noChangeAspect="1"/>
-          </p:cNvPicPr>
-          <p:nvPr/>
-        </p:nvPicPr>
-        <p:blipFill>
-          <a:blip r:embed="rId8">
-            <a:extLst>
-              <a:ext uri="{28A0092B-C50C-407E-A947-70E740481C1C}">
-                <a14:useLocalDpi xmlns:a14="http://schemas.microsoft.com/office/drawing/2010/main" val="0"/>
-              </a:ext>
-            </a:extLst>
-          </a:blip>
-          <a:stretch>
-            <a:fillRect/>
-          </a:stretch>
-        </p:blipFill>
-        <p:spPr>
-          <a:xfrm>
-            <a:off x="3526288" y="27050447"/>
+            <a:off x="713282" y="26284262"/>
             <a:ext cx="7065866" cy="2956393"/>
           </a:xfrm>
           <a:prstGeom prst="rect">
@@ -9698,8 +8238,8 @@
         </p:nvSpPr>
         <p:spPr bwMode="auto">
           <a:xfrm>
-            <a:off x="10861489" y="30729981"/>
-            <a:ext cx="6890118" cy="1107996"/>
+            <a:off x="22738418" y="28755185"/>
+            <a:ext cx="6961982" cy="1107996"/>
           </a:xfrm>
           <a:prstGeom prst="rect">
             <a:avLst/>
@@ -9831,187 +8371,23 @@
             </a:lvl9pPr>
           </a:lstStyle>
           <a:p>
-            <a:pPr algn="just" eaLnBrk="1" hangingPunct="1"/>
+            <a:pPr algn="ctr" eaLnBrk="1" hangingPunct="1"/>
+            <a:r>
+              <a:rPr lang="en-GB" altLang="en-US" sz="2200" b="1" dirty="0">
+                <a:latin typeface="Helvetica" panose="020B0604020202020204" pitchFamily="34" charset="0"/>
+                <a:cs typeface="Helvetica" panose="020B0604020202020204" pitchFamily="34" charset="0"/>
+              </a:rPr>
+              <a:t>Leakage detection</a:t>
+            </a:r>
+          </a:p>
+          <a:p>
+            <a:pPr eaLnBrk="1" hangingPunct="1"/>
             <a:r>
               <a:rPr lang="en-GB" altLang="en-US" sz="2200" dirty="0">
                 <a:latin typeface="Helvetica" panose="020B0604020202020204" pitchFamily="34" charset="0"/>
                 <a:cs typeface="Helvetica" panose="020B0604020202020204" pitchFamily="34" charset="0"/>
               </a:rPr>
-              <a:t>Leakage detection: The big difference between the measured consumer flow and the Kalman Filter </a:t>
-            </a:r>
-            <a:r>
-              <a:rPr lang="en-GB" altLang="en-US" sz="2200" dirty="0" err="1">
-                <a:latin typeface="Helvetica" panose="020B0604020202020204" pitchFamily="34" charset="0"/>
-                <a:cs typeface="Helvetica" panose="020B0604020202020204" pitchFamily="34" charset="0"/>
-              </a:rPr>
-              <a:t>esitmate</a:t>
-            </a:r>
-            <a:r>
-              <a:rPr lang="en-GB" altLang="en-US" sz="2200" dirty="0">
-                <a:latin typeface="Helvetica" panose="020B0604020202020204" pitchFamily="34" charset="0"/>
-                <a:cs typeface="Helvetica" panose="020B0604020202020204" pitchFamily="34" charset="0"/>
-              </a:rPr>
-              <a:t> indicates a leakage</a:t>
-            </a:r>
-          </a:p>
-        </p:txBody>
-      </p:sp>
-      <p:sp>
-        <p:nvSpPr>
-          <p:cNvPr id="60" name="TextBox 56">
-            <a:extLst>
-              <a:ext uri="{FF2B5EF4-FFF2-40B4-BE49-F238E27FC236}">
-                <a16:creationId xmlns:a16="http://schemas.microsoft.com/office/drawing/2014/main" id="{1F12F02F-02BF-7F48-BE7D-7130D9D1C8C2}"/>
-              </a:ext>
-            </a:extLst>
-          </p:cNvPr>
-          <p:cNvSpPr txBox="1">
-            <a:spLocks noChangeArrowheads="1"/>
-          </p:cNvSpPr>
-          <p:nvPr/>
-        </p:nvSpPr>
-        <p:spPr bwMode="auto">
-          <a:xfrm>
-            <a:off x="20564893" y="32203168"/>
-            <a:ext cx="6924675" cy="769441"/>
-          </a:xfrm>
-          <a:prstGeom prst="rect">
-            <a:avLst/>
-          </a:prstGeom>
-          <a:noFill/>
-          <a:ln>
-            <a:noFill/>
-          </a:ln>
-          <a:extLst>
-            <a:ext uri="{909E8E84-426E-40DD-AFC4-6F175D3DCCD1}">
-              <a14:hiddenFill xmlns:a14="http://schemas.microsoft.com/office/drawing/2010/main">
-                <a:solidFill>
-                  <a:srgbClr val="FFFFFF"/>
-                </a:solidFill>
-              </a14:hiddenFill>
-            </a:ext>
-            <a:ext uri="{91240B29-F687-4F45-9708-019B960494DF}">
-              <a14:hiddenLine xmlns:a14="http://schemas.microsoft.com/office/drawing/2010/main" w="9525">
-                <a:solidFill>
-                  <a:srgbClr val="000000"/>
-                </a:solidFill>
-                <a:miter lim="800000"/>
-                <a:headEnd/>
-                <a:tailEnd/>
-              </a14:hiddenLine>
-            </a:ext>
-          </a:extLst>
-        </p:spPr>
-        <p:txBody>
-          <a:bodyPr>
-            <a:spAutoFit/>
-          </a:bodyPr>
-          <a:lstStyle>
-            <a:lvl1pPr>
-              <a:defRPr sz="6600">
-                <a:solidFill>
-                  <a:schemeClr val="tx1"/>
-                </a:solidFill>
-                <a:latin typeface="Arial" panose="020B0604020202020204" pitchFamily="34" charset="0"/>
-              </a:defRPr>
-            </a:lvl1pPr>
-            <a:lvl2pPr marL="742950" indent="-285750">
-              <a:defRPr sz="6600">
-                <a:solidFill>
-                  <a:schemeClr val="tx1"/>
-                </a:solidFill>
-                <a:latin typeface="Arial" panose="020B0604020202020204" pitchFamily="34" charset="0"/>
-              </a:defRPr>
-            </a:lvl2pPr>
-            <a:lvl3pPr marL="1143000" indent="-228600">
-              <a:defRPr sz="6600">
-                <a:solidFill>
-                  <a:schemeClr val="tx1"/>
-                </a:solidFill>
-                <a:latin typeface="Arial" panose="020B0604020202020204" pitchFamily="34" charset="0"/>
-              </a:defRPr>
-            </a:lvl3pPr>
-            <a:lvl4pPr marL="1600200" indent="-228600">
-              <a:defRPr sz="6600">
-                <a:solidFill>
-                  <a:schemeClr val="tx1"/>
-                </a:solidFill>
-                <a:latin typeface="Arial" panose="020B0604020202020204" pitchFamily="34" charset="0"/>
-              </a:defRPr>
-            </a:lvl4pPr>
-            <a:lvl5pPr marL="2057400" indent="-228600">
-              <a:defRPr sz="6600">
-                <a:solidFill>
-                  <a:schemeClr val="tx1"/>
-                </a:solidFill>
-                <a:latin typeface="Arial" panose="020B0604020202020204" pitchFamily="34" charset="0"/>
-              </a:defRPr>
-            </a:lvl5pPr>
-            <a:lvl6pPr marL="2514600" indent="-228600" eaLnBrk="0" fontAlgn="base" hangingPunct="0">
-              <a:spcBef>
-                <a:spcPct val="0"/>
-              </a:spcBef>
-              <a:spcAft>
-                <a:spcPct val="0"/>
-              </a:spcAft>
-              <a:defRPr sz="6600">
-                <a:solidFill>
-                  <a:schemeClr val="tx1"/>
-                </a:solidFill>
-                <a:latin typeface="Arial" panose="020B0604020202020204" pitchFamily="34" charset="0"/>
-              </a:defRPr>
-            </a:lvl6pPr>
-            <a:lvl7pPr marL="2971800" indent="-228600" eaLnBrk="0" fontAlgn="base" hangingPunct="0">
-              <a:spcBef>
-                <a:spcPct val="0"/>
-              </a:spcBef>
-              <a:spcAft>
-                <a:spcPct val="0"/>
-              </a:spcAft>
-              <a:defRPr sz="6600">
-                <a:solidFill>
-                  <a:schemeClr val="tx1"/>
-                </a:solidFill>
-                <a:latin typeface="Arial" panose="020B0604020202020204" pitchFamily="34" charset="0"/>
-              </a:defRPr>
-            </a:lvl7pPr>
-            <a:lvl8pPr marL="3429000" indent="-228600" eaLnBrk="0" fontAlgn="base" hangingPunct="0">
-              <a:spcBef>
-                <a:spcPct val="0"/>
-              </a:spcBef>
-              <a:spcAft>
-                <a:spcPct val="0"/>
-              </a:spcAft>
-              <a:defRPr sz="6600">
-                <a:solidFill>
-                  <a:schemeClr val="tx1"/>
-                </a:solidFill>
-                <a:latin typeface="Arial" panose="020B0604020202020204" pitchFamily="34" charset="0"/>
-              </a:defRPr>
-            </a:lvl8pPr>
-            <a:lvl9pPr marL="3886200" indent="-228600" eaLnBrk="0" fontAlgn="base" hangingPunct="0">
-              <a:spcBef>
-                <a:spcPct val="0"/>
-              </a:spcBef>
-              <a:spcAft>
-                <a:spcPct val="0"/>
-              </a:spcAft>
-              <a:defRPr sz="6600">
-                <a:solidFill>
-                  <a:schemeClr val="tx1"/>
-                </a:solidFill>
-                <a:latin typeface="Arial" panose="020B0604020202020204" pitchFamily="34" charset="0"/>
-              </a:defRPr>
-            </a:lvl9pPr>
-          </a:lstStyle>
-          <a:p>
-            <a:pPr algn="just" eaLnBrk="1" hangingPunct="1"/>
-            <a:r>
-              <a:rPr lang="en-GB" altLang="en-US" sz="2200" b="1" dirty="0">
-                <a:latin typeface="Helvetica" panose="020B0604020202020204" pitchFamily="34" charset="0"/>
-                <a:cs typeface="Helvetica" panose="020B0604020202020204" pitchFamily="34" charset="0"/>
-              </a:rPr>
-              <a:t>- Insert Kalman filter and LQR controller oscillations from incorrect tuning</a:t>
+              <a:t>Difference between measured consumer flow and estimate indicates leakage</a:t>
             </a:r>
           </a:p>
         </p:txBody>
@@ -10031,7 +8407,7 @@
           <p:nvPr/>
         </p:nvPicPr>
         <p:blipFill>
-          <a:blip r:embed="rId9">
+          <a:blip r:embed="rId7">
             <a:extLst>
               <a:ext uri="{28A0092B-C50C-407E-A947-70E740481C1C}">
                 <a14:useLocalDpi xmlns:a14="http://schemas.microsoft.com/office/drawing/2010/main" val="0"/>
@@ -10046,42 +8422,6 @@
           <a:xfrm>
             <a:off x="21850135" y="3132136"/>
             <a:ext cx="7613865" cy="5431981"/>
-          </a:xfrm>
-          <a:prstGeom prst="rect">
-            <a:avLst/>
-          </a:prstGeom>
-        </p:spPr>
-      </p:pic>
-      <p:pic>
-        <p:nvPicPr>
-          <p:cNvPr id="8" name="Picture 7">
-            <a:extLst>
-              <a:ext uri="{FF2B5EF4-FFF2-40B4-BE49-F238E27FC236}">
-                <a16:creationId xmlns:a16="http://schemas.microsoft.com/office/drawing/2014/main" id="{9DE72C86-46F9-427C-8B36-E911496E5E9B}"/>
-              </a:ext>
-            </a:extLst>
-          </p:cNvPr>
-          <p:cNvPicPr>
-            <a:picLocks noChangeAspect="1"/>
-          </p:cNvPicPr>
-          <p:nvPr/>
-        </p:nvPicPr>
-        <p:blipFill>
-          <a:blip r:embed="rId10">
-            <a:extLst>
-              <a:ext uri="{28A0092B-C50C-407E-A947-70E740481C1C}">
-                <a14:useLocalDpi xmlns:a14="http://schemas.microsoft.com/office/drawing/2010/main" val="0"/>
-              </a:ext>
-            </a:extLst>
-          </a:blip>
-          <a:stretch>
-            <a:fillRect/>
-          </a:stretch>
-        </p:blipFill>
-        <p:spPr>
-          <a:xfrm>
-            <a:off x="39587745" y="15383958"/>
-            <a:ext cx="28322510" cy="12047166"/>
           </a:xfrm>
           <a:prstGeom prst="rect">
             <a:avLst/>
@@ -10278,12 +8618,283 @@
           </a:p>
         </p:txBody>
       </p:sp>
+      <p:sp>
+        <p:nvSpPr>
+          <p:cNvPr id="3" name="TextBox 2">
+            <a:extLst>
+              <a:ext uri="{FF2B5EF4-FFF2-40B4-BE49-F238E27FC236}">
+                <a16:creationId xmlns:a16="http://schemas.microsoft.com/office/drawing/2014/main" id="{9294FF24-1762-6A48-9820-623CE2F41F28}"/>
+              </a:ext>
+            </a:extLst>
+          </p:cNvPr>
+          <p:cNvSpPr txBox="1"/>
+          <p:nvPr/>
+        </p:nvSpPr>
+        <p:spPr>
+          <a:xfrm>
+            <a:off x="1424898" y="17712546"/>
+            <a:ext cx="9996848" cy="1046440"/>
+          </a:xfrm>
+          <a:prstGeom prst="rect">
+            <a:avLst/>
+          </a:prstGeom>
+          <a:noFill/>
+        </p:spPr>
+        <p:txBody>
+          <a:bodyPr wrap="square" rtlCol="0">
+            <a:spAutoFit/>
+          </a:bodyPr>
+          <a:lstStyle/>
+          <a:p>
+            <a:r>
+              <a:rPr lang="en-GB" sz="2200" b="1" dirty="0"/>
+              <a:t>    Coupling between controller and estimator</a:t>
+            </a:r>
+          </a:p>
+          <a:p>
+            <a:r>
+              <a:rPr lang="en-GB" sz="2000" dirty="0"/>
+              <a:t>LQR and Kalman needs to be decoupled in time otherwise -&gt; coupled oscillators</a:t>
+            </a:r>
+          </a:p>
+          <a:p>
+            <a:r>
+              <a:rPr lang="en-GB" sz="2000" dirty="0"/>
+              <a:t>We discovered this the hard way:</a:t>
+            </a:r>
+          </a:p>
+        </p:txBody>
+      </p:sp>
+      <p:sp>
+        <p:nvSpPr>
+          <p:cNvPr id="58" name="TextBox 57">
+            <a:extLst>
+              <a:ext uri="{FF2B5EF4-FFF2-40B4-BE49-F238E27FC236}">
+                <a16:creationId xmlns:a16="http://schemas.microsoft.com/office/drawing/2014/main" id="{C97B4D2E-7CFB-5D4E-8B42-413A40067C6C}"/>
+              </a:ext>
+            </a:extLst>
+          </p:cNvPr>
+          <p:cNvSpPr txBox="1"/>
+          <p:nvPr/>
+        </p:nvSpPr>
+        <p:spPr>
+          <a:xfrm>
+            <a:off x="1079842" y="12343156"/>
+            <a:ext cx="10332248" cy="1354217"/>
+          </a:xfrm>
+          <a:prstGeom prst="rect">
+            <a:avLst/>
+          </a:prstGeom>
+          <a:noFill/>
+        </p:spPr>
+        <p:txBody>
+          <a:bodyPr wrap="square" rtlCol="0">
+            <a:spAutoFit/>
+          </a:bodyPr>
+          <a:lstStyle/>
+          <a:p>
+            <a:r>
+              <a:rPr lang="en-DK" sz="2200" b="1" dirty="0"/>
+              <a:t>Kalman filter for leakage detection and disturbance estimation</a:t>
+            </a:r>
+          </a:p>
+          <a:p>
+            <a:pPr marL="342900" indent="-342900">
+              <a:buFont typeface="Arial" panose="020B0604020202020204" pitchFamily="34" charset="0"/>
+              <a:buChar char="•"/>
+            </a:pPr>
+            <a:r>
+              <a:rPr lang="en-DK" sz="2000" dirty="0"/>
+              <a:t>Consumer flow is not realistically measured</a:t>
+            </a:r>
+          </a:p>
+          <a:p>
+            <a:pPr marL="342900" indent="-342900">
+              <a:buFont typeface="Arial" panose="020B0604020202020204" pitchFamily="34" charset="0"/>
+              <a:buChar char="•"/>
+            </a:pPr>
+            <a:r>
+              <a:rPr lang="en-DK" sz="2000" dirty="0"/>
+              <a:t>Stiff kalman filtering allows forleakage detection and disturbance estimation</a:t>
+            </a:r>
+          </a:p>
+          <a:p>
+            <a:pPr marL="342900" indent="-342900">
+              <a:buFont typeface="Arial" panose="020B0604020202020204" pitchFamily="34" charset="0"/>
+              <a:buChar char="•"/>
+            </a:pPr>
+            <a:r>
+              <a:rPr lang="en-DK" sz="2000" dirty="0"/>
+              <a:t>Input is based on mass conservation: What comes in must come out</a:t>
+            </a:r>
+          </a:p>
+        </p:txBody>
+      </p:sp>
+      <p:sp>
+        <p:nvSpPr>
+          <p:cNvPr id="59" name="TextBox 58">
+            <a:extLst>
+              <a:ext uri="{FF2B5EF4-FFF2-40B4-BE49-F238E27FC236}">
+                <a16:creationId xmlns:a16="http://schemas.microsoft.com/office/drawing/2014/main" id="{148C781F-070E-1B48-8043-9A09D41D4203}"/>
+              </a:ext>
+            </a:extLst>
+          </p:cNvPr>
+          <p:cNvSpPr txBox="1"/>
+          <p:nvPr/>
+        </p:nvSpPr>
+        <p:spPr>
+          <a:xfrm>
+            <a:off x="20480345" y="18084619"/>
+            <a:ext cx="8930426" cy="1969770"/>
+          </a:xfrm>
+          <a:prstGeom prst="rect">
+            <a:avLst/>
+          </a:prstGeom>
+          <a:noFill/>
+        </p:spPr>
+        <p:txBody>
+          <a:bodyPr wrap="square" rtlCol="0">
+            <a:spAutoFit/>
+          </a:bodyPr>
+          <a:lstStyle/>
+          <a:p>
+            <a:r>
+              <a:rPr lang="en-GB" sz="2200" b="1" dirty="0"/>
+              <a:t>Root locus method</a:t>
+            </a:r>
+          </a:p>
+          <a:p>
+            <a:pPr marL="342900" indent="-342900">
+              <a:buFont typeface="Arial" panose="020B0604020202020204" pitchFamily="34" charset="0"/>
+              <a:buChar char="•"/>
+            </a:pPr>
+            <a:r>
+              <a:rPr lang="en-GB" sz="2000" dirty="0"/>
+              <a:t>Identical controller for both pumps</a:t>
+            </a:r>
+          </a:p>
+          <a:p>
+            <a:pPr marL="342900" indent="-342900">
+              <a:buFont typeface="Arial" panose="020B0604020202020204" pitchFamily="34" charset="0"/>
+              <a:buChar char="•"/>
+            </a:pPr>
+            <a:r>
+              <a:rPr lang="en-GB" sz="2000" dirty="0"/>
+              <a:t>Implemented as PI</a:t>
+            </a:r>
+          </a:p>
+          <a:p>
+            <a:pPr marL="342900" indent="-342900">
+              <a:buFont typeface="Arial" panose="020B0604020202020204" pitchFamily="34" charset="0"/>
+              <a:buChar char="•"/>
+            </a:pPr>
+            <a:r>
+              <a:rPr lang="en-GB" sz="2000" dirty="0"/>
+              <a:t>Designed with root locus</a:t>
+            </a:r>
+          </a:p>
+          <a:p>
+            <a:pPr marL="342900" indent="-342900">
+              <a:buFont typeface="Arial" panose="020B0604020202020204" pitchFamily="34" charset="0"/>
+              <a:buChar char="•"/>
+            </a:pPr>
+            <a:r>
+              <a:rPr lang="en-GB" sz="2000" dirty="0"/>
+              <a:t>Time delay modelled w. </a:t>
+            </a:r>
+            <a:r>
+              <a:rPr lang="en-GB" sz="2000" dirty="0" err="1"/>
+              <a:t>pade</a:t>
+            </a:r>
+            <a:r>
+              <a:rPr lang="en-GB" sz="2000" dirty="0"/>
+              <a:t> approximation</a:t>
+            </a:r>
+          </a:p>
+          <a:p>
+            <a:pPr marL="342900" indent="-342900">
+              <a:buFont typeface="Arial" panose="020B0604020202020204" pitchFamily="34" charset="0"/>
+              <a:buChar char="•"/>
+            </a:pPr>
+            <a:r>
+              <a:rPr lang="en-GB" sz="2000" dirty="0"/>
+              <a:t>Model was inaccurate -&gt; manual tuning in lab</a:t>
+            </a:r>
+          </a:p>
+        </p:txBody>
+      </p:sp>
+      <p:sp>
+        <p:nvSpPr>
+          <p:cNvPr id="62" name="TextBox 61">
+            <a:extLst>
+              <a:ext uri="{FF2B5EF4-FFF2-40B4-BE49-F238E27FC236}">
+                <a16:creationId xmlns:a16="http://schemas.microsoft.com/office/drawing/2014/main" id="{1C4C3594-4BBC-CB4A-B52B-66C40B0AB692}"/>
+              </a:ext>
+            </a:extLst>
+          </p:cNvPr>
+          <p:cNvSpPr txBox="1"/>
+          <p:nvPr/>
+        </p:nvSpPr>
+        <p:spPr>
+          <a:xfrm>
+            <a:off x="19941014" y="9921247"/>
+            <a:ext cx="9469757" cy="3200876"/>
+          </a:xfrm>
+          <a:prstGeom prst="rect">
+            <a:avLst/>
+          </a:prstGeom>
+          <a:noFill/>
+        </p:spPr>
+        <p:txBody>
+          <a:bodyPr wrap="square" rtlCol="0">
+            <a:spAutoFit/>
+          </a:bodyPr>
+          <a:lstStyle/>
+          <a:p>
+            <a:r>
+              <a:rPr lang="en-GB" sz="2200" b="1" dirty="0"/>
+              <a:t>    Controller choices</a:t>
+            </a:r>
+          </a:p>
+          <a:p>
+            <a:r>
+              <a:rPr lang="en-GB" sz="2000" dirty="0"/>
+              <a:t>LQR controller with integral action </a:t>
+            </a:r>
+            <a:br>
+              <a:rPr lang="en-GB" sz="2000" dirty="0"/>
+            </a:br>
+            <a:endParaRPr lang="en-GB" sz="2000" dirty="0"/>
+          </a:p>
+          <a:p>
+            <a:br>
+              <a:rPr lang="en-GB" sz="2000" dirty="0"/>
+            </a:br>
+            <a:endParaRPr lang="en-GB" sz="2000" dirty="0"/>
+          </a:p>
+          <a:p>
+            <a:br>
+              <a:rPr lang="en-GB" sz="2000" dirty="0"/>
+            </a:br>
+            <a:endParaRPr lang="en-GB" sz="2000" dirty="0"/>
+          </a:p>
+          <a:p>
+            <a:endParaRPr lang="en-GB" sz="2000" dirty="0"/>
+          </a:p>
+          <a:p>
+            <a:r>
+              <a:rPr lang="en-GB" sz="2000" dirty="0"/>
+              <a:t>Transfer matrix for the two pumps indicate low coupling, allowing for decentralized control.</a:t>
+            </a:r>
+          </a:p>
+        </p:txBody>
+      </p:sp>
       <p:pic>
         <p:nvPicPr>
-          <p:cNvPr id="27" name="Picture 26">
+          <p:cNvPr id="19" name="Picture 18">
             <a:extLst>
               <a:ext uri="{FF2B5EF4-FFF2-40B4-BE49-F238E27FC236}">
-                <a16:creationId xmlns:a16="http://schemas.microsoft.com/office/drawing/2014/main" id="{5B129D72-8E8E-4048-937A-5F807E49DBE3}"/>
+                <a16:creationId xmlns:a16="http://schemas.microsoft.com/office/drawing/2014/main" id="{4770FD39-CBB5-544A-95E5-44AF3D8FFA96}"/>
               </a:ext>
             </a:extLst>
           </p:cNvPr>
@@ -10293,7 +8904,7 @@
           <p:nvPr/>
         </p:nvPicPr>
         <p:blipFill>
-          <a:blip r:embed="rId11">
+          <a:blip r:embed="rId8">
             <a:extLst>
               <a:ext uri="{28A0092B-C50C-407E-A947-70E740481C1C}">
                 <a14:useLocalDpi xmlns:a14="http://schemas.microsoft.com/office/drawing/2010/main" val="0"/>
@@ -10306,44 +8917,211 @@
         </p:blipFill>
         <p:spPr>
           <a:xfrm>
-            <a:off x="719931" y="10660063"/>
-            <a:ext cx="28744069" cy="12226480"/>
+            <a:off x="11617836" y="10945705"/>
+            <a:ext cx="7582375" cy="11630519"/>
           </a:xfrm>
           <a:prstGeom prst="rect">
             <a:avLst/>
           </a:prstGeom>
         </p:spPr>
       </p:pic>
-      <p:pic>
-        <p:nvPicPr>
-          <p:cNvPr id="4" name="Picture 3">
-            <a:extLst>
-              <a:ext uri="{FF2B5EF4-FFF2-40B4-BE49-F238E27FC236}">
-                <a16:creationId xmlns:a16="http://schemas.microsoft.com/office/drawing/2014/main" id="{C849BEC9-D98F-49D9-B71F-84238995EEB6}"/>
-              </a:ext>
-            </a:extLst>
-          </p:cNvPr>
-          <p:cNvPicPr>
-            <a:picLocks noChangeAspect="1"/>
-          </p:cNvPicPr>
-          <p:nvPr/>
-        </p:nvPicPr>
-        <p:blipFill>
-          <a:blip r:embed="rId12"/>
-          <a:stretch>
-            <a:fillRect/>
-          </a:stretch>
-        </p:blipFill>
-        <p:spPr>
-          <a:xfrm>
-            <a:off x="1690772" y="14411700"/>
-            <a:ext cx="6401602" cy="2843088"/>
-          </a:xfrm>
-          <a:prstGeom prst="rect">
-            <a:avLst/>
-          </a:prstGeom>
-        </p:spPr>
-      </p:pic>
+      <mc:AlternateContent xmlns:mc="http://schemas.openxmlformats.org/markup-compatibility/2006">
+        <mc:Choice xmlns:a14="http://schemas.microsoft.com/office/drawing/2010/main" Requires="a14">
+          <p:sp>
+            <p:nvSpPr>
+              <p:cNvPr id="67" name="TextBox 66">
+                <a:extLst>
+                  <a:ext uri="{FF2B5EF4-FFF2-40B4-BE49-F238E27FC236}">
+                    <a16:creationId xmlns:a16="http://schemas.microsoft.com/office/drawing/2014/main" id="{6ABCEAB8-4C4D-5945-8A19-606819F968A7}"/>
+                  </a:ext>
+                </a:extLst>
+              </p:cNvPr>
+              <p:cNvSpPr txBox="1"/>
+              <p:nvPr/>
+            </p:nvSpPr>
+            <p:spPr>
+              <a:xfrm>
+                <a:off x="1296439" y="10071151"/>
+                <a:ext cx="9024256" cy="1661993"/>
+              </a:xfrm>
+              <a:prstGeom prst="rect">
+                <a:avLst/>
+              </a:prstGeom>
+              <a:noFill/>
+            </p:spPr>
+            <p:txBody>
+              <a:bodyPr wrap="square" rtlCol="0">
+                <a:spAutoFit/>
+              </a:bodyPr>
+              <a:lstStyle/>
+              <a:p>
+                <a:r>
+                  <a:rPr lang="en-DK" sz="2200" b="1" dirty="0"/>
+                  <a:t>    Graph Theory</a:t>
+                </a:r>
+              </a:p>
+              <a:p>
+                <a:r>
+                  <a:rPr lang="en-DK" sz="2000" dirty="0"/>
+                  <a:t>Graph theory is a framework for deriving the system of equatios for a network in a systematical way</a:t>
+                </a:r>
+              </a:p>
+              <a:p>
+                <a:endParaRPr lang="en-DK" sz="2000" dirty="0"/>
+              </a:p>
+              <a:p>
+                <a:r>
+                  <a:rPr lang="da-DK" sz="2000" b="0" dirty="0"/>
+                  <a:t>	</a:t>
+                </a:r>
+                <a14:m>
+                  <m:oMath xmlns:m="http://schemas.openxmlformats.org/officeDocument/2006/math">
+                    <m:sSub>
+                      <m:sSubPr>
+                        <m:ctrlPr>
+                          <a:rPr lang="da-DK" sz="2000" b="0" i="1" smtClean="0">
+                            <a:latin typeface="Cambria Math" panose="02040503050406030204" pitchFamily="18" charset="0"/>
+                          </a:rPr>
+                        </m:ctrlPr>
+                      </m:sSubPr>
+                      <m:e>
+                        <m:r>
+                          <a:rPr lang="da-DK" sz="2000" b="0" i="1" smtClean="0">
+                            <a:latin typeface="Cambria Math" panose="02040503050406030204" pitchFamily="18" charset="0"/>
+                          </a:rPr>
+                          <m:t>𝑒</m:t>
+                        </m:r>
+                      </m:e>
+                      <m:sub>
+                        <m:r>
+                          <a:rPr lang="da-DK" sz="2000" b="0" i="1" smtClean="0">
+                            <a:latin typeface="Cambria Math" panose="02040503050406030204" pitchFamily="18" charset="0"/>
+                          </a:rPr>
+                          <m:t>𝑛</m:t>
+                        </m:r>
+                      </m:sub>
+                    </m:sSub>
+                  </m:oMath>
+                </a14:m>
+                <a:r>
+                  <a:rPr lang="en-DK" sz="2000" dirty="0"/>
+                  <a:t>: components,    </a:t>
+                </a:r>
+                <a14:m>
+                  <m:oMath xmlns:m="http://schemas.openxmlformats.org/officeDocument/2006/math">
+                    <m:sSub>
+                      <m:sSubPr>
+                        <m:ctrlPr>
+                          <a:rPr lang="da-DK" sz="2000" b="0" i="1" dirty="0" smtClean="0">
+                            <a:latin typeface="Cambria Math" panose="02040503050406030204" pitchFamily="18" charset="0"/>
+                          </a:rPr>
+                        </m:ctrlPr>
+                      </m:sSubPr>
+                      <m:e>
+                        <m:r>
+                          <a:rPr lang="da-DK" sz="2000" b="0" i="1" dirty="0" smtClean="0">
+                            <a:latin typeface="Cambria Math" panose="02040503050406030204" pitchFamily="18" charset="0"/>
+                          </a:rPr>
+                          <m:t>𝑣</m:t>
+                        </m:r>
+                      </m:e>
+                      <m:sub>
+                        <m:r>
+                          <a:rPr lang="da-DK" sz="2000" b="0" i="1" dirty="0" smtClean="0">
+                            <a:latin typeface="Cambria Math" panose="02040503050406030204" pitchFamily="18" charset="0"/>
+                          </a:rPr>
+                          <m:t>𝑛</m:t>
+                        </m:r>
+                      </m:sub>
+                    </m:sSub>
+                  </m:oMath>
+                </a14:m>
+                <a:r>
+                  <a:rPr lang="en-DK" sz="2000" dirty="0"/>
+                  <a:t>: connections,    </a:t>
+                </a:r>
+                <a14:m>
+                  <m:oMath xmlns:m="http://schemas.openxmlformats.org/officeDocument/2006/math">
+                    <m:sSub>
+                      <m:sSubPr>
+                        <m:ctrlPr>
+                          <a:rPr lang="da-DK" sz="2000" b="0" i="1" dirty="0" smtClean="0">
+                            <a:latin typeface="Cambria Math" panose="02040503050406030204" pitchFamily="18" charset="0"/>
+                          </a:rPr>
+                        </m:ctrlPr>
+                      </m:sSubPr>
+                      <m:e>
+                        <m:r>
+                          <a:rPr lang="da-DK" sz="2000" b="0" i="1" dirty="0" smtClean="0">
+                            <a:latin typeface="Cambria Math" panose="02040503050406030204" pitchFamily="18" charset="0"/>
+                          </a:rPr>
+                          <m:t>𝑑</m:t>
+                        </m:r>
+                      </m:e>
+                      <m:sub>
+                        <m:r>
+                          <a:rPr lang="da-DK" sz="2000" b="0" i="1" dirty="0" smtClean="0">
+                            <a:latin typeface="Cambria Math" panose="02040503050406030204" pitchFamily="18" charset="0"/>
+                          </a:rPr>
+                          <m:t>𝑛</m:t>
+                        </m:r>
+                      </m:sub>
+                    </m:sSub>
+                  </m:oMath>
+                </a14:m>
+                <a:r>
+                  <a:rPr lang="en-DK" sz="2000" dirty="0"/>
+                  <a:t>: external flow demands</a:t>
+                </a:r>
+              </a:p>
+            </p:txBody>
+          </p:sp>
+        </mc:Choice>
+        <mc:Fallback>
+          <p:sp>
+            <p:nvSpPr>
+              <p:cNvPr id="67" name="TextBox 66">
+                <a:extLst>
+                  <a:ext uri="{FF2B5EF4-FFF2-40B4-BE49-F238E27FC236}">
+                    <a16:creationId xmlns:a16="http://schemas.microsoft.com/office/drawing/2014/main" id="{6ABCEAB8-4C4D-5945-8A19-606819F968A7}"/>
+                  </a:ext>
+                </a:extLst>
+              </p:cNvPr>
+              <p:cNvSpPr txBox="1">
+                <a:spLocks noRot="1" noChangeAspect="1" noMove="1" noResize="1" noEditPoints="1" noAdjustHandles="1" noChangeArrowheads="1" noChangeShapeType="1" noTextEdit="1"/>
+              </p:cNvSpPr>
+              <p:nvPr/>
+            </p:nvSpPr>
+            <p:spPr>
+              <a:xfrm>
+                <a:off x="1296439" y="10071151"/>
+                <a:ext cx="9024256" cy="1661993"/>
+              </a:xfrm>
+              <a:prstGeom prst="rect">
+                <a:avLst/>
+              </a:prstGeom>
+              <a:blipFill>
+                <a:blip r:embed="rId9"/>
+                <a:stretch>
+                  <a:fillRect l="-844" t="-1504" b="-5263"/>
+                </a:stretch>
+              </a:blipFill>
+            </p:spPr>
+            <p:txBody>
+              <a:bodyPr/>
+              <a:lstStyle/>
+              <a:p>
+                <a:r>
+                  <a:rPr lang="en-DK">
+                    <a:noFill/>
+                  </a:rPr>
+                  <a:t> </a:t>
+                </a:r>
+              </a:p>
+            </p:txBody>
+          </p:sp>
+        </mc:Fallback>
+      </mc:AlternateContent>
       <p:pic>
         <p:nvPicPr>
           <p:cNvPr id="13341" name="Picture 8">
@@ -10359,7 +9137,7 @@
           <p:nvPr/>
         </p:nvPicPr>
         <p:blipFill>
-          <a:blip r:embed="rId13">
+          <a:blip r:embed="rId10">
             <a:extLst>
               <a:ext uri="{28A0092B-C50C-407E-A947-70E740481C1C}">
                 <a14:useLocalDpi xmlns:a14="http://schemas.microsoft.com/office/drawing/2010/main" val="0"/>
@@ -10373,8 +9151,8 @@
         </p:blipFill>
         <p:spPr bwMode="auto">
           <a:xfrm>
-            <a:off x="12137919" y="11543464"/>
-            <a:ext cx="6077162" cy="2812619"/>
+            <a:off x="11848542" y="11574107"/>
+            <a:ext cx="6557090" cy="3048356"/>
           </a:xfrm>
           <a:prstGeom prst="rect">
             <a:avLst/>
@@ -10402,99 +9180,6 @@
               </a14:hiddenLine>
             </a:ext>
           </a:extLst>
-        </p:spPr>
-      </p:pic>
-      <p:graphicFrame>
-        <p:nvGraphicFramePr>
-          <p:cNvPr id="12" name="Object 11">
-            <a:extLst>
-              <a:ext uri="{FF2B5EF4-FFF2-40B4-BE49-F238E27FC236}">
-                <a16:creationId xmlns:a16="http://schemas.microsoft.com/office/drawing/2014/main" id="{266A74DF-3BD5-446A-9847-83D83F74ABF3}"/>
-              </a:ext>
-            </a:extLst>
-          </p:cNvPr>
-          <p:cNvGraphicFramePr>
-            <a:graphicFrameLocks noChangeAspect="1"/>
-          </p:cNvGraphicFramePr>
-          <p:nvPr>
-            <p:extLst>
-              <p:ext uri="{D42A27DB-BD31-4B8C-83A1-F6EECF244321}">
-                <p14:modId xmlns:p14="http://schemas.microsoft.com/office/powerpoint/2010/main" val="1378411479"/>
-              </p:ext>
-            </p:extLst>
-          </p:nvPr>
-        </p:nvGraphicFramePr>
-        <p:xfrm>
-          <a:off x="21217732" y="13123952"/>
-          <a:ext cx="7882904" cy="4359927"/>
-        </p:xfrm>
-        <a:graphic>
-          <a:graphicData uri="http://schemas.openxmlformats.org/presentationml/2006/ole">
-            <mc:AlternateContent xmlns:mc="http://schemas.openxmlformats.org/markup-compatibility/2006">
-              <mc:Choice xmlns:v="urn:schemas-microsoft-com:vml" Requires="v">
-                <p:oleObj spid="_x0000_s1027" name="Acrobat Document" r:id="rId14" imgW="7715024" imgH="4267200" progId="Acrobat.Document.DC">
-                  <p:embed/>
-                </p:oleObj>
-              </mc:Choice>
-              <mc:Fallback>
-                <p:oleObj name="Acrobat Document" r:id="rId14" imgW="7715024" imgH="4267200" progId="Acrobat.Document.DC">
-                  <p:embed/>
-                  <p:pic>
-                    <p:nvPicPr>
-                      <p:cNvPr id="0" name=""/>
-                      <p:cNvPicPr/>
-                      <p:nvPr/>
-                    </p:nvPicPr>
-                    <p:blipFill>
-                      <a:blip r:embed="rId15"/>
-                      <a:stretch>
-                        <a:fillRect/>
-                      </a:stretch>
-                    </p:blipFill>
-                    <p:spPr>
-                      <a:xfrm>
-                        <a:off x="21217732" y="13123952"/>
-                        <a:ext cx="7882904" cy="4359927"/>
-                      </a:xfrm>
-                      <a:prstGeom prst="rect">
-                        <a:avLst/>
-                      </a:prstGeom>
-                    </p:spPr>
-                  </p:pic>
-                </p:oleObj>
-              </mc:Fallback>
-            </mc:AlternateContent>
-          </a:graphicData>
-        </a:graphic>
-      </p:graphicFrame>
-      <p:pic>
-        <p:nvPicPr>
-          <p:cNvPr id="16" name="Picture 15">
-            <a:extLst>
-              <a:ext uri="{FF2B5EF4-FFF2-40B4-BE49-F238E27FC236}">
-                <a16:creationId xmlns:a16="http://schemas.microsoft.com/office/drawing/2014/main" id="{F9AF0FFB-360E-4890-81F2-83D3EE785256}"/>
-              </a:ext>
-            </a:extLst>
-          </p:cNvPr>
-          <p:cNvPicPr>
-            <a:picLocks noChangeAspect="1"/>
-          </p:cNvPicPr>
-          <p:nvPr/>
-        </p:nvPicPr>
-        <p:blipFill>
-          <a:blip r:embed="rId16"/>
-          <a:stretch>
-            <a:fillRect/>
-          </a:stretch>
-        </p:blipFill>
-        <p:spPr>
-          <a:xfrm>
-            <a:off x="864017" y="19118432"/>
-            <a:ext cx="8142758" cy="3381626"/>
-          </a:xfrm>
-          <a:prstGeom prst="rect">
-            <a:avLst/>
-          </a:prstGeom>
         </p:spPr>
       </p:pic>
       <p:pic>
@@ -10512,14 +9197,14 @@
           <p:nvPr/>
         </p:nvPicPr>
         <p:blipFill>
-          <a:blip r:embed="rId17"/>
+          <a:blip r:embed="rId11"/>
           <a:stretch>
             <a:fillRect/>
           </a:stretch>
         </p:blipFill>
         <p:spPr>
           <a:xfrm>
-            <a:off x="15121731" y="17104109"/>
+            <a:off x="15290650" y="17679686"/>
             <a:ext cx="3893962" cy="301358"/>
           </a:xfrm>
           <a:prstGeom prst="rect">
@@ -10542,14 +9227,14 @@
           <p:nvPr/>
         </p:nvPicPr>
         <p:blipFill>
-          <a:blip r:embed="rId18"/>
+          <a:blip r:embed="rId12"/>
           <a:stretch>
             <a:fillRect/>
           </a:stretch>
         </p:blipFill>
         <p:spPr>
           <a:xfrm>
-            <a:off x="12477393" y="17060862"/>
+            <a:off x="12197140" y="17583723"/>
             <a:ext cx="1156472" cy="293612"/>
           </a:xfrm>
           <a:prstGeom prst="rect">
@@ -10557,12 +9242,66 @@
           </a:prstGeom>
         </p:spPr>
       </p:pic>
+      <p:sp>
+        <p:nvSpPr>
+          <p:cNvPr id="65" name="TextBox 64">
+            <a:extLst>
+              <a:ext uri="{FF2B5EF4-FFF2-40B4-BE49-F238E27FC236}">
+                <a16:creationId xmlns:a16="http://schemas.microsoft.com/office/drawing/2014/main" id="{3205C5C3-5887-904D-B034-801DFE50E27F}"/>
+              </a:ext>
+            </a:extLst>
+          </p:cNvPr>
+          <p:cNvSpPr txBox="1"/>
+          <p:nvPr/>
+        </p:nvSpPr>
+        <p:spPr>
+          <a:xfrm>
+            <a:off x="18917698" y="20736032"/>
+            <a:ext cx="10557850" cy="2031325"/>
+          </a:xfrm>
+          <a:prstGeom prst="rect">
+            <a:avLst/>
+          </a:prstGeom>
+          <a:noFill/>
+        </p:spPr>
+        <p:txBody>
+          <a:bodyPr wrap="square" rtlCol="0">
+            <a:spAutoFit/>
+          </a:bodyPr>
+          <a:lstStyle/>
+          <a:p>
+            <a:r>
+              <a:rPr lang="en-GB" sz="2200" b="1" dirty="0"/>
+              <a:t>    Reliability of Networked control </a:t>
+            </a:r>
+          </a:p>
+          <a:p>
+            <a:r>
+              <a:rPr lang="en-GB" sz="2000" dirty="0"/>
+              <a:t>Decentralised controller not impacted by network problems</a:t>
+            </a:r>
+          </a:p>
+          <a:p>
+            <a:r>
+              <a:rPr lang="en-GB" sz="2000" dirty="0"/>
+              <a:t>LQR controller with Try-Once-Discard Protocol enables stable system for arbitrary amount of package loss in the mean square sense. The reference may oscillate but it the mean of the oscillations will be the reference</a:t>
+            </a:r>
+            <a:r>
+              <a:rPr lang="en-GB" sz="2200" dirty="0"/>
+              <a:t>. </a:t>
+            </a:r>
+          </a:p>
+          <a:p>
+            <a:endParaRPr lang="en-DK" sz="2200" dirty="0"/>
+          </a:p>
+        </p:txBody>
+      </p:sp>
       <p:pic>
         <p:nvPicPr>
-          <p:cNvPr id="25" name="Picture 24">
+          <p:cNvPr id="26" name="Picture 25">
             <a:extLst>
               <a:ext uri="{FF2B5EF4-FFF2-40B4-BE49-F238E27FC236}">
-                <a16:creationId xmlns:a16="http://schemas.microsoft.com/office/drawing/2014/main" id="{E39166FF-46FB-49E0-891F-DDB5B276E858}"/>
+                <a16:creationId xmlns:a16="http://schemas.microsoft.com/office/drawing/2014/main" id="{D0608F3C-F131-B443-AEBF-67C1548E0772}"/>
               </a:ext>
             </a:extLst>
           </p:cNvPr>
@@ -10572,15 +9311,21 @@
           <p:nvPr/>
         </p:nvPicPr>
         <p:blipFill>
-          <a:blip r:embed="rId19"/>
+          <a:blip r:embed="rId13">
+            <a:extLst>
+              <a:ext uri="{28A0092B-C50C-407E-A947-70E740481C1C}">
+                <a14:useLocalDpi xmlns:a14="http://schemas.microsoft.com/office/drawing/2010/main" val="0"/>
+              </a:ext>
+            </a:extLst>
+          </a:blip>
           <a:stretch>
             <a:fillRect/>
           </a:stretch>
         </p:blipFill>
         <p:spPr>
           <a:xfrm>
-            <a:off x="26162188" y="11833955"/>
-            <a:ext cx="2436794" cy="577733"/>
+            <a:off x="20094555" y="13116121"/>
+            <a:ext cx="9261060" cy="4935535"/>
           </a:xfrm>
           <a:prstGeom prst="rect">
             <a:avLst/>
@@ -10589,10 +9334,10 @@
       </p:pic>
       <p:pic>
         <p:nvPicPr>
-          <p:cNvPr id="29" name="Picture 28">
+          <p:cNvPr id="30" name="Picture 29">
             <a:extLst>
               <a:ext uri="{FF2B5EF4-FFF2-40B4-BE49-F238E27FC236}">
-                <a16:creationId xmlns:a16="http://schemas.microsoft.com/office/drawing/2014/main" id="{387D898F-5264-4249-BBEC-6DFA0D452937}"/>
+                <a16:creationId xmlns:a16="http://schemas.microsoft.com/office/drawing/2014/main" id="{E1DC114E-7758-3940-BAA5-875B3796C38D}"/>
               </a:ext>
             </a:extLst>
           </p:cNvPr>
@@ -10602,21 +9347,478 @@
           <p:nvPr/>
         </p:nvPicPr>
         <p:blipFill>
-          <a:blip r:embed="rId20"/>
+          <a:blip r:embed="rId14">
+            <a:extLst>
+              <a:ext uri="{28A0092B-C50C-407E-A947-70E740481C1C}">
+                <a14:useLocalDpi xmlns:a14="http://schemas.microsoft.com/office/drawing/2010/main" val="0"/>
+              </a:ext>
+            </a:extLst>
+          </a:blip>
           <a:stretch>
             <a:fillRect/>
           </a:stretch>
         </p:blipFill>
         <p:spPr>
           <a:xfrm>
-            <a:off x="25451963" y="10772370"/>
-            <a:ext cx="3708986" cy="1030692"/>
+            <a:off x="1248068" y="18907411"/>
+            <a:ext cx="9108467" cy="3811027"/>
           </a:xfrm>
           <a:prstGeom prst="rect">
             <a:avLst/>
           </a:prstGeom>
         </p:spPr>
       </p:pic>
+      <p:pic>
+        <p:nvPicPr>
+          <p:cNvPr id="38" name="Picture 37">
+            <a:extLst>
+              <a:ext uri="{FF2B5EF4-FFF2-40B4-BE49-F238E27FC236}">
+                <a16:creationId xmlns:a16="http://schemas.microsoft.com/office/drawing/2014/main" id="{96679718-3EB1-3B44-98C0-A4594CF8EE81}"/>
+              </a:ext>
+            </a:extLst>
+          </p:cNvPr>
+          <p:cNvPicPr>
+            <a:picLocks noChangeAspect="1"/>
+          </p:cNvPicPr>
+          <p:nvPr/>
+        </p:nvPicPr>
+        <p:blipFill>
+          <a:blip r:embed="rId15">
+            <a:extLst>
+              <a:ext uri="{28A0092B-C50C-407E-A947-70E740481C1C}">
+                <a14:useLocalDpi xmlns:a14="http://schemas.microsoft.com/office/drawing/2010/main" val="0"/>
+              </a:ext>
+            </a:extLst>
+          </a:blip>
+          <a:stretch>
+            <a:fillRect/>
+          </a:stretch>
+        </p:blipFill>
+        <p:spPr>
+          <a:xfrm>
+            <a:off x="1765884" y="13838084"/>
+            <a:ext cx="7449063" cy="3290084"/>
+          </a:xfrm>
+          <a:prstGeom prst="rect">
+            <a:avLst/>
+          </a:prstGeom>
+        </p:spPr>
+      </p:pic>
+      <p:pic>
+        <p:nvPicPr>
+          <p:cNvPr id="39" name="Picture 38">
+            <a:extLst>
+              <a:ext uri="{FF2B5EF4-FFF2-40B4-BE49-F238E27FC236}">
+                <a16:creationId xmlns:a16="http://schemas.microsoft.com/office/drawing/2014/main" id="{C2A80934-905B-EE40-85BD-AECD47525885}"/>
+              </a:ext>
+            </a:extLst>
+          </p:cNvPr>
+          <p:cNvPicPr>
+            <a:picLocks noChangeAspect="1"/>
+          </p:cNvPicPr>
+          <p:nvPr/>
+        </p:nvPicPr>
+        <p:blipFill>
+          <a:blip r:embed="rId16"/>
+          <a:stretch>
+            <a:fillRect/>
+          </a:stretch>
+        </p:blipFill>
+        <p:spPr>
+          <a:xfrm>
+            <a:off x="20208301" y="10806648"/>
+            <a:ext cx="5230525" cy="1520084"/>
+          </a:xfrm>
+          <a:prstGeom prst="rect">
+            <a:avLst/>
+          </a:prstGeom>
+        </p:spPr>
+      </p:pic>
+      <p:pic>
+        <p:nvPicPr>
+          <p:cNvPr id="40" name="Picture 39">
+            <a:extLst>
+              <a:ext uri="{FF2B5EF4-FFF2-40B4-BE49-F238E27FC236}">
+                <a16:creationId xmlns:a16="http://schemas.microsoft.com/office/drawing/2014/main" id="{7F3C440F-C16B-874C-8E50-AA6B993BD3CD}"/>
+              </a:ext>
+            </a:extLst>
+          </p:cNvPr>
+          <p:cNvPicPr>
+            <a:picLocks noChangeAspect="1"/>
+          </p:cNvPicPr>
+          <p:nvPr/>
+        </p:nvPicPr>
+        <p:blipFill>
+          <a:blip r:embed="rId17"/>
+          <a:stretch>
+            <a:fillRect/>
+          </a:stretch>
+        </p:blipFill>
+        <p:spPr>
+          <a:xfrm>
+            <a:off x="25939693" y="11162323"/>
+            <a:ext cx="3099750" cy="750405"/>
+          </a:xfrm>
+          <a:prstGeom prst="rect">
+            <a:avLst/>
+          </a:prstGeom>
+        </p:spPr>
+      </p:pic>
+      <p:sp>
+        <p:nvSpPr>
+          <p:cNvPr id="41" name="Rounded Rectangle 40">
+            <a:extLst>
+              <a:ext uri="{FF2B5EF4-FFF2-40B4-BE49-F238E27FC236}">
+                <a16:creationId xmlns:a16="http://schemas.microsoft.com/office/drawing/2014/main" id="{78991CFE-CB2E-B44C-A17D-D6CBB92225C9}"/>
+              </a:ext>
+            </a:extLst>
+          </p:cNvPr>
+          <p:cNvSpPr/>
+          <p:nvPr/>
+        </p:nvSpPr>
+        <p:spPr bwMode="auto">
+          <a:xfrm>
+            <a:off x="19697706" y="9703479"/>
+            <a:ext cx="9942191" cy="10513404"/>
+          </a:xfrm>
+          <a:prstGeom prst="roundRect">
+            <a:avLst>
+              <a:gd name="adj" fmla="val 5710"/>
+            </a:avLst>
+          </a:prstGeom>
+          <a:noFill/>
+          <a:ln w="12700" cap="flat" cmpd="sng" algn="ctr">
+            <a:solidFill>
+              <a:schemeClr val="tx1"/>
+            </a:solidFill>
+            <a:prstDash val="solid"/>
+            <a:round/>
+            <a:headEnd type="none" w="med" len="med"/>
+            <a:tailEnd type="none" w="med" len="med"/>
+          </a:ln>
+          <a:effectLst/>
+        </p:spPr>
+        <p:txBody>
+          <a:bodyPr vert="horz" wrap="square" lIns="91440" tIns="45720" rIns="91440" bIns="45720" numCol="1" rtlCol="0" anchor="t" anchorCtr="0" compatLnSpc="1">
+            <a:prstTxWarp prst="textNoShape">
+              <a:avLst/>
+            </a:prstTxWarp>
+          </a:bodyPr>
+          <a:lstStyle/>
+          <a:p>
+            <a:pPr marL="0" marR="0" indent="0" algn="l" defTabSz="4173538" rtl="0" eaLnBrk="1" fontAlgn="base" latinLnBrk="0" hangingPunct="1">
+              <a:lnSpc>
+                <a:spcPct val="100000"/>
+              </a:lnSpc>
+              <a:spcBef>
+                <a:spcPct val="0"/>
+              </a:spcBef>
+              <a:spcAft>
+                <a:spcPct val="0"/>
+              </a:spcAft>
+              <a:buClrTx/>
+              <a:buSzTx/>
+              <a:buFontTx/>
+              <a:buNone/>
+              <a:tabLst/>
+            </a:pPr>
+            <a:endParaRPr kumimoji="0" lang="en-DK" sz="6600" b="0" i="0" u="none" strike="noStrike" cap="none" normalizeH="0" baseline="0">
+              <a:ln>
+                <a:noFill/>
+              </a:ln>
+              <a:solidFill>
+                <a:schemeClr val="tx1"/>
+              </a:solidFill>
+              <a:effectLst/>
+              <a:latin typeface="Arial" charset="0"/>
+            </a:endParaRPr>
+          </a:p>
+        </p:txBody>
+      </p:sp>
+      <p:sp>
+        <p:nvSpPr>
+          <p:cNvPr id="94" name="Rounded Rectangle 93">
+            <a:extLst>
+              <a:ext uri="{FF2B5EF4-FFF2-40B4-BE49-F238E27FC236}">
+                <a16:creationId xmlns:a16="http://schemas.microsoft.com/office/drawing/2014/main" id="{8B3A19B5-03E3-3044-BFE8-CF97A1ECCACD}"/>
+              </a:ext>
+            </a:extLst>
+          </p:cNvPr>
+          <p:cNvSpPr/>
+          <p:nvPr/>
+        </p:nvSpPr>
+        <p:spPr bwMode="auto">
+          <a:xfrm>
+            <a:off x="18772255" y="20583593"/>
+            <a:ext cx="10914289" cy="2050952"/>
+          </a:xfrm>
+          <a:prstGeom prst="roundRect">
+            <a:avLst>
+              <a:gd name="adj" fmla="val 20339"/>
+            </a:avLst>
+          </a:prstGeom>
+          <a:noFill/>
+          <a:ln w="12700" cap="flat" cmpd="sng" algn="ctr">
+            <a:solidFill>
+              <a:schemeClr val="tx1"/>
+            </a:solidFill>
+            <a:prstDash val="solid"/>
+            <a:round/>
+            <a:headEnd type="none" w="med" len="med"/>
+            <a:tailEnd type="none" w="med" len="med"/>
+          </a:ln>
+          <a:effectLst/>
+        </p:spPr>
+        <p:txBody>
+          <a:bodyPr vert="horz" wrap="square" lIns="91440" tIns="45720" rIns="91440" bIns="45720" numCol="1" rtlCol="0" anchor="t" anchorCtr="0" compatLnSpc="1">
+            <a:prstTxWarp prst="textNoShape">
+              <a:avLst/>
+            </a:prstTxWarp>
+          </a:bodyPr>
+          <a:lstStyle/>
+          <a:p>
+            <a:pPr marL="0" marR="0" indent="0" algn="l" defTabSz="4173538" rtl="0" eaLnBrk="1" fontAlgn="base" latinLnBrk="0" hangingPunct="1">
+              <a:lnSpc>
+                <a:spcPct val="100000"/>
+              </a:lnSpc>
+              <a:spcBef>
+                <a:spcPct val="0"/>
+              </a:spcBef>
+              <a:spcAft>
+                <a:spcPct val="0"/>
+              </a:spcAft>
+              <a:buClrTx/>
+              <a:buSzTx/>
+              <a:buFontTx/>
+              <a:buNone/>
+              <a:tabLst/>
+            </a:pPr>
+            <a:endParaRPr kumimoji="0" lang="en-DK" sz="6600" b="0" i="0" u="none" strike="noStrike" cap="none" normalizeH="0" baseline="0">
+              <a:ln>
+                <a:noFill/>
+              </a:ln>
+              <a:solidFill>
+                <a:schemeClr val="tx1"/>
+              </a:solidFill>
+              <a:effectLst/>
+              <a:latin typeface="Arial" charset="0"/>
+            </a:endParaRPr>
+          </a:p>
+        </p:txBody>
+      </p:sp>
+      <p:sp>
+        <p:nvSpPr>
+          <p:cNvPr id="95" name="Rounded Rectangle 94">
+            <a:extLst>
+              <a:ext uri="{FF2B5EF4-FFF2-40B4-BE49-F238E27FC236}">
+                <a16:creationId xmlns:a16="http://schemas.microsoft.com/office/drawing/2014/main" id="{35381EB3-3E16-0949-8E2D-5996BF8543C2}"/>
+              </a:ext>
+            </a:extLst>
+          </p:cNvPr>
+          <p:cNvSpPr/>
+          <p:nvPr/>
+        </p:nvSpPr>
+        <p:spPr bwMode="auto">
+          <a:xfrm>
+            <a:off x="1002764" y="9897820"/>
+            <a:ext cx="9317931" cy="2014908"/>
+          </a:xfrm>
+          <a:prstGeom prst="roundRect">
+            <a:avLst>
+              <a:gd name="adj" fmla="val 14906"/>
+            </a:avLst>
+          </a:prstGeom>
+          <a:noFill/>
+          <a:ln w="12700" cap="flat" cmpd="sng" algn="ctr">
+            <a:solidFill>
+              <a:schemeClr val="tx1"/>
+            </a:solidFill>
+            <a:prstDash val="solid"/>
+            <a:round/>
+            <a:headEnd type="none" w="med" len="med"/>
+            <a:tailEnd type="none" w="med" len="med"/>
+          </a:ln>
+          <a:effectLst/>
+        </p:spPr>
+        <p:txBody>
+          <a:bodyPr vert="horz" wrap="square" lIns="91440" tIns="45720" rIns="91440" bIns="45720" numCol="1" rtlCol="0" anchor="t" anchorCtr="0" compatLnSpc="1">
+            <a:prstTxWarp prst="textNoShape">
+              <a:avLst/>
+            </a:prstTxWarp>
+          </a:bodyPr>
+          <a:lstStyle/>
+          <a:p>
+            <a:pPr marL="0" marR="0" indent="0" algn="l" defTabSz="4173538" rtl="0" eaLnBrk="1" fontAlgn="base" latinLnBrk="0" hangingPunct="1">
+              <a:lnSpc>
+                <a:spcPct val="100000"/>
+              </a:lnSpc>
+              <a:spcBef>
+                <a:spcPct val="0"/>
+              </a:spcBef>
+              <a:spcAft>
+                <a:spcPct val="0"/>
+              </a:spcAft>
+              <a:buClrTx/>
+              <a:buSzTx/>
+              <a:buFontTx/>
+              <a:buNone/>
+              <a:tabLst/>
+            </a:pPr>
+            <a:endParaRPr kumimoji="0" lang="en-DK" sz="6600" b="0" i="0" u="none" strike="noStrike" cap="none" normalizeH="0" baseline="0">
+              <a:ln>
+                <a:noFill/>
+              </a:ln>
+              <a:solidFill>
+                <a:schemeClr val="tx1"/>
+              </a:solidFill>
+              <a:effectLst/>
+              <a:latin typeface="Arial" charset="0"/>
+            </a:endParaRPr>
+          </a:p>
+        </p:txBody>
+      </p:sp>
+      <p:sp>
+        <p:nvSpPr>
+          <p:cNvPr id="96" name="Rounded Rectangle 95">
+            <a:extLst>
+              <a:ext uri="{FF2B5EF4-FFF2-40B4-BE49-F238E27FC236}">
+                <a16:creationId xmlns:a16="http://schemas.microsoft.com/office/drawing/2014/main" id="{69F3162D-87C2-5448-A517-977CA6989DD1}"/>
+              </a:ext>
+            </a:extLst>
+          </p:cNvPr>
+          <p:cNvSpPr/>
+          <p:nvPr/>
+        </p:nvSpPr>
+        <p:spPr bwMode="auto">
+          <a:xfrm>
+            <a:off x="713282" y="12223917"/>
+            <a:ext cx="9554268" cy="5028315"/>
+          </a:xfrm>
+          <a:prstGeom prst="roundRect">
+            <a:avLst>
+              <a:gd name="adj" fmla="val 5710"/>
+            </a:avLst>
+          </a:prstGeom>
+          <a:noFill/>
+          <a:ln w="12700" cap="flat" cmpd="sng" algn="ctr">
+            <a:solidFill>
+              <a:schemeClr val="tx1"/>
+            </a:solidFill>
+            <a:prstDash val="solid"/>
+            <a:round/>
+            <a:headEnd type="none" w="med" len="med"/>
+            <a:tailEnd type="none" w="med" len="med"/>
+          </a:ln>
+          <a:effectLst/>
+        </p:spPr>
+        <p:txBody>
+          <a:bodyPr vert="horz" wrap="square" lIns="91440" tIns="45720" rIns="91440" bIns="45720" numCol="1" rtlCol="0" anchor="t" anchorCtr="0" compatLnSpc="1">
+            <a:prstTxWarp prst="textNoShape">
+              <a:avLst/>
+            </a:prstTxWarp>
+          </a:bodyPr>
+          <a:lstStyle/>
+          <a:p>
+            <a:pPr marL="0" marR="0" indent="0" algn="l" defTabSz="4173538" rtl="0" eaLnBrk="1" fontAlgn="base" latinLnBrk="0" hangingPunct="1">
+              <a:lnSpc>
+                <a:spcPct val="100000"/>
+              </a:lnSpc>
+              <a:spcBef>
+                <a:spcPct val="0"/>
+              </a:spcBef>
+              <a:spcAft>
+                <a:spcPct val="0"/>
+              </a:spcAft>
+              <a:buClrTx/>
+              <a:buSzTx/>
+              <a:buFontTx/>
+              <a:buNone/>
+              <a:tabLst/>
+            </a:pPr>
+            <a:endParaRPr kumimoji="0" lang="en-DK" sz="6600" b="0" i="0" u="none" strike="noStrike" cap="none" normalizeH="0" baseline="0">
+              <a:ln>
+                <a:noFill/>
+              </a:ln>
+              <a:solidFill>
+                <a:schemeClr val="tx1"/>
+              </a:solidFill>
+              <a:effectLst/>
+              <a:latin typeface="Arial" charset="0"/>
+            </a:endParaRPr>
+          </a:p>
+        </p:txBody>
+      </p:sp>
+      <p:sp>
+        <p:nvSpPr>
+          <p:cNvPr id="97" name="Rounded Rectangle 96">
+            <a:extLst>
+              <a:ext uri="{FF2B5EF4-FFF2-40B4-BE49-F238E27FC236}">
+                <a16:creationId xmlns:a16="http://schemas.microsoft.com/office/drawing/2014/main" id="{F4656977-81BA-1749-BA8F-651BDAA56AED}"/>
+              </a:ext>
+            </a:extLst>
+          </p:cNvPr>
+          <p:cNvSpPr/>
+          <p:nvPr/>
+        </p:nvSpPr>
+        <p:spPr bwMode="auto">
+          <a:xfrm>
+            <a:off x="1126949" y="17613419"/>
+            <a:ext cx="9554268" cy="5357901"/>
+          </a:xfrm>
+          <a:prstGeom prst="roundRect">
+            <a:avLst>
+              <a:gd name="adj" fmla="val 5710"/>
+            </a:avLst>
+          </a:prstGeom>
+          <a:noFill/>
+          <a:ln w="12700" cap="flat" cmpd="sng" algn="ctr">
+            <a:solidFill>
+              <a:schemeClr val="tx1"/>
+            </a:solidFill>
+            <a:prstDash val="solid"/>
+            <a:round/>
+            <a:headEnd type="none" w="med" len="med"/>
+            <a:tailEnd type="none" w="med" len="med"/>
+          </a:ln>
+          <a:effectLst/>
+        </p:spPr>
+        <p:txBody>
+          <a:bodyPr vert="horz" wrap="square" lIns="91440" tIns="45720" rIns="91440" bIns="45720" numCol="1" rtlCol="0" anchor="t" anchorCtr="0" compatLnSpc="1">
+            <a:prstTxWarp prst="textNoShape">
+              <a:avLst/>
+            </a:prstTxWarp>
+          </a:bodyPr>
+          <a:lstStyle/>
+          <a:p>
+            <a:pPr marL="0" marR="0" indent="0" algn="l" defTabSz="4173538" rtl="0" eaLnBrk="1" fontAlgn="base" latinLnBrk="0" hangingPunct="1">
+              <a:lnSpc>
+                <a:spcPct val="100000"/>
+              </a:lnSpc>
+              <a:spcBef>
+                <a:spcPct val="0"/>
+              </a:spcBef>
+              <a:spcAft>
+                <a:spcPct val="0"/>
+              </a:spcAft>
+              <a:buClrTx/>
+              <a:buSzTx/>
+              <a:buFontTx/>
+              <a:buNone/>
+              <a:tabLst/>
+            </a:pPr>
+            <a:endParaRPr kumimoji="0" lang="en-DK" sz="6600" b="0" i="0" u="none" strike="noStrike" cap="none" normalizeH="0" baseline="0">
+              <a:ln>
+                <a:noFill/>
+              </a:ln>
+              <a:solidFill>
+                <a:schemeClr val="tx1"/>
+              </a:solidFill>
+              <a:effectLst/>
+              <a:latin typeface="Arial" charset="0"/>
+            </a:endParaRPr>
+          </a:p>
+        </p:txBody>
+      </p:sp>
     </p:spTree>
   </p:cSld>
   <p:clrMapOvr>

</xml_diff>

<commit_message>
Delete all poster versions but one. Move some stuff around. Poster almost done
</commit_message>
<xml_diff>
--- a/Poster/WDN_poster_R.pptx
+++ b/Poster/WDN_poster_R.pptx
@@ -3732,7 +3732,10 @@
         <a:gradFill rotWithShape="0">
           <a:gsLst>
             <a:gs pos="0">
-              <a:srgbClr val="CCECFF"/>
+              <a:srgbClr val="0070C0">
+                <a:lumMod val="38000"/>
+                <a:lumOff val="62000"/>
+              </a:srgbClr>
             </a:gs>
             <a:gs pos="100000">
               <a:srgbClr val="5E6D76"/>
@@ -3778,7 +3781,7 @@
           </a:xfrm>
           <a:prstGeom prst="roundRect">
             <a:avLst>
-              <a:gd name="adj" fmla="val 3875"/>
+              <a:gd name="adj" fmla="val 2026"/>
             </a:avLst>
           </a:prstGeom>
           <a:solidFill>
@@ -3948,8 +3951,8 @@
         </p:nvSpPr>
         <p:spPr bwMode="auto">
           <a:xfrm>
-            <a:off x="431800" y="339393"/>
-            <a:ext cx="13937348" cy="1754326"/>
+            <a:off x="431799" y="339393"/>
+            <a:ext cx="14689931" cy="1754326"/>
           </a:xfrm>
           <a:prstGeom prst="rect">
             <a:avLst/>
@@ -4113,34 +4116,11 @@
               <a:buNone/>
             </a:pPr>
             <a:r>
-              <a:rPr lang="en-GB" altLang="en-US" sz="5400" b="1" dirty="0" err="1">
-                <a:latin typeface="Helvetica" panose="020B0604020202020204" pitchFamily="34" charset="0"/>
-                <a:cs typeface="Helvetica" panose="020B0604020202020204" pitchFamily="34" charset="0"/>
-              </a:rPr>
-              <a:t>Modeling</a:t>
-            </a:r>
-            <a:r>
               <a:rPr lang="en-GB" altLang="en-US" sz="5400" b="1" dirty="0">
                 <a:latin typeface="Helvetica" panose="020B0604020202020204" pitchFamily="34" charset="0"/>
                 <a:cs typeface="Helvetica" panose="020B0604020202020204" pitchFamily="34" charset="0"/>
               </a:rPr>
-              <a:t> and Networked Control of</a:t>
-            </a:r>
-          </a:p>
-          <a:p>
-            <a:pPr eaLnBrk="1" hangingPunct="1">
-              <a:spcBef>
-                <a:spcPct val="0"/>
-              </a:spcBef>
-              <a:buFontTx/>
-              <a:buNone/>
-            </a:pPr>
-            <a:r>
-              <a:rPr lang="en-GB" altLang="en-US" sz="5400" b="1" dirty="0">
-                <a:latin typeface="Helvetica" panose="020B0604020202020204" pitchFamily="34" charset="0"/>
-                <a:cs typeface="Helvetica" panose="020B0604020202020204" pitchFamily="34" charset="0"/>
-              </a:rPr>
-              <a:t>Water Distribution Networks</a:t>
+              <a:t>MODELLING AND NETWORKED CONTROL OF WATER DISTRIBUTION NETWORKS</a:t>
             </a:r>
           </a:p>
         </p:txBody>
@@ -4162,7 +4142,7 @@
         <p:spPr bwMode="auto">
           <a:xfrm>
             <a:off x="15488548" y="245046"/>
-            <a:ext cx="15637668" cy="2308324"/>
+            <a:ext cx="14338990" cy="2308324"/>
           </a:xfrm>
           <a:prstGeom prst="rect">
             <a:avLst/>
@@ -4337,8 +4317,40 @@
                 <a:latin typeface="Helvetica" panose="020B0604020202020204" pitchFamily="34" charset="0"/>
                 <a:cs typeface="Helvetica" panose="020B0604020202020204" pitchFamily="34" charset="0"/>
               </a:rPr>
-              <a:t>: Laurits H. Andersen, Mathias C. Frederiksen,</a:t>
-            </a:r>
+              <a:t>: </a:t>
+            </a:r>
+            <a:r>
+              <a:rPr lang="en-GB" altLang="en-US" sz="3600" i="1" dirty="0">
+                <a:latin typeface="Helvetica" panose="020B0604020202020204" pitchFamily="34" charset="0"/>
+                <a:cs typeface="Helvetica" panose="020B0604020202020204" pitchFamily="34" charset="0"/>
+              </a:rPr>
+              <a:t>L. H. Andersen,  M. C. Frederiksen,  C. M. Jensen,  J. N. Jensen,  R. L. Kristiansen, K. </a:t>
+            </a:r>
+            <a:r>
+              <a:rPr lang="en-GB" altLang="en-US" sz="3600" i="1" dirty="0" err="1">
+                <a:latin typeface="Helvetica" panose="020B0604020202020204" pitchFamily="34" charset="0"/>
+                <a:cs typeface="Helvetica" panose="020B0604020202020204" pitchFamily="34" charset="0"/>
+              </a:rPr>
+              <a:t>Laustsen</a:t>
+            </a:r>
+            <a:r>
+              <a:rPr lang="en-GB" altLang="en-US" sz="3600" i="1" dirty="0">
+                <a:latin typeface="Helvetica" panose="020B0604020202020204" pitchFamily="34" charset="0"/>
+                <a:cs typeface="Helvetica" panose="020B0604020202020204" pitchFamily="34" charset="0"/>
+              </a:rPr>
+              <a:t>  and  M. H. </a:t>
+            </a:r>
+            <a:r>
+              <a:rPr lang="en-GB" altLang="en-US" sz="3600" i="1" dirty="0" err="1">
+                <a:latin typeface="Helvetica" panose="020B0604020202020204" pitchFamily="34" charset="0"/>
+                <a:cs typeface="Helvetica" panose="020B0604020202020204" pitchFamily="34" charset="0"/>
+              </a:rPr>
+              <a:t>Therkildsen</a:t>
+            </a:r>
+            <a:endParaRPr lang="en-GB" altLang="en-US" sz="3600" i="1" dirty="0">
+              <a:latin typeface="Helvetica" panose="020B0604020202020204" pitchFamily="34" charset="0"/>
+              <a:cs typeface="Helvetica" panose="020B0604020202020204" pitchFamily="34" charset="0"/>
+            </a:endParaRPr>
           </a:p>
           <a:p>
             <a:pPr eaLnBrk="1" hangingPunct="1">
@@ -4349,37 +4361,19 @@
               <a:buNone/>
             </a:pPr>
             <a:r>
+              <a:rPr lang="en-GB" altLang="en-US" sz="3600" b="1" dirty="0">
+                <a:latin typeface="Helvetica" panose="020B0604020202020204" pitchFamily="34" charset="0"/>
+                <a:cs typeface="Helvetica" panose="020B0604020202020204" pitchFamily="34" charset="0"/>
+              </a:rPr>
+              <a:t>GROUP NO.: </a:t>
+            </a:r>
+            <a:r>
               <a:rPr lang="en-GB" altLang="en-US" sz="3600" dirty="0">
                 <a:latin typeface="Helvetica" panose="020B0604020202020204" pitchFamily="34" charset="0"/>
                 <a:cs typeface="Helvetica" panose="020B0604020202020204" pitchFamily="34" charset="0"/>
               </a:rPr>
-              <a:t>Christian M. Jensen, Jeppe N. Jensen, Rasmus L. Kristiansen, Kasper </a:t>
-            </a:r>
-            <a:r>
-              <a:rPr lang="en-GB" altLang="en-US" sz="3600" dirty="0" err="1">
-                <a:latin typeface="Helvetica" panose="020B0604020202020204" pitchFamily="34" charset="0"/>
-                <a:cs typeface="Helvetica" panose="020B0604020202020204" pitchFamily="34" charset="0"/>
-              </a:rPr>
-              <a:t>Laustsen</a:t>
-            </a:r>
-            <a:r>
-              <a:rPr lang="en-GB" altLang="en-US" sz="3600" dirty="0">
-                <a:latin typeface="Helvetica" panose="020B0604020202020204" pitchFamily="34" charset="0"/>
-                <a:cs typeface="Helvetica" panose="020B0604020202020204" pitchFamily="34" charset="0"/>
-              </a:rPr>
-              <a:t> and Martin H. </a:t>
-            </a:r>
-            <a:r>
-              <a:rPr lang="en-GB" altLang="en-US" sz="3600" dirty="0" err="1">
-                <a:latin typeface="Helvetica" panose="020B0604020202020204" pitchFamily="34" charset="0"/>
-                <a:cs typeface="Helvetica" panose="020B0604020202020204" pitchFamily="34" charset="0"/>
-              </a:rPr>
-              <a:t>Therkildsen</a:t>
-            </a:r>
-            <a:endParaRPr lang="en-GB" altLang="en-US" sz="3600" dirty="0">
-              <a:latin typeface="Helvetica" panose="020B0604020202020204" pitchFamily="34" charset="0"/>
-              <a:cs typeface="Helvetica" panose="020B0604020202020204" pitchFamily="34" charset="0"/>
-            </a:endParaRPr>
+              <a:t>733</a:t>
+            </a:r>
           </a:p>
           <a:p>
             <a:pPr eaLnBrk="1" hangingPunct="1">
@@ -4416,9 +4410,9 @@
         <p:grpSpPr bwMode="auto">
           <a:xfrm>
             <a:off x="15335554" y="33892606"/>
-            <a:ext cx="14670088" cy="5945820"/>
-            <a:chOff x="15464295" y="29481462"/>
-            <a:chExt cx="14669630" cy="8746985"/>
+            <a:ext cx="14670088" cy="5945819"/>
+            <a:chOff x="15464295" y="29481463"/>
+            <a:chExt cx="14669630" cy="8746984"/>
           </a:xfrm>
         </p:grpSpPr>
         <p:sp>
@@ -4612,7 +4606,7 @@
           </p:nvSpPr>
           <p:spPr bwMode="auto">
             <a:xfrm>
-              <a:off x="20608925" y="29481462"/>
+              <a:off x="20608925" y="29545397"/>
               <a:ext cx="5032147" cy="1629990"/>
             </a:xfrm>
             <a:prstGeom prst="rect">
@@ -4802,8 +4796,8 @@
           </p:nvSpPr>
           <p:spPr bwMode="auto">
             <a:xfrm>
-              <a:off x="15946438" y="31038503"/>
-              <a:ext cx="13868400" cy="1313047"/>
+              <a:off x="15946438" y="31179065"/>
+              <a:ext cx="13868400" cy="4256083"/>
             </a:xfrm>
             <a:prstGeom prst="rect">
               <a:avLst/>
@@ -4959,30 +4953,55 @@
               </a:lvl9pPr>
             </a:lstStyle>
             <a:p>
-              <a:pPr eaLnBrk="1" hangingPunct="1">
+              <a:pPr marL="0" indent="0" eaLnBrk="1" hangingPunct="1">
                 <a:spcBef>
                   <a:spcPct val="0"/>
                 </a:spcBef>
-                <a:buFontTx/>
                 <a:buNone/>
               </a:pPr>
               <a:r>
-                <a:rPr lang="en-GB" altLang="en-US" sz="2600">
+                <a:rPr lang="en-GB" altLang="en-US" sz="2600" dirty="0">
                   <a:latin typeface="Helvetica" panose="020B0604020202020204" pitchFamily="34" charset="0"/>
                   <a:cs typeface="Helvetica" panose="020B0604020202020204" pitchFamily="34" charset="0"/>
                 </a:rPr>
-                <a:t>Emphasize what is the main contribution of your work and it’s originality</a:t>
+                <a:t>﻿A cascaded control structure consisting of an outer LQR and inner PI-controllers as well as leakage detection and disturbance estimation with Kalman filter, is proposed for regulation of pressure. </a:t>
               </a:r>
             </a:p>
             <a:p>
-              <a:pPr algn="dist" eaLnBrk="1" hangingPunct="1">
+              <a:pPr marL="0" indent="0" eaLnBrk="1" hangingPunct="1">
                 <a:spcBef>
                   <a:spcPct val="0"/>
                 </a:spcBef>
-                <a:buFont typeface="Wingdings" pitchFamily="2" charset="2"/>
-                <a:buChar char="§"/>
+                <a:buNone/>
               </a:pPr>
-              <a:endParaRPr lang="en-GB" altLang="en-US" sz="2600">
+              <a:r>
+                <a:rPr lang="en-GB" altLang="en-US" sz="2600" dirty="0">
+                  <a:latin typeface="Helvetica" panose="020B0604020202020204" pitchFamily="34" charset="0"/>
+                  <a:cs typeface="Helvetica" panose="020B0604020202020204" pitchFamily="34" charset="0"/>
+                </a:rPr>
+                <a:t>Despite model uncertainties and difficulties with the WDN including pump delays and coupling and slower dynamics an efficient and stable controller was implemented.</a:t>
+              </a:r>
+            </a:p>
+            <a:p>
+              <a:pPr marL="0" indent="0" eaLnBrk="1" hangingPunct="1">
+                <a:spcBef>
+                  <a:spcPct val="0"/>
+                </a:spcBef>
+                <a:buNone/>
+              </a:pPr>
+              <a:endParaRPr lang="en-GB" altLang="en-US" sz="2600" dirty="0">
+                <a:latin typeface="Helvetica" panose="020B0604020202020204" pitchFamily="34" charset="0"/>
+                <a:cs typeface="Helvetica" panose="020B0604020202020204" pitchFamily="34" charset="0"/>
+              </a:endParaRPr>
+            </a:p>
+            <a:p>
+              <a:pPr marL="0" indent="0" eaLnBrk="1" hangingPunct="1">
+                <a:spcBef>
+                  <a:spcPct val="0"/>
+                </a:spcBef>
+                <a:buNone/>
+              </a:pPr>
+              <a:endParaRPr lang="en-GB" altLang="en-US" sz="2600" dirty="0">
                 <a:latin typeface="Helvetica" panose="020B0604020202020204" pitchFamily="34" charset="0"/>
                 <a:cs typeface="Helvetica" panose="020B0604020202020204" pitchFamily="34" charset="0"/>
               </a:endParaRPr>
@@ -5203,7 +5222,7 @@
           </p:nvSpPr>
           <p:spPr bwMode="auto">
             <a:xfrm>
-              <a:off x="20456525" y="38677532"/>
+              <a:off x="15721026" y="38234265"/>
               <a:ext cx="2228817" cy="2097068"/>
             </a:xfrm>
             <a:prstGeom prst="rect">
@@ -5368,201 +5387,11 @@
                 <a:buNone/>
               </a:pPr>
               <a:r>
-                <a:rPr lang="en-GB" altLang="en-US" sz="6600">
+                <a:rPr lang="en-GB" altLang="en-US" sz="6600" dirty="0">
                   <a:latin typeface="Helvetica" panose="020B0604020202020204" pitchFamily="34" charset="0"/>
                   <a:cs typeface="Helvetica" panose="020B0604020202020204" pitchFamily="34" charset="0"/>
                 </a:rPr>
                 <a:t>References</a:t>
-              </a:r>
-            </a:p>
-          </p:txBody>
-        </p:sp>
-        <p:sp>
-          <p:nvSpPr>
-            <p:cNvPr id="13355" name="Text Box 71">
-              <a:extLst>
-                <a:ext uri="{FF2B5EF4-FFF2-40B4-BE49-F238E27FC236}">
-                  <a16:creationId xmlns:a16="http://schemas.microsoft.com/office/drawing/2014/main" id="{7FACA6DC-B0D2-A44B-B79C-D2C7B757478B}"/>
-                </a:ext>
-              </a:extLst>
-            </p:cNvPr>
-            <p:cNvSpPr txBox="1">
-              <a:spLocks noChangeArrowheads="1"/>
-            </p:cNvSpPr>
-            <p:nvPr/>
-          </p:nvSpPr>
-          <p:spPr bwMode="auto">
-            <a:xfrm>
-              <a:off x="22548777" y="39616062"/>
-              <a:ext cx="345098" cy="757275"/>
-            </a:xfrm>
-            <a:prstGeom prst="rect">
-              <a:avLst/>
-            </a:prstGeom>
-            <a:noFill/>
-            <a:ln>
-              <a:noFill/>
-            </a:ln>
-            <a:extLst>
-              <a:ext uri="{909E8E84-426E-40DD-AFC4-6F175D3DCCD1}">
-                <a14:hiddenFill xmlns:a14="http://schemas.microsoft.com/office/drawing/2010/main">
-                  <a:solidFill>
-                    <a:srgbClr val="FFFFFF"/>
-                  </a:solidFill>
-                </a14:hiddenFill>
-              </a:ext>
-              <a:ext uri="{91240B29-F687-4F45-9708-019B960494DF}">
-                <a14:hiddenLine xmlns:a14="http://schemas.microsoft.com/office/drawing/2010/main" w="9525">
-                  <a:solidFill>
-                    <a:srgbClr val="000000"/>
-                  </a:solidFill>
-                  <a:miter lim="800000"/>
-                  <a:headEnd/>
-                  <a:tailEnd/>
-                </a14:hiddenLine>
-              </a:ext>
-            </a:extLst>
-          </p:spPr>
-          <p:txBody>
-            <a:bodyPr wrap="none">
-              <a:spAutoFit/>
-            </a:bodyPr>
-            <a:lstStyle>
-              <a:lvl1pPr defTabSz="4173538">
-                <a:spcBef>
-                  <a:spcPct val="20000"/>
-                </a:spcBef>
-                <a:buChar char="•"/>
-                <a:defRPr sz="14600">
-                  <a:solidFill>
-                    <a:schemeClr val="tx1"/>
-                  </a:solidFill>
-                  <a:latin typeface="Arial" panose="020B0604020202020204" pitchFamily="34" charset="0"/>
-                </a:defRPr>
-              </a:lvl1pPr>
-              <a:lvl2pPr marL="742950" indent="-285750" defTabSz="4173538">
-                <a:spcBef>
-                  <a:spcPct val="20000"/>
-                </a:spcBef>
-                <a:buChar char="–"/>
-                <a:defRPr sz="12800">
-                  <a:solidFill>
-                    <a:schemeClr val="tx1"/>
-                  </a:solidFill>
-                  <a:latin typeface="Arial" panose="020B0604020202020204" pitchFamily="34" charset="0"/>
-                </a:defRPr>
-              </a:lvl2pPr>
-              <a:lvl3pPr marL="1143000" indent="-228600" defTabSz="4173538">
-                <a:spcBef>
-                  <a:spcPct val="20000"/>
-                </a:spcBef>
-                <a:buChar char="•"/>
-                <a:defRPr sz="11000">
-                  <a:solidFill>
-                    <a:schemeClr val="tx1"/>
-                  </a:solidFill>
-                  <a:latin typeface="Arial" panose="020B0604020202020204" pitchFamily="34" charset="0"/>
-                </a:defRPr>
-              </a:lvl3pPr>
-              <a:lvl4pPr marL="1600200" indent="-228600" defTabSz="4173538">
-                <a:spcBef>
-                  <a:spcPct val="20000"/>
-                </a:spcBef>
-                <a:buChar char="–"/>
-                <a:defRPr sz="9100">
-                  <a:solidFill>
-                    <a:schemeClr val="tx1"/>
-                  </a:solidFill>
-                  <a:latin typeface="Arial" panose="020B0604020202020204" pitchFamily="34" charset="0"/>
-                </a:defRPr>
-              </a:lvl4pPr>
-              <a:lvl5pPr marL="2057400" indent="-228600" defTabSz="4173538">
-                <a:spcBef>
-                  <a:spcPct val="20000"/>
-                </a:spcBef>
-                <a:buChar char="»"/>
-                <a:defRPr sz="9100">
-                  <a:solidFill>
-                    <a:schemeClr val="tx1"/>
-                  </a:solidFill>
-                  <a:latin typeface="Arial" panose="020B0604020202020204" pitchFamily="34" charset="0"/>
-                </a:defRPr>
-              </a:lvl5pPr>
-              <a:lvl6pPr marL="2514600" indent="-228600" defTabSz="4173538" eaLnBrk="0" fontAlgn="base" hangingPunct="0">
-                <a:spcBef>
-                  <a:spcPct val="20000"/>
-                </a:spcBef>
-                <a:spcAft>
-                  <a:spcPct val="0"/>
-                </a:spcAft>
-                <a:buChar char="»"/>
-                <a:defRPr sz="9100">
-                  <a:solidFill>
-                    <a:schemeClr val="tx1"/>
-                  </a:solidFill>
-                  <a:latin typeface="Arial" panose="020B0604020202020204" pitchFamily="34" charset="0"/>
-                </a:defRPr>
-              </a:lvl6pPr>
-              <a:lvl7pPr marL="2971800" indent="-228600" defTabSz="4173538" eaLnBrk="0" fontAlgn="base" hangingPunct="0">
-                <a:spcBef>
-                  <a:spcPct val="20000"/>
-                </a:spcBef>
-                <a:spcAft>
-                  <a:spcPct val="0"/>
-                </a:spcAft>
-                <a:buChar char="»"/>
-                <a:defRPr sz="9100">
-                  <a:solidFill>
-                    <a:schemeClr val="tx1"/>
-                  </a:solidFill>
-                  <a:latin typeface="Arial" panose="020B0604020202020204" pitchFamily="34" charset="0"/>
-                </a:defRPr>
-              </a:lvl7pPr>
-              <a:lvl8pPr marL="3429000" indent="-228600" defTabSz="4173538" eaLnBrk="0" fontAlgn="base" hangingPunct="0">
-                <a:spcBef>
-                  <a:spcPct val="20000"/>
-                </a:spcBef>
-                <a:spcAft>
-                  <a:spcPct val="0"/>
-                </a:spcAft>
-                <a:buChar char="»"/>
-                <a:defRPr sz="9100">
-                  <a:solidFill>
-                    <a:schemeClr val="tx1"/>
-                  </a:solidFill>
-                  <a:latin typeface="Arial" panose="020B0604020202020204" pitchFamily="34" charset="0"/>
-                </a:defRPr>
-              </a:lvl8pPr>
-              <a:lvl9pPr marL="3886200" indent="-228600" defTabSz="4173538" eaLnBrk="0" fontAlgn="base" hangingPunct="0">
-                <a:spcBef>
-                  <a:spcPct val="20000"/>
-                </a:spcBef>
-                <a:spcAft>
-                  <a:spcPct val="0"/>
-                </a:spcAft>
-                <a:buChar char="»"/>
-                <a:defRPr sz="9100">
-                  <a:solidFill>
-                    <a:schemeClr val="tx1"/>
-                  </a:solidFill>
-                  <a:latin typeface="Arial" panose="020B0604020202020204" pitchFamily="34" charset="0"/>
-                </a:defRPr>
-              </a:lvl9pPr>
-            </a:lstStyle>
-            <a:p>
-              <a:pPr algn="just" eaLnBrk="1" hangingPunct="1">
-                <a:spcBef>
-                  <a:spcPct val="0"/>
-                </a:spcBef>
-                <a:buFontTx/>
-                <a:buNone/>
-              </a:pPr>
-              <a:r>
-                <a:rPr lang="en-GB" altLang="en-US" sz="2000">
-                  <a:latin typeface="Helvetica" panose="020B0604020202020204" pitchFamily="34" charset="0"/>
-                  <a:cs typeface="Helvetica" panose="020B0604020202020204" pitchFamily="34" charset="0"/>
-                </a:rPr>
-                <a:t>TBD</a:t>
               </a:r>
             </a:p>
           </p:txBody>
@@ -5984,7 +5813,7 @@
               <a:buNone/>
             </a:pPr>
             <a:r>
-              <a:rPr lang="en-GB" altLang="en-US" sz="6600">
+              <a:rPr lang="en-GB" altLang="en-US" sz="6600" dirty="0">
                 <a:latin typeface="Helvetica" panose="020B0604020202020204" pitchFamily="34" charset="0"/>
                 <a:cs typeface="Helvetica" panose="020B0604020202020204" pitchFamily="34" charset="0"/>
               </a:rPr>
@@ -6009,10 +5838,10 @@
         </p:nvGrpSpPr>
         <p:grpSpPr bwMode="auto">
           <a:xfrm>
-            <a:off x="333920" y="33863079"/>
-            <a:ext cx="14706600" cy="5975348"/>
-            <a:chOff x="15123210" y="5338760"/>
-            <a:chExt cx="14705915" cy="23963030"/>
+            <a:off x="333920" y="33912762"/>
+            <a:ext cx="14706600" cy="5913465"/>
+            <a:chOff x="15123210" y="5538005"/>
+            <a:chExt cx="14705915" cy="23714858"/>
           </a:xfrm>
         </p:grpSpPr>
         <p:sp>
@@ -6036,7 +5865,7 @@
             </a:xfrm>
             <a:prstGeom prst="roundRect">
               <a:avLst>
-                <a:gd name="adj" fmla="val 6856"/>
+                <a:gd name="adj" fmla="val 5777"/>
               </a:avLst>
             </a:prstGeom>
             <a:solidFill>
@@ -6206,8 +6035,8 @@
           </p:nvSpPr>
           <p:spPr bwMode="auto">
             <a:xfrm>
-              <a:off x="20070240" y="5338760"/>
-              <a:ext cx="4276934" cy="4530580"/>
+              <a:off x="20070240" y="5544293"/>
+              <a:ext cx="4276934" cy="4530581"/>
             </a:xfrm>
             <a:prstGeom prst="rect">
               <a:avLst/>
@@ -6371,7 +6200,7 @@
                 <a:buNone/>
               </a:pPr>
               <a:r>
-                <a:rPr lang="en-GB" altLang="en-US" sz="6600">
+                <a:rPr lang="en-GB" altLang="en-US" sz="6600" dirty="0">
                   <a:latin typeface="Helvetica" panose="020B0604020202020204" pitchFamily="34" charset="0"/>
                   <a:cs typeface="Helvetica" panose="020B0604020202020204" pitchFamily="34" charset="0"/>
                 </a:rPr>
@@ -6396,8 +6225,8 @@
           </p:nvSpPr>
           <p:spPr bwMode="auto">
             <a:xfrm>
-              <a:off x="15656585" y="12563822"/>
-              <a:ext cx="13867754" cy="16737968"/>
+              <a:off x="15693577" y="10403163"/>
+              <a:ext cx="13867754" cy="18020504"/>
             </a:xfrm>
             <a:prstGeom prst="rect">
               <a:avLst/>
@@ -6438,6 +6267,20 @@
                   <a:cs typeface="Helvetica" panose="020B0604020202020204" pitchFamily="34" charset="0"/>
                 </a:rPr>
                 <a:t>Kalman filter has to be stiff/slow to allow for leakage detection – limits disturbance estimation.</a:t>
+              </a:r>
+            </a:p>
+            <a:p>
+              <a:pPr marL="514350" indent="-514350" defTabSz="4173538" eaLnBrk="1" hangingPunct="1">
+                <a:buFont typeface="+mj-lt"/>
+                <a:buAutoNum type="arabicPeriod"/>
+                <a:defRPr/>
+              </a:pPr>
+              <a:r>
+                <a:rPr lang="en-GB" sz="2600" dirty="0">
+                  <a:latin typeface="Helvetica" panose="020B0604020202020204" pitchFamily="34" charset="0"/>
+                  <a:cs typeface="Helvetica" panose="020B0604020202020204" pitchFamily="34" charset="0"/>
+                </a:rPr>
+                <a:t>A leakage has to be sudden and large to be detectable.</a:t>
               </a:r>
             </a:p>
             <a:p>
@@ -6709,8 +6552,8 @@
           </p:nvSpPr>
           <p:spPr bwMode="auto">
             <a:xfrm>
-              <a:off x="572429" y="33291462"/>
-              <a:ext cx="14243780" cy="961492"/>
+              <a:off x="598376" y="33291462"/>
+              <a:ext cx="14217834" cy="961492"/>
             </a:xfrm>
             <a:prstGeom prst="rect">
               <a:avLst/>
@@ -6900,7 +6743,7 @@
         </p:nvSpPr>
         <p:spPr bwMode="auto">
           <a:xfrm>
-            <a:off x="1219977" y="7226282"/>
+            <a:off x="713282" y="6500945"/>
             <a:ext cx="9175750" cy="1569660"/>
           </a:xfrm>
           <a:prstGeom prst="rect">
@@ -7049,17 +6892,7 @@
                 <a:latin typeface="Helvetica" panose="020B0604020202020204" pitchFamily="34" charset="0"/>
                 <a:cs typeface="Helvetica" panose="020B0604020202020204" pitchFamily="34" charset="0"/>
               </a:rPr>
-              <a:t>How can a reliable networked controller for the WDN be</a:t>
-            </a:r>
-          </a:p>
-          <a:p>
-            <a:pPr eaLnBrk="1" hangingPunct="1"/>
-            <a:r>
-              <a:rPr lang="en-GB" altLang="en-US" sz="2400" dirty="0">
-                <a:latin typeface="Helvetica" panose="020B0604020202020204" pitchFamily="34" charset="0"/>
-                <a:cs typeface="Helvetica" panose="020B0604020202020204" pitchFamily="34" charset="0"/>
-              </a:rPr>
-              <a:t>implemented that delivers constant pressure control?</a:t>
+              <a:t>How can a reliable networked controller for the WDN be implemented that delivers constant pressure control?</a:t>
             </a:r>
           </a:p>
           <a:p>
@@ -7088,7 +6921,7 @@
         <p:spPr bwMode="auto">
           <a:xfrm>
             <a:off x="779463" y="4037012"/>
-            <a:ext cx="13738225" cy="3693319"/>
+            <a:ext cx="13738225" cy="2893100"/>
           </a:xfrm>
           <a:prstGeom prst="rect">
             <a:avLst/>
@@ -7301,32 +7134,6 @@
               <a:cs typeface="Helvetica" panose="020B0604020202020204" pitchFamily="34" charset="0"/>
             </a:endParaRPr>
           </a:p>
-          <a:p>
-            <a:pPr algn="just" eaLnBrk="1" hangingPunct="1">
-              <a:spcBef>
-                <a:spcPct val="0"/>
-              </a:spcBef>
-              <a:buFontTx/>
-              <a:buNone/>
-            </a:pPr>
-            <a:endParaRPr lang="en-GB" altLang="en-US" sz="2600" dirty="0">
-              <a:latin typeface="Helvetica" panose="020B0604020202020204" pitchFamily="34" charset="0"/>
-              <a:cs typeface="Helvetica" panose="020B0604020202020204" pitchFamily="34" charset="0"/>
-            </a:endParaRPr>
-          </a:p>
-          <a:p>
-            <a:pPr algn="just" eaLnBrk="1" hangingPunct="1">
-              <a:spcBef>
-                <a:spcPct val="0"/>
-              </a:spcBef>
-              <a:buFontTx/>
-              <a:buNone/>
-            </a:pPr>
-            <a:endParaRPr lang="en-GB" altLang="en-US" sz="2600" dirty="0">
-              <a:latin typeface="Helvetica" panose="020B0604020202020204" pitchFamily="34" charset="0"/>
-              <a:cs typeface="Helvetica" panose="020B0604020202020204" pitchFamily="34" charset="0"/>
-            </a:endParaRPr>
-          </a:p>
         </p:txBody>
       </p:sp>
       <p:sp>
@@ -7345,8 +7152,8 @@
         </p:nvSpPr>
         <p:spPr bwMode="auto">
           <a:xfrm>
-            <a:off x="903853" y="25038683"/>
-            <a:ext cx="6515893" cy="1107996"/>
+            <a:off x="1008320" y="25593180"/>
+            <a:ext cx="5815762" cy="1107996"/>
           </a:xfrm>
           <a:prstGeom prst="rect">
             <a:avLst/>
@@ -7478,7 +7285,7 @@
             </a:lvl9pPr>
           </a:lstStyle>
           <a:p>
-            <a:pPr algn="ctr" eaLnBrk="1" hangingPunct="1"/>
+            <a:pPr eaLnBrk="1" hangingPunct="1"/>
             <a:r>
               <a:rPr lang="en-GB" altLang="en-US" sz="2200" b="1" dirty="0">
                 <a:latin typeface="Helvetica" panose="020B0604020202020204" pitchFamily="34" charset="0"/>
@@ -7502,176 +7309,6 @@
                 <a:cs typeface="Helvetica" panose="020B0604020202020204" pitchFamily="34" charset="0"/>
               </a:rPr>
               <a:t>ollows constant tank pressure difference, starting 15 mm below reference.</a:t>
-            </a:r>
-          </a:p>
-        </p:txBody>
-      </p:sp>
-      <p:sp>
-        <p:nvSpPr>
-          <p:cNvPr id="50" name="TextBox 51">
-            <a:extLst>
-              <a:ext uri="{FF2B5EF4-FFF2-40B4-BE49-F238E27FC236}">
-                <a16:creationId xmlns:a16="http://schemas.microsoft.com/office/drawing/2014/main" id="{A02FD1A0-72B1-CD4A-8D5D-F6C1EF4672EC}"/>
-              </a:ext>
-            </a:extLst>
-          </p:cNvPr>
-          <p:cNvSpPr txBox="1">
-            <a:spLocks noChangeArrowheads="1"/>
-          </p:cNvSpPr>
-          <p:nvPr/>
-        </p:nvSpPr>
-        <p:spPr bwMode="auto">
-          <a:xfrm>
-            <a:off x="15539641" y="24552901"/>
-            <a:ext cx="6924675" cy="769441"/>
-          </a:xfrm>
-          <a:prstGeom prst="rect">
-            <a:avLst/>
-          </a:prstGeom>
-          <a:noFill/>
-          <a:ln>
-            <a:noFill/>
-          </a:ln>
-          <a:extLst>
-            <a:ext uri="{909E8E84-426E-40DD-AFC4-6F175D3DCCD1}">
-              <a14:hiddenFill xmlns:a14="http://schemas.microsoft.com/office/drawing/2010/main">
-                <a:solidFill>
-                  <a:srgbClr val="FFFFFF"/>
-                </a:solidFill>
-              </a14:hiddenFill>
-            </a:ext>
-            <a:ext uri="{91240B29-F687-4F45-9708-019B960494DF}">
-              <a14:hiddenLine xmlns:a14="http://schemas.microsoft.com/office/drawing/2010/main" w="9525">
-                <a:solidFill>
-                  <a:srgbClr val="000000"/>
-                </a:solidFill>
-                <a:miter lim="800000"/>
-                <a:headEnd/>
-                <a:tailEnd/>
-              </a14:hiddenLine>
-            </a:ext>
-          </a:extLst>
-        </p:spPr>
-        <p:txBody>
-          <a:bodyPr>
-            <a:spAutoFit/>
-          </a:bodyPr>
-          <a:lstStyle>
-            <a:lvl1pPr>
-              <a:defRPr sz="6600">
-                <a:solidFill>
-                  <a:schemeClr val="tx1"/>
-                </a:solidFill>
-                <a:latin typeface="Arial" panose="020B0604020202020204" pitchFamily="34" charset="0"/>
-              </a:defRPr>
-            </a:lvl1pPr>
-            <a:lvl2pPr marL="742950" indent="-285750">
-              <a:defRPr sz="6600">
-                <a:solidFill>
-                  <a:schemeClr val="tx1"/>
-                </a:solidFill>
-                <a:latin typeface="Arial" panose="020B0604020202020204" pitchFamily="34" charset="0"/>
-              </a:defRPr>
-            </a:lvl2pPr>
-            <a:lvl3pPr marL="1143000" indent="-228600">
-              <a:defRPr sz="6600">
-                <a:solidFill>
-                  <a:schemeClr val="tx1"/>
-                </a:solidFill>
-                <a:latin typeface="Arial" panose="020B0604020202020204" pitchFamily="34" charset="0"/>
-              </a:defRPr>
-            </a:lvl3pPr>
-            <a:lvl4pPr marL="1600200" indent="-228600">
-              <a:defRPr sz="6600">
-                <a:solidFill>
-                  <a:schemeClr val="tx1"/>
-                </a:solidFill>
-                <a:latin typeface="Arial" panose="020B0604020202020204" pitchFamily="34" charset="0"/>
-              </a:defRPr>
-            </a:lvl4pPr>
-            <a:lvl5pPr marL="2057400" indent="-228600">
-              <a:defRPr sz="6600">
-                <a:solidFill>
-                  <a:schemeClr val="tx1"/>
-                </a:solidFill>
-                <a:latin typeface="Arial" panose="020B0604020202020204" pitchFamily="34" charset="0"/>
-              </a:defRPr>
-            </a:lvl5pPr>
-            <a:lvl6pPr marL="2514600" indent="-228600" eaLnBrk="0" fontAlgn="base" hangingPunct="0">
-              <a:spcBef>
-                <a:spcPct val="0"/>
-              </a:spcBef>
-              <a:spcAft>
-                <a:spcPct val="0"/>
-              </a:spcAft>
-              <a:defRPr sz="6600">
-                <a:solidFill>
-                  <a:schemeClr val="tx1"/>
-                </a:solidFill>
-                <a:latin typeface="Arial" panose="020B0604020202020204" pitchFamily="34" charset="0"/>
-              </a:defRPr>
-            </a:lvl6pPr>
-            <a:lvl7pPr marL="2971800" indent="-228600" eaLnBrk="0" fontAlgn="base" hangingPunct="0">
-              <a:spcBef>
-                <a:spcPct val="0"/>
-              </a:spcBef>
-              <a:spcAft>
-                <a:spcPct val="0"/>
-              </a:spcAft>
-              <a:defRPr sz="6600">
-                <a:solidFill>
-                  <a:schemeClr val="tx1"/>
-                </a:solidFill>
-                <a:latin typeface="Arial" panose="020B0604020202020204" pitchFamily="34" charset="0"/>
-              </a:defRPr>
-            </a:lvl7pPr>
-            <a:lvl8pPr marL="3429000" indent="-228600" eaLnBrk="0" fontAlgn="base" hangingPunct="0">
-              <a:spcBef>
-                <a:spcPct val="0"/>
-              </a:spcBef>
-              <a:spcAft>
-                <a:spcPct val="0"/>
-              </a:spcAft>
-              <a:defRPr sz="6600">
-                <a:solidFill>
-                  <a:schemeClr val="tx1"/>
-                </a:solidFill>
-                <a:latin typeface="Arial" panose="020B0604020202020204" pitchFamily="34" charset="0"/>
-              </a:defRPr>
-            </a:lvl8pPr>
-            <a:lvl9pPr marL="3886200" indent="-228600" eaLnBrk="0" fontAlgn="base" hangingPunct="0">
-              <a:spcBef>
-                <a:spcPct val="0"/>
-              </a:spcBef>
-              <a:spcAft>
-                <a:spcPct val="0"/>
-              </a:spcAft>
-              <a:defRPr sz="6600">
-                <a:solidFill>
-                  <a:schemeClr val="tx1"/>
-                </a:solidFill>
-                <a:latin typeface="Arial" panose="020B0604020202020204" pitchFamily="34" charset="0"/>
-              </a:defRPr>
-            </a:lvl9pPr>
-          </a:lstStyle>
-          <a:p>
-            <a:pPr algn="ctr" eaLnBrk="1" hangingPunct="1"/>
-            <a:r>
-              <a:rPr lang="en-GB" altLang="en-US" sz="2200" b="1" dirty="0">
-                <a:latin typeface="Helvetica" panose="020B0604020202020204" pitchFamily="34" charset="0"/>
-                <a:cs typeface="Helvetica" panose="020B0604020202020204" pitchFamily="34" charset="0"/>
-              </a:rPr>
-              <a:t>Inner loop Pump control</a:t>
-            </a:r>
-          </a:p>
-          <a:p>
-            <a:pPr eaLnBrk="1" hangingPunct="1"/>
-            <a:r>
-              <a:rPr lang="en-GB" altLang="en-US" sz="2200" dirty="0">
-                <a:latin typeface="Helvetica" panose="020B0604020202020204" pitchFamily="34" charset="0"/>
-                <a:cs typeface="Helvetica" panose="020B0604020202020204" pitchFamily="34" charset="0"/>
-              </a:rPr>
-              <a:t>Pumps attempt to follow their reference </a:t>
             </a:r>
           </a:p>
         </p:txBody>
@@ -7836,176 +7473,6 @@
           </a:p>
         </p:txBody>
       </p:sp>
-      <p:sp>
-        <p:nvSpPr>
-          <p:cNvPr id="52" name="TextBox 56">
-            <a:extLst>
-              <a:ext uri="{FF2B5EF4-FFF2-40B4-BE49-F238E27FC236}">
-                <a16:creationId xmlns:a16="http://schemas.microsoft.com/office/drawing/2014/main" id="{4A40FF4D-198B-9A4F-B2E0-E098F43AC70E}"/>
-              </a:ext>
-            </a:extLst>
-          </p:cNvPr>
-          <p:cNvSpPr txBox="1">
-            <a:spLocks noChangeArrowheads="1"/>
-          </p:cNvSpPr>
-          <p:nvPr/>
-        </p:nvSpPr>
-        <p:spPr bwMode="auto">
-          <a:xfrm>
-            <a:off x="8180866" y="28185455"/>
-            <a:ext cx="6924675" cy="1107996"/>
-          </a:xfrm>
-          <a:prstGeom prst="rect">
-            <a:avLst/>
-          </a:prstGeom>
-          <a:noFill/>
-          <a:ln>
-            <a:noFill/>
-          </a:ln>
-          <a:extLst>
-            <a:ext uri="{909E8E84-426E-40DD-AFC4-6F175D3DCCD1}">
-              <a14:hiddenFill xmlns:a14="http://schemas.microsoft.com/office/drawing/2010/main">
-                <a:solidFill>
-                  <a:srgbClr val="FFFFFF"/>
-                </a:solidFill>
-              </a14:hiddenFill>
-            </a:ext>
-            <a:ext uri="{91240B29-F687-4F45-9708-019B960494DF}">
-              <a14:hiddenLine xmlns:a14="http://schemas.microsoft.com/office/drawing/2010/main" w="9525">
-                <a:solidFill>
-                  <a:srgbClr val="000000"/>
-                </a:solidFill>
-                <a:miter lim="800000"/>
-                <a:headEnd/>
-                <a:tailEnd/>
-              </a14:hiddenLine>
-            </a:ext>
-          </a:extLst>
-        </p:spPr>
-        <p:txBody>
-          <a:bodyPr>
-            <a:spAutoFit/>
-          </a:bodyPr>
-          <a:lstStyle>
-            <a:lvl1pPr>
-              <a:defRPr sz="6600">
-                <a:solidFill>
-                  <a:schemeClr val="tx1"/>
-                </a:solidFill>
-                <a:latin typeface="Arial" panose="020B0604020202020204" pitchFamily="34" charset="0"/>
-              </a:defRPr>
-            </a:lvl1pPr>
-            <a:lvl2pPr marL="742950" indent="-285750">
-              <a:defRPr sz="6600">
-                <a:solidFill>
-                  <a:schemeClr val="tx1"/>
-                </a:solidFill>
-                <a:latin typeface="Arial" panose="020B0604020202020204" pitchFamily="34" charset="0"/>
-              </a:defRPr>
-            </a:lvl2pPr>
-            <a:lvl3pPr marL="1143000" indent="-228600">
-              <a:defRPr sz="6600">
-                <a:solidFill>
-                  <a:schemeClr val="tx1"/>
-                </a:solidFill>
-                <a:latin typeface="Arial" panose="020B0604020202020204" pitchFamily="34" charset="0"/>
-              </a:defRPr>
-            </a:lvl3pPr>
-            <a:lvl4pPr marL="1600200" indent="-228600">
-              <a:defRPr sz="6600">
-                <a:solidFill>
-                  <a:schemeClr val="tx1"/>
-                </a:solidFill>
-                <a:latin typeface="Arial" panose="020B0604020202020204" pitchFamily="34" charset="0"/>
-              </a:defRPr>
-            </a:lvl4pPr>
-            <a:lvl5pPr marL="2057400" indent="-228600">
-              <a:defRPr sz="6600">
-                <a:solidFill>
-                  <a:schemeClr val="tx1"/>
-                </a:solidFill>
-                <a:latin typeface="Arial" panose="020B0604020202020204" pitchFamily="34" charset="0"/>
-              </a:defRPr>
-            </a:lvl5pPr>
-            <a:lvl6pPr marL="2514600" indent="-228600" eaLnBrk="0" fontAlgn="base" hangingPunct="0">
-              <a:spcBef>
-                <a:spcPct val="0"/>
-              </a:spcBef>
-              <a:spcAft>
-                <a:spcPct val="0"/>
-              </a:spcAft>
-              <a:defRPr sz="6600">
-                <a:solidFill>
-                  <a:schemeClr val="tx1"/>
-                </a:solidFill>
-                <a:latin typeface="Arial" panose="020B0604020202020204" pitchFamily="34" charset="0"/>
-              </a:defRPr>
-            </a:lvl6pPr>
-            <a:lvl7pPr marL="2971800" indent="-228600" eaLnBrk="0" fontAlgn="base" hangingPunct="0">
-              <a:spcBef>
-                <a:spcPct val="0"/>
-              </a:spcBef>
-              <a:spcAft>
-                <a:spcPct val="0"/>
-              </a:spcAft>
-              <a:defRPr sz="6600">
-                <a:solidFill>
-                  <a:schemeClr val="tx1"/>
-                </a:solidFill>
-                <a:latin typeface="Arial" panose="020B0604020202020204" pitchFamily="34" charset="0"/>
-              </a:defRPr>
-            </a:lvl7pPr>
-            <a:lvl8pPr marL="3429000" indent="-228600" eaLnBrk="0" fontAlgn="base" hangingPunct="0">
-              <a:spcBef>
-                <a:spcPct val="0"/>
-              </a:spcBef>
-              <a:spcAft>
-                <a:spcPct val="0"/>
-              </a:spcAft>
-              <a:defRPr sz="6600">
-                <a:solidFill>
-                  <a:schemeClr val="tx1"/>
-                </a:solidFill>
-                <a:latin typeface="Arial" panose="020B0604020202020204" pitchFamily="34" charset="0"/>
-              </a:defRPr>
-            </a:lvl8pPr>
-            <a:lvl9pPr marL="3886200" indent="-228600" eaLnBrk="0" fontAlgn="base" hangingPunct="0">
-              <a:spcBef>
-                <a:spcPct val="0"/>
-              </a:spcBef>
-              <a:spcAft>
-                <a:spcPct val="0"/>
-              </a:spcAft>
-              <a:defRPr sz="6600">
-                <a:solidFill>
-                  <a:schemeClr val="tx1"/>
-                </a:solidFill>
-                <a:latin typeface="Arial" panose="020B0604020202020204" pitchFamily="34" charset="0"/>
-              </a:defRPr>
-            </a:lvl9pPr>
-          </a:lstStyle>
-          <a:p>
-            <a:pPr algn="ctr" eaLnBrk="1" hangingPunct="1"/>
-            <a:r>
-              <a:rPr lang="en-GB" altLang="en-US" sz="2200" b="1" dirty="0">
-                <a:latin typeface="Helvetica" panose="020B0604020202020204" pitchFamily="34" charset="0"/>
-                <a:cs typeface="Helvetica" panose="020B0604020202020204" pitchFamily="34" charset="0"/>
-              </a:rPr>
-              <a:t>Consumer flow (disturbance) estimation</a:t>
-            </a:r>
-          </a:p>
-          <a:p>
-            <a:pPr eaLnBrk="1" hangingPunct="1"/>
-            <a:r>
-              <a:rPr lang="en-GB" altLang="en-US" sz="2200" dirty="0">
-                <a:latin typeface="Helvetica" panose="020B0604020202020204" pitchFamily="34" charset="0"/>
-                <a:cs typeface="Helvetica" panose="020B0604020202020204" pitchFamily="34" charset="0"/>
-              </a:rPr>
-              <a:t>The Kalman filter tracking based on model and measurement data</a:t>
-            </a:r>
-          </a:p>
-        </p:txBody>
-      </p:sp>
       <p:pic>
         <p:nvPicPr>
           <p:cNvPr id="53" name="Picture 52">
@@ -8034,8 +7501,8 @@
         </p:blipFill>
         <p:spPr>
           <a:xfrm>
-            <a:off x="7341385" y="29273366"/>
-            <a:ext cx="7161942" cy="4168089"/>
+            <a:off x="6562228" y="28530266"/>
+            <a:ext cx="8165515" cy="4752145"/>
           </a:xfrm>
           <a:prstGeom prst="rect">
             <a:avLst/>
@@ -8044,10 +7511,10 @@
       </p:pic>
       <p:pic>
         <p:nvPicPr>
-          <p:cNvPr id="54" name="Picture 53">
+          <p:cNvPr id="56" name="Picture 55">
             <a:extLst>
               <a:ext uri="{FF2B5EF4-FFF2-40B4-BE49-F238E27FC236}">
-                <a16:creationId xmlns:a16="http://schemas.microsoft.com/office/drawing/2014/main" id="{928DD5A1-827C-C142-82B2-EB86987C2556}"/>
+                <a16:creationId xmlns:a16="http://schemas.microsoft.com/office/drawing/2014/main" id="{4A077C95-FD8A-2447-8340-EAB9A573F2BC}"/>
               </a:ext>
             </a:extLst>
           </p:cNvPr>
@@ -8070,8 +7537,8 @@
         </p:blipFill>
         <p:spPr>
           <a:xfrm>
-            <a:off x="14983553" y="25312500"/>
-            <a:ext cx="7226910" cy="4143666"/>
+            <a:off x="7087518" y="24804970"/>
+            <a:ext cx="7606279" cy="3182504"/>
           </a:xfrm>
           <a:prstGeom prst="rect">
             <a:avLst/>
@@ -8106,44 +7573,8 @@
         </p:blipFill>
         <p:spPr>
           <a:xfrm>
-            <a:off x="22221047" y="30061926"/>
-            <a:ext cx="7351572" cy="3137530"/>
-          </a:xfrm>
-          <a:prstGeom prst="rect">
-            <a:avLst/>
-          </a:prstGeom>
-        </p:spPr>
-      </p:pic>
-      <p:pic>
-        <p:nvPicPr>
-          <p:cNvPr id="56" name="Picture 55">
-            <a:extLst>
-              <a:ext uri="{FF2B5EF4-FFF2-40B4-BE49-F238E27FC236}">
-                <a16:creationId xmlns:a16="http://schemas.microsoft.com/office/drawing/2014/main" id="{4A077C95-FD8A-2447-8340-EAB9A573F2BC}"/>
-              </a:ext>
-            </a:extLst>
-          </p:cNvPr>
-          <p:cNvPicPr>
-            <a:picLocks noChangeAspect="1"/>
-          </p:cNvPicPr>
-          <p:nvPr/>
-        </p:nvPicPr>
-        <p:blipFill>
-          <a:blip r:embed="rId6">
-            <a:extLst>
-              <a:ext uri="{28A0092B-C50C-407E-A947-70E740481C1C}">
-                <a14:useLocalDpi xmlns:a14="http://schemas.microsoft.com/office/drawing/2010/main" val="0"/>
-              </a:ext>
-            </a:extLst>
-          </a:blip>
-          <a:stretch>
-            <a:fillRect/>
-          </a:stretch>
-        </p:blipFill>
-        <p:spPr>
-          <a:xfrm>
-            <a:off x="713282" y="26284262"/>
-            <a:ext cx="7065866" cy="2956393"/>
+            <a:off x="21477790" y="24683954"/>
+            <a:ext cx="7456951" cy="3182504"/>
           </a:xfrm>
           <a:prstGeom prst="rect">
             <a:avLst/>
@@ -8166,8 +7597,8 @@
         </p:nvSpPr>
         <p:spPr bwMode="auto">
           <a:xfrm>
-            <a:off x="22738418" y="28755185"/>
-            <a:ext cx="6961982" cy="1107996"/>
+            <a:off x="15823268" y="25536487"/>
+            <a:ext cx="5298612" cy="1107996"/>
           </a:xfrm>
           <a:prstGeom prst="rect">
             <a:avLst/>
@@ -8299,7 +7730,7 @@
             </a:lvl9pPr>
           </a:lstStyle>
           <a:p>
-            <a:pPr algn="ctr" eaLnBrk="1" hangingPunct="1"/>
+            <a:pPr eaLnBrk="1" hangingPunct="1"/>
             <a:r>
               <a:rPr lang="en-GB" altLang="en-US" sz="2200" b="1" dirty="0">
                 <a:latin typeface="Helvetica" panose="020B0604020202020204" pitchFamily="34" charset="0"/>
@@ -8335,7 +7766,7 @@
           <p:nvPr/>
         </p:nvPicPr>
         <p:blipFill>
-          <a:blip r:embed="rId7">
+          <a:blip r:embed="rId6">
             <a:extLst>
               <a:ext uri="{28A0092B-C50C-407E-A947-70E740481C1C}">
                 <a14:useLocalDpi xmlns:a14="http://schemas.microsoft.com/office/drawing/2010/main" val="0"/>
@@ -8560,7 +7991,7 @@
         </p:nvSpPr>
         <p:spPr>
           <a:xfrm>
-            <a:off x="1424898" y="17712546"/>
+            <a:off x="1857158" y="17656082"/>
             <a:ext cx="9996848" cy="1046440"/>
           </a:xfrm>
           <a:prstGeom prst="rect">
@@ -8832,7 +8263,7 @@
           <p:nvPr/>
         </p:nvPicPr>
         <p:blipFill>
-          <a:blip r:embed="rId8">
+          <a:blip r:embed="rId7">
             <a:extLst>
               <a:ext uri="{28A0092B-C50C-407E-A947-70E740481C1C}">
                 <a14:useLocalDpi xmlns:a14="http://schemas.microsoft.com/office/drawing/2010/main" val="0"/>
@@ -8853,8 +8284,8 @@
           </a:prstGeom>
         </p:spPr>
       </p:pic>
-      <mc:AlternateContent xmlns:mc="http://schemas.openxmlformats.org/markup-compatibility/2006" xmlns:a14="http://schemas.microsoft.com/office/drawing/2010/main">
-        <mc:Choice Requires="a14">
+      <mc:AlternateContent xmlns:mc="http://schemas.openxmlformats.org/markup-compatibility/2006">
+        <mc:Choice xmlns:a14="http://schemas.microsoft.com/office/drawing/2010/main" Requires="a14">
           <p:sp>
             <p:nvSpPr>
               <p:cNvPr id="67" name="TextBox 66">
@@ -8869,7 +8300,7 @@
             </p:nvSpPr>
             <p:spPr>
               <a:xfrm>
-                <a:off x="1296439" y="10071151"/>
+                <a:off x="1680328" y="9993779"/>
                 <a:ext cx="9024256" cy="1661993"/>
               </a:xfrm>
               <a:prstGeom prst="rect">
@@ -9005,7 +8436,7 @@
             </p:txBody>
           </p:sp>
         </mc:Choice>
-        <mc:Fallback xmlns="">
+        <mc:Fallback>
           <p:sp>
             <p:nvSpPr>
               <p:cNvPr id="67" name="TextBox 66">
@@ -9022,16 +8453,16 @@
             </p:nvSpPr>
             <p:spPr>
               <a:xfrm>
-                <a:off x="1296439" y="10071151"/>
+                <a:off x="1680328" y="9993779"/>
                 <a:ext cx="9024256" cy="1661993"/>
               </a:xfrm>
               <a:prstGeom prst="rect">
                 <a:avLst/>
               </a:prstGeom>
               <a:blipFill>
-                <a:blip r:embed="rId9"/>
+                <a:blip r:embed="rId8"/>
                 <a:stretch>
-                  <a:fillRect l="-844" t="-1504" b="-5263"/>
+                  <a:fillRect l="-703" t="-2273" b="-6061"/>
                 </a:stretch>
               </a:blipFill>
             </p:spPr>
@@ -9065,7 +8496,7 @@
           <p:nvPr/>
         </p:nvPicPr>
         <p:blipFill>
-          <a:blip r:embed="rId10">
+          <a:blip r:embed="rId9">
             <a:extLst>
               <a:ext uri="{28A0092B-C50C-407E-A947-70E740481C1C}">
                 <a14:useLocalDpi xmlns:a14="http://schemas.microsoft.com/office/drawing/2010/main" val="0"/>
@@ -9125,7 +8556,7 @@
           <p:nvPr/>
         </p:nvPicPr>
         <p:blipFill>
-          <a:blip r:embed="rId11"/>
+          <a:blip r:embed="rId10"/>
           <a:stretch>
             <a:fillRect/>
           </a:stretch>
@@ -9155,7 +8586,7 @@
           <p:nvPr/>
         </p:nvPicPr>
         <p:blipFill>
-          <a:blip r:embed="rId12"/>
+          <a:blip r:embed="rId11"/>
           <a:stretch>
             <a:fillRect/>
           </a:stretch>
@@ -9239,7 +8670,7 @@
           <p:nvPr/>
         </p:nvPicPr>
         <p:blipFill>
-          <a:blip r:embed="rId13">
+          <a:blip r:embed="rId12">
             <a:extLst>
               <a:ext uri="{28A0092B-C50C-407E-A947-70E740481C1C}">
                 <a14:useLocalDpi xmlns:a14="http://schemas.microsoft.com/office/drawing/2010/main" val="0"/>
@@ -9275,7 +8706,7 @@
           <p:nvPr/>
         </p:nvPicPr>
         <p:blipFill>
-          <a:blip r:embed="rId14">
+          <a:blip r:embed="rId13">
             <a:extLst>
               <a:ext uri="{28A0092B-C50C-407E-A947-70E740481C1C}">
                 <a14:useLocalDpi xmlns:a14="http://schemas.microsoft.com/office/drawing/2010/main" val="0"/>
@@ -9288,7 +8719,7 @@
         </p:blipFill>
         <p:spPr>
           <a:xfrm>
-            <a:off x="1248068" y="18907411"/>
+            <a:off x="1680328" y="18850947"/>
             <a:ext cx="9108467" cy="3811027"/>
           </a:xfrm>
           <a:prstGeom prst="rect">
@@ -9311,7 +8742,7 @@
           <p:nvPr/>
         </p:nvPicPr>
         <p:blipFill>
-          <a:blip r:embed="rId15">
+          <a:blip r:embed="rId14">
             <a:extLst>
               <a:ext uri="{28A0092B-C50C-407E-A947-70E740481C1C}">
                 <a14:useLocalDpi xmlns:a14="http://schemas.microsoft.com/office/drawing/2010/main" val="0"/>
@@ -9347,7 +8778,7 @@
           <p:nvPr/>
         </p:nvPicPr>
         <p:blipFill>
-          <a:blip r:embed="rId16"/>
+          <a:blip r:embed="rId15"/>
           <a:stretch>
             <a:fillRect/>
           </a:stretch>
@@ -9377,7 +8808,7 @@
           <p:nvPr/>
         </p:nvPicPr>
         <p:blipFill>
-          <a:blip r:embed="rId17"/>
+          <a:blip r:embed="rId16"/>
           <a:stretch>
             <a:fillRect/>
           </a:stretch>
@@ -9548,7 +8979,7 @@
         </p:nvSpPr>
         <p:spPr bwMode="auto">
           <a:xfrm>
-            <a:off x="1002764" y="9897820"/>
+            <a:off x="1386653" y="9820448"/>
             <a:ext cx="9317931" cy="2014908"/>
           </a:xfrm>
           <a:prstGeom prst="roundRect">
@@ -9690,7 +9121,7 @@
         </p:nvSpPr>
         <p:spPr bwMode="auto">
           <a:xfrm>
-            <a:off x="1126949" y="17613419"/>
+            <a:off x="1559209" y="17556955"/>
             <a:ext cx="9554268" cy="5357901"/>
           </a:xfrm>
           <a:prstGeom prst="roundRect">
@@ -9744,6 +9175,485 @@
               <a:effectLst/>
               <a:latin typeface="Arial" charset="0"/>
             </a:endParaRPr>
+          </a:p>
+        </p:txBody>
+      </p:sp>
+      <p:grpSp>
+        <p:nvGrpSpPr>
+          <p:cNvPr id="24" name="Group 23">
+            <a:extLst>
+              <a:ext uri="{FF2B5EF4-FFF2-40B4-BE49-F238E27FC236}">
+                <a16:creationId xmlns:a16="http://schemas.microsoft.com/office/drawing/2014/main" id="{34ED1396-6EFA-AC4E-8AF9-C66D656ABAD2}"/>
+              </a:ext>
+            </a:extLst>
+          </p:cNvPr>
+          <p:cNvGrpSpPr/>
+          <p:nvPr/>
+        </p:nvGrpSpPr>
+        <p:grpSpPr>
+          <a:xfrm>
+            <a:off x="15817712" y="28477532"/>
+            <a:ext cx="13166646" cy="4915425"/>
+            <a:chOff x="16377200" y="24108837"/>
+            <a:chExt cx="13166646" cy="4915425"/>
+          </a:xfrm>
+        </p:grpSpPr>
+        <p:pic>
+          <p:nvPicPr>
+            <p:cNvPr id="54" name="Picture 53">
+              <a:extLst>
+                <a:ext uri="{FF2B5EF4-FFF2-40B4-BE49-F238E27FC236}">
+                  <a16:creationId xmlns:a16="http://schemas.microsoft.com/office/drawing/2014/main" id="{928DD5A1-827C-C142-82B2-EB86987C2556}"/>
+                </a:ext>
+              </a:extLst>
+            </p:cNvPr>
+            <p:cNvPicPr>
+              <a:picLocks noChangeAspect="1"/>
+            </p:cNvPicPr>
+            <p:nvPr/>
+          </p:nvPicPr>
+          <p:blipFill>
+            <a:blip r:embed="rId17">
+              <a:extLst>
+                <a:ext uri="{28A0092B-C50C-407E-A947-70E740481C1C}">
+                  <a14:useLocalDpi xmlns:a14="http://schemas.microsoft.com/office/drawing/2010/main" val="0"/>
+                </a:ext>
+              </a:extLst>
+            </a:blip>
+            <a:stretch>
+              <a:fillRect/>
+            </a:stretch>
+          </p:blipFill>
+          <p:spPr>
+            <a:xfrm>
+              <a:off x="20970921" y="24108837"/>
+              <a:ext cx="8572925" cy="4915425"/>
+            </a:xfrm>
+            <a:prstGeom prst="rect">
+              <a:avLst/>
+            </a:prstGeom>
+          </p:spPr>
+        </p:pic>
+        <p:sp>
+          <p:nvSpPr>
+            <p:cNvPr id="50" name="TextBox 51">
+              <a:extLst>
+                <a:ext uri="{FF2B5EF4-FFF2-40B4-BE49-F238E27FC236}">
+                  <a16:creationId xmlns:a16="http://schemas.microsoft.com/office/drawing/2014/main" id="{A02FD1A0-72B1-CD4A-8D5D-F6C1EF4672EC}"/>
+                </a:ext>
+              </a:extLst>
+            </p:cNvPr>
+            <p:cNvSpPr txBox="1">
+              <a:spLocks noChangeArrowheads="1"/>
+            </p:cNvSpPr>
+            <p:nvPr/>
+          </p:nvSpPr>
+          <p:spPr bwMode="auto">
+            <a:xfrm>
+              <a:off x="16377200" y="26049559"/>
+              <a:ext cx="5105400" cy="769441"/>
+            </a:xfrm>
+            <a:prstGeom prst="rect">
+              <a:avLst/>
+            </a:prstGeom>
+            <a:noFill/>
+            <a:ln>
+              <a:noFill/>
+            </a:ln>
+            <a:extLst>
+              <a:ext uri="{909E8E84-426E-40DD-AFC4-6F175D3DCCD1}">
+                <a14:hiddenFill xmlns:a14="http://schemas.microsoft.com/office/drawing/2010/main">
+                  <a:solidFill>
+                    <a:srgbClr val="FFFFFF"/>
+                  </a:solidFill>
+                </a14:hiddenFill>
+              </a:ext>
+              <a:ext uri="{91240B29-F687-4F45-9708-019B960494DF}">
+                <a14:hiddenLine xmlns:a14="http://schemas.microsoft.com/office/drawing/2010/main" w="9525">
+                  <a:solidFill>
+                    <a:srgbClr val="000000"/>
+                  </a:solidFill>
+                  <a:miter lim="800000"/>
+                  <a:headEnd/>
+                  <a:tailEnd/>
+                </a14:hiddenLine>
+              </a:ext>
+            </a:extLst>
+          </p:spPr>
+          <p:txBody>
+            <a:bodyPr wrap="square">
+              <a:spAutoFit/>
+            </a:bodyPr>
+            <a:lstStyle>
+              <a:lvl1pPr>
+                <a:defRPr sz="6600">
+                  <a:solidFill>
+                    <a:schemeClr val="tx1"/>
+                  </a:solidFill>
+                  <a:latin typeface="Arial" panose="020B0604020202020204" pitchFamily="34" charset="0"/>
+                </a:defRPr>
+              </a:lvl1pPr>
+              <a:lvl2pPr marL="742950" indent="-285750">
+                <a:defRPr sz="6600">
+                  <a:solidFill>
+                    <a:schemeClr val="tx1"/>
+                  </a:solidFill>
+                  <a:latin typeface="Arial" panose="020B0604020202020204" pitchFamily="34" charset="0"/>
+                </a:defRPr>
+              </a:lvl2pPr>
+              <a:lvl3pPr marL="1143000" indent="-228600">
+                <a:defRPr sz="6600">
+                  <a:solidFill>
+                    <a:schemeClr val="tx1"/>
+                  </a:solidFill>
+                  <a:latin typeface="Arial" panose="020B0604020202020204" pitchFamily="34" charset="0"/>
+                </a:defRPr>
+              </a:lvl3pPr>
+              <a:lvl4pPr marL="1600200" indent="-228600">
+                <a:defRPr sz="6600">
+                  <a:solidFill>
+                    <a:schemeClr val="tx1"/>
+                  </a:solidFill>
+                  <a:latin typeface="Arial" panose="020B0604020202020204" pitchFamily="34" charset="0"/>
+                </a:defRPr>
+              </a:lvl4pPr>
+              <a:lvl5pPr marL="2057400" indent="-228600">
+                <a:defRPr sz="6600">
+                  <a:solidFill>
+                    <a:schemeClr val="tx1"/>
+                  </a:solidFill>
+                  <a:latin typeface="Arial" panose="020B0604020202020204" pitchFamily="34" charset="0"/>
+                </a:defRPr>
+              </a:lvl5pPr>
+              <a:lvl6pPr marL="2514600" indent="-228600" eaLnBrk="0" fontAlgn="base" hangingPunct="0">
+                <a:spcBef>
+                  <a:spcPct val="0"/>
+                </a:spcBef>
+                <a:spcAft>
+                  <a:spcPct val="0"/>
+                </a:spcAft>
+                <a:defRPr sz="6600">
+                  <a:solidFill>
+                    <a:schemeClr val="tx1"/>
+                  </a:solidFill>
+                  <a:latin typeface="Arial" panose="020B0604020202020204" pitchFamily="34" charset="0"/>
+                </a:defRPr>
+              </a:lvl6pPr>
+              <a:lvl7pPr marL="2971800" indent="-228600" eaLnBrk="0" fontAlgn="base" hangingPunct="0">
+                <a:spcBef>
+                  <a:spcPct val="0"/>
+                </a:spcBef>
+                <a:spcAft>
+                  <a:spcPct val="0"/>
+                </a:spcAft>
+                <a:defRPr sz="6600">
+                  <a:solidFill>
+                    <a:schemeClr val="tx1"/>
+                  </a:solidFill>
+                  <a:latin typeface="Arial" panose="020B0604020202020204" pitchFamily="34" charset="0"/>
+                </a:defRPr>
+              </a:lvl7pPr>
+              <a:lvl8pPr marL="3429000" indent="-228600" eaLnBrk="0" fontAlgn="base" hangingPunct="0">
+                <a:spcBef>
+                  <a:spcPct val="0"/>
+                </a:spcBef>
+                <a:spcAft>
+                  <a:spcPct val="0"/>
+                </a:spcAft>
+                <a:defRPr sz="6600">
+                  <a:solidFill>
+                    <a:schemeClr val="tx1"/>
+                  </a:solidFill>
+                  <a:latin typeface="Arial" panose="020B0604020202020204" pitchFamily="34" charset="0"/>
+                </a:defRPr>
+              </a:lvl8pPr>
+              <a:lvl9pPr marL="3886200" indent="-228600" eaLnBrk="0" fontAlgn="base" hangingPunct="0">
+                <a:spcBef>
+                  <a:spcPct val="0"/>
+                </a:spcBef>
+                <a:spcAft>
+                  <a:spcPct val="0"/>
+                </a:spcAft>
+                <a:defRPr sz="6600">
+                  <a:solidFill>
+                    <a:schemeClr val="tx1"/>
+                  </a:solidFill>
+                  <a:latin typeface="Arial" panose="020B0604020202020204" pitchFamily="34" charset="0"/>
+                </a:defRPr>
+              </a:lvl9pPr>
+            </a:lstStyle>
+            <a:p>
+              <a:pPr eaLnBrk="1" hangingPunct="1"/>
+              <a:r>
+                <a:rPr lang="en-GB" altLang="en-US" sz="2200" b="1" dirty="0">
+                  <a:latin typeface="Helvetica" panose="020B0604020202020204" pitchFamily="34" charset="0"/>
+                  <a:cs typeface="Helvetica" panose="020B0604020202020204" pitchFamily="34" charset="0"/>
+                </a:rPr>
+                <a:t>Inner loop Pump control</a:t>
+              </a:r>
+            </a:p>
+            <a:p>
+              <a:pPr eaLnBrk="1" hangingPunct="1"/>
+              <a:r>
+                <a:rPr lang="en-GB" altLang="en-US" sz="2200" dirty="0">
+                  <a:latin typeface="Helvetica" panose="020B0604020202020204" pitchFamily="34" charset="0"/>
+                  <a:cs typeface="Helvetica" panose="020B0604020202020204" pitchFamily="34" charset="0"/>
+                </a:rPr>
+                <a:t>Pumps attempt to follow their reference </a:t>
+              </a:r>
+            </a:p>
+          </p:txBody>
+        </p:sp>
+      </p:grpSp>
+      <p:cxnSp>
+        <p:nvCxnSpPr>
+          <p:cNvPr id="15" name="Straight Connector 14">
+            <a:extLst>
+              <a:ext uri="{FF2B5EF4-FFF2-40B4-BE49-F238E27FC236}">
+                <a16:creationId xmlns:a16="http://schemas.microsoft.com/office/drawing/2014/main" id="{ED73CC87-45B2-7B47-9937-CD2EA9FD7867}"/>
+              </a:ext>
+            </a:extLst>
+          </p:cNvPr>
+          <p:cNvCxnSpPr>
+            <a:cxnSpLocks/>
+          </p:cNvCxnSpPr>
+          <p:nvPr/>
+        </p:nvCxnSpPr>
+        <p:spPr bwMode="auto">
+          <a:xfrm flipH="1">
+            <a:off x="779464" y="28262262"/>
+            <a:ext cx="28696084" cy="0"/>
+          </a:xfrm>
+          <a:prstGeom prst="line">
+            <a:avLst/>
+          </a:prstGeom>
+          <a:ln>
+            <a:headEnd type="none" w="med" len="med"/>
+            <a:tailEnd type="none" w="med" len="med"/>
+          </a:ln>
+        </p:spPr>
+        <p:style>
+          <a:lnRef idx="3">
+            <a:schemeClr val="dk1"/>
+          </a:lnRef>
+          <a:fillRef idx="0">
+            <a:schemeClr val="dk1"/>
+          </a:fillRef>
+          <a:effectRef idx="2">
+            <a:schemeClr val="dk1"/>
+          </a:effectRef>
+          <a:fontRef idx="minor">
+            <a:schemeClr val="tx1"/>
+          </a:fontRef>
+        </p:style>
+      </p:cxnSp>
+      <p:cxnSp>
+        <p:nvCxnSpPr>
+          <p:cNvPr id="17" name="Straight Connector 16">
+            <a:extLst>
+              <a:ext uri="{FF2B5EF4-FFF2-40B4-BE49-F238E27FC236}">
+                <a16:creationId xmlns:a16="http://schemas.microsoft.com/office/drawing/2014/main" id="{A6882CD3-0935-8247-89EB-798AC9D415F2}"/>
+              </a:ext>
+            </a:extLst>
+          </p:cNvPr>
+          <p:cNvCxnSpPr/>
+          <p:nvPr/>
+        </p:nvCxnSpPr>
+        <p:spPr bwMode="auto">
+          <a:xfrm>
+            <a:off x="15192237" y="24806322"/>
+            <a:ext cx="0" cy="8429771"/>
+          </a:xfrm>
+          <a:prstGeom prst="line">
+            <a:avLst/>
+          </a:prstGeom>
+          <a:ln>
+            <a:headEnd type="none" w="med" len="med"/>
+            <a:tailEnd type="none" w="med" len="med"/>
+          </a:ln>
+        </p:spPr>
+        <p:style>
+          <a:lnRef idx="3">
+            <a:schemeClr val="dk1"/>
+          </a:lnRef>
+          <a:fillRef idx="0">
+            <a:schemeClr val="dk1"/>
+          </a:fillRef>
+          <a:effectRef idx="2">
+            <a:schemeClr val="dk1"/>
+          </a:effectRef>
+          <a:fontRef idx="minor">
+            <a:schemeClr val="tx1"/>
+          </a:fontRef>
+        </p:style>
+      </p:cxnSp>
+      <p:sp>
+        <p:nvSpPr>
+          <p:cNvPr id="52" name="TextBox 56">
+            <a:extLst>
+              <a:ext uri="{FF2B5EF4-FFF2-40B4-BE49-F238E27FC236}">
+                <a16:creationId xmlns:a16="http://schemas.microsoft.com/office/drawing/2014/main" id="{4A40FF4D-198B-9A4F-B2E0-E098F43AC70E}"/>
+              </a:ext>
+            </a:extLst>
+          </p:cNvPr>
+          <p:cNvSpPr txBox="1">
+            <a:spLocks noChangeArrowheads="1"/>
+          </p:cNvSpPr>
+          <p:nvPr/>
+        </p:nvSpPr>
+        <p:spPr bwMode="auto">
+          <a:xfrm>
+            <a:off x="904314" y="30381246"/>
+            <a:ext cx="5785200" cy="1107996"/>
+          </a:xfrm>
+          <a:prstGeom prst="rect">
+            <a:avLst/>
+          </a:prstGeom>
+          <a:noFill/>
+          <a:ln>
+            <a:noFill/>
+          </a:ln>
+          <a:extLst>
+            <a:ext uri="{909E8E84-426E-40DD-AFC4-6F175D3DCCD1}">
+              <a14:hiddenFill xmlns:a14="http://schemas.microsoft.com/office/drawing/2010/main">
+                <a:solidFill>
+                  <a:srgbClr val="FFFFFF"/>
+                </a:solidFill>
+              </a14:hiddenFill>
+            </a:ext>
+            <a:ext uri="{91240B29-F687-4F45-9708-019B960494DF}">
+              <a14:hiddenLine xmlns:a14="http://schemas.microsoft.com/office/drawing/2010/main" w="9525">
+                <a:solidFill>
+                  <a:srgbClr val="000000"/>
+                </a:solidFill>
+                <a:miter lim="800000"/>
+                <a:headEnd/>
+                <a:tailEnd/>
+              </a14:hiddenLine>
+            </a:ext>
+          </a:extLst>
+        </p:spPr>
+        <p:txBody>
+          <a:bodyPr wrap="square">
+            <a:spAutoFit/>
+          </a:bodyPr>
+          <a:lstStyle>
+            <a:lvl1pPr>
+              <a:defRPr sz="6600">
+                <a:solidFill>
+                  <a:schemeClr val="tx1"/>
+                </a:solidFill>
+                <a:latin typeface="Arial" panose="020B0604020202020204" pitchFamily="34" charset="0"/>
+              </a:defRPr>
+            </a:lvl1pPr>
+            <a:lvl2pPr marL="742950" indent="-285750">
+              <a:defRPr sz="6600">
+                <a:solidFill>
+                  <a:schemeClr val="tx1"/>
+                </a:solidFill>
+                <a:latin typeface="Arial" panose="020B0604020202020204" pitchFamily="34" charset="0"/>
+              </a:defRPr>
+            </a:lvl2pPr>
+            <a:lvl3pPr marL="1143000" indent="-228600">
+              <a:defRPr sz="6600">
+                <a:solidFill>
+                  <a:schemeClr val="tx1"/>
+                </a:solidFill>
+                <a:latin typeface="Arial" panose="020B0604020202020204" pitchFamily="34" charset="0"/>
+              </a:defRPr>
+            </a:lvl3pPr>
+            <a:lvl4pPr marL="1600200" indent="-228600">
+              <a:defRPr sz="6600">
+                <a:solidFill>
+                  <a:schemeClr val="tx1"/>
+                </a:solidFill>
+                <a:latin typeface="Arial" panose="020B0604020202020204" pitchFamily="34" charset="0"/>
+              </a:defRPr>
+            </a:lvl4pPr>
+            <a:lvl5pPr marL="2057400" indent="-228600">
+              <a:defRPr sz="6600">
+                <a:solidFill>
+                  <a:schemeClr val="tx1"/>
+                </a:solidFill>
+                <a:latin typeface="Arial" panose="020B0604020202020204" pitchFamily="34" charset="0"/>
+              </a:defRPr>
+            </a:lvl5pPr>
+            <a:lvl6pPr marL="2514600" indent="-228600" eaLnBrk="0" fontAlgn="base" hangingPunct="0">
+              <a:spcBef>
+                <a:spcPct val="0"/>
+              </a:spcBef>
+              <a:spcAft>
+                <a:spcPct val="0"/>
+              </a:spcAft>
+              <a:defRPr sz="6600">
+                <a:solidFill>
+                  <a:schemeClr val="tx1"/>
+                </a:solidFill>
+                <a:latin typeface="Arial" panose="020B0604020202020204" pitchFamily="34" charset="0"/>
+              </a:defRPr>
+            </a:lvl6pPr>
+            <a:lvl7pPr marL="2971800" indent="-228600" eaLnBrk="0" fontAlgn="base" hangingPunct="0">
+              <a:spcBef>
+                <a:spcPct val="0"/>
+              </a:spcBef>
+              <a:spcAft>
+                <a:spcPct val="0"/>
+              </a:spcAft>
+              <a:defRPr sz="6600">
+                <a:solidFill>
+                  <a:schemeClr val="tx1"/>
+                </a:solidFill>
+                <a:latin typeface="Arial" panose="020B0604020202020204" pitchFamily="34" charset="0"/>
+              </a:defRPr>
+            </a:lvl7pPr>
+            <a:lvl8pPr marL="3429000" indent="-228600" eaLnBrk="0" fontAlgn="base" hangingPunct="0">
+              <a:spcBef>
+                <a:spcPct val="0"/>
+              </a:spcBef>
+              <a:spcAft>
+                <a:spcPct val="0"/>
+              </a:spcAft>
+              <a:defRPr sz="6600">
+                <a:solidFill>
+                  <a:schemeClr val="tx1"/>
+                </a:solidFill>
+                <a:latin typeface="Arial" panose="020B0604020202020204" pitchFamily="34" charset="0"/>
+              </a:defRPr>
+            </a:lvl8pPr>
+            <a:lvl9pPr marL="3886200" indent="-228600" eaLnBrk="0" fontAlgn="base" hangingPunct="0">
+              <a:spcBef>
+                <a:spcPct val="0"/>
+              </a:spcBef>
+              <a:spcAft>
+                <a:spcPct val="0"/>
+              </a:spcAft>
+              <a:defRPr sz="6600">
+                <a:solidFill>
+                  <a:schemeClr val="tx1"/>
+                </a:solidFill>
+                <a:latin typeface="Arial" panose="020B0604020202020204" pitchFamily="34" charset="0"/>
+              </a:defRPr>
+            </a:lvl9pPr>
+          </a:lstStyle>
+          <a:p>
+            <a:pPr eaLnBrk="1" hangingPunct="1"/>
+            <a:r>
+              <a:rPr lang="en-GB" altLang="en-US" sz="2200" b="1" dirty="0">
+                <a:latin typeface="Helvetica" panose="020B0604020202020204" pitchFamily="34" charset="0"/>
+                <a:cs typeface="Helvetica" panose="020B0604020202020204" pitchFamily="34" charset="0"/>
+              </a:rPr>
+              <a:t>Consumer flow (disturbance) estimation</a:t>
+            </a:r>
+          </a:p>
+          <a:p>
+            <a:pPr eaLnBrk="1" hangingPunct="1"/>
+            <a:r>
+              <a:rPr lang="en-GB" altLang="en-US" sz="2200" dirty="0">
+                <a:latin typeface="Helvetica" panose="020B0604020202020204" pitchFamily="34" charset="0"/>
+                <a:cs typeface="Helvetica" panose="020B0604020202020204" pitchFamily="34" charset="0"/>
+              </a:rPr>
+              <a:t>The Kalman filter tracking based on model and measurement data</a:t>
+            </a:r>
           </a:p>
         </p:txBody>
       </p:sp>

</xml_diff>

<commit_message>
Add review changes to poster - only references missing
</commit_message>
<xml_diff>
--- a/Poster/WDN_poster_R.pptx
+++ b/Poster/WDN_poster_R.pptx
@@ -3777,7 +3777,7 @@
         <p:spPr bwMode="auto">
           <a:xfrm>
             <a:off x="378504" y="9419415"/>
-            <a:ext cx="29489400" cy="13804022"/>
+            <a:ext cx="29542696" cy="13804022"/>
           </a:xfrm>
           <a:prstGeom prst="roundRect">
             <a:avLst>
@@ -4310,7 +4310,7 @@
                 <a:latin typeface="Helvetica" panose="020B0604020202020204" pitchFamily="34" charset="0"/>
                 <a:cs typeface="Helvetica" panose="020B0604020202020204" pitchFamily="34" charset="0"/>
               </a:rPr>
-              <a:t>Authors</a:t>
+              <a:t>AUTHORS</a:t>
             </a:r>
             <a:r>
               <a:rPr lang="en-GB" altLang="en-US" sz="3600" dirty="0">
@@ -4410,9 +4410,9 @@
         <p:grpSpPr bwMode="auto">
           <a:xfrm>
             <a:off x="15335554" y="33892606"/>
-            <a:ext cx="14670088" cy="5945819"/>
+            <a:ext cx="14585646" cy="5945819"/>
             <a:chOff x="15464295" y="29481463"/>
-            <a:chExt cx="14669630" cy="8746984"/>
+            <a:chExt cx="14585191" cy="8746984"/>
           </a:xfrm>
         </p:grpSpPr>
         <p:sp>
@@ -4432,7 +4432,7 @@
           <p:spPr bwMode="auto">
             <a:xfrm>
               <a:off x="15464295" y="29481463"/>
-              <a:ext cx="14669630" cy="8746984"/>
+              <a:ext cx="14585191" cy="8746984"/>
             </a:xfrm>
             <a:prstGeom prst="roundRect">
               <a:avLst>
@@ -4796,7 +4796,7 @@
           </p:nvSpPr>
           <p:spPr bwMode="auto">
             <a:xfrm>
-              <a:off x="15946438" y="31179065"/>
+              <a:off x="15946437" y="31366650"/>
               <a:ext cx="13868400" cy="4256083"/>
             </a:xfrm>
             <a:prstGeom prst="rect">
@@ -4964,7 +4964,7 @@
                   <a:latin typeface="Helvetica" panose="020B0604020202020204" pitchFamily="34" charset="0"/>
                   <a:cs typeface="Helvetica" panose="020B0604020202020204" pitchFamily="34" charset="0"/>
                 </a:rPr>
-                <a:t>﻿A cascaded control structure consisting of an outer LQR and inner PI-controllers as well as leakage detection and disturbance estimation with Kalman filter, is proposed for regulation of pressure. </a:t>
+                <a:t>﻿A cascaded control structure consisting of an outer LQR and inner PI-controllers as well as leakage detection and disturbance estimation with Kalman filter, is proposed for regulation of level in an elevated water reservoir. </a:t>
               </a:r>
             </a:p>
             <a:p>
@@ -4979,7 +4979,7 @@
                   <a:latin typeface="Helvetica" panose="020B0604020202020204" pitchFamily="34" charset="0"/>
                   <a:cs typeface="Helvetica" panose="020B0604020202020204" pitchFamily="34" charset="0"/>
                 </a:rPr>
-                <a:t>Despite model uncertainties and difficulties with the WDN including pump delays and coupling and slower dynamics an efficient and stable controller was implemented.</a:t>
+                <a:t>Despite model uncertainties and difficulties with the Lab WDN including pump delays, coupling, and slower dynamics, an efficient and stable controller was implemented.</a:t>
               </a:r>
             </a:p>
             <a:p>
@@ -5025,10 +5025,10 @@
         </p:nvGrpSpPr>
         <p:grpSpPr bwMode="auto">
           <a:xfrm>
-            <a:off x="338138" y="40136714"/>
-            <a:ext cx="29489400" cy="2426765"/>
-            <a:chOff x="15579725" y="38076514"/>
-            <a:chExt cx="14554200" cy="4206549"/>
+            <a:off x="378504" y="40136714"/>
+            <a:ext cx="29542697" cy="2426765"/>
+            <a:chOff x="15599647" y="38076514"/>
+            <a:chExt cx="14580504" cy="4206549"/>
           </a:xfrm>
         </p:grpSpPr>
         <p:sp>
@@ -5047,8 +5047,8 @@
           </p:nvSpPr>
           <p:spPr bwMode="auto">
             <a:xfrm>
-              <a:off x="15579725" y="38076514"/>
-              <a:ext cx="14554200" cy="4206549"/>
+              <a:off x="15599647" y="38076514"/>
+              <a:ext cx="14580504" cy="4206549"/>
             </a:xfrm>
             <a:prstGeom prst="roundRect">
               <a:avLst>
@@ -5199,7 +5199,7 @@
                 <a:buFontTx/>
                 <a:buNone/>
               </a:pPr>
-              <a:endParaRPr lang="en-GB" altLang="en-US" sz="6600">
+              <a:endParaRPr lang="en-GB" altLang="en-US" sz="6600" dirty="0">
                 <a:latin typeface="Helvetica" panose="020B0604020202020204" pitchFamily="34" charset="0"/>
                 <a:cs typeface="Helvetica" panose="020B0604020202020204" pitchFamily="34" charset="0"/>
               </a:endParaRPr>
@@ -5413,8 +5413,8 @@
         </p:nvSpPr>
         <p:spPr bwMode="auto">
           <a:xfrm>
-            <a:off x="431800" y="2811462"/>
-            <a:ext cx="29489400" cy="6445806"/>
+            <a:off x="378504" y="2811462"/>
+            <a:ext cx="29542696" cy="6445806"/>
           </a:xfrm>
           <a:prstGeom prst="roundRect">
             <a:avLst>
@@ -5838,10 +5838,10 @@
         </p:nvGrpSpPr>
         <p:grpSpPr bwMode="auto">
           <a:xfrm>
-            <a:off x="333920" y="33912762"/>
-            <a:ext cx="14706600" cy="5913465"/>
-            <a:chOff x="15123210" y="5538005"/>
-            <a:chExt cx="14705915" cy="23714858"/>
+            <a:off x="378504" y="33912762"/>
+            <a:ext cx="14662016" cy="5913465"/>
+            <a:chOff x="15167792" y="5538005"/>
+            <a:chExt cx="14661333" cy="23714858"/>
           </a:xfrm>
         </p:grpSpPr>
         <p:sp>
@@ -5860,8 +5860,8 @@
           </p:nvSpPr>
           <p:spPr bwMode="auto">
             <a:xfrm>
-              <a:off x="15123210" y="5538005"/>
-              <a:ext cx="14705915" cy="23714858"/>
+              <a:off x="15167792" y="5538005"/>
+              <a:ext cx="14661333" cy="23714858"/>
             </a:xfrm>
             <a:prstGeom prst="roundRect">
               <a:avLst>
@@ -6252,7 +6252,7 @@
                   <a:latin typeface="Helvetica" panose="020B0604020202020204" pitchFamily="34" charset="0"/>
                   <a:cs typeface="Helvetica" panose="020B0604020202020204" pitchFamily="34" charset="0"/>
                 </a:rPr>
-                <a:t>Disturbance estimation with Kalman filter for feed forward to LQR requires increase of controller bandwidth to avoid synchronisation.</a:t>
+                <a:t>Disturbance estimation with Kalman filter for feedforward to LQR requires increase of controller bandwidth to avoid synchronisation.</a:t>
               </a:r>
             </a:p>
             <a:p>
@@ -6280,7 +6280,7 @@
                   <a:latin typeface="Helvetica" panose="020B0604020202020204" pitchFamily="34" charset="0"/>
                   <a:cs typeface="Helvetica" panose="020B0604020202020204" pitchFamily="34" charset="0"/>
                 </a:rPr>
-                <a:t>A leakage has to be sudden and large to be detectable.</a:t>
+                <a:t>A leakage has to be sudden and large relative to consumer demand to be detectable.</a:t>
               </a:r>
             </a:p>
             <a:p>
@@ -6308,7 +6308,7 @@
                   <a:latin typeface="Helvetica" panose="020B0604020202020204" pitchFamily="34" charset="0"/>
                   <a:cs typeface="Helvetica" panose="020B0604020202020204" pitchFamily="34" charset="0"/>
                 </a:rPr>
-                <a:t>Delay not is in simulation – could be cause of oscillations in for pump controllers. Coupling lost between pumps seen in lab must have been lost in linearisation.</a:t>
+                <a:t>Delay not in simulation – could partly cause oscillations in pump controllers. Coupling between pumps seen in lab must have been lost in linearisation.</a:t>
               </a:r>
             </a:p>
             <a:p>
@@ -6322,7 +6322,7 @@
                   <a:latin typeface="Helvetica" panose="020B0604020202020204" pitchFamily="34" charset="0"/>
                   <a:cs typeface="Helvetica" panose="020B0604020202020204" pitchFamily="34" charset="0"/>
                 </a:rPr>
-                <a:t>Reliability of system due to package loss suggests marginally stable system.</a:t>
+                <a:t>Behaviour of system due to package loss suggests stability.</a:t>
               </a:r>
             </a:p>
             <a:p>
@@ -6882,7 +6882,7 @@
                 <a:latin typeface="Helvetica" panose="020B0604020202020204" pitchFamily="34" charset="0"/>
                 <a:cs typeface="Helvetica" panose="020B0604020202020204" pitchFamily="34" charset="0"/>
               </a:rPr>
-              <a:t>Problem formulation</a:t>
+              <a:t>Problem Formulation</a:t>
             </a:r>
           </a:p>
           <a:p>
@@ -6892,7 +6892,7 @@
                 <a:latin typeface="Helvetica" panose="020B0604020202020204" pitchFamily="34" charset="0"/>
                 <a:cs typeface="Helvetica" panose="020B0604020202020204" pitchFamily="34" charset="0"/>
               </a:rPr>
-              <a:t>How can a reliable networked controller for the WDN be implemented that delivers constant pressure control?</a:t>
+              <a:t>How can a reliable networked controller for the WDN be implemented that delivers constant level control?</a:t>
             </a:r>
           </a:p>
           <a:p>
@@ -6921,7 +6921,7 @@
         <p:spPr bwMode="auto">
           <a:xfrm>
             <a:off x="779463" y="4037012"/>
-            <a:ext cx="13738225" cy="2893100"/>
+            <a:ext cx="13738225" cy="2092881"/>
           </a:xfrm>
           <a:prstGeom prst="rect">
             <a:avLst/>
@@ -7107,32 +7107,6 @@
               </a:rPr>
               <a:t>A reliable Water Distribution Network (WDN) is a pivotal part of any developed society. The objective of this project is, firstly, to both optimize the WDN control resulting in improvement in consumer experience and decreased strain on WDN components. Secondly leakage detection is introduced.</a:t>
             </a:r>
-          </a:p>
-          <a:p>
-            <a:pPr algn="just" eaLnBrk="1" hangingPunct="1">
-              <a:spcBef>
-                <a:spcPct val="0"/>
-              </a:spcBef>
-              <a:buFontTx/>
-              <a:buNone/>
-            </a:pPr>
-            <a:endParaRPr lang="en-GB" altLang="en-US" sz="2600" dirty="0">
-              <a:latin typeface="Helvetica" panose="020B0604020202020204" pitchFamily="34" charset="0"/>
-              <a:cs typeface="Helvetica" panose="020B0604020202020204" pitchFamily="34" charset="0"/>
-            </a:endParaRPr>
-          </a:p>
-          <a:p>
-            <a:pPr algn="just" eaLnBrk="1" hangingPunct="1">
-              <a:spcBef>
-                <a:spcPct val="0"/>
-              </a:spcBef>
-              <a:buFontTx/>
-              <a:buNone/>
-            </a:pPr>
-            <a:endParaRPr lang="en-GB" altLang="en-US" sz="2600" dirty="0">
-              <a:latin typeface="Helvetica" panose="020B0604020202020204" pitchFamily="34" charset="0"/>
-              <a:cs typeface="Helvetica" panose="020B0604020202020204" pitchFamily="34" charset="0"/>
-            </a:endParaRPr>
           </a:p>
         </p:txBody>
       </p:sp>
@@ -7291,24 +7265,17 @@
                 <a:latin typeface="Helvetica" panose="020B0604020202020204" pitchFamily="34" charset="0"/>
                 <a:cs typeface="Helvetica" panose="020B0604020202020204" pitchFamily="34" charset="0"/>
               </a:rPr>
-              <a:t>Outer Loop LQR control</a:t>
+              <a:t>Outer Loop LQR Control</a:t>
             </a:r>
           </a:p>
           <a:p>
             <a:pPr eaLnBrk="1" hangingPunct="1"/>
-            <a:r>
-              <a:rPr lang="en-GB" altLang="en-US" sz="2200" b="1" dirty="0">
-                <a:latin typeface="Helvetica" panose="020B0604020202020204" pitchFamily="34" charset="0"/>
-                <a:cs typeface="Helvetica" panose="020B0604020202020204" pitchFamily="34" charset="0"/>
-              </a:rPr>
-              <a:t>F</a:t>
-            </a:r>
             <a:r>
               <a:rPr lang="en-GB" altLang="en-US" sz="2200" dirty="0">
                 <a:latin typeface="Helvetica" panose="020B0604020202020204" pitchFamily="34" charset="0"/>
                 <a:cs typeface="Helvetica" panose="020B0604020202020204" pitchFamily="34" charset="0"/>
               </a:rPr>
-              <a:t>ollows constant tank pressure difference, starting 15 mm below reference.</a:t>
+              <a:t>Follows constant tank level reference, starting 15 mm below reference.</a:t>
             </a:r>
           </a:p>
         </p:txBody>
@@ -7545,42 +7512,6 @@
           </a:prstGeom>
         </p:spPr>
       </p:pic>
-      <p:pic>
-        <p:nvPicPr>
-          <p:cNvPr id="55" name="Picture 54">
-            <a:extLst>
-              <a:ext uri="{FF2B5EF4-FFF2-40B4-BE49-F238E27FC236}">
-                <a16:creationId xmlns:a16="http://schemas.microsoft.com/office/drawing/2014/main" id="{2C13C81C-FDD6-EB42-9E96-8DB2A50812B6}"/>
-              </a:ext>
-            </a:extLst>
-          </p:cNvPr>
-          <p:cNvPicPr>
-            <a:picLocks noChangeAspect="1"/>
-          </p:cNvPicPr>
-          <p:nvPr/>
-        </p:nvPicPr>
-        <p:blipFill>
-          <a:blip r:embed="rId5">
-            <a:extLst>
-              <a:ext uri="{28A0092B-C50C-407E-A947-70E740481C1C}">
-                <a14:useLocalDpi xmlns:a14="http://schemas.microsoft.com/office/drawing/2010/main" val="0"/>
-              </a:ext>
-            </a:extLst>
-          </a:blip>
-          <a:stretch>
-            <a:fillRect/>
-          </a:stretch>
-        </p:blipFill>
-        <p:spPr>
-          <a:xfrm>
-            <a:off x="21477790" y="24683954"/>
-            <a:ext cx="7456951" cy="3182504"/>
-          </a:xfrm>
-          <a:prstGeom prst="rect">
-            <a:avLst/>
-          </a:prstGeom>
-        </p:spPr>
-      </p:pic>
       <p:sp>
         <p:nvSpPr>
           <p:cNvPr id="57" name="TextBox 56">
@@ -7736,7 +7667,7 @@
                 <a:latin typeface="Helvetica" panose="020B0604020202020204" pitchFamily="34" charset="0"/>
                 <a:cs typeface="Helvetica" panose="020B0604020202020204" pitchFamily="34" charset="0"/>
               </a:rPr>
-              <a:t>Leakage detection</a:t>
+              <a:t>Leakage Detection</a:t>
             </a:r>
           </a:p>
           <a:p>
@@ -7766,7 +7697,7 @@
           <p:nvPr/>
         </p:nvPicPr>
         <p:blipFill>
-          <a:blip r:embed="rId6">
+          <a:blip r:embed="rId5">
             <a:extLst>
               <a:ext uri="{28A0092B-C50C-407E-A947-70E740481C1C}">
                 <a14:useLocalDpi xmlns:a14="http://schemas.microsoft.com/office/drawing/2010/main" val="0"/>
@@ -7779,7 +7710,7 @@
         </p:blipFill>
         <p:spPr>
           <a:xfrm>
-            <a:off x="21850135" y="3132136"/>
+            <a:off x="21850135" y="3246881"/>
             <a:ext cx="7613865" cy="5431981"/>
           </a:xfrm>
           <a:prstGeom prst="rect">
@@ -7803,8 +7734,8 @@
         </p:nvSpPr>
         <p:spPr bwMode="auto">
           <a:xfrm>
-            <a:off x="11388710" y="9529024"/>
-            <a:ext cx="7011856" cy="1107996"/>
+            <a:off x="11019690" y="9529128"/>
+            <a:ext cx="8565165" cy="1107996"/>
           </a:xfrm>
           <a:prstGeom prst="rect">
             <a:avLst/>
@@ -7972,7 +7903,7 @@
                 <a:latin typeface="Helvetica" panose="020B0604020202020204" pitchFamily="34" charset="0"/>
                 <a:cs typeface="Helvetica" panose="020B0604020202020204" pitchFamily="34" charset="0"/>
               </a:rPr>
-              <a:t>Modelling, design </a:t>
+              <a:t>Modelling and Design </a:t>
             </a:r>
           </a:p>
         </p:txBody>
@@ -8007,7 +7938,7 @@
           <a:p>
             <a:r>
               <a:rPr lang="en-GB" sz="2200" b="1" dirty="0"/>
-              <a:t>    Coupling between controller and estimator</a:t>
+              <a:t>    Coupling between Controller and Estimator</a:t>
             </a:r>
           </a:p>
           <a:p>
@@ -8054,7 +7985,7 @@
           <a:p>
             <a:r>
               <a:rPr lang="en-DK" sz="2200" b="1" dirty="0"/>
-              <a:t>Kalman filter for leakage detection and disturbance estimation</a:t>
+              <a:t>Kalman Filter for Leakage Detection and Disturbance Estimation</a:t>
             </a:r>
           </a:p>
           <a:p>
@@ -8074,7 +8005,7 @@
             </a:pPr>
             <a:r>
               <a:rPr lang="en-DK" sz="2000" dirty="0"/>
-              <a:t>Stiff kalman filtering allows forleakage detection and disturbance estimation</a:t>
+              <a:t>Stiff kalman filtering allows for leakage detection and disturbance estimation</a:t>
             </a:r>
           </a:p>
           <a:p>
@@ -8119,7 +8050,7 @@
           <a:p>
             <a:r>
               <a:rPr lang="en-GB" sz="2200" b="1" dirty="0"/>
-              <a:t>Root locus method</a:t>
+              <a:t>Root Locus Method</a:t>
             </a:r>
           </a:p>
           <a:p>
@@ -8163,7 +8094,7 @@
             </a:r>
             <a:r>
               <a:rPr lang="en-GB" sz="2000" dirty="0" err="1"/>
-              <a:t>pade</a:t>
+              <a:t>Padé</a:t>
             </a:r>
             <a:r>
               <a:rPr lang="en-GB" sz="2000" dirty="0"/>
@@ -8212,7 +8143,7 @@
           <a:p>
             <a:r>
               <a:rPr lang="en-GB" sz="2200" b="1" dirty="0"/>
-              <a:t>    Controller choices</a:t>
+              <a:t>    Controller Choices</a:t>
             </a:r>
           </a:p>
           <a:p>
@@ -8248,42 +8179,6 @@
           </a:p>
         </p:txBody>
       </p:sp>
-      <p:pic>
-        <p:nvPicPr>
-          <p:cNvPr id="19" name="Picture 18">
-            <a:extLst>
-              <a:ext uri="{FF2B5EF4-FFF2-40B4-BE49-F238E27FC236}">
-                <a16:creationId xmlns:a16="http://schemas.microsoft.com/office/drawing/2014/main" id="{4770FD39-CBB5-544A-95E5-44AF3D8FFA96}"/>
-              </a:ext>
-            </a:extLst>
-          </p:cNvPr>
-          <p:cNvPicPr>
-            <a:picLocks noChangeAspect="1"/>
-          </p:cNvPicPr>
-          <p:nvPr/>
-        </p:nvPicPr>
-        <p:blipFill>
-          <a:blip r:embed="rId7">
-            <a:extLst>
-              <a:ext uri="{28A0092B-C50C-407E-A947-70E740481C1C}">
-                <a14:useLocalDpi xmlns:a14="http://schemas.microsoft.com/office/drawing/2010/main" val="0"/>
-              </a:ext>
-            </a:extLst>
-          </a:blip>
-          <a:stretch>
-            <a:fillRect/>
-          </a:stretch>
-        </p:blipFill>
-        <p:spPr>
-          <a:xfrm>
-            <a:off x="11617836" y="10945705"/>
-            <a:ext cx="7582375" cy="11630519"/>
-          </a:xfrm>
-          <a:prstGeom prst="rect">
-            <a:avLst/>
-          </a:prstGeom>
-        </p:spPr>
-      </p:pic>
       <mc:AlternateContent xmlns:mc="http://schemas.openxmlformats.org/markup-compatibility/2006">
         <mc:Choice xmlns:a14="http://schemas.microsoft.com/office/drawing/2010/main" Requires="a14">
           <p:sp>
@@ -8301,7 +8196,7 @@
             <p:spPr>
               <a:xfrm>
                 <a:off x="1680328" y="9993779"/>
-                <a:ext cx="9024256" cy="1661993"/>
+                <a:ext cx="8913803" cy="1661993"/>
               </a:xfrm>
               <a:prstGeom prst="rect">
                 <a:avLst/>
@@ -8430,7 +8325,7 @@
                 </a14:m>
                 <a:r>
                   <a:rPr lang="en-DK" sz="2000" dirty="0"/>
-                  <a:t>: external flow demands</a:t>
+                  <a:t>: external flow</a:t>
                 </a:r>
               </a:p>
             </p:txBody>
@@ -8454,15 +8349,15 @@
             <p:spPr>
               <a:xfrm>
                 <a:off x="1680328" y="9993779"/>
-                <a:ext cx="9024256" cy="1661993"/>
+                <a:ext cx="8913803" cy="1661993"/>
               </a:xfrm>
               <a:prstGeom prst="rect">
                 <a:avLst/>
               </a:prstGeom>
               <a:blipFill>
-                <a:blip r:embed="rId8"/>
+                <a:blip r:embed="rId6"/>
                 <a:stretch>
-                  <a:fillRect l="-703" t="-2273" b="-6061"/>
+                  <a:fillRect l="-711" t="-2273" r="-711" b="-6061"/>
                 </a:stretch>
               </a:blipFill>
             </p:spPr>
@@ -8481,126 +8376,6 @@
           </p:sp>
         </mc:Fallback>
       </mc:AlternateContent>
-      <p:pic>
-        <p:nvPicPr>
-          <p:cNvPr id="13341" name="Picture 8">
-            <a:extLst>
-              <a:ext uri="{FF2B5EF4-FFF2-40B4-BE49-F238E27FC236}">
-                <a16:creationId xmlns:a16="http://schemas.microsoft.com/office/drawing/2014/main" id="{B959DBC8-D19A-6441-8E3E-3CDF14ED708A}"/>
-              </a:ext>
-            </a:extLst>
-          </p:cNvPr>
-          <p:cNvPicPr>
-            <a:picLocks noChangeAspect="1" noChangeArrowheads="1"/>
-          </p:cNvPicPr>
-          <p:nvPr/>
-        </p:nvPicPr>
-        <p:blipFill>
-          <a:blip r:embed="rId9">
-            <a:extLst>
-              <a:ext uri="{28A0092B-C50C-407E-A947-70E740481C1C}">
-                <a14:useLocalDpi xmlns:a14="http://schemas.microsoft.com/office/drawing/2010/main" val="0"/>
-              </a:ext>
-            </a:extLst>
-          </a:blip>
-          <a:srcRect/>
-          <a:stretch>
-            <a:fillRect/>
-          </a:stretch>
-        </p:blipFill>
-        <p:spPr bwMode="auto">
-          <a:xfrm>
-            <a:off x="11848542" y="11574107"/>
-            <a:ext cx="6557090" cy="3048356"/>
-          </a:xfrm>
-          <a:prstGeom prst="rect">
-            <a:avLst/>
-          </a:prstGeom>
-          <a:noFill/>
-          <a:ln>
-            <a:noFill/>
-          </a:ln>
-          <a:extLst>
-            <a:ext uri="{909E8E84-426E-40DD-AFC4-6F175D3DCCD1}">
-              <a14:hiddenFill xmlns:a14="http://schemas.microsoft.com/office/drawing/2010/main">
-                <a:solidFill>
-                  <a:srgbClr val="FFFFFF"/>
-                </a:solidFill>
-              </a14:hiddenFill>
-            </a:ext>
-            <a:ext uri="{91240B29-F687-4F45-9708-019B960494DF}">
-              <a14:hiddenLine xmlns:a14="http://schemas.microsoft.com/office/drawing/2010/main" w="9525">
-                <a:solidFill>
-                  <a:srgbClr val="000000"/>
-                </a:solidFill>
-                <a:miter lim="800000"/>
-                <a:headEnd/>
-                <a:tailEnd/>
-              </a14:hiddenLine>
-            </a:ext>
-          </a:extLst>
-        </p:spPr>
-      </p:pic>
-      <p:pic>
-        <p:nvPicPr>
-          <p:cNvPr id="20" name="Picture 19">
-            <a:extLst>
-              <a:ext uri="{FF2B5EF4-FFF2-40B4-BE49-F238E27FC236}">
-                <a16:creationId xmlns:a16="http://schemas.microsoft.com/office/drawing/2014/main" id="{35F31AD6-3B1B-4228-8E29-193A9D7C2B51}"/>
-              </a:ext>
-            </a:extLst>
-          </p:cNvPr>
-          <p:cNvPicPr>
-            <a:picLocks noChangeAspect="1"/>
-          </p:cNvPicPr>
-          <p:nvPr/>
-        </p:nvPicPr>
-        <p:blipFill>
-          <a:blip r:embed="rId10"/>
-          <a:stretch>
-            <a:fillRect/>
-          </a:stretch>
-        </p:blipFill>
-        <p:spPr>
-          <a:xfrm>
-            <a:off x="15290650" y="17679686"/>
-            <a:ext cx="3893962" cy="301358"/>
-          </a:xfrm>
-          <a:prstGeom prst="rect">
-            <a:avLst/>
-          </a:prstGeom>
-        </p:spPr>
-      </p:pic>
-      <p:pic>
-        <p:nvPicPr>
-          <p:cNvPr id="23" name="Picture 22">
-            <a:extLst>
-              <a:ext uri="{FF2B5EF4-FFF2-40B4-BE49-F238E27FC236}">
-                <a16:creationId xmlns:a16="http://schemas.microsoft.com/office/drawing/2014/main" id="{F1E2E721-3DDF-4B56-9FF1-A12901654A0C}"/>
-              </a:ext>
-            </a:extLst>
-          </p:cNvPr>
-          <p:cNvPicPr>
-            <a:picLocks noChangeAspect="1"/>
-          </p:cNvPicPr>
-          <p:nvPr/>
-        </p:nvPicPr>
-        <p:blipFill>
-          <a:blip r:embed="rId11"/>
-          <a:stretch>
-            <a:fillRect/>
-          </a:stretch>
-        </p:blipFill>
-        <p:spPr>
-          <a:xfrm>
-            <a:off x="12197140" y="17583723"/>
-            <a:ext cx="1156472" cy="293612"/>
-          </a:xfrm>
-          <a:prstGeom prst="rect">
-            <a:avLst/>
-          </a:prstGeom>
-        </p:spPr>
-      </p:pic>
       <p:sp>
         <p:nvSpPr>
           <p:cNvPr id="65" name="TextBox 64">
@@ -8631,7 +8406,7 @@
           <a:p>
             <a:r>
               <a:rPr lang="en-GB" sz="2200" b="1" dirty="0"/>
-              <a:t>    Reliability of Networked control </a:t>
+              <a:t>    Reliability of Networked Control </a:t>
             </a:r>
           </a:p>
           <a:p>
@@ -8643,7 +8418,7 @@
           <a:p>
             <a:r>
               <a:rPr lang="en-GB" sz="2000" dirty="0"/>
-              <a:t>LQR controller with Try-Once-Discard Protocol enables stable system for arbitrary amount of package loss in the mean square sense. The reference may oscillate but it the mean of the oscillations will be the reference</a:t>
+              <a:t>LQR controller with Try-Once-Discard Protocol enables marginally stable system for arbitrary amount of package loss. The system may oscillate but the mean of the oscillations will be the reference</a:t>
             </a:r>
             <a:r>
               <a:rPr lang="en-GB" sz="2200" dirty="0"/>
@@ -8670,7 +8445,7 @@
           <p:nvPr/>
         </p:nvPicPr>
         <p:blipFill>
-          <a:blip r:embed="rId12">
+          <a:blip r:embed="rId7">
             <a:extLst>
               <a:ext uri="{28A0092B-C50C-407E-A947-70E740481C1C}">
                 <a14:useLocalDpi xmlns:a14="http://schemas.microsoft.com/office/drawing/2010/main" val="0"/>
@@ -8706,7 +8481,7 @@
           <p:nvPr/>
         </p:nvPicPr>
         <p:blipFill>
-          <a:blip r:embed="rId13">
+          <a:blip r:embed="rId8">
             <a:extLst>
               <a:ext uri="{28A0092B-C50C-407E-A947-70E740481C1C}">
                 <a14:useLocalDpi xmlns:a14="http://schemas.microsoft.com/office/drawing/2010/main" val="0"/>
@@ -8742,7 +8517,7 @@
           <p:nvPr/>
         </p:nvPicPr>
         <p:blipFill>
-          <a:blip r:embed="rId14">
+          <a:blip r:embed="rId9">
             <a:extLst>
               <a:ext uri="{28A0092B-C50C-407E-A947-70E740481C1C}">
                 <a14:useLocalDpi xmlns:a14="http://schemas.microsoft.com/office/drawing/2010/main" val="0"/>
@@ -8778,7 +8553,7 @@
           <p:nvPr/>
         </p:nvPicPr>
         <p:blipFill>
-          <a:blip r:embed="rId15"/>
+          <a:blip r:embed="rId10"/>
           <a:stretch>
             <a:fillRect/>
           </a:stretch>
@@ -8808,14 +8583,14 @@
           <p:nvPr/>
         </p:nvPicPr>
         <p:blipFill>
-          <a:blip r:embed="rId16"/>
+          <a:blip r:embed="rId11"/>
           <a:stretch>
             <a:fillRect/>
           </a:stretch>
         </p:blipFill>
         <p:spPr>
           <a:xfrm>
-            <a:off x="25939693" y="11162323"/>
+            <a:off x="25945052" y="10674405"/>
             <a:ext cx="3099750" cy="750405"/>
           </a:xfrm>
           <a:prstGeom prst="rect">
@@ -8896,77 +8671,6 @@
       </p:sp>
       <p:sp>
         <p:nvSpPr>
-          <p:cNvPr id="94" name="Rounded Rectangle 93">
-            <a:extLst>
-              <a:ext uri="{FF2B5EF4-FFF2-40B4-BE49-F238E27FC236}">
-                <a16:creationId xmlns:a16="http://schemas.microsoft.com/office/drawing/2014/main" id="{8B3A19B5-03E3-3044-BFE8-CF97A1ECCACD}"/>
-              </a:ext>
-            </a:extLst>
-          </p:cNvPr>
-          <p:cNvSpPr/>
-          <p:nvPr/>
-        </p:nvSpPr>
-        <p:spPr bwMode="auto">
-          <a:xfrm>
-            <a:off x="18772255" y="20583593"/>
-            <a:ext cx="10914289" cy="2050952"/>
-          </a:xfrm>
-          <a:prstGeom prst="roundRect">
-            <a:avLst>
-              <a:gd name="adj" fmla="val 20339"/>
-            </a:avLst>
-          </a:prstGeom>
-          <a:noFill/>
-          <a:ln w="12700" cap="flat" cmpd="sng" algn="ctr">
-            <a:solidFill>
-              <a:schemeClr val="tx1"/>
-            </a:solidFill>
-            <a:prstDash val="solid"/>
-            <a:round/>
-            <a:headEnd type="none" w="med" len="med"/>
-            <a:tailEnd type="none" w="med" len="med"/>
-          </a:ln>
-          <a:effectLst/>
-        </p:spPr>
-        <p:txBody>
-          <a:bodyPr vert="horz" wrap="square" lIns="91440" tIns="45720" rIns="91440" bIns="45720" numCol="1" rtlCol="0" anchor="t" anchorCtr="0" compatLnSpc="1">
-            <a:prstTxWarp prst="textNoShape">
-              <a:avLst/>
-            </a:prstTxWarp>
-          </a:bodyPr>
-          <a:lstStyle/>
-          <a:p>
-            <a:pPr marL="0" marR="0" indent="0" algn="l" defTabSz="4173538" rtl="0" eaLnBrk="1" fontAlgn="base" latinLnBrk="0" hangingPunct="1">
-              <a:lnSpc>
-                <a:spcPct val="100000"/>
-              </a:lnSpc>
-              <a:spcBef>
-                <a:spcPct val="0"/>
-              </a:spcBef>
-              <a:spcAft>
-                <a:spcPct val="0"/>
-              </a:spcAft>
-              <a:buClrTx/>
-              <a:buSzTx/>
-              <a:buFontTx/>
-              <a:buNone/>
-              <a:tabLst/>
-            </a:pPr>
-            <a:endParaRPr kumimoji="0" lang="en-DK" sz="6600" b="0" i="0" u="none" strike="noStrike" cap="none" normalizeH="0" baseline="0">
-              <a:ln>
-                <a:noFill/>
-              </a:ln>
-              <a:solidFill>
-                <a:schemeClr val="tx1"/>
-              </a:solidFill>
-              <a:effectLst/>
-              <a:latin typeface="Arial" charset="0"/>
-            </a:endParaRPr>
-          </a:p>
-        </p:txBody>
-      </p:sp>
-      <p:sp>
-        <p:nvSpPr>
           <p:cNvPr id="95" name="Rounded Rectangle 94">
             <a:extLst>
               <a:ext uri="{FF2B5EF4-FFF2-40B4-BE49-F238E27FC236}">
@@ -9178,233 +8882,212 @@
           </a:p>
         </p:txBody>
       </p:sp>
-      <p:grpSp>
-        <p:nvGrpSpPr>
-          <p:cNvPr id="24" name="Group 23">
+      <p:pic>
+        <p:nvPicPr>
+          <p:cNvPr id="54" name="Picture 53">
             <a:extLst>
               <a:ext uri="{FF2B5EF4-FFF2-40B4-BE49-F238E27FC236}">
-                <a16:creationId xmlns:a16="http://schemas.microsoft.com/office/drawing/2014/main" id="{34ED1396-6EFA-AC4E-8AF9-C66D656ABAD2}"/>
+                <a16:creationId xmlns:a16="http://schemas.microsoft.com/office/drawing/2014/main" id="{928DD5A1-827C-C142-82B2-EB86987C2556}"/>
               </a:ext>
             </a:extLst>
           </p:cNvPr>
-          <p:cNvGrpSpPr/>
+          <p:cNvPicPr>
+            <a:picLocks noChangeAspect="1"/>
+          </p:cNvPicPr>
           <p:nvPr/>
-        </p:nvGrpSpPr>
-        <p:grpSpPr>
-          <a:xfrm>
-            <a:off x="15817712" y="28477532"/>
-            <a:ext cx="13166646" cy="4915425"/>
-            <a:chOff x="16377200" y="24108837"/>
-            <a:chExt cx="13166646" cy="4915425"/>
-          </a:xfrm>
-        </p:grpSpPr>
-        <p:pic>
-          <p:nvPicPr>
-            <p:cNvPr id="54" name="Picture 53">
-              <a:extLst>
-                <a:ext uri="{FF2B5EF4-FFF2-40B4-BE49-F238E27FC236}">
-                  <a16:creationId xmlns:a16="http://schemas.microsoft.com/office/drawing/2014/main" id="{928DD5A1-827C-C142-82B2-EB86987C2556}"/>
-                </a:ext>
-              </a:extLst>
-            </p:cNvPr>
-            <p:cNvPicPr>
-              <a:picLocks noChangeAspect="1"/>
-            </p:cNvPicPr>
-            <p:nvPr/>
-          </p:nvPicPr>
-          <p:blipFill>
-            <a:blip r:embed="rId17">
-              <a:extLst>
-                <a:ext uri="{28A0092B-C50C-407E-A947-70E740481C1C}">
-                  <a14:useLocalDpi xmlns:a14="http://schemas.microsoft.com/office/drawing/2010/main" val="0"/>
-                </a:ext>
-              </a:extLst>
-            </a:blip>
-            <a:stretch>
-              <a:fillRect/>
-            </a:stretch>
-          </p:blipFill>
-          <p:spPr>
-            <a:xfrm>
-              <a:off x="20970921" y="24108837"/>
-              <a:ext cx="8572925" cy="4915425"/>
-            </a:xfrm>
-            <a:prstGeom prst="rect">
-              <a:avLst/>
-            </a:prstGeom>
-          </p:spPr>
-        </p:pic>
-        <p:sp>
-          <p:nvSpPr>
-            <p:cNvPr id="50" name="TextBox 51">
-              <a:extLst>
-                <a:ext uri="{FF2B5EF4-FFF2-40B4-BE49-F238E27FC236}">
-                  <a16:creationId xmlns:a16="http://schemas.microsoft.com/office/drawing/2014/main" id="{A02FD1A0-72B1-CD4A-8D5D-F6C1EF4672EC}"/>
-                </a:ext>
-              </a:extLst>
-            </p:cNvPr>
-            <p:cNvSpPr txBox="1">
-              <a:spLocks noChangeArrowheads="1"/>
-            </p:cNvSpPr>
-            <p:nvPr/>
-          </p:nvSpPr>
-          <p:spPr bwMode="auto">
-            <a:xfrm>
-              <a:off x="16377200" y="26049559"/>
-              <a:ext cx="5105400" cy="769441"/>
-            </a:xfrm>
-            <a:prstGeom prst="rect">
-              <a:avLst/>
-            </a:prstGeom>
-            <a:noFill/>
-            <a:ln>
-              <a:noFill/>
-            </a:ln>
+        </p:nvPicPr>
+        <p:blipFill>
+          <a:blip r:embed="rId12">
             <a:extLst>
-              <a:ext uri="{909E8E84-426E-40DD-AFC4-6F175D3DCCD1}">
-                <a14:hiddenFill xmlns:a14="http://schemas.microsoft.com/office/drawing/2010/main">
-                  <a:solidFill>
-                    <a:srgbClr val="FFFFFF"/>
-                  </a:solidFill>
-                </a14:hiddenFill>
-              </a:ext>
-              <a:ext uri="{91240B29-F687-4F45-9708-019B960494DF}">
-                <a14:hiddenLine xmlns:a14="http://schemas.microsoft.com/office/drawing/2010/main" w="9525">
-                  <a:solidFill>
-                    <a:srgbClr val="000000"/>
-                  </a:solidFill>
-                  <a:miter lim="800000"/>
-                  <a:headEnd/>
-                  <a:tailEnd/>
-                </a14:hiddenLine>
+              <a:ext uri="{28A0092B-C50C-407E-A947-70E740481C1C}">
+                <a14:useLocalDpi xmlns:a14="http://schemas.microsoft.com/office/drawing/2010/main" val="0"/>
               </a:ext>
             </a:extLst>
-          </p:spPr>
-          <p:txBody>
-            <a:bodyPr wrap="square">
-              <a:spAutoFit/>
-            </a:bodyPr>
-            <a:lstStyle>
-              <a:lvl1pPr>
-                <a:defRPr sz="6600">
-                  <a:solidFill>
-                    <a:schemeClr val="tx1"/>
-                  </a:solidFill>
-                  <a:latin typeface="Arial" panose="020B0604020202020204" pitchFamily="34" charset="0"/>
-                </a:defRPr>
-              </a:lvl1pPr>
-              <a:lvl2pPr marL="742950" indent="-285750">
-                <a:defRPr sz="6600">
-                  <a:solidFill>
-                    <a:schemeClr val="tx1"/>
-                  </a:solidFill>
-                  <a:latin typeface="Arial" panose="020B0604020202020204" pitchFamily="34" charset="0"/>
-                </a:defRPr>
-              </a:lvl2pPr>
-              <a:lvl3pPr marL="1143000" indent="-228600">
-                <a:defRPr sz="6600">
-                  <a:solidFill>
-                    <a:schemeClr val="tx1"/>
-                  </a:solidFill>
-                  <a:latin typeface="Arial" panose="020B0604020202020204" pitchFamily="34" charset="0"/>
-                </a:defRPr>
-              </a:lvl3pPr>
-              <a:lvl4pPr marL="1600200" indent="-228600">
-                <a:defRPr sz="6600">
-                  <a:solidFill>
-                    <a:schemeClr val="tx1"/>
-                  </a:solidFill>
-                  <a:latin typeface="Arial" panose="020B0604020202020204" pitchFamily="34" charset="0"/>
-                </a:defRPr>
-              </a:lvl4pPr>
-              <a:lvl5pPr marL="2057400" indent="-228600">
-                <a:defRPr sz="6600">
-                  <a:solidFill>
-                    <a:schemeClr val="tx1"/>
-                  </a:solidFill>
-                  <a:latin typeface="Arial" panose="020B0604020202020204" pitchFamily="34" charset="0"/>
-                </a:defRPr>
-              </a:lvl5pPr>
-              <a:lvl6pPr marL="2514600" indent="-228600" eaLnBrk="0" fontAlgn="base" hangingPunct="0">
-                <a:spcBef>
-                  <a:spcPct val="0"/>
-                </a:spcBef>
-                <a:spcAft>
-                  <a:spcPct val="0"/>
-                </a:spcAft>
-                <a:defRPr sz="6600">
-                  <a:solidFill>
-                    <a:schemeClr val="tx1"/>
-                  </a:solidFill>
-                  <a:latin typeface="Arial" panose="020B0604020202020204" pitchFamily="34" charset="0"/>
-                </a:defRPr>
-              </a:lvl6pPr>
-              <a:lvl7pPr marL="2971800" indent="-228600" eaLnBrk="0" fontAlgn="base" hangingPunct="0">
-                <a:spcBef>
-                  <a:spcPct val="0"/>
-                </a:spcBef>
-                <a:spcAft>
-                  <a:spcPct val="0"/>
-                </a:spcAft>
-                <a:defRPr sz="6600">
-                  <a:solidFill>
-                    <a:schemeClr val="tx1"/>
-                  </a:solidFill>
-                  <a:latin typeface="Arial" panose="020B0604020202020204" pitchFamily="34" charset="0"/>
-                </a:defRPr>
-              </a:lvl7pPr>
-              <a:lvl8pPr marL="3429000" indent="-228600" eaLnBrk="0" fontAlgn="base" hangingPunct="0">
-                <a:spcBef>
-                  <a:spcPct val="0"/>
-                </a:spcBef>
-                <a:spcAft>
-                  <a:spcPct val="0"/>
-                </a:spcAft>
-                <a:defRPr sz="6600">
-                  <a:solidFill>
-                    <a:schemeClr val="tx1"/>
-                  </a:solidFill>
-                  <a:latin typeface="Arial" panose="020B0604020202020204" pitchFamily="34" charset="0"/>
-                </a:defRPr>
-              </a:lvl8pPr>
-              <a:lvl9pPr marL="3886200" indent="-228600" eaLnBrk="0" fontAlgn="base" hangingPunct="0">
-                <a:spcBef>
-                  <a:spcPct val="0"/>
-                </a:spcBef>
-                <a:spcAft>
-                  <a:spcPct val="0"/>
-                </a:spcAft>
-                <a:defRPr sz="6600">
-                  <a:solidFill>
-                    <a:schemeClr val="tx1"/>
-                  </a:solidFill>
-                  <a:latin typeface="Arial" panose="020B0604020202020204" pitchFamily="34" charset="0"/>
-                </a:defRPr>
-              </a:lvl9pPr>
-            </a:lstStyle>
-            <a:p>
-              <a:pPr eaLnBrk="1" hangingPunct="1"/>
-              <a:r>
-                <a:rPr lang="en-GB" altLang="en-US" sz="2200" b="1" dirty="0">
-                  <a:latin typeface="Helvetica" panose="020B0604020202020204" pitchFamily="34" charset="0"/>
-                  <a:cs typeface="Helvetica" panose="020B0604020202020204" pitchFamily="34" charset="0"/>
-                </a:rPr>
-                <a:t>Inner loop Pump control</a:t>
-              </a:r>
-            </a:p>
-            <a:p>
-              <a:pPr eaLnBrk="1" hangingPunct="1"/>
-              <a:r>
-                <a:rPr lang="en-GB" altLang="en-US" sz="2200" dirty="0">
-                  <a:latin typeface="Helvetica" panose="020B0604020202020204" pitchFamily="34" charset="0"/>
-                  <a:cs typeface="Helvetica" panose="020B0604020202020204" pitchFamily="34" charset="0"/>
-                </a:rPr>
-                <a:t>Pumps attempt to follow their reference </a:t>
-              </a:r>
-            </a:p>
-          </p:txBody>
-        </p:sp>
-      </p:grpSp>
+          </a:blip>
+          <a:stretch>
+            <a:fillRect/>
+          </a:stretch>
+        </p:blipFill>
+        <p:spPr>
+          <a:xfrm>
+            <a:off x="20723226" y="28456833"/>
+            <a:ext cx="8572925" cy="4915425"/>
+          </a:xfrm>
+          <a:prstGeom prst="rect">
+            <a:avLst/>
+          </a:prstGeom>
+        </p:spPr>
+      </p:pic>
+      <p:sp>
+        <p:nvSpPr>
+          <p:cNvPr id="50" name="TextBox 51">
+            <a:extLst>
+              <a:ext uri="{FF2B5EF4-FFF2-40B4-BE49-F238E27FC236}">
+                <a16:creationId xmlns:a16="http://schemas.microsoft.com/office/drawing/2014/main" id="{A02FD1A0-72B1-CD4A-8D5D-F6C1EF4672EC}"/>
+              </a:ext>
+            </a:extLst>
+          </p:cNvPr>
+          <p:cNvSpPr txBox="1">
+            <a:spLocks noChangeArrowheads="1"/>
+          </p:cNvSpPr>
+          <p:nvPr/>
+        </p:nvSpPr>
+        <p:spPr bwMode="auto">
+          <a:xfrm>
+            <a:off x="15817711" y="30418254"/>
+            <a:ext cx="5284571" cy="1107996"/>
+          </a:xfrm>
+          <a:prstGeom prst="rect">
+            <a:avLst/>
+          </a:prstGeom>
+          <a:noFill/>
+          <a:ln>
+            <a:noFill/>
+          </a:ln>
+          <a:extLst>
+            <a:ext uri="{909E8E84-426E-40DD-AFC4-6F175D3DCCD1}">
+              <a14:hiddenFill xmlns:a14="http://schemas.microsoft.com/office/drawing/2010/main">
+                <a:solidFill>
+                  <a:srgbClr val="FFFFFF"/>
+                </a:solidFill>
+              </a14:hiddenFill>
+            </a:ext>
+            <a:ext uri="{91240B29-F687-4F45-9708-019B960494DF}">
+              <a14:hiddenLine xmlns:a14="http://schemas.microsoft.com/office/drawing/2010/main" w="9525">
+                <a:solidFill>
+                  <a:srgbClr val="000000"/>
+                </a:solidFill>
+                <a:miter lim="800000"/>
+                <a:headEnd/>
+                <a:tailEnd/>
+              </a14:hiddenLine>
+            </a:ext>
+          </a:extLst>
+        </p:spPr>
+        <p:txBody>
+          <a:bodyPr wrap="square">
+            <a:spAutoFit/>
+          </a:bodyPr>
+          <a:lstStyle>
+            <a:lvl1pPr>
+              <a:defRPr sz="6600">
+                <a:solidFill>
+                  <a:schemeClr val="tx1"/>
+                </a:solidFill>
+                <a:latin typeface="Arial" panose="020B0604020202020204" pitchFamily="34" charset="0"/>
+              </a:defRPr>
+            </a:lvl1pPr>
+            <a:lvl2pPr marL="742950" indent="-285750">
+              <a:defRPr sz="6600">
+                <a:solidFill>
+                  <a:schemeClr val="tx1"/>
+                </a:solidFill>
+                <a:latin typeface="Arial" panose="020B0604020202020204" pitchFamily="34" charset="0"/>
+              </a:defRPr>
+            </a:lvl2pPr>
+            <a:lvl3pPr marL="1143000" indent="-228600">
+              <a:defRPr sz="6600">
+                <a:solidFill>
+                  <a:schemeClr val="tx1"/>
+                </a:solidFill>
+                <a:latin typeface="Arial" panose="020B0604020202020204" pitchFamily="34" charset="0"/>
+              </a:defRPr>
+            </a:lvl3pPr>
+            <a:lvl4pPr marL="1600200" indent="-228600">
+              <a:defRPr sz="6600">
+                <a:solidFill>
+                  <a:schemeClr val="tx1"/>
+                </a:solidFill>
+                <a:latin typeface="Arial" panose="020B0604020202020204" pitchFamily="34" charset="0"/>
+              </a:defRPr>
+            </a:lvl4pPr>
+            <a:lvl5pPr marL="2057400" indent="-228600">
+              <a:defRPr sz="6600">
+                <a:solidFill>
+                  <a:schemeClr val="tx1"/>
+                </a:solidFill>
+                <a:latin typeface="Arial" panose="020B0604020202020204" pitchFamily="34" charset="0"/>
+              </a:defRPr>
+            </a:lvl5pPr>
+            <a:lvl6pPr marL="2514600" indent="-228600" eaLnBrk="0" fontAlgn="base" hangingPunct="0">
+              <a:spcBef>
+                <a:spcPct val="0"/>
+              </a:spcBef>
+              <a:spcAft>
+                <a:spcPct val="0"/>
+              </a:spcAft>
+              <a:defRPr sz="6600">
+                <a:solidFill>
+                  <a:schemeClr val="tx1"/>
+                </a:solidFill>
+                <a:latin typeface="Arial" panose="020B0604020202020204" pitchFamily="34" charset="0"/>
+              </a:defRPr>
+            </a:lvl6pPr>
+            <a:lvl7pPr marL="2971800" indent="-228600" eaLnBrk="0" fontAlgn="base" hangingPunct="0">
+              <a:spcBef>
+                <a:spcPct val="0"/>
+              </a:spcBef>
+              <a:spcAft>
+                <a:spcPct val="0"/>
+              </a:spcAft>
+              <a:defRPr sz="6600">
+                <a:solidFill>
+                  <a:schemeClr val="tx1"/>
+                </a:solidFill>
+                <a:latin typeface="Arial" panose="020B0604020202020204" pitchFamily="34" charset="0"/>
+              </a:defRPr>
+            </a:lvl7pPr>
+            <a:lvl8pPr marL="3429000" indent="-228600" eaLnBrk="0" fontAlgn="base" hangingPunct="0">
+              <a:spcBef>
+                <a:spcPct val="0"/>
+              </a:spcBef>
+              <a:spcAft>
+                <a:spcPct val="0"/>
+              </a:spcAft>
+              <a:defRPr sz="6600">
+                <a:solidFill>
+                  <a:schemeClr val="tx1"/>
+                </a:solidFill>
+                <a:latin typeface="Arial" panose="020B0604020202020204" pitchFamily="34" charset="0"/>
+              </a:defRPr>
+            </a:lvl8pPr>
+            <a:lvl9pPr marL="3886200" indent="-228600" eaLnBrk="0" fontAlgn="base" hangingPunct="0">
+              <a:spcBef>
+                <a:spcPct val="0"/>
+              </a:spcBef>
+              <a:spcAft>
+                <a:spcPct val="0"/>
+              </a:spcAft>
+              <a:defRPr sz="6600">
+                <a:solidFill>
+                  <a:schemeClr val="tx1"/>
+                </a:solidFill>
+                <a:latin typeface="Arial" panose="020B0604020202020204" pitchFamily="34" charset="0"/>
+              </a:defRPr>
+            </a:lvl9pPr>
+          </a:lstStyle>
+          <a:p>
+            <a:pPr eaLnBrk="1" hangingPunct="1"/>
+            <a:r>
+              <a:rPr lang="en-GB" altLang="en-US" sz="2200" b="1" dirty="0">
+                <a:latin typeface="Helvetica" panose="020B0604020202020204" pitchFamily="34" charset="0"/>
+                <a:cs typeface="Helvetica" panose="020B0604020202020204" pitchFamily="34" charset="0"/>
+              </a:rPr>
+              <a:t>Inner Loop Pump Control</a:t>
+            </a:r>
+          </a:p>
+          <a:p>
+            <a:pPr eaLnBrk="1" hangingPunct="1"/>
+            <a:r>
+              <a:rPr lang="en-GB" altLang="en-US" sz="2200" dirty="0">
+                <a:latin typeface="Helvetica" panose="020B0604020202020204" pitchFamily="34" charset="0"/>
+                <a:cs typeface="Helvetica" panose="020B0604020202020204" pitchFamily="34" charset="0"/>
+              </a:rPr>
+              <a:t>Pumps attempt to follow their reference, but oscillate around it </a:t>
+            </a:r>
+          </a:p>
+        </p:txBody>
+      </p:sp>
       <p:cxnSp>
         <p:nvCxnSpPr>
           <p:cNvPr id="15" name="Straight Connector 14">
@@ -9642,7 +9325,7 @@
                 <a:latin typeface="Helvetica" panose="020B0604020202020204" pitchFamily="34" charset="0"/>
                 <a:cs typeface="Helvetica" panose="020B0604020202020204" pitchFamily="34" charset="0"/>
               </a:rPr>
-              <a:t>Consumer flow (disturbance) estimation</a:t>
+              <a:t>Consumer Flow (disturbance) Estimation</a:t>
             </a:r>
           </a:p>
           <a:p>
@@ -9652,8 +9335,378 @@
                 <a:latin typeface="Helvetica" panose="020B0604020202020204" pitchFamily="34" charset="0"/>
                 <a:cs typeface="Helvetica" panose="020B0604020202020204" pitchFamily="34" charset="0"/>
               </a:rPr>
-              <a:t>The Kalman filter tracking based on model and measurement data</a:t>
-            </a:r>
+              <a:t>The Kalman filter tracking based on harmonic model and flow measurement data</a:t>
+            </a:r>
+          </a:p>
+        </p:txBody>
+      </p:sp>
+      <p:pic>
+        <p:nvPicPr>
+          <p:cNvPr id="2" name="Picture 1">
+            <a:extLst>
+              <a:ext uri="{FF2B5EF4-FFF2-40B4-BE49-F238E27FC236}">
+                <a16:creationId xmlns:a16="http://schemas.microsoft.com/office/drawing/2014/main" id="{ECAC45CD-E92A-544E-BFDD-7AE327AF5F66}"/>
+              </a:ext>
+            </a:extLst>
+          </p:cNvPr>
+          <p:cNvPicPr>
+            <a:picLocks noChangeAspect="1"/>
+          </p:cNvPicPr>
+          <p:nvPr/>
+        </p:nvPicPr>
+        <p:blipFill>
+          <a:blip r:embed="rId13"/>
+          <a:stretch>
+            <a:fillRect/>
+          </a:stretch>
+        </p:blipFill>
+        <p:spPr>
+          <a:xfrm>
+            <a:off x="25951402" y="11505884"/>
+            <a:ext cx="2762142" cy="812800"/>
+          </a:xfrm>
+          <a:prstGeom prst="rect">
+            <a:avLst/>
+          </a:prstGeom>
+        </p:spPr>
+      </p:pic>
+      <p:pic>
+        <p:nvPicPr>
+          <p:cNvPr id="5" name="Picture 4">
+            <a:extLst>
+              <a:ext uri="{FF2B5EF4-FFF2-40B4-BE49-F238E27FC236}">
+                <a16:creationId xmlns:a16="http://schemas.microsoft.com/office/drawing/2014/main" id="{DEDABA5A-1B5F-2044-8A6E-4F27A39230D6}"/>
+              </a:ext>
+            </a:extLst>
+          </p:cNvPr>
+          <p:cNvPicPr>
+            <a:picLocks noChangeAspect="1"/>
+          </p:cNvPicPr>
+          <p:nvPr/>
+        </p:nvPicPr>
+        <p:blipFill>
+          <a:blip r:embed="rId14">
+            <a:extLst>
+              <a:ext uri="{28A0092B-C50C-407E-A947-70E740481C1C}">
+                <a14:useLocalDpi xmlns:a14="http://schemas.microsoft.com/office/drawing/2010/main" val="0"/>
+              </a:ext>
+            </a:extLst>
+          </a:blip>
+          <a:stretch>
+            <a:fillRect/>
+          </a:stretch>
+        </p:blipFill>
+        <p:spPr>
+          <a:xfrm>
+            <a:off x="21408212" y="24451611"/>
+            <a:ext cx="7845414" cy="3383335"/>
+          </a:xfrm>
+          <a:prstGeom prst="rect">
+            <a:avLst/>
+          </a:prstGeom>
+        </p:spPr>
+      </p:pic>
+      <p:sp>
+        <p:nvSpPr>
+          <p:cNvPr id="6" name="TextBox 5">
+            <a:extLst>
+              <a:ext uri="{FF2B5EF4-FFF2-40B4-BE49-F238E27FC236}">
+                <a16:creationId xmlns:a16="http://schemas.microsoft.com/office/drawing/2014/main" id="{1D59F060-F7E5-3A4B-85C1-48F40567132B}"/>
+              </a:ext>
+            </a:extLst>
+          </p:cNvPr>
+          <p:cNvSpPr txBox="1"/>
+          <p:nvPr/>
+        </p:nvSpPr>
+        <p:spPr>
+          <a:xfrm>
+            <a:off x="779463" y="41367558"/>
+            <a:ext cx="28363068" cy="461665"/>
+          </a:xfrm>
+          <a:prstGeom prst="rect">
+            <a:avLst/>
+          </a:prstGeom>
+          <a:noFill/>
+        </p:spPr>
+        <p:txBody>
+          <a:bodyPr wrap="square" rtlCol="0">
+            <a:spAutoFit/>
+          </a:bodyPr>
+          <a:lstStyle/>
+          <a:p>
+            <a:r>
+              <a:rPr lang="en-DK" sz="2400" dirty="0"/>
+              <a:t>Pan</a:t>
+            </a:r>
+          </a:p>
+        </p:txBody>
+      </p:sp>
+      <p:grpSp>
+        <p:nvGrpSpPr>
+          <p:cNvPr id="8" name="Group 7">
+            <a:extLst>
+              <a:ext uri="{FF2B5EF4-FFF2-40B4-BE49-F238E27FC236}">
+                <a16:creationId xmlns:a16="http://schemas.microsoft.com/office/drawing/2014/main" id="{C6A71990-40EB-2D4E-BCD1-512DFD3C500D}"/>
+              </a:ext>
+            </a:extLst>
+          </p:cNvPr>
+          <p:cNvGrpSpPr/>
+          <p:nvPr/>
+        </p:nvGrpSpPr>
+        <p:grpSpPr>
+          <a:xfrm>
+            <a:off x="11364729" y="11092475"/>
+            <a:ext cx="7582375" cy="11630519"/>
+            <a:chOff x="11682276" y="15207564"/>
+            <a:chExt cx="7582375" cy="11630519"/>
+          </a:xfrm>
+        </p:grpSpPr>
+        <p:grpSp>
+          <p:nvGrpSpPr>
+            <p:cNvPr id="7" name="Group 6">
+              <a:extLst>
+                <a:ext uri="{FF2B5EF4-FFF2-40B4-BE49-F238E27FC236}">
+                  <a16:creationId xmlns:a16="http://schemas.microsoft.com/office/drawing/2014/main" id="{8519043F-3320-834C-9EB3-C19354BD4ACB}"/>
+                </a:ext>
+              </a:extLst>
+            </p:cNvPr>
+            <p:cNvGrpSpPr/>
+            <p:nvPr/>
+          </p:nvGrpSpPr>
+          <p:grpSpPr>
+            <a:xfrm>
+              <a:off x="11682276" y="15207564"/>
+              <a:ext cx="7582375" cy="11630519"/>
+              <a:chOff x="11617836" y="10945705"/>
+              <a:chExt cx="7582375" cy="11630519"/>
+            </a:xfrm>
+          </p:grpSpPr>
+          <p:pic>
+            <p:nvPicPr>
+              <p:cNvPr id="19" name="Picture 18">
+                <a:extLst>
+                  <a:ext uri="{FF2B5EF4-FFF2-40B4-BE49-F238E27FC236}">
+                    <a16:creationId xmlns:a16="http://schemas.microsoft.com/office/drawing/2014/main" id="{4770FD39-CBB5-544A-95E5-44AF3D8FFA96}"/>
+                  </a:ext>
+                </a:extLst>
+              </p:cNvPr>
+              <p:cNvPicPr>
+                <a:picLocks noChangeAspect="1"/>
+              </p:cNvPicPr>
+              <p:nvPr/>
+            </p:nvPicPr>
+            <p:blipFill>
+              <a:blip r:embed="rId15">
+                <a:extLst>
+                  <a:ext uri="{28A0092B-C50C-407E-A947-70E740481C1C}">
+                    <a14:useLocalDpi xmlns:a14="http://schemas.microsoft.com/office/drawing/2010/main" val="0"/>
+                  </a:ext>
+                </a:extLst>
+              </a:blip>
+              <a:stretch>
+                <a:fillRect/>
+              </a:stretch>
+            </p:blipFill>
+            <p:spPr>
+              <a:xfrm>
+                <a:off x="11617836" y="10945705"/>
+                <a:ext cx="7582375" cy="11630519"/>
+              </a:xfrm>
+              <a:prstGeom prst="rect">
+                <a:avLst/>
+              </a:prstGeom>
+            </p:spPr>
+          </p:pic>
+          <p:pic>
+            <p:nvPicPr>
+              <p:cNvPr id="20" name="Picture 19">
+                <a:extLst>
+                  <a:ext uri="{FF2B5EF4-FFF2-40B4-BE49-F238E27FC236}">
+                    <a16:creationId xmlns:a16="http://schemas.microsoft.com/office/drawing/2014/main" id="{35F31AD6-3B1B-4228-8E29-193A9D7C2B51}"/>
+                  </a:ext>
+                </a:extLst>
+              </p:cNvPr>
+              <p:cNvPicPr>
+                <a:picLocks noChangeAspect="1"/>
+              </p:cNvPicPr>
+              <p:nvPr/>
+            </p:nvPicPr>
+            <p:blipFill>
+              <a:blip r:embed="rId16"/>
+              <a:stretch>
+                <a:fillRect/>
+              </a:stretch>
+            </p:blipFill>
+            <p:spPr>
+              <a:xfrm>
+                <a:off x="15290650" y="17679686"/>
+                <a:ext cx="3893962" cy="301358"/>
+              </a:xfrm>
+              <a:prstGeom prst="rect">
+                <a:avLst/>
+              </a:prstGeom>
+            </p:spPr>
+          </p:pic>
+          <p:pic>
+            <p:nvPicPr>
+              <p:cNvPr id="23" name="Picture 22">
+                <a:extLst>
+                  <a:ext uri="{FF2B5EF4-FFF2-40B4-BE49-F238E27FC236}">
+                    <a16:creationId xmlns:a16="http://schemas.microsoft.com/office/drawing/2014/main" id="{F1E2E721-3DDF-4B56-9FF1-A12901654A0C}"/>
+                  </a:ext>
+                </a:extLst>
+              </p:cNvPr>
+              <p:cNvPicPr>
+                <a:picLocks noChangeAspect="1"/>
+              </p:cNvPicPr>
+              <p:nvPr/>
+            </p:nvPicPr>
+            <p:blipFill>
+              <a:blip r:embed="rId17"/>
+              <a:stretch>
+                <a:fillRect/>
+              </a:stretch>
+            </p:blipFill>
+            <p:spPr>
+              <a:xfrm>
+                <a:off x="12197140" y="17583723"/>
+                <a:ext cx="1156472" cy="293612"/>
+              </a:xfrm>
+              <a:prstGeom prst="rect">
+                <a:avLst/>
+              </a:prstGeom>
+            </p:spPr>
+          </p:pic>
+        </p:grpSp>
+        <p:pic>
+          <p:nvPicPr>
+            <p:cNvPr id="13341" name="Picture 8">
+              <a:extLst>
+                <a:ext uri="{FF2B5EF4-FFF2-40B4-BE49-F238E27FC236}">
+                  <a16:creationId xmlns:a16="http://schemas.microsoft.com/office/drawing/2014/main" id="{B959DBC8-D19A-6441-8E3E-3CDF14ED708A}"/>
+                </a:ext>
+              </a:extLst>
+            </p:cNvPr>
+            <p:cNvPicPr>
+              <a:picLocks noChangeAspect="1" noChangeArrowheads="1"/>
+            </p:cNvPicPr>
+            <p:nvPr/>
+          </p:nvPicPr>
+          <p:blipFill>
+            <a:blip r:embed="rId18">
+              <a:extLst>
+                <a:ext uri="{28A0092B-C50C-407E-A947-70E740481C1C}">
+                  <a14:useLocalDpi xmlns:a14="http://schemas.microsoft.com/office/drawing/2010/main" val="0"/>
+                </a:ext>
+              </a:extLst>
+            </a:blip>
+            <a:srcRect/>
+            <a:stretch>
+              <a:fillRect/>
+            </a:stretch>
+          </p:blipFill>
+          <p:spPr bwMode="auto">
+            <a:xfrm>
+              <a:off x="11918256" y="15897776"/>
+              <a:ext cx="6557090" cy="3048356"/>
+            </a:xfrm>
+            <a:prstGeom prst="rect">
+              <a:avLst/>
+            </a:prstGeom>
+            <a:noFill/>
+            <a:ln>
+              <a:noFill/>
+            </a:ln>
+            <a:extLst>
+              <a:ext uri="{909E8E84-426E-40DD-AFC4-6F175D3DCCD1}">
+                <a14:hiddenFill xmlns:a14="http://schemas.microsoft.com/office/drawing/2010/main">
+                  <a:solidFill>
+                    <a:srgbClr val="FFFFFF"/>
+                  </a:solidFill>
+                </a14:hiddenFill>
+              </a:ext>
+              <a:ext uri="{91240B29-F687-4F45-9708-019B960494DF}">
+                <a14:hiddenLine xmlns:a14="http://schemas.microsoft.com/office/drawing/2010/main" w="9525">
+                  <a:solidFill>
+                    <a:srgbClr val="000000"/>
+                  </a:solidFill>
+                  <a:miter lim="800000"/>
+                  <a:headEnd/>
+                  <a:tailEnd/>
+                </a14:hiddenLine>
+              </a:ext>
+            </a:extLst>
+          </p:spPr>
+        </p:pic>
+      </p:grpSp>
+      <p:sp>
+        <p:nvSpPr>
+          <p:cNvPr id="94" name="Rounded Rectangle 93">
+            <a:extLst>
+              <a:ext uri="{FF2B5EF4-FFF2-40B4-BE49-F238E27FC236}">
+                <a16:creationId xmlns:a16="http://schemas.microsoft.com/office/drawing/2014/main" id="{8B3A19B5-03E3-3044-BFE8-CF97A1ECCACD}"/>
+              </a:ext>
+            </a:extLst>
+          </p:cNvPr>
+          <p:cNvSpPr/>
+          <p:nvPr/>
+        </p:nvSpPr>
+        <p:spPr bwMode="auto">
+          <a:xfrm>
+            <a:off x="18772255" y="20583593"/>
+            <a:ext cx="10914289" cy="2050952"/>
+          </a:xfrm>
+          <a:prstGeom prst="roundRect">
+            <a:avLst>
+              <a:gd name="adj" fmla="val 20339"/>
+            </a:avLst>
+          </a:prstGeom>
+          <a:noFill/>
+          <a:ln w="12700" cap="flat" cmpd="sng" algn="ctr">
+            <a:solidFill>
+              <a:schemeClr val="tx1"/>
+            </a:solidFill>
+            <a:prstDash val="solid"/>
+            <a:round/>
+            <a:headEnd type="none" w="med" len="med"/>
+            <a:tailEnd type="none" w="med" len="med"/>
+          </a:ln>
+          <a:effectLst/>
+        </p:spPr>
+        <p:txBody>
+          <a:bodyPr vert="horz" wrap="square" lIns="91440" tIns="45720" rIns="91440" bIns="45720" numCol="1" rtlCol="0" anchor="t" anchorCtr="0" compatLnSpc="1">
+            <a:prstTxWarp prst="textNoShape">
+              <a:avLst/>
+            </a:prstTxWarp>
+          </a:bodyPr>
+          <a:lstStyle/>
+          <a:p>
+            <a:pPr marL="0" marR="0" indent="0" algn="l" defTabSz="4173538" rtl="0" eaLnBrk="1" fontAlgn="base" latinLnBrk="0" hangingPunct="1">
+              <a:lnSpc>
+                <a:spcPct val="100000"/>
+              </a:lnSpc>
+              <a:spcBef>
+                <a:spcPct val="0"/>
+              </a:spcBef>
+              <a:spcAft>
+                <a:spcPct val="0"/>
+              </a:spcAft>
+              <a:buClrTx/>
+              <a:buSzTx/>
+              <a:buFontTx/>
+              <a:buNone/>
+              <a:tabLst/>
+            </a:pPr>
+            <a:endParaRPr kumimoji="0" lang="en-DK" sz="6600" b="0" i="0" u="none" strike="noStrike" cap="none" normalizeH="0" baseline="0">
+              <a:ln>
+                <a:noFill/>
+              </a:ln>
+              <a:solidFill>
+                <a:schemeClr val="tx1"/>
+              </a:solidFill>
+              <a:effectLst/>
+              <a:latin typeface="Arial" charset="0"/>
+            </a:endParaRPr>
           </a:p>
         </p:txBody>
       </p:sp>

</xml_diff>

<commit_message>
Add references and final fiddeling/arranging of boxes to allow big enough title and other shit requirements
</commit_message>
<xml_diff>
--- a/Poster/WDN_poster_R.pptx
+++ b/Poster/WDN_poster_R.pptx
@@ -4,6 +4,9 @@
   <p:sldMasterIdLst>
     <p:sldMasterId id="2147483648" r:id="rId1"/>
   </p:sldMasterIdLst>
+  <p:notesMasterIdLst>
+    <p:notesMasterId r:id="rId3"/>
+  </p:notesMasterIdLst>
   <p:sldIdLst>
     <p:sldId id="256" r:id="rId2"/>
   </p:sldIdLst>
@@ -151,6 +154,440 @@
     </p:ext>
   </p:extLst>
 </p:presentation>
+</file>
+
+<file path=ppt/notesMasters/notesMaster1.xml><?xml version="1.0" encoding="utf-8"?>
+<p:notesMaster xmlns:a="http://schemas.openxmlformats.org/drawingml/2006/main" xmlns:r="http://schemas.openxmlformats.org/officeDocument/2006/relationships" xmlns:p="http://schemas.openxmlformats.org/presentationml/2006/main">
+  <p:cSld>
+    <p:bg>
+      <p:bgRef idx="1001">
+        <a:schemeClr val="bg1"/>
+      </p:bgRef>
+    </p:bg>
+    <p:spTree>
+      <p:nvGrpSpPr>
+        <p:cNvPr id="1" name=""/>
+        <p:cNvGrpSpPr/>
+        <p:nvPr/>
+      </p:nvGrpSpPr>
+      <p:grpSpPr>
+        <a:xfrm>
+          <a:off x="0" y="0"/>
+          <a:ext cx="0" cy="0"/>
+          <a:chOff x="0" y="0"/>
+          <a:chExt cx="0" cy="0"/>
+        </a:xfrm>
+      </p:grpSpPr>
+      <p:sp>
+        <p:nvSpPr>
+          <p:cNvPr id="2" name="Header Placeholder 1"/>
+          <p:cNvSpPr>
+            <a:spLocks noGrp="1"/>
+          </p:cNvSpPr>
+          <p:nvPr>
+            <p:ph type="hdr" sz="quarter"/>
+          </p:nvPr>
+        </p:nvSpPr>
+        <p:spPr>
+          <a:xfrm>
+            <a:off x="0" y="0"/>
+            <a:ext cx="3076575" cy="512763"/>
+          </a:xfrm>
+          <a:prstGeom prst="rect">
+            <a:avLst/>
+          </a:prstGeom>
+        </p:spPr>
+        <p:txBody>
+          <a:bodyPr vert="horz" lIns="91440" tIns="45720" rIns="91440" bIns="45720" rtlCol="0"/>
+          <a:lstStyle>
+            <a:lvl1pPr algn="l">
+              <a:defRPr sz="1200"/>
+            </a:lvl1pPr>
+          </a:lstStyle>
+          <a:p>
+            <a:endParaRPr lang="en-GB"/>
+          </a:p>
+        </p:txBody>
+      </p:sp>
+      <p:sp>
+        <p:nvSpPr>
+          <p:cNvPr id="3" name="Date Placeholder 2"/>
+          <p:cNvSpPr>
+            <a:spLocks noGrp="1"/>
+          </p:cNvSpPr>
+          <p:nvPr>
+            <p:ph type="dt" idx="1"/>
+          </p:nvPr>
+        </p:nvSpPr>
+        <p:spPr>
+          <a:xfrm>
+            <a:off x="4021138" y="0"/>
+            <a:ext cx="3076575" cy="512763"/>
+          </a:xfrm>
+          <a:prstGeom prst="rect">
+            <a:avLst/>
+          </a:prstGeom>
+        </p:spPr>
+        <p:txBody>
+          <a:bodyPr vert="horz" lIns="91440" tIns="45720" rIns="91440" bIns="45720" rtlCol="0"/>
+          <a:lstStyle>
+            <a:lvl1pPr algn="r">
+              <a:defRPr sz="1200"/>
+            </a:lvl1pPr>
+          </a:lstStyle>
+          <a:p>
+            <a:fld id="{18534B13-6DEA-486D-9040-E48B401DE2A8}" type="datetimeFigureOut">
+              <a:rPr lang="en-GB" smtClean="0"/>
+              <a:t>15/12/2021</a:t>
+            </a:fld>
+            <a:endParaRPr lang="en-GB"/>
+          </a:p>
+        </p:txBody>
+      </p:sp>
+      <p:sp>
+        <p:nvSpPr>
+          <p:cNvPr id="4" name="Slide Image Placeholder 3"/>
+          <p:cNvSpPr>
+            <a:spLocks noGrp="1" noRot="1" noChangeAspect="1"/>
+          </p:cNvSpPr>
+          <p:nvPr>
+            <p:ph type="sldImg" idx="2"/>
+          </p:nvPr>
+        </p:nvSpPr>
+        <p:spPr>
+          <a:xfrm>
+            <a:off x="2328863" y="1279525"/>
+            <a:ext cx="2441575" cy="3454400"/>
+          </a:xfrm>
+          <a:prstGeom prst="rect">
+            <a:avLst/>
+          </a:prstGeom>
+          <a:noFill/>
+          <a:ln w="12700">
+            <a:solidFill>
+              <a:prstClr val="black"/>
+            </a:solidFill>
+          </a:ln>
+        </p:spPr>
+        <p:txBody>
+          <a:bodyPr vert="horz" lIns="91440" tIns="45720" rIns="91440" bIns="45720" rtlCol="0" anchor="ctr"/>
+          <a:lstStyle/>
+          <a:p>
+            <a:endParaRPr lang="en-GB"/>
+          </a:p>
+        </p:txBody>
+      </p:sp>
+      <p:sp>
+        <p:nvSpPr>
+          <p:cNvPr id="5" name="Notes Placeholder 4"/>
+          <p:cNvSpPr>
+            <a:spLocks noGrp="1"/>
+          </p:cNvSpPr>
+          <p:nvPr>
+            <p:ph type="body" sz="quarter" idx="3"/>
+          </p:nvPr>
+        </p:nvSpPr>
+        <p:spPr>
+          <a:xfrm>
+            <a:off x="709613" y="4926013"/>
+            <a:ext cx="5680075" cy="4029075"/>
+          </a:xfrm>
+          <a:prstGeom prst="rect">
+            <a:avLst/>
+          </a:prstGeom>
+        </p:spPr>
+        <p:txBody>
+          <a:bodyPr vert="horz" lIns="91440" tIns="45720" rIns="91440" bIns="45720" rtlCol="0"/>
+          <a:lstStyle/>
+          <a:p>
+            <a:pPr lvl="0"/>
+            <a:r>
+              <a:rPr lang="en-US"/>
+              <a:t>Click to edit Master text styles</a:t>
+            </a:r>
+          </a:p>
+          <a:p>
+            <a:pPr lvl="1"/>
+            <a:r>
+              <a:rPr lang="en-US"/>
+              <a:t>Second level</a:t>
+            </a:r>
+          </a:p>
+          <a:p>
+            <a:pPr lvl="2"/>
+            <a:r>
+              <a:rPr lang="en-US"/>
+              <a:t>Third level</a:t>
+            </a:r>
+          </a:p>
+          <a:p>
+            <a:pPr lvl="3"/>
+            <a:r>
+              <a:rPr lang="en-US"/>
+              <a:t>Fourth level</a:t>
+            </a:r>
+          </a:p>
+          <a:p>
+            <a:pPr lvl="4"/>
+            <a:r>
+              <a:rPr lang="en-US"/>
+              <a:t>Fifth level</a:t>
+            </a:r>
+            <a:endParaRPr lang="en-GB"/>
+          </a:p>
+        </p:txBody>
+      </p:sp>
+      <p:sp>
+        <p:nvSpPr>
+          <p:cNvPr id="6" name="Footer Placeholder 5"/>
+          <p:cNvSpPr>
+            <a:spLocks noGrp="1"/>
+          </p:cNvSpPr>
+          <p:nvPr>
+            <p:ph type="ftr" sz="quarter" idx="4"/>
+          </p:nvPr>
+        </p:nvSpPr>
+        <p:spPr>
+          <a:xfrm>
+            <a:off x="0" y="9721850"/>
+            <a:ext cx="3076575" cy="512763"/>
+          </a:xfrm>
+          <a:prstGeom prst="rect">
+            <a:avLst/>
+          </a:prstGeom>
+        </p:spPr>
+        <p:txBody>
+          <a:bodyPr vert="horz" lIns="91440" tIns="45720" rIns="91440" bIns="45720" rtlCol="0" anchor="b"/>
+          <a:lstStyle>
+            <a:lvl1pPr algn="l">
+              <a:defRPr sz="1200"/>
+            </a:lvl1pPr>
+          </a:lstStyle>
+          <a:p>
+            <a:endParaRPr lang="en-GB"/>
+          </a:p>
+        </p:txBody>
+      </p:sp>
+      <p:sp>
+        <p:nvSpPr>
+          <p:cNvPr id="7" name="Slide Number Placeholder 6"/>
+          <p:cNvSpPr>
+            <a:spLocks noGrp="1"/>
+          </p:cNvSpPr>
+          <p:nvPr>
+            <p:ph type="sldNum" sz="quarter" idx="5"/>
+          </p:nvPr>
+        </p:nvSpPr>
+        <p:spPr>
+          <a:xfrm>
+            <a:off x="4021138" y="9721850"/>
+            <a:ext cx="3076575" cy="512763"/>
+          </a:xfrm>
+          <a:prstGeom prst="rect">
+            <a:avLst/>
+          </a:prstGeom>
+        </p:spPr>
+        <p:txBody>
+          <a:bodyPr vert="horz" lIns="91440" tIns="45720" rIns="91440" bIns="45720" rtlCol="0" anchor="b"/>
+          <a:lstStyle>
+            <a:lvl1pPr algn="r">
+              <a:defRPr sz="1200"/>
+            </a:lvl1pPr>
+          </a:lstStyle>
+          <a:p>
+            <a:fld id="{B93D79C3-6E9F-417C-A9A8-D7101115F3A6}" type="slidenum">
+              <a:rPr lang="en-GB" smtClean="0"/>
+              <a:t>‹#›</a:t>
+            </a:fld>
+            <a:endParaRPr lang="en-GB"/>
+          </a:p>
+        </p:txBody>
+      </p:sp>
+    </p:spTree>
+    <p:extLst>
+      <p:ext uri="{BB962C8B-B14F-4D97-AF65-F5344CB8AC3E}">
+        <p14:creationId xmlns:p14="http://schemas.microsoft.com/office/powerpoint/2010/main" val="2456308891"/>
+      </p:ext>
+    </p:extLst>
+  </p:cSld>
+  <p:clrMap bg1="lt1" tx1="dk1" bg2="lt2" tx2="dk2" accent1="accent1" accent2="accent2" accent3="accent3" accent4="accent4" accent5="accent5" accent6="accent6" hlink="hlink" folHlink="folHlink"/>
+  <p:notesStyle>
+    <a:lvl1pPr marL="0" algn="l" defTabSz="914400" rtl="0" eaLnBrk="1" latinLnBrk="0" hangingPunct="1">
+      <a:defRPr sz="1200" kern="1200">
+        <a:solidFill>
+          <a:schemeClr val="tx1"/>
+        </a:solidFill>
+        <a:latin typeface="+mn-lt"/>
+        <a:ea typeface="+mn-ea"/>
+        <a:cs typeface="+mn-cs"/>
+      </a:defRPr>
+    </a:lvl1pPr>
+    <a:lvl2pPr marL="457200" algn="l" defTabSz="914400" rtl="0" eaLnBrk="1" latinLnBrk="0" hangingPunct="1">
+      <a:defRPr sz="1200" kern="1200">
+        <a:solidFill>
+          <a:schemeClr val="tx1"/>
+        </a:solidFill>
+        <a:latin typeface="+mn-lt"/>
+        <a:ea typeface="+mn-ea"/>
+        <a:cs typeface="+mn-cs"/>
+      </a:defRPr>
+    </a:lvl2pPr>
+    <a:lvl3pPr marL="914400" algn="l" defTabSz="914400" rtl="0" eaLnBrk="1" latinLnBrk="0" hangingPunct="1">
+      <a:defRPr sz="1200" kern="1200">
+        <a:solidFill>
+          <a:schemeClr val="tx1"/>
+        </a:solidFill>
+        <a:latin typeface="+mn-lt"/>
+        <a:ea typeface="+mn-ea"/>
+        <a:cs typeface="+mn-cs"/>
+      </a:defRPr>
+    </a:lvl3pPr>
+    <a:lvl4pPr marL="1371600" algn="l" defTabSz="914400" rtl="0" eaLnBrk="1" latinLnBrk="0" hangingPunct="1">
+      <a:defRPr sz="1200" kern="1200">
+        <a:solidFill>
+          <a:schemeClr val="tx1"/>
+        </a:solidFill>
+        <a:latin typeface="+mn-lt"/>
+        <a:ea typeface="+mn-ea"/>
+        <a:cs typeface="+mn-cs"/>
+      </a:defRPr>
+    </a:lvl4pPr>
+    <a:lvl5pPr marL="1828800" algn="l" defTabSz="914400" rtl="0" eaLnBrk="1" latinLnBrk="0" hangingPunct="1">
+      <a:defRPr sz="1200" kern="1200">
+        <a:solidFill>
+          <a:schemeClr val="tx1"/>
+        </a:solidFill>
+        <a:latin typeface="+mn-lt"/>
+        <a:ea typeface="+mn-ea"/>
+        <a:cs typeface="+mn-cs"/>
+      </a:defRPr>
+    </a:lvl5pPr>
+    <a:lvl6pPr marL="2286000" algn="l" defTabSz="914400" rtl="0" eaLnBrk="1" latinLnBrk="0" hangingPunct="1">
+      <a:defRPr sz="1200" kern="1200">
+        <a:solidFill>
+          <a:schemeClr val="tx1"/>
+        </a:solidFill>
+        <a:latin typeface="+mn-lt"/>
+        <a:ea typeface="+mn-ea"/>
+        <a:cs typeface="+mn-cs"/>
+      </a:defRPr>
+    </a:lvl6pPr>
+    <a:lvl7pPr marL="2743200" algn="l" defTabSz="914400" rtl="0" eaLnBrk="1" latinLnBrk="0" hangingPunct="1">
+      <a:defRPr sz="1200" kern="1200">
+        <a:solidFill>
+          <a:schemeClr val="tx1"/>
+        </a:solidFill>
+        <a:latin typeface="+mn-lt"/>
+        <a:ea typeface="+mn-ea"/>
+        <a:cs typeface="+mn-cs"/>
+      </a:defRPr>
+    </a:lvl7pPr>
+    <a:lvl8pPr marL="3200400" algn="l" defTabSz="914400" rtl="0" eaLnBrk="1" latinLnBrk="0" hangingPunct="1">
+      <a:defRPr sz="1200" kern="1200">
+        <a:solidFill>
+          <a:schemeClr val="tx1"/>
+        </a:solidFill>
+        <a:latin typeface="+mn-lt"/>
+        <a:ea typeface="+mn-ea"/>
+        <a:cs typeface="+mn-cs"/>
+      </a:defRPr>
+    </a:lvl8pPr>
+    <a:lvl9pPr marL="3657600" algn="l" defTabSz="914400" rtl="0" eaLnBrk="1" latinLnBrk="0" hangingPunct="1">
+      <a:defRPr sz="1200" kern="1200">
+        <a:solidFill>
+          <a:schemeClr val="tx1"/>
+        </a:solidFill>
+        <a:latin typeface="+mn-lt"/>
+        <a:ea typeface="+mn-ea"/>
+        <a:cs typeface="+mn-cs"/>
+      </a:defRPr>
+    </a:lvl9pPr>
+  </p:notesStyle>
+</p:notesMaster>
+</file>
+
+<file path=ppt/notesSlides/notesSlide1.xml><?xml version="1.0" encoding="utf-8"?>
+<p:notes xmlns:a="http://schemas.openxmlformats.org/drawingml/2006/main" xmlns:r="http://schemas.openxmlformats.org/officeDocument/2006/relationships" xmlns:p="http://schemas.openxmlformats.org/presentationml/2006/main">
+  <p:cSld>
+    <p:spTree>
+      <p:nvGrpSpPr>
+        <p:cNvPr id="1" name=""/>
+        <p:cNvGrpSpPr/>
+        <p:nvPr/>
+      </p:nvGrpSpPr>
+      <p:grpSpPr>
+        <a:xfrm>
+          <a:off x="0" y="0"/>
+          <a:ext cx="0" cy="0"/>
+          <a:chOff x="0" y="0"/>
+          <a:chExt cx="0" cy="0"/>
+        </a:xfrm>
+      </p:grpSpPr>
+      <p:sp>
+        <p:nvSpPr>
+          <p:cNvPr id="2" name="Slide Image Placeholder 1"/>
+          <p:cNvSpPr>
+            <a:spLocks noGrp="1" noRot="1" noChangeAspect="1"/>
+          </p:cNvSpPr>
+          <p:nvPr>
+            <p:ph type="sldImg"/>
+          </p:nvPr>
+        </p:nvSpPr>
+        <p:spPr/>
+      </p:sp>
+      <p:sp>
+        <p:nvSpPr>
+          <p:cNvPr id="3" name="Notes Placeholder 2"/>
+          <p:cNvSpPr>
+            <a:spLocks noGrp="1"/>
+          </p:cNvSpPr>
+          <p:nvPr>
+            <p:ph type="body" idx="1"/>
+          </p:nvPr>
+        </p:nvSpPr>
+        <p:spPr/>
+        <p:txBody>
+          <a:bodyPr/>
+          <a:lstStyle/>
+          <a:p>
+            <a:endParaRPr lang="en-GB" dirty="0"/>
+          </a:p>
+        </p:txBody>
+      </p:sp>
+      <p:sp>
+        <p:nvSpPr>
+          <p:cNvPr id="4" name="Slide Number Placeholder 3"/>
+          <p:cNvSpPr>
+            <a:spLocks noGrp="1"/>
+          </p:cNvSpPr>
+          <p:nvPr>
+            <p:ph type="sldNum" sz="quarter" idx="5"/>
+          </p:nvPr>
+        </p:nvSpPr>
+        <p:spPr/>
+        <p:txBody>
+          <a:bodyPr/>
+          <a:lstStyle/>
+          <a:p>
+            <a:fld id="{B93D79C3-6E9F-417C-A9A8-D7101115F3A6}" type="slidenum">
+              <a:rPr lang="en-GB" smtClean="0"/>
+              <a:t>1</a:t>
+            </a:fld>
+            <a:endParaRPr lang="en-GB"/>
+          </a:p>
+        </p:txBody>
+      </p:sp>
+    </p:spTree>
+    <p:extLst>
+      <p:ext uri="{BB962C8B-B14F-4D97-AF65-F5344CB8AC3E}">
+        <p14:creationId xmlns:p14="http://schemas.microsoft.com/office/powerpoint/2010/main" val="129156345"/>
+      </p:ext>
+    </p:extLst>
+  </p:cSld>
+  <p:clrMapOvr>
+    <a:masterClrMapping/>
+  </p:clrMapOvr>
+</p:notes>
 </file>
 
 <file path=ppt/slideLayouts/slideLayout1.xml><?xml version="1.0" encoding="utf-8"?>
@@ -3776,7 +4213,7 @@
         </p:nvSpPr>
         <p:spPr bwMode="auto">
           <a:xfrm>
-            <a:off x="378504" y="9419415"/>
+            <a:off x="378504" y="10407796"/>
             <a:ext cx="29542696" cy="13804022"/>
           </a:xfrm>
           <a:prstGeom prst="roundRect">
@@ -3951,8 +4388,8 @@
         </p:nvSpPr>
         <p:spPr bwMode="auto">
           <a:xfrm>
-            <a:off x="431799" y="339393"/>
-            <a:ext cx="14689931" cy="1754326"/>
+            <a:off x="415925" y="30405"/>
+            <a:ext cx="29542696" cy="3046988"/>
           </a:xfrm>
           <a:prstGeom prst="rect">
             <a:avLst/>
@@ -4116,11 +4553,11 @@
               <a:buNone/>
             </a:pPr>
             <a:r>
-              <a:rPr lang="en-GB" altLang="en-US" sz="5400" b="1" dirty="0">
+              <a:rPr lang="en-GB" altLang="en-US" sz="9600" b="1" dirty="0">
                 <a:latin typeface="Helvetica" panose="020B0604020202020204" pitchFamily="34" charset="0"/>
                 <a:cs typeface="Helvetica" panose="020B0604020202020204" pitchFamily="34" charset="0"/>
               </a:rPr>
-              <a:t>MODELLING AND NETWORKED CONTROL OF WATER DISTRIBUTION NETWORKS</a:t>
+              <a:t>MODELLING AND NETWORKED CONTROL OF WATER DISTRIBUTION NETWORKS </a:t>
             </a:r>
           </a:p>
         </p:txBody>
@@ -4141,8 +4578,8 @@
         </p:nvSpPr>
         <p:spPr bwMode="auto">
           <a:xfrm>
-            <a:off x="15488548" y="245046"/>
-            <a:ext cx="14338990" cy="2308324"/>
+            <a:off x="415926" y="2885936"/>
+            <a:ext cx="29270618" cy="1754326"/>
           </a:xfrm>
           <a:prstGeom prst="rect">
             <a:avLst/>
@@ -4306,51 +4743,26 @@
               <a:buNone/>
             </a:pPr>
             <a:r>
-              <a:rPr lang="en-GB" altLang="en-US" sz="3600" b="1" dirty="0">
+              <a:rPr lang="en-GB" altLang="en-US" sz="5400" b="1" dirty="0">
                 <a:latin typeface="Helvetica" panose="020B0604020202020204" pitchFamily="34" charset="0"/>
                 <a:cs typeface="Helvetica" panose="020B0604020202020204" pitchFamily="34" charset="0"/>
               </a:rPr>
               <a:t>AUTHORS</a:t>
             </a:r>
             <a:r>
-              <a:rPr lang="en-GB" altLang="en-US" sz="3600" dirty="0">
+              <a:rPr lang="en-GB" altLang="en-US" sz="5400" dirty="0">
                 <a:latin typeface="Helvetica" panose="020B0604020202020204" pitchFamily="34" charset="0"/>
                 <a:cs typeface="Helvetica" panose="020B0604020202020204" pitchFamily="34" charset="0"/>
               </a:rPr>
               <a:t>: </a:t>
             </a:r>
             <a:r>
-              <a:rPr lang="en-GB" altLang="en-US" sz="3600" i="1" dirty="0">
+              <a:rPr lang="en-GB" altLang="en-US" sz="5400" i="1" dirty="0">
                 <a:latin typeface="Helvetica" panose="020B0604020202020204" pitchFamily="34" charset="0"/>
                 <a:cs typeface="Helvetica" panose="020B0604020202020204" pitchFamily="34" charset="0"/>
               </a:rPr>
-              <a:t>L. H. Andersen,  M. C. Frederiksen,  C. M. Jensen,  J. N. Jensen,  R. L. Kristiansen, K. </a:t>
-            </a:r>
-            <a:r>
-              <a:rPr lang="en-GB" altLang="en-US" sz="3600" i="1" dirty="0" err="1">
-                <a:latin typeface="Helvetica" panose="020B0604020202020204" pitchFamily="34" charset="0"/>
-                <a:cs typeface="Helvetica" panose="020B0604020202020204" pitchFamily="34" charset="0"/>
-              </a:rPr>
-              <a:t>Laustsen</a:t>
-            </a:r>
-            <a:r>
-              <a:rPr lang="en-GB" altLang="en-US" sz="3600" i="1" dirty="0">
-                <a:latin typeface="Helvetica" panose="020B0604020202020204" pitchFamily="34" charset="0"/>
-                <a:cs typeface="Helvetica" panose="020B0604020202020204" pitchFamily="34" charset="0"/>
-              </a:rPr>
-              <a:t>  and  M. H. </a:t>
-            </a:r>
-            <a:r>
-              <a:rPr lang="en-GB" altLang="en-US" sz="3600" i="1" dirty="0" err="1">
-                <a:latin typeface="Helvetica" panose="020B0604020202020204" pitchFamily="34" charset="0"/>
-                <a:cs typeface="Helvetica" panose="020B0604020202020204" pitchFamily="34" charset="0"/>
-              </a:rPr>
-              <a:t>Therkildsen</a:t>
-            </a:r>
-            <a:endParaRPr lang="en-GB" altLang="en-US" sz="3600" i="1" dirty="0">
-              <a:latin typeface="Helvetica" panose="020B0604020202020204" pitchFamily="34" charset="0"/>
-              <a:cs typeface="Helvetica" panose="020B0604020202020204" pitchFamily="34" charset="0"/>
-            </a:endParaRPr>
+              <a:t>L. Andersen, M. Frederiksen, C. Jensen, J. Jensen, </a:t>
+            </a:r>
           </a:p>
           <a:p>
             <a:pPr eaLnBrk="1" hangingPunct="1">
@@ -4361,34 +4773,25 @@
               <a:buNone/>
             </a:pPr>
             <a:r>
-              <a:rPr lang="en-GB" altLang="en-US" sz="3600" b="1" dirty="0">
+              <a:rPr lang="en-GB" altLang="en-US" sz="5400" i="1" dirty="0">
+                <a:latin typeface="Helvetica" panose="020B0604020202020204" pitchFamily="34" charset="0"/>
+                <a:cs typeface="Helvetica" panose="020B0604020202020204" pitchFamily="34" charset="0"/>
+              </a:rPr>
+              <a:t>R. Kristiansen, K. Laustsen and M. Therkildsen		             </a:t>
+            </a:r>
+            <a:r>
+              <a:rPr lang="en-GB" altLang="en-US" sz="5400" b="1" dirty="0">
                 <a:latin typeface="Helvetica" panose="020B0604020202020204" pitchFamily="34" charset="0"/>
                 <a:cs typeface="Helvetica" panose="020B0604020202020204" pitchFamily="34" charset="0"/>
               </a:rPr>
               <a:t>GROUP NO.: </a:t>
             </a:r>
             <a:r>
-              <a:rPr lang="en-GB" altLang="en-US" sz="3600" dirty="0">
+              <a:rPr lang="en-GB" altLang="en-US" sz="5400" dirty="0">
                 <a:latin typeface="Helvetica" panose="020B0604020202020204" pitchFamily="34" charset="0"/>
                 <a:cs typeface="Helvetica" panose="020B0604020202020204" pitchFamily="34" charset="0"/>
               </a:rPr>
               <a:t>733</a:t>
-            </a:r>
-          </a:p>
-          <a:p>
-            <a:pPr eaLnBrk="1" hangingPunct="1">
-              <a:spcBef>
-                <a:spcPct val="0"/>
-              </a:spcBef>
-              <a:buFontTx/>
-              <a:buNone/>
-            </a:pPr>
-            <a:r>
-              <a:rPr lang="en-GB" altLang="en-US" sz="3600" dirty="0">
-                <a:latin typeface="Helvetica" panose="020B0604020202020204" pitchFamily="34" charset="0"/>
-                <a:cs typeface="Helvetica" panose="020B0604020202020204" pitchFamily="34" charset="0"/>
-              </a:rPr>
-              <a:t>Department of Electronic Systems, Aalborg University, Denmark</a:t>
             </a:r>
           </a:p>
         </p:txBody>
@@ -4409,7 +4812,7 @@
         </p:nvGrpSpPr>
         <p:grpSpPr bwMode="auto">
           <a:xfrm>
-            <a:off x="15335554" y="33892606"/>
+            <a:off x="15335554" y="34737043"/>
             <a:ext cx="14585646" cy="5945819"/>
             <a:chOff x="15464295" y="29481463"/>
             <a:chExt cx="14585191" cy="8746984"/>
@@ -5025,10 +5428,10 @@
         </p:nvGrpSpPr>
         <p:grpSpPr bwMode="auto">
           <a:xfrm>
-            <a:off x="378504" y="40136714"/>
-            <a:ext cx="29542697" cy="2426765"/>
-            <a:chOff x="15599647" y="38076514"/>
-            <a:chExt cx="14580504" cy="4206549"/>
+            <a:off x="378504" y="40759061"/>
+            <a:ext cx="21220227" cy="1804418"/>
+            <a:chOff x="15599647" y="37897739"/>
+            <a:chExt cx="14580504" cy="4385324"/>
           </a:xfrm>
         </p:grpSpPr>
         <p:sp>
@@ -5222,8 +5625,8 @@
           </p:nvSpPr>
           <p:spPr bwMode="auto">
             <a:xfrm>
-              <a:off x="15721026" y="38234265"/>
-              <a:ext cx="2228817" cy="2097068"/>
+              <a:off x="15736424" y="37897739"/>
+              <a:ext cx="2228817" cy="2097067"/>
             </a:xfrm>
             <a:prstGeom prst="rect">
               <a:avLst/>
@@ -5413,8 +5816,8 @@
         </p:nvSpPr>
         <p:spPr bwMode="auto">
           <a:xfrm>
-            <a:off x="378504" y="2811462"/>
-            <a:ext cx="29542696" cy="6445806"/>
+            <a:off x="378504" y="4837624"/>
+            <a:ext cx="29542696" cy="5365238"/>
           </a:xfrm>
           <a:prstGeom prst="roundRect">
             <a:avLst>
@@ -5587,7 +5990,7 @@
           <p:nvPr/>
         </p:nvPicPr>
         <p:blipFill>
-          <a:blip r:embed="rId2">
+          <a:blip r:embed="rId3">
             <a:extLst>
               <a:ext uri="{28A0092B-C50C-407E-A947-70E740481C1C}">
                 <a14:useLocalDpi xmlns:a14="http://schemas.microsoft.com/office/drawing/2010/main" val="0"/>
@@ -5601,7 +6004,7 @@
         </p:blipFill>
         <p:spPr bwMode="auto">
           <a:xfrm>
-            <a:off x="10728326" y="5755623"/>
+            <a:off x="11603831" y="7267575"/>
             <a:ext cx="9994900" cy="2782887"/>
           </a:xfrm>
           <a:prstGeom prst="rect">
@@ -5648,7 +6051,7 @@
         </p:nvSpPr>
         <p:spPr bwMode="auto">
           <a:xfrm>
-            <a:off x="655638" y="2928937"/>
+            <a:off x="655638" y="4908794"/>
             <a:ext cx="13803312" cy="1108075"/>
           </a:xfrm>
           <a:prstGeom prst="rect">
@@ -5838,7 +6241,7 @@
         </p:nvGrpSpPr>
         <p:grpSpPr bwMode="auto">
           <a:xfrm>
-            <a:off x="378504" y="33912762"/>
+            <a:off x="378504" y="34757199"/>
             <a:ext cx="14662016" cy="5913465"/>
             <a:chOff x="15167792" y="5538005"/>
             <a:chExt cx="14661333" cy="23714858"/>
@@ -6355,7 +6758,7 @@
         </p:nvGrpSpPr>
         <p:grpSpPr bwMode="auto">
           <a:xfrm>
-            <a:off x="378504" y="23422182"/>
+            <a:off x="378504" y="24410563"/>
             <a:ext cx="29542696" cy="10186044"/>
             <a:chOff x="400843" y="33291458"/>
             <a:chExt cx="14554200" cy="8839199"/>
@@ -6743,7 +7146,7 @@
         </p:nvSpPr>
         <p:spPr bwMode="auto">
           <a:xfrm>
-            <a:off x="713282" y="6500945"/>
+            <a:off x="713282" y="8480802"/>
             <a:ext cx="9175750" cy="1569660"/>
           </a:xfrm>
           <a:prstGeom prst="rect">
@@ -6920,7 +7323,7 @@
         </p:nvSpPr>
         <p:spPr bwMode="auto">
           <a:xfrm>
-            <a:off x="779463" y="4037012"/>
+            <a:off x="779463" y="6016869"/>
             <a:ext cx="13738225" cy="2092881"/>
           </a:xfrm>
           <a:prstGeom prst="rect">
@@ -7126,7 +7529,7 @@
         </p:nvSpPr>
         <p:spPr bwMode="auto">
           <a:xfrm>
-            <a:off x="1008320" y="25593180"/>
+            <a:off x="1008320" y="26581561"/>
             <a:ext cx="5815762" cy="1107996"/>
           </a:xfrm>
           <a:prstGeom prst="rect">
@@ -7296,7 +7699,7 @@
         </p:nvSpPr>
         <p:spPr bwMode="auto">
           <a:xfrm>
-            <a:off x="1008320" y="23817120"/>
+            <a:off x="1008320" y="24805501"/>
             <a:ext cx="10812139" cy="830997"/>
           </a:xfrm>
           <a:prstGeom prst="rect">
@@ -7455,7 +7858,7 @@
           <p:nvPr/>
         </p:nvPicPr>
         <p:blipFill>
-          <a:blip r:embed="rId3">
+          <a:blip r:embed="rId4">
             <a:extLst>
               <a:ext uri="{28A0092B-C50C-407E-A947-70E740481C1C}">
                 <a14:useLocalDpi xmlns:a14="http://schemas.microsoft.com/office/drawing/2010/main" val="0"/>
@@ -7468,7 +7871,7 @@
         </p:blipFill>
         <p:spPr>
           <a:xfrm>
-            <a:off x="6562228" y="28530266"/>
+            <a:off x="6562228" y="29518647"/>
             <a:ext cx="8165515" cy="4752145"/>
           </a:xfrm>
           <a:prstGeom prst="rect">
@@ -7491,7 +7894,7 @@
           <p:nvPr/>
         </p:nvPicPr>
         <p:blipFill>
-          <a:blip r:embed="rId4">
+          <a:blip r:embed="rId5">
             <a:extLst>
               <a:ext uri="{28A0092B-C50C-407E-A947-70E740481C1C}">
                 <a14:useLocalDpi xmlns:a14="http://schemas.microsoft.com/office/drawing/2010/main" val="0"/>
@@ -7504,7 +7907,7 @@
         </p:blipFill>
         <p:spPr>
           <a:xfrm>
-            <a:off x="7087518" y="24804970"/>
+            <a:off x="7087518" y="25793351"/>
             <a:ext cx="7606279" cy="3182504"/>
           </a:xfrm>
           <a:prstGeom prst="rect">
@@ -7528,7 +7931,7 @@
         </p:nvSpPr>
         <p:spPr bwMode="auto">
           <a:xfrm>
-            <a:off x="15823268" y="25536487"/>
+            <a:off x="15823268" y="26524868"/>
             <a:ext cx="5298612" cy="1107996"/>
           </a:xfrm>
           <a:prstGeom prst="rect">
@@ -7697,7 +8100,7 @@
           <p:nvPr/>
         </p:nvPicPr>
         <p:blipFill>
-          <a:blip r:embed="rId5">
+          <a:blip r:embed="rId6">
             <a:extLst>
               <a:ext uri="{28A0092B-C50C-407E-A947-70E740481C1C}">
                 <a14:useLocalDpi xmlns:a14="http://schemas.microsoft.com/office/drawing/2010/main" val="0"/>
@@ -7710,8 +8113,8 @@
         </p:blipFill>
         <p:spPr>
           <a:xfrm>
-            <a:off x="21850135" y="3246881"/>
-            <a:ext cx="7613865" cy="5431981"/>
+            <a:off x="22436931" y="5061833"/>
+            <a:ext cx="6992429" cy="4988628"/>
           </a:xfrm>
           <a:prstGeom prst="rect">
             <a:avLst/>
@@ -7734,7 +8137,7 @@
         </p:nvSpPr>
         <p:spPr bwMode="auto">
           <a:xfrm>
-            <a:off x="11019690" y="9529128"/>
+            <a:off x="11019690" y="10517509"/>
             <a:ext cx="8565165" cy="1107996"/>
           </a:xfrm>
           <a:prstGeom prst="rect">
@@ -7922,7 +8325,7 @@
         </p:nvSpPr>
         <p:spPr>
           <a:xfrm>
-            <a:off x="1857158" y="17656082"/>
+            <a:off x="1857158" y="18644463"/>
             <a:ext cx="9996848" cy="1046440"/>
           </a:xfrm>
           <a:prstGeom prst="rect">
@@ -7969,7 +8372,7 @@
         </p:nvSpPr>
         <p:spPr>
           <a:xfrm>
-            <a:off x="1079842" y="12343156"/>
+            <a:off x="1079842" y="13331537"/>
             <a:ext cx="10332248" cy="1354217"/>
           </a:xfrm>
           <a:prstGeom prst="rect">
@@ -8034,7 +8437,7 @@
         </p:nvSpPr>
         <p:spPr>
           <a:xfrm>
-            <a:off x="20480345" y="18084619"/>
+            <a:off x="20480345" y="19073000"/>
             <a:ext cx="8930426" cy="1969770"/>
           </a:xfrm>
           <a:prstGeom prst="rect">
@@ -8127,7 +8530,7 @@
         </p:nvSpPr>
         <p:spPr>
           <a:xfrm>
-            <a:off x="19941014" y="9921247"/>
+            <a:off x="19941014" y="10909628"/>
             <a:ext cx="9469757" cy="3200876"/>
           </a:xfrm>
           <a:prstGeom prst="rect">
@@ -8195,7 +8598,7 @@
             </p:nvSpPr>
             <p:spPr>
               <a:xfrm>
-                <a:off x="1680328" y="9993779"/>
+                <a:off x="1680328" y="10982160"/>
                 <a:ext cx="8913803" cy="1661993"/>
               </a:xfrm>
               <a:prstGeom prst="rect">
@@ -8348,16 +8751,16 @@
             </p:nvSpPr>
             <p:spPr>
               <a:xfrm>
-                <a:off x="1680328" y="9993779"/>
+                <a:off x="1680328" y="10982160"/>
                 <a:ext cx="8913803" cy="1661993"/>
               </a:xfrm>
               <a:prstGeom prst="rect">
                 <a:avLst/>
               </a:prstGeom>
               <a:blipFill>
-                <a:blip r:embed="rId6"/>
+                <a:blip r:embed="rId7"/>
                 <a:stretch>
-                  <a:fillRect l="-711" t="-2273" r="-711" b="-6061"/>
+                  <a:fillRect l="-752" t="-2206" r="-752" b="-6250"/>
                 </a:stretch>
               </a:blipFill>
             </p:spPr>
@@ -8366,7 +8769,7 @@
               <a:lstStyle/>
               <a:p>
                 <a:r>
-                  <a:rPr lang="en-DK">
+                  <a:rPr lang="en-GB">
                     <a:noFill/>
                   </a:rPr>
                   <a:t> </a:t>
@@ -8390,7 +8793,7 @@
         </p:nvSpPr>
         <p:spPr>
           <a:xfrm>
-            <a:off x="18917698" y="20736032"/>
+            <a:off x="18917698" y="21724413"/>
             <a:ext cx="10557850" cy="2031325"/>
           </a:xfrm>
           <a:prstGeom prst="rect">
@@ -8445,7 +8848,7 @@
           <p:nvPr/>
         </p:nvPicPr>
         <p:blipFill>
-          <a:blip r:embed="rId7">
+          <a:blip r:embed="rId8">
             <a:extLst>
               <a:ext uri="{28A0092B-C50C-407E-A947-70E740481C1C}">
                 <a14:useLocalDpi xmlns:a14="http://schemas.microsoft.com/office/drawing/2010/main" val="0"/>
@@ -8458,7 +8861,7 @@
         </p:blipFill>
         <p:spPr>
           <a:xfrm>
-            <a:off x="20094555" y="13116121"/>
+            <a:off x="20094555" y="14104502"/>
             <a:ext cx="9261060" cy="4935535"/>
           </a:xfrm>
           <a:prstGeom prst="rect">
@@ -8481,7 +8884,7 @@
           <p:nvPr/>
         </p:nvPicPr>
         <p:blipFill>
-          <a:blip r:embed="rId8">
+          <a:blip r:embed="rId9">
             <a:extLst>
               <a:ext uri="{28A0092B-C50C-407E-A947-70E740481C1C}">
                 <a14:useLocalDpi xmlns:a14="http://schemas.microsoft.com/office/drawing/2010/main" val="0"/>
@@ -8494,7 +8897,7 @@
         </p:blipFill>
         <p:spPr>
           <a:xfrm>
-            <a:off x="1680328" y="18850947"/>
+            <a:off x="1680328" y="19839328"/>
             <a:ext cx="9108467" cy="3811027"/>
           </a:xfrm>
           <a:prstGeom prst="rect">
@@ -8517,7 +8920,7 @@
           <p:nvPr/>
         </p:nvPicPr>
         <p:blipFill>
-          <a:blip r:embed="rId9">
+          <a:blip r:embed="rId10">
             <a:extLst>
               <a:ext uri="{28A0092B-C50C-407E-A947-70E740481C1C}">
                 <a14:useLocalDpi xmlns:a14="http://schemas.microsoft.com/office/drawing/2010/main" val="0"/>
@@ -8530,7 +8933,7 @@
         </p:blipFill>
         <p:spPr>
           <a:xfrm>
-            <a:off x="1765884" y="13838084"/>
+            <a:off x="1765884" y="14826465"/>
             <a:ext cx="7449063" cy="3290084"/>
           </a:xfrm>
           <a:prstGeom prst="rect">
@@ -8553,14 +8956,14 @@
           <p:nvPr/>
         </p:nvPicPr>
         <p:blipFill>
-          <a:blip r:embed="rId10"/>
+          <a:blip r:embed="rId11"/>
           <a:stretch>
             <a:fillRect/>
           </a:stretch>
         </p:blipFill>
         <p:spPr>
           <a:xfrm>
-            <a:off x="20208301" y="10806648"/>
+            <a:off x="20208301" y="11795029"/>
             <a:ext cx="5230525" cy="1520084"/>
           </a:xfrm>
           <a:prstGeom prst="rect">
@@ -8583,14 +8986,14 @@
           <p:nvPr/>
         </p:nvPicPr>
         <p:blipFill>
-          <a:blip r:embed="rId11"/>
+          <a:blip r:embed="rId12"/>
           <a:stretch>
             <a:fillRect/>
           </a:stretch>
         </p:blipFill>
         <p:spPr>
           <a:xfrm>
-            <a:off x="25945052" y="10674405"/>
+            <a:off x="25945052" y="11662786"/>
             <a:ext cx="3099750" cy="750405"/>
           </a:xfrm>
           <a:prstGeom prst="rect">
@@ -8612,7 +9015,7 @@
         </p:nvSpPr>
         <p:spPr bwMode="auto">
           <a:xfrm>
-            <a:off x="19697706" y="9703479"/>
+            <a:off x="19697706" y="10691860"/>
             <a:ext cx="9942191" cy="10513404"/>
           </a:xfrm>
           <a:prstGeom prst="roundRect">
@@ -8683,7 +9086,7 @@
         </p:nvSpPr>
         <p:spPr bwMode="auto">
           <a:xfrm>
-            <a:off x="1386653" y="9820448"/>
+            <a:off x="1386653" y="10808829"/>
             <a:ext cx="9317931" cy="2014908"/>
           </a:xfrm>
           <a:prstGeom prst="roundRect">
@@ -8754,7 +9157,7 @@
         </p:nvSpPr>
         <p:spPr bwMode="auto">
           <a:xfrm>
-            <a:off x="713282" y="12223917"/>
+            <a:off x="713282" y="13212298"/>
             <a:ext cx="9554268" cy="5028315"/>
           </a:xfrm>
           <a:prstGeom prst="roundRect">
@@ -8825,7 +9228,7 @@
         </p:nvSpPr>
         <p:spPr bwMode="auto">
           <a:xfrm>
-            <a:off x="1559209" y="17556955"/>
+            <a:off x="1559209" y="18545336"/>
             <a:ext cx="9554268" cy="5357901"/>
           </a:xfrm>
           <a:prstGeom prst="roundRect">
@@ -8897,7 +9300,7 @@
           <p:nvPr/>
         </p:nvPicPr>
         <p:blipFill>
-          <a:blip r:embed="rId12">
+          <a:blip r:embed="rId13">
             <a:extLst>
               <a:ext uri="{28A0092B-C50C-407E-A947-70E740481C1C}">
                 <a14:useLocalDpi xmlns:a14="http://schemas.microsoft.com/office/drawing/2010/main" val="0"/>
@@ -8910,7 +9313,7 @@
         </p:blipFill>
         <p:spPr>
           <a:xfrm>
-            <a:off x="20723226" y="28456833"/>
+            <a:off x="20723226" y="29445214"/>
             <a:ext cx="8572925" cy="4915425"/>
           </a:xfrm>
           <a:prstGeom prst="rect">
@@ -8934,7 +9337,7 @@
         </p:nvSpPr>
         <p:spPr bwMode="auto">
           <a:xfrm>
-            <a:off x="15817711" y="30418254"/>
+            <a:off x="15817711" y="31406635"/>
             <a:ext cx="5284571" cy="1107996"/>
           </a:xfrm>
           <a:prstGeom prst="rect">
@@ -9104,7 +9507,7 @@
         </p:nvCxnSpPr>
         <p:spPr bwMode="auto">
           <a:xfrm flipH="1">
-            <a:off x="779464" y="28262262"/>
+            <a:off x="779464" y="29250643"/>
             <a:ext cx="28696084" cy="0"/>
           </a:xfrm>
           <a:prstGeom prst="line">
@@ -9144,7 +9547,7 @@
         </p:nvCxnSpPr>
         <p:spPr bwMode="auto">
           <a:xfrm>
-            <a:off x="15192237" y="24806322"/>
+            <a:off x="15192237" y="25794703"/>
             <a:ext cx="0" cy="8429771"/>
           </a:xfrm>
           <a:prstGeom prst="line">
@@ -9186,7 +9589,7 @@
         </p:nvSpPr>
         <p:spPr bwMode="auto">
           <a:xfrm>
-            <a:off x="904314" y="30381246"/>
+            <a:off x="904314" y="31369627"/>
             <a:ext cx="5785200" cy="1107996"/>
           </a:xfrm>
           <a:prstGeom prst="rect">
@@ -9355,14 +9758,14 @@
           <p:nvPr/>
         </p:nvPicPr>
         <p:blipFill>
-          <a:blip r:embed="rId13"/>
+          <a:blip r:embed="rId14"/>
           <a:stretch>
             <a:fillRect/>
           </a:stretch>
         </p:blipFill>
         <p:spPr>
           <a:xfrm>
-            <a:off x="25951402" y="11505884"/>
+            <a:off x="25951402" y="12494265"/>
             <a:ext cx="2762142" cy="812800"/>
           </a:xfrm>
           <a:prstGeom prst="rect">
@@ -9385,7 +9788,7 @@
           <p:nvPr/>
         </p:nvPicPr>
         <p:blipFill>
-          <a:blip r:embed="rId14">
+          <a:blip r:embed="rId15">
             <a:extLst>
               <a:ext uri="{28A0092B-C50C-407E-A947-70E740481C1C}">
                 <a14:useLocalDpi xmlns:a14="http://schemas.microsoft.com/office/drawing/2010/main" val="0"/>
@@ -9398,7 +9801,7 @@
         </p:blipFill>
         <p:spPr>
           <a:xfrm>
-            <a:off x="21408212" y="24451611"/>
+            <a:off x="21408212" y="25439992"/>
             <a:ext cx="7845414" cy="3383335"/>
           </a:xfrm>
           <a:prstGeom prst="rect">
@@ -9420,8 +9823,8 @@
         </p:nvSpPr>
         <p:spPr>
           <a:xfrm>
-            <a:off x="779463" y="41367558"/>
-            <a:ext cx="28363068" cy="461665"/>
+            <a:off x="5490415" y="41126480"/>
+            <a:ext cx="16721974" cy="1200329"/>
           </a:xfrm>
           <a:prstGeom prst="rect">
             <a:avLst/>
@@ -9434,10 +9837,227 @@
           </a:bodyPr>
           <a:lstStyle/>
           <a:p>
-            <a:r>
-              <a:rPr lang="en-DK" sz="2400" dirty="0"/>
-              <a:t>Pan</a:t>
-            </a:r>
+            <a:pPr algn="l"/>
+            <a:r>
+              <a:rPr lang="en-US" sz="1800" b="0" i="0" u="none" strike="noStrike" baseline="0" dirty="0">
+                <a:latin typeface="NimbusRomNo9L-Regu"/>
+              </a:rPr>
+              <a:t>[1] P. K. </a:t>
+            </a:r>
+            <a:r>
+              <a:rPr lang="en-US" sz="1800" b="0" i="0" u="none" strike="noStrike" baseline="0" dirty="0" err="1">
+                <a:latin typeface="NimbusRomNo9L-Regu"/>
+              </a:rPr>
+              <a:t>Swamee</a:t>
+            </a:r>
+            <a:r>
+              <a:rPr lang="en-US" sz="1800" b="0" i="0" u="none" strike="noStrike" baseline="0" dirty="0">
+                <a:latin typeface="NimbusRomNo9L-Regu"/>
+              </a:rPr>
+              <a:t> and A. K. Sharma, </a:t>
+            </a:r>
+            <a:r>
+              <a:rPr lang="en-US" sz="1800" b="0" i="1" u="none" strike="noStrike" baseline="0" dirty="0">
+                <a:latin typeface="NimbusRomNo9L-ReguItal"/>
+              </a:rPr>
+              <a:t>Design of Water Supply Pipe Networks</a:t>
+            </a:r>
+            <a:r>
+              <a:rPr lang="en-US" sz="1800" b="0" i="0" u="none" strike="noStrike" baseline="0" dirty="0">
+                <a:latin typeface="NimbusRomNo9L-Regu"/>
+              </a:rPr>
+              <a:t>. </a:t>
+            </a:r>
+            <a:r>
+              <a:rPr lang="en-GB" sz="1800" b="0" i="0" u="none" strike="noStrike" baseline="0" dirty="0">
+                <a:latin typeface="NimbusRomNo9L-Regu"/>
+              </a:rPr>
+              <a:t>Wiley-</a:t>
+            </a:r>
+            <a:r>
+              <a:rPr lang="en-GB" sz="1800" b="0" i="0" u="none" strike="noStrike" baseline="0" dirty="0" err="1">
+                <a:latin typeface="NimbusRomNo9L-Regu"/>
+              </a:rPr>
+              <a:t>Interscience</a:t>
+            </a:r>
+            <a:r>
+              <a:rPr lang="en-GB" sz="1800" b="0" i="0" u="none" strike="noStrike" baseline="0" dirty="0">
+                <a:latin typeface="NimbusRomNo9L-Regu"/>
+              </a:rPr>
+              <a:t>, 2008.</a:t>
+            </a:r>
+          </a:p>
+          <a:p>
+            <a:pPr algn="l"/>
+            <a:r>
+              <a:rPr lang="en-GB" sz="1800" b="0" i="0" u="none" strike="noStrike" baseline="0" dirty="0">
+                <a:latin typeface="NimbusRomNo9L-Regu"/>
+              </a:rPr>
+              <a:t>[2] S. </a:t>
+            </a:r>
+            <a:r>
+              <a:rPr lang="en-GB" sz="1800" b="0" i="0" u="none" strike="noStrike" baseline="0" dirty="0" err="1">
+                <a:latin typeface="NimbusRomNo9L-Regu"/>
+              </a:rPr>
+              <a:t>Skogestad</a:t>
+            </a:r>
+            <a:r>
+              <a:rPr lang="en-GB" sz="1800" b="0" i="0" u="none" strike="noStrike" baseline="0" dirty="0">
+                <a:latin typeface="NimbusRomNo9L-Regu"/>
+              </a:rPr>
+              <a:t> and I. Postlethwaite, </a:t>
+            </a:r>
+            <a:r>
+              <a:rPr lang="en-GB" sz="1800" b="0" i="1" u="none" strike="noStrike" baseline="0" dirty="0">
+                <a:latin typeface="NimbusRomNo9L-ReguItal"/>
+              </a:rPr>
+              <a:t>Multivariable Feedback </a:t>
+            </a:r>
+            <a:r>
+              <a:rPr lang="en-US" sz="1800" b="0" i="1" u="none" strike="noStrike" baseline="0" dirty="0">
+                <a:latin typeface="NimbusRomNo9L-ReguItal"/>
+              </a:rPr>
+              <a:t>Control: Analysis and Design</a:t>
+            </a:r>
+            <a:r>
+              <a:rPr lang="en-US" sz="1800" b="0" i="1" u="none" strike="noStrike" baseline="0" dirty="0">
+                <a:latin typeface="NimbusRomNo9L-Regu"/>
+              </a:rPr>
+              <a:t>, 2nd ed</a:t>
+            </a:r>
+            <a:r>
+              <a:rPr lang="en-US" sz="1800" b="0" i="0" u="none" strike="noStrike" baseline="0" dirty="0">
+                <a:latin typeface="NimbusRomNo9L-Regu"/>
+              </a:rPr>
+              <a:t>. John Wiley and Sons Ltd, 2005, vol. 1. [Online].</a:t>
+            </a:r>
+          </a:p>
+          <a:p>
+            <a:pPr algn="l"/>
+            <a:r>
+              <a:rPr lang="en-US" sz="1800" b="0" i="0" u="none" strike="noStrike" baseline="0" dirty="0">
+                <a:latin typeface="NimbusRomNo9L-Regu"/>
+              </a:rPr>
+              <a:t>[3] G. </a:t>
+            </a:r>
+            <a:r>
+              <a:rPr lang="en-US" sz="1800" b="0" i="0" u="none" strike="noStrike" baseline="0" dirty="0" err="1">
+                <a:latin typeface="NimbusRomNo9L-Regu"/>
+              </a:rPr>
+              <a:t>Pannocchia</a:t>
+            </a:r>
+            <a:r>
+              <a:rPr lang="en-US" sz="1800" b="0" i="0" u="none" strike="noStrike" baseline="0" dirty="0">
+                <a:latin typeface="NimbusRomNo9L-Regu"/>
+              </a:rPr>
+              <a:t>, M. </a:t>
+            </a:r>
+            <a:r>
+              <a:rPr lang="en-US" sz="1800" b="0" i="0" u="none" strike="noStrike" baseline="0" dirty="0" err="1">
+                <a:latin typeface="NimbusRomNo9L-Regu"/>
+              </a:rPr>
+              <a:t>Gabiccini</a:t>
+            </a:r>
+            <a:r>
+              <a:rPr lang="en-US" sz="1800" b="0" i="0" u="none" strike="noStrike" baseline="0" dirty="0">
+                <a:latin typeface="NimbusRomNo9L-Regu"/>
+              </a:rPr>
+              <a:t>, and A. </a:t>
+            </a:r>
+            <a:r>
+              <a:rPr lang="en-US" sz="1800" b="0" i="0" u="none" strike="noStrike" baseline="0" dirty="0" err="1">
+                <a:latin typeface="NimbusRomNo9L-Regu"/>
+              </a:rPr>
+              <a:t>Artoni</a:t>
+            </a:r>
+            <a:r>
+              <a:rPr lang="en-US" sz="1800" b="0" i="0" u="none" strike="noStrike" baseline="0" dirty="0">
+                <a:latin typeface="NimbusRomNo9L-Regu"/>
+              </a:rPr>
+              <a:t>, </a:t>
+            </a:r>
+            <a:r>
+              <a:rPr lang="en-US" sz="1800" b="0" i="1" u="none" strike="noStrike" baseline="0" dirty="0">
+                <a:latin typeface="NimbusRomNo9L-Regu"/>
+              </a:rPr>
+              <a:t>Offset-free MPC explained: Novelties, subtleties, and applications</a:t>
+            </a:r>
+            <a:r>
+              <a:rPr lang="en-US" sz="1800" b="0" i="0" u="none" strike="noStrike" baseline="0" dirty="0">
+                <a:latin typeface="NimbusRomNo9L-Regu"/>
+              </a:rPr>
+              <a:t>, </a:t>
+            </a:r>
+            <a:r>
+              <a:rPr lang="en-US" sz="1800" b="0" i="0" u="none" strike="noStrike" baseline="0" dirty="0">
+                <a:latin typeface="NimbusRomNo9L-ReguItal"/>
+              </a:rPr>
+              <a:t>IFAC-</a:t>
+            </a:r>
+            <a:r>
+              <a:rPr lang="en-US" sz="1800" b="0" i="0" u="none" strike="noStrike" baseline="0" dirty="0" err="1">
+                <a:latin typeface="NimbusRomNo9L-ReguItal"/>
+              </a:rPr>
+              <a:t>PapersOnLine</a:t>
+            </a:r>
+            <a:r>
+              <a:rPr lang="en-US" sz="1800" b="0" i="0" u="none" strike="noStrike" baseline="0" dirty="0">
+                <a:latin typeface="NimbusRomNo9L-Regu"/>
+              </a:rPr>
+              <a:t>, </a:t>
+            </a:r>
+            <a:r>
+              <a:rPr lang="nl-NL" sz="1800" b="0" i="0" u="none" strike="noStrike" baseline="0" dirty="0">
+                <a:latin typeface="NimbusRomNo9L-Regu"/>
+              </a:rPr>
+              <a:t>vol. 48, no. 23, pp. 342–351, jan 2015.</a:t>
+            </a:r>
+          </a:p>
+          <a:p>
+            <a:pPr algn="l"/>
+            <a:r>
+              <a:rPr lang="en-US" sz="1800" b="0" i="0" u="none" strike="noStrike" baseline="0" dirty="0">
+                <a:latin typeface="NimbusRomNo9L-Regu"/>
+              </a:rPr>
+              <a:t>[4] S. Hu and W. Y. Yan, </a:t>
+            </a:r>
+            <a:r>
+              <a:rPr lang="en-US" sz="1800" b="0" i="1" u="none" strike="noStrike" baseline="0" dirty="0">
+                <a:latin typeface="NimbusRomNo9L-Regu"/>
+              </a:rPr>
+              <a:t>Stability robustness of networked control systems with respect to packet loss</a:t>
+            </a:r>
+            <a:r>
+              <a:rPr lang="en-US" sz="1800" b="0" i="0" u="none" strike="noStrike" baseline="0" dirty="0">
+                <a:latin typeface="NimbusRomNo9L-Regu"/>
+              </a:rPr>
+              <a:t>, </a:t>
+            </a:r>
+            <a:r>
+              <a:rPr lang="en-US" sz="1800" b="0" i="0" u="none" strike="noStrike" baseline="0" dirty="0" err="1">
+                <a:latin typeface="NimbusRomNo9L-ReguItal"/>
+              </a:rPr>
+              <a:t>Automatica</a:t>
+            </a:r>
+            <a:r>
+              <a:rPr lang="en-US" sz="1800" b="0" i="0" u="none" strike="noStrike" baseline="0" dirty="0">
+                <a:latin typeface="NimbusRomNo9L-Regu"/>
+              </a:rPr>
+              <a:t>, vol. 43, no. 7, pp. 1243–1248, </a:t>
+            </a:r>
+            <a:r>
+              <a:rPr lang="en-GB" sz="1800" b="0" i="0" u="none" strike="noStrike" baseline="0" dirty="0" err="1">
+                <a:latin typeface="NimbusRomNo9L-Regu"/>
+              </a:rPr>
+              <a:t>jul</a:t>
+            </a:r>
+            <a:r>
+              <a:rPr lang="en-GB" sz="1800" b="0" i="0" u="none" strike="noStrike" baseline="0" dirty="0">
+                <a:latin typeface="NimbusRomNo9L-Regu"/>
+              </a:rPr>
+              <a:t> 2007.</a:t>
+            </a:r>
+            <a:endParaRPr lang="en-DK" sz="2400" dirty="0"/>
           </a:p>
         </p:txBody>
       </p:sp>
@@ -9455,7 +10075,7 @@
         </p:nvGrpSpPr>
         <p:grpSpPr>
           <a:xfrm>
-            <a:off x="11364729" y="11092475"/>
+            <a:off x="11364729" y="12080856"/>
             <a:ext cx="7582375" cy="11630519"/>
             <a:chOff x="11682276" y="15207564"/>
             <a:chExt cx="7582375" cy="11630519"/>
@@ -9496,7 +10116,7 @@
               <p:nvPr/>
             </p:nvPicPr>
             <p:blipFill>
-              <a:blip r:embed="rId15">
+              <a:blip r:embed="rId16">
                 <a:extLst>
                   <a:ext uri="{28A0092B-C50C-407E-A947-70E740481C1C}">
                     <a14:useLocalDpi xmlns:a14="http://schemas.microsoft.com/office/drawing/2010/main" val="0"/>
@@ -9532,7 +10152,7 @@
               <p:nvPr/>
             </p:nvPicPr>
             <p:blipFill>
-              <a:blip r:embed="rId16"/>
+              <a:blip r:embed="rId17"/>
               <a:stretch>
                 <a:fillRect/>
               </a:stretch>
@@ -9562,7 +10182,7 @@
               <p:nvPr/>
             </p:nvPicPr>
             <p:blipFill>
-              <a:blip r:embed="rId17"/>
+              <a:blip r:embed="rId18"/>
               <a:stretch>
                 <a:fillRect/>
               </a:stretch>
@@ -9593,7 +10213,7 @@
             <p:nvPr/>
           </p:nvPicPr>
           <p:blipFill>
-            <a:blip r:embed="rId18">
+            <a:blip r:embed="rId19">
               <a:extLst>
                 <a:ext uri="{28A0092B-C50C-407E-A947-70E740481C1C}">
                   <a14:useLocalDpi xmlns:a14="http://schemas.microsoft.com/office/drawing/2010/main" val="0"/>
@@ -9653,7 +10273,7 @@
         </p:nvSpPr>
         <p:spPr bwMode="auto">
           <a:xfrm>
-            <a:off x="18772255" y="20583593"/>
+            <a:off x="18772255" y="21571974"/>
             <a:ext cx="10914289" cy="2050952"/>
           </a:xfrm>
           <a:prstGeom prst="roundRect">
@@ -9706,6 +10326,60 @@
               </a:solidFill>
               <a:effectLst/>
               <a:latin typeface="Arial" charset="0"/>
+            </a:endParaRPr>
+          </a:p>
+        </p:txBody>
+      </p:sp>
+      <p:sp>
+        <p:nvSpPr>
+          <p:cNvPr id="63" name="TextBox 62">
+            <a:extLst>
+              <a:ext uri="{FF2B5EF4-FFF2-40B4-BE49-F238E27FC236}">
+                <a16:creationId xmlns:a16="http://schemas.microsoft.com/office/drawing/2014/main" id="{D6B33400-CD1D-47EF-8FA8-9469982E6B0F}"/>
+              </a:ext>
+            </a:extLst>
+          </p:cNvPr>
+          <p:cNvSpPr txBox="1"/>
+          <p:nvPr/>
+        </p:nvSpPr>
+        <p:spPr>
+          <a:xfrm>
+            <a:off x="22055931" y="41106994"/>
+            <a:ext cx="8878824" cy="1200329"/>
+          </a:xfrm>
+          <a:prstGeom prst="rect">
+            <a:avLst/>
+          </a:prstGeom>
+          <a:noFill/>
+        </p:spPr>
+        <p:txBody>
+          <a:bodyPr wrap="square">
+            <a:spAutoFit/>
+          </a:bodyPr>
+          <a:lstStyle/>
+          <a:p>
+            <a:pPr eaLnBrk="1" hangingPunct="1">
+              <a:spcBef>
+                <a:spcPct val="0"/>
+              </a:spcBef>
+              <a:buNone/>
+            </a:pPr>
+            <a:r>
+              <a:rPr lang="en-GB" altLang="en-US" sz="3600" dirty="0">
+                <a:solidFill>
+                  <a:schemeClr val="bg1"/>
+                </a:solidFill>
+                <a:latin typeface="Helvetica" panose="020B0604020202020204" pitchFamily="34" charset="0"/>
+                <a:cs typeface="Helvetica" panose="020B0604020202020204" pitchFamily="34" charset="0"/>
+              </a:rPr>
+              <a:t>Department of Electronic Systems, Aalborg University, Denmark</a:t>
+            </a:r>
+            <a:endParaRPr lang="en-GB" altLang="en-US" sz="5400" dirty="0">
+              <a:solidFill>
+                <a:schemeClr val="bg1"/>
+              </a:solidFill>
+              <a:latin typeface="Helvetica" panose="020B0604020202020204" pitchFamily="34" charset="0"/>
+              <a:cs typeface="Helvetica" panose="020B0604020202020204" pitchFamily="34" charset="0"/>
             </a:endParaRPr>
           </a:p>
         </p:txBody>
@@ -10559,4 +11233,299 @@
     </a:extraClrScheme>
   </a:extraClrSchemeLst>
 </a:theme>
+</file>
+
+<file path=ppt/theme/theme2.xml><?xml version="1.0" encoding="utf-8"?>
+<a:theme xmlns:a="http://schemas.openxmlformats.org/drawingml/2006/main" name="Office Theme">
+  <a:themeElements>
+    <a:clrScheme name="Office">
+      <a:dk1>
+        <a:sysClr val="windowText" lastClr="000000"/>
+      </a:dk1>
+      <a:lt1>
+        <a:sysClr val="window" lastClr="FFFFFF"/>
+      </a:lt1>
+      <a:dk2>
+        <a:srgbClr val="44546A"/>
+      </a:dk2>
+      <a:lt2>
+        <a:srgbClr val="E7E6E6"/>
+      </a:lt2>
+      <a:accent1>
+        <a:srgbClr val="4472C4"/>
+      </a:accent1>
+      <a:accent2>
+        <a:srgbClr val="ED7D31"/>
+      </a:accent2>
+      <a:accent3>
+        <a:srgbClr val="A5A5A5"/>
+      </a:accent3>
+      <a:accent4>
+        <a:srgbClr val="FFC000"/>
+      </a:accent4>
+      <a:accent5>
+        <a:srgbClr val="5B9BD5"/>
+      </a:accent5>
+      <a:accent6>
+        <a:srgbClr val="70AD47"/>
+      </a:accent6>
+      <a:hlink>
+        <a:srgbClr val="0563C1"/>
+      </a:hlink>
+      <a:folHlink>
+        <a:srgbClr val="954F72"/>
+      </a:folHlink>
+    </a:clrScheme>
+    <a:fontScheme name="Office">
+      <a:majorFont>
+        <a:latin typeface="Calibri Light" panose="020F0302020204030204"/>
+        <a:ea typeface=""/>
+        <a:cs typeface=""/>
+        <a:font script="Jpan" typeface="游ゴシック Light"/>
+        <a:font script="Hang" typeface="맑은 고딕"/>
+        <a:font script="Hans" typeface="等线 Light"/>
+        <a:font script="Hant" typeface="新細明體"/>
+        <a:font script="Arab" typeface="Times New Roman"/>
+        <a:font script="Hebr" typeface="Times New Roman"/>
+        <a:font script="Thai" typeface="Angsana New"/>
+        <a:font script="Ethi" typeface="Nyala"/>
+        <a:font script="Beng" typeface="Vrinda"/>
+        <a:font script="Gujr" typeface="Shruti"/>
+        <a:font script="Khmr" typeface="MoolBoran"/>
+        <a:font script="Knda" typeface="Tunga"/>
+        <a:font script="Guru" typeface="Raavi"/>
+        <a:font script="Cans" typeface="Euphemia"/>
+        <a:font script="Cher" typeface="Plantagenet Cherokee"/>
+        <a:font script="Yiii" typeface="Microsoft Yi Baiti"/>
+        <a:font script="Tibt" typeface="Microsoft Himalaya"/>
+        <a:font script="Thaa" typeface="MV Boli"/>
+        <a:font script="Deva" typeface="Mangal"/>
+        <a:font script="Telu" typeface="Gautami"/>
+        <a:font script="Taml" typeface="Latha"/>
+        <a:font script="Syrc" typeface="Estrangelo Edessa"/>
+        <a:font script="Orya" typeface="Kalinga"/>
+        <a:font script="Mlym" typeface="Kartika"/>
+        <a:font script="Laoo" typeface="DokChampa"/>
+        <a:font script="Sinh" typeface="Iskoola Pota"/>
+        <a:font script="Mong" typeface="Mongolian Baiti"/>
+        <a:font script="Viet" typeface="Times New Roman"/>
+        <a:font script="Uigh" typeface="Microsoft Uighur"/>
+        <a:font script="Geor" typeface="Sylfaen"/>
+        <a:font script="Armn" typeface="Arial"/>
+        <a:font script="Bugi" typeface="Leelawadee UI"/>
+        <a:font script="Bopo" typeface="Microsoft JhengHei"/>
+        <a:font script="Java" typeface="Javanese Text"/>
+        <a:font script="Lisu" typeface="Segoe UI"/>
+        <a:font script="Mymr" typeface="Myanmar Text"/>
+        <a:font script="Nkoo" typeface="Ebrima"/>
+        <a:font script="Olck" typeface="Nirmala UI"/>
+        <a:font script="Osma" typeface="Ebrima"/>
+        <a:font script="Phag" typeface="Phagspa"/>
+        <a:font script="Syrn" typeface="Estrangelo Edessa"/>
+        <a:font script="Syrj" typeface="Estrangelo Edessa"/>
+        <a:font script="Syre" typeface="Estrangelo Edessa"/>
+        <a:font script="Sora" typeface="Nirmala UI"/>
+        <a:font script="Tale" typeface="Microsoft Tai Le"/>
+        <a:font script="Talu" typeface="Microsoft New Tai Lue"/>
+        <a:font script="Tfng" typeface="Ebrima"/>
+      </a:majorFont>
+      <a:minorFont>
+        <a:latin typeface="Calibri" panose="020F0502020204030204"/>
+        <a:ea typeface=""/>
+        <a:cs typeface=""/>
+        <a:font script="Jpan" typeface="游ゴシック"/>
+        <a:font script="Hang" typeface="맑은 고딕"/>
+        <a:font script="Hans" typeface="等线"/>
+        <a:font script="Hant" typeface="新細明體"/>
+        <a:font script="Arab" typeface="Arial"/>
+        <a:font script="Hebr" typeface="Arial"/>
+        <a:font script="Thai" typeface="Cordia New"/>
+        <a:font script="Ethi" typeface="Nyala"/>
+        <a:font script="Beng" typeface="Vrinda"/>
+        <a:font script="Gujr" typeface="Shruti"/>
+        <a:font script="Khmr" typeface="DaunPenh"/>
+        <a:font script="Knda" typeface="Tunga"/>
+        <a:font script="Guru" typeface="Raavi"/>
+        <a:font script="Cans" typeface="Euphemia"/>
+        <a:font script="Cher" typeface="Plantagenet Cherokee"/>
+        <a:font script="Yiii" typeface="Microsoft Yi Baiti"/>
+        <a:font script="Tibt" typeface="Microsoft Himalaya"/>
+        <a:font script="Thaa" typeface="MV Boli"/>
+        <a:font script="Deva" typeface="Mangal"/>
+        <a:font script="Telu" typeface="Gautami"/>
+        <a:font script="Taml" typeface="Latha"/>
+        <a:font script="Syrc" typeface="Estrangelo Edessa"/>
+        <a:font script="Orya" typeface="Kalinga"/>
+        <a:font script="Mlym" typeface="Kartika"/>
+        <a:font script="Laoo" typeface="DokChampa"/>
+        <a:font script="Sinh" typeface="Iskoola Pota"/>
+        <a:font script="Mong" typeface="Mongolian Baiti"/>
+        <a:font script="Viet" typeface="Arial"/>
+        <a:font script="Uigh" typeface="Microsoft Uighur"/>
+        <a:font script="Geor" typeface="Sylfaen"/>
+        <a:font script="Armn" typeface="Arial"/>
+        <a:font script="Bugi" typeface="Leelawadee UI"/>
+        <a:font script="Bopo" typeface="Microsoft JhengHei"/>
+        <a:font script="Java" typeface="Javanese Text"/>
+        <a:font script="Lisu" typeface="Segoe UI"/>
+        <a:font script="Mymr" typeface="Myanmar Text"/>
+        <a:font script="Nkoo" typeface="Ebrima"/>
+        <a:font script="Olck" typeface="Nirmala UI"/>
+        <a:font script="Osma" typeface="Ebrima"/>
+        <a:font script="Phag" typeface="Phagspa"/>
+        <a:font script="Syrn" typeface="Estrangelo Edessa"/>
+        <a:font script="Syrj" typeface="Estrangelo Edessa"/>
+        <a:font script="Syre" typeface="Estrangelo Edessa"/>
+        <a:font script="Sora" typeface="Nirmala UI"/>
+        <a:font script="Tale" typeface="Microsoft Tai Le"/>
+        <a:font script="Talu" typeface="Microsoft New Tai Lue"/>
+        <a:font script="Tfng" typeface="Ebrima"/>
+      </a:minorFont>
+    </a:fontScheme>
+    <a:fmtScheme name="Office">
+      <a:fillStyleLst>
+        <a:solidFill>
+          <a:schemeClr val="phClr"/>
+        </a:solidFill>
+        <a:gradFill rotWithShape="1">
+          <a:gsLst>
+            <a:gs pos="0">
+              <a:schemeClr val="phClr">
+                <a:lumMod val="110000"/>
+                <a:satMod val="105000"/>
+                <a:tint val="67000"/>
+              </a:schemeClr>
+            </a:gs>
+            <a:gs pos="50000">
+              <a:schemeClr val="phClr">
+                <a:lumMod val="105000"/>
+                <a:satMod val="103000"/>
+                <a:tint val="73000"/>
+              </a:schemeClr>
+            </a:gs>
+            <a:gs pos="100000">
+              <a:schemeClr val="phClr">
+                <a:lumMod val="105000"/>
+                <a:satMod val="109000"/>
+                <a:tint val="81000"/>
+              </a:schemeClr>
+            </a:gs>
+          </a:gsLst>
+          <a:lin ang="5400000" scaled="0"/>
+        </a:gradFill>
+        <a:gradFill rotWithShape="1">
+          <a:gsLst>
+            <a:gs pos="0">
+              <a:schemeClr val="phClr">
+                <a:satMod val="103000"/>
+                <a:lumMod val="102000"/>
+                <a:tint val="94000"/>
+              </a:schemeClr>
+            </a:gs>
+            <a:gs pos="50000">
+              <a:schemeClr val="phClr">
+                <a:satMod val="110000"/>
+                <a:lumMod val="100000"/>
+                <a:shade val="100000"/>
+              </a:schemeClr>
+            </a:gs>
+            <a:gs pos="100000">
+              <a:schemeClr val="phClr">
+                <a:lumMod val="99000"/>
+                <a:satMod val="120000"/>
+                <a:shade val="78000"/>
+              </a:schemeClr>
+            </a:gs>
+          </a:gsLst>
+          <a:lin ang="5400000" scaled="0"/>
+        </a:gradFill>
+      </a:fillStyleLst>
+      <a:lnStyleLst>
+        <a:ln w="6350" cap="flat" cmpd="sng" algn="ctr">
+          <a:solidFill>
+            <a:schemeClr val="phClr"/>
+          </a:solidFill>
+          <a:prstDash val="solid"/>
+          <a:miter lim="800000"/>
+        </a:ln>
+        <a:ln w="12700" cap="flat" cmpd="sng" algn="ctr">
+          <a:solidFill>
+            <a:schemeClr val="phClr"/>
+          </a:solidFill>
+          <a:prstDash val="solid"/>
+          <a:miter lim="800000"/>
+        </a:ln>
+        <a:ln w="19050" cap="flat" cmpd="sng" algn="ctr">
+          <a:solidFill>
+            <a:schemeClr val="phClr"/>
+          </a:solidFill>
+          <a:prstDash val="solid"/>
+          <a:miter lim="800000"/>
+        </a:ln>
+      </a:lnStyleLst>
+      <a:effectStyleLst>
+        <a:effectStyle>
+          <a:effectLst/>
+        </a:effectStyle>
+        <a:effectStyle>
+          <a:effectLst/>
+        </a:effectStyle>
+        <a:effectStyle>
+          <a:effectLst>
+            <a:outerShdw blurRad="57150" dist="19050" dir="5400000" algn="ctr" rotWithShape="0">
+              <a:srgbClr val="000000">
+                <a:alpha val="63000"/>
+              </a:srgbClr>
+            </a:outerShdw>
+          </a:effectLst>
+        </a:effectStyle>
+      </a:effectStyleLst>
+      <a:bgFillStyleLst>
+        <a:solidFill>
+          <a:schemeClr val="phClr"/>
+        </a:solidFill>
+        <a:solidFill>
+          <a:schemeClr val="phClr">
+            <a:tint val="95000"/>
+            <a:satMod val="170000"/>
+          </a:schemeClr>
+        </a:solidFill>
+        <a:gradFill rotWithShape="1">
+          <a:gsLst>
+            <a:gs pos="0">
+              <a:schemeClr val="phClr">
+                <a:tint val="93000"/>
+                <a:satMod val="150000"/>
+                <a:shade val="98000"/>
+                <a:lumMod val="102000"/>
+              </a:schemeClr>
+            </a:gs>
+            <a:gs pos="50000">
+              <a:schemeClr val="phClr">
+                <a:tint val="98000"/>
+                <a:satMod val="130000"/>
+                <a:shade val="90000"/>
+                <a:lumMod val="103000"/>
+              </a:schemeClr>
+            </a:gs>
+            <a:gs pos="100000">
+              <a:schemeClr val="phClr">
+                <a:shade val="63000"/>
+                <a:satMod val="120000"/>
+              </a:schemeClr>
+            </a:gs>
+          </a:gsLst>
+          <a:lin ang="5400000" scaled="0"/>
+        </a:gradFill>
+      </a:bgFillStyleLst>
+    </a:fmtScheme>
+  </a:themeElements>
+  <a:objectDefaults/>
+  <a:extraClrSchemeLst/>
+  <a:extLst>
+    <a:ext uri="{05A4C25C-085E-4340-85A3-A5531E510DB2}">
+      <thm15:themeFamily xmlns:thm15="http://schemas.microsoft.com/office/thememl/2012/main" name="Office Theme" id="{62F939B6-93AF-4DB8-9C6B-D6C7DFDC589F}" vid="{4A3C46E8-61CC-4603-A589-7422A47A8E4A}"/>
+    </a:ext>
+  </a:extLst>
+</a:theme>
 </file>
</xml_diff>